<commit_message>
Added AI, ML, & DL definition slides to intro presentation.
</commit_message>
<xml_diff>
--- a/presentations/01_deep_learn_intro.pptx
+++ b/presentations/01_deep_learn_intro.pptx
@@ -5,22 +5,26 @@
     <p:sldMasterId id="2147483648" r:id="rId1"/>
   </p:sldMasterIdLst>
   <p:notesMasterIdLst>
-    <p:notesMasterId r:id="rId15"/>
+    <p:notesMasterId r:id="rId19"/>
   </p:notesMasterIdLst>
   <p:sldIdLst>
     <p:sldId id="326" r:id="rId2"/>
-    <p:sldId id="257" r:id="rId3"/>
+    <p:sldId id="346" r:id="rId3"/>
     <p:sldId id="303" r:id="rId4"/>
     <p:sldId id="323" r:id="rId5"/>
     <p:sldId id="274" r:id="rId6"/>
-    <p:sldId id="302" r:id="rId7"/>
-    <p:sldId id="325" r:id="rId8"/>
-    <p:sldId id="301" r:id="rId9"/>
-    <p:sldId id="290" r:id="rId10"/>
-    <p:sldId id="295" r:id="rId11"/>
-    <p:sldId id="296" r:id="rId12"/>
-    <p:sldId id="297" r:id="rId13"/>
-    <p:sldId id="305" r:id="rId14"/>
+    <p:sldId id="334" r:id="rId7"/>
+    <p:sldId id="335" r:id="rId8"/>
+    <p:sldId id="281" r:id="rId9"/>
+    <p:sldId id="325" r:id="rId10"/>
+    <p:sldId id="301" r:id="rId11"/>
+    <p:sldId id="290" r:id="rId12"/>
+    <p:sldId id="295" r:id="rId13"/>
+    <p:sldId id="296" r:id="rId14"/>
+    <p:sldId id="297" r:id="rId15"/>
+    <p:sldId id="305" r:id="rId16"/>
+    <p:sldId id="347" r:id="rId17"/>
+    <p:sldId id="302" r:id="rId18"/>
   </p:sldIdLst>
   <p:sldSz cx="12192000" cy="6858000"/>
   <p:notesSz cx="7023100" cy="9309100"/>
@@ -220,7 +224,7 @@
           <a:p>
             <a:fld id="{FD93C9B2-20F6-4DB1-B471-224337D0AC79}" type="datetimeFigureOut">
               <a:rPr lang="en-US" smtClean="0"/>
-              <a:t>10/20/2021</a:t>
+              <a:t>3/18/2022</a:t>
             </a:fld>
             <a:endParaRPr lang="en-US"/>
           </a:p>
@@ -656,119 +660,9 @@
           <a:lstStyle/>
           <a:p>
             <a:r>
-              <a:rPr lang="en-US" sz="1100" b="0" i="0" dirty="0">
-                <a:solidFill>
-                  <a:srgbClr val="3C3C3B"/>
-                </a:solidFill>
-                <a:effectLst/>
-                <a:latin typeface="Calibri" panose="020F0502020204030204" pitchFamily="34" charset="0"/>
-                <a:cs typeface="Calibri" panose="020F0502020204030204" pitchFamily="34" charset="0"/>
-              </a:rPr>
-              <a:t>A </a:t>
-            </a:r>
-            <a:r>
-              <a:rPr lang="en-US" sz="1100" b="1" i="0" dirty="0">
-                <a:solidFill>
-                  <a:srgbClr val="3C3C3B"/>
-                </a:solidFill>
-                <a:effectLst/>
-                <a:latin typeface="Calibri" panose="020F0502020204030204" pitchFamily="34" charset="0"/>
-                <a:cs typeface="Calibri" panose="020F0502020204030204" pitchFamily="34" charset="0"/>
-              </a:rPr>
-              <a:t>convolutional neural network (CNN) </a:t>
-            </a:r>
-            <a:r>
-              <a:rPr lang="en-US" sz="1100" b="0" i="0" dirty="0">
-                <a:solidFill>
-                  <a:srgbClr val="3C3C3B"/>
-                </a:solidFill>
-                <a:effectLst/>
-                <a:latin typeface="Calibri" panose="020F0502020204030204" pitchFamily="34" charset="0"/>
-                <a:cs typeface="Calibri" panose="020F0502020204030204" pitchFamily="34" charset="0"/>
-              </a:rPr>
-              <a:t>is a class of AI models that are predominantly used for image recognition.  In a fully connected neural network, each neuron in a layer is connected to every other neuron in the next layer.  CNNs, however, adopt a different strategy and do not employ a fully connected architecture. Instead, CNNs extract local features from images, which are then fed to the subsequent layers.  Some application of CNNs include:</a:t>
-            </a:r>
-          </a:p>
-          <a:p>
-            <a:endParaRPr lang="en-US" sz="1100" b="0" i="0" dirty="0">
-              <a:solidFill>
-                <a:srgbClr val="3C3C3B"/>
-              </a:solidFill>
-              <a:effectLst/>
-              <a:latin typeface="Calibri" panose="020F0502020204030204" pitchFamily="34" charset="0"/>
-              <a:cs typeface="Calibri" panose="020F0502020204030204" pitchFamily="34" charset="0"/>
-            </a:endParaRPr>
-          </a:p>
-          <a:p>
-            <a:pPr marL="233309" indent="-233309" defTabSz="933237">
-              <a:buFontTx/>
-              <a:buAutoNum type="arabicPeriod"/>
-              <a:defRPr/>
-            </a:pPr>
-            <a:r>
-              <a:rPr lang="en-US" sz="1100" b="0" i="0" dirty="0">
-                <a:solidFill>
-                  <a:srgbClr val="000000"/>
-                </a:solidFill>
-                <a:effectLst/>
-                <a:latin typeface="Calibri" panose="020F0502020204030204" pitchFamily="34" charset="0"/>
-                <a:cs typeface="Calibri" panose="020F0502020204030204" pitchFamily="34" charset="0"/>
-              </a:rPr>
-              <a:t>Image processing</a:t>
-            </a:r>
-          </a:p>
-          <a:p>
-            <a:pPr marL="233309" indent="-233309" defTabSz="933237">
-              <a:buFontTx/>
-              <a:buAutoNum type="arabicPeriod"/>
-              <a:defRPr/>
-            </a:pPr>
-            <a:r>
-              <a:rPr lang="en-US" sz="1100" b="0" i="0" dirty="0">
-                <a:solidFill>
-                  <a:srgbClr val="000000"/>
-                </a:solidFill>
-                <a:effectLst/>
-                <a:latin typeface="Calibri" panose="020F0502020204030204" pitchFamily="34" charset="0"/>
-                <a:cs typeface="Calibri" panose="020F0502020204030204" pitchFamily="34" charset="0"/>
-              </a:rPr>
-              <a:t>Computer Vision</a:t>
-            </a:r>
-          </a:p>
-          <a:p>
-            <a:pPr marL="233309" indent="-233309" defTabSz="933237">
-              <a:buFontTx/>
-              <a:buAutoNum type="arabicPeriod"/>
-              <a:defRPr/>
-            </a:pPr>
-            <a:r>
-              <a:rPr lang="en-US" sz="1100" b="0" i="0" dirty="0">
-                <a:solidFill>
-                  <a:srgbClr val="000000"/>
-                </a:solidFill>
-                <a:effectLst/>
-                <a:latin typeface="Calibri" panose="020F0502020204030204" pitchFamily="34" charset="0"/>
-                <a:cs typeface="Calibri" panose="020F0502020204030204" pitchFamily="34" charset="0"/>
-              </a:rPr>
-              <a:t>Speech Recognition</a:t>
-            </a:r>
-          </a:p>
-          <a:p>
-            <a:pPr marL="233309" indent="-233309" defTabSz="933237">
-              <a:buFontTx/>
-              <a:buAutoNum type="arabicPeriod"/>
-              <a:defRPr/>
-            </a:pPr>
-            <a:endParaRPr lang="en-US" b="0" i="0" dirty="0">
-              <a:solidFill>
-                <a:srgbClr val="000000"/>
-              </a:solidFill>
-              <a:effectLst/>
-              <a:latin typeface="Lato"/>
-            </a:endParaRPr>
-          </a:p>
-          <a:p>
-            <a:endParaRPr lang="en-US" dirty="0"/>
+              <a:rPr lang="en-US" dirty="0"/>
+              <a:t>There are a variety of neural network types and innovation is ongoing in this area.  So, I’d like to conclude this presentation with a brief overview of some of the more popular architectures, including their various applications.</a:t>
+            </a:r>
           </a:p>
         </p:txBody>
       </p:sp>
@@ -798,7 +692,7 @@
     </p:spTree>
     <p:extLst>
       <p:ext uri="{BB962C8B-B14F-4D97-AF65-F5344CB8AC3E}">
-        <p14:creationId xmlns:p14="http://schemas.microsoft.com/office/powerpoint/2010/main" val="345247314"/>
+        <p14:creationId xmlns:p14="http://schemas.microsoft.com/office/powerpoint/2010/main" val="3873866018"/>
       </p:ext>
     </p:extLst>
   </p:cSld>
@@ -853,15 +747,24 @@
           <a:lstStyle/>
           <a:p>
             <a:r>
+              <a:rPr lang="en-US" sz="1100" b="0" i="0" dirty="0">
+                <a:solidFill>
+                  <a:srgbClr val="3C3C3B"/>
+                </a:solidFill>
+                <a:effectLst/>
+                <a:latin typeface="+mn-lt"/>
+              </a:rPr>
+              <a:t>The </a:t>
+            </a:r>
+            <a:r>
               <a:rPr lang="en-US" sz="1100" b="1" i="0" dirty="0">
                 <a:solidFill>
                   <a:srgbClr val="3C3C3B"/>
                 </a:solidFill>
                 <a:effectLst/>
-                <a:latin typeface="Calibri" panose="020F0502020204030204" pitchFamily="34" charset="0"/>
-                <a:cs typeface="Calibri" panose="020F0502020204030204" pitchFamily="34" charset="0"/>
-              </a:rPr>
-              <a:t>Recurrent neural networks (RNNs) </a:t>
+                <a:latin typeface="+mn-lt"/>
+              </a:rPr>
+              <a:t>multi-layer perceptron</a:t>
             </a:r>
             <a:r>
               <a:rPr lang="en-US" sz="1100" b="0" i="0" dirty="0">
@@ -869,10 +772,29 @@
                   <a:srgbClr val="3C3C3B"/>
                 </a:solidFill>
                 <a:effectLst/>
-                <a:latin typeface="Calibri" panose="020F0502020204030204" pitchFamily="34" charset="0"/>
-                <a:cs typeface="Calibri" panose="020F0502020204030204" pitchFamily="34" charset="0"/>
-              </a:rPr>
-              <a:t>propagate data forward, but also backwards.  As pictured here, the red arrow indicates that the hidden layer connects back to itself, thereby allowing the network to remember what it has already done. </a:t>
+                <a:latin typeface="+mn-lt"/>
+              </a:rPr>
+              <a:t> (</a:t>
+            </a:r>
+            <a:r>
+              <a:rPr lang="en-US" sz="1100" b="1" i="0" dirty="0">
+                <a:solidFill>
+                  <a:srgbClr val="3C3C3B"/>
+                </a:solidFill>
+                <a:effectLst/>
+                <a:latin typeface="+mn-lt"/>
+              </a:rPr>
+              <a:t>MLP</a:t>
+            </a:r>
+            <a:r>
+              <a:rPr lang="en-US" sz="1100" b="0" i="0" dirty="0">
+                <a:solidFill>
+                  <a:srgbClr val="3C3C3B"/>
+                </a:solidFill>
+                <a:effectLst/>
+                <a:latin typeface="+mn-lt"/>
+              </a:rPr>
+              <a:t>) is a basic type of neural network. An MLP is also known as a feed-forward network.  Applications of the multi-layer perceptron include:</a:t>
             </a:r>
           </a:p>
           <a:p>
@@ -881,53 +803,12 @@
                 <a:srgbClr val="3C3C3B"/>
               </a:solidFill>
               <a:effectLst/>
-              <a:latin typeface="Calibri" panose="020F0502020204030204" pitchFamily="34" charset="0"/>
-              <a:cs typeface="Calibri" panose="020F0502020204030204" pitchFamily="34" charset="0"/>
+              <a:latin typeface="+mn-lt"/>
             </a:endParaRPr>
           </a:p>
           <a:p>
-            <a:r>
-              <a:rPr lang="en-US" sz="1100" b="0" i="0" dirty="0">
-                <a:solidFill>
-                  <a:srgbClr val="3C3C3B"/>
-                </a:solidFill>
-                <a:effectLst/>
-                <a:latin typeface="Calibri" panose="020F0502020204030204" pitchFamily="34" charset="0"/>
-                <a:cs typeface="Calibri" panose="020F0502020204030204" pitchFamily="34" charset="0"/>
-              </a:rPr>
-              <a:t>Some application of RNNs include:</a:t>
-            </a:r>
-          </a:p>
-          <a:p>
-            <a:endParaRPr lang="en-US" sz="1100" b="0" i="0" dirty="0">
-              <a:solidFill>
-                <a:srgbClr val="3C3C3B"/>
-              </a:solidFill>
-              <a:effectLst/>
-              <a:latin typeface="Calibri" panose="020F0502020204030204" pitchFamily="34" charset="0"/>
-              <a:cs typeface="Calibri" panose="020F0502020204030204" pitchFamily="34" charset="0"/>
-            </a:endParaRPr>
-          </a:p>
-          <a:p>
-            <a:pPr marL="233309" indent="-233309">
-              <a:buFont typeface="Arial" panose="020B0604020202020204" pitchFamily="34" charset="0"/>
-              <a:buAutoNum type="arabicPeriod"/>
-            </a:pPr>
-            <a:r>
-              <a:rPr lang="en-US" sz="1100" b="0" i="0" dirty="0">
-                <a:solidFill>
-                  <a:srgbClr val="000000"/>
-                </a:solidFill>
-                <a:effectLst/>
-                <a:latin typeface="Calibri" panose="020F0502020204030204" pitchFamily="34" charset="0"/>
-                <a:cs typeface="Calibri" panose="020F0502020204030204" pitchFamily="34" charset="0"/>
-              </a:rPr>
-              <a:t>Text processing like auto suggest, grammar checks, etc.</a:t>
-            </a:r>
-          </a:p>
-          <a:p>
             <a:pPr marL="233309" indent="-233309" defTabSz="933237">
-              <a:buFont typeface="Arial" panose="020B0604020202020204" pitchFamily="34" charset="0"/>
+              <a:buFontTx/>
               <a:buAutoNum type="arabicPeriod"/>
               <a:defRPr/>
             </a:pPr>
@@ -937,15 +818,14 @@
                   <a:srgbClr val="000000"/>
                 </a:solidFill>
                 <a:effectLst/>
-                <a:latin typeface="Calibri" panose="020F0502020204030204" pitchFamily="34" charset="0"/>
-                <a:cs typeface="Calibri" panose="020F0502020204030204" pitchFamily="34" charset="0"/>
-              </a:rPr>
-              <a:t>Text to speech processing</a:t>
+                <a:latin typeface="+mn-lt"/>
+              </a:rPr>
+              <a:t>Complex Classification</a:t>
             </a:r>
           </a:p>
           <a:p>
             <a:pPr marL="233309" indent="-233309" defTabSz="933237">
-              <a:buFont typeface="Arial" panose="020B0604020202020204" pitchFamily="34" charset="0"/>
+              <a:buFontTx/>
               <a:buAutoNum type="arabicPeriod"/>
               <a:defRPr/>
             </a:pPr>
@@ -955,47 +835,25 @@
                   <a:srgbClr val="000000"/>
                 </a:solidFill>
                 <a:effectLst/>
-                <a:latin typeface="Calibri" panose="020F0502020204030204" pitchFamily="34" charset="0"/>
-                <a:cs typeface="Calibri" panose="020F0502020204030204" pitchFamily="34" charset="0"/>
-              </a:rPr>
-              <a:t>Sentiment Analysis</a:t>
-            </a:r>
-          </a:p>
-          <a:p>
-            <a:pPr marL="233309" indent="-233309" defTabSz="933237">
-              <a:buFont typeface="Arial" panose="020B0604020202020204" pitchFamily="34" charset="0"/>
-              <a:buAutoNum type="arabicPeriod"/>
+                <a:latin typeface="+mn-lt"/>
+              </a:rPr>
+              <a:t>Machine Translation</a:t>
+            </a:r>
+          </a:p>
+          <a:p>
+            <a:pPr defTabSz="933237">
               <a:defRPr/>
             </a:pPr>
-            <a:r>
-              <a:rPr lang="en-US" sz="1100" b="0" i="0" dirty="0">
-                <a:solidFill>
-                  <a:srgbClr val="000000"/>
-                </a:solidFill>
-                <a:effectLst/>
-                <a:latin typeface="Calibri" panose="020F0502020204030204" pitchFamily="34" charset="0"/>
-                <a:cs typeface="Calibri" panose="020F0502020204030204" pitchFamily="34" charset="0"/>
-              </a:rPr>
-              <a:t>Time sequence projections</a:t>
-            </a:r>
-          </a:p>
-          <a:p>
-            <a:pPr marL="233309" indent="-233309" defTabSz="933237">
-              <a:buFont typeface="Arial" panose="020B0604020202020204" pitchFamily="34" charset="0"/>
-              <a:buAutoNum type="arabicPeriod"/>
-              <a:defRPr/>
-            </a:pPr>
-            <a:r>
-              <a:rPr lang="en-US" sz="1100" b="0" i="0" dirty="0">
-                <a:solidFill>
-                  <a:srgbClr val="000000"/>
-                </a:solidFill>
-                <a:effectLst/>
-                <a:latin typeface="Calibri" panose="020F0502020204030204" pitchFamily="34" charset="0"/>
-                <a:cs typeface="Calibri" panose="020F0502020204030204" pitchFamily="34" charset="0"/>
-              </a:rPr>
-              <a:t>Translation</a:t>
-            </a:r>
+            <a:endParaRPr lang="en-US" b="0" i="0" dirty="0">
+              <a:solidFill>
+                <a:srgbClr val="000000"/>
+              </a:solidFill>
+              <a:effectLst/>
+              <a:latin typeface="Lato"/>
+            </a:endParaRPr>
+          </a:p>
+          <a:p>
+            <a:endParaRPr lang="en-US" dirty="0"/>
           </a:p>
         </p:txBody>
       </p:sp>
@@ -1025,7 +883,7 @@
     </p:spTree>
     <p:extLst>
       <p:ext uri="{BB962C8B-B14F-4D97-AF65-F5344CB8AC3E}">
-        <p14:creationId xmlns:p14="http://schemas.microsoft.com/office/powerpoint/2010/main" val="4149381120"/>
+        <p14:creationId xmlns:p14="http://schemas.microsoft.com/office/powerpoint/2010/main" val="473801370"/>
       </p:ext>
     </p:extLst>
   </p:cSld>
@@ -1079,107 +937,120 @@
           <a:bodyPr/>
           <a:lstStyle/>
           <a:p>
-            <a:pPr marL="0" marR="0" lvl="0" indent="0" algn="l" defTabSz="914400" rtl="0" eaLnBrk="1" fontAlgn="auto" latinLnBrk="0" hangingPunct="1">
-              <a:lnSpc>
-                <a:spcPct val="100000"/>
-              </a:lnSpc>
-              <a:spcBef>
-                <a:spcPts val="0"/>
-              </a:spcBef>
-              <a:spcAft>
-                <a:spcPts val="0"/>
-              </a:spcAft>
-              <a:buClrTx/>
-              <a:buSzTx/>
-              <a:buFontTx/>
-              <a:buNone/>
-              <a:tabLst/>
-              <a:defRPr/>
-            </a:pPr>
-            <a:r>
-              <a:rPr lang="en-US" sz="1100" dirty="0">
-                <a:latin typeface="+mn-lt"/>
+            <a:r>
+              <a:rPr lang="en-US" sz="1100" b="0" i="0" dirty="0">
+                <a:solidFill>
+                  <a:srgbClr val="3C3C3B"/>
+                </a:solidFill>
+                <a:effectLst/>
+                <a:latin typeface="Calibri" panose="020F0502020204030204" pitchFamily="34" charset="0"/>
+                <a:cs typeface="Calibri" panose="020F0502020204030204" pitchFamily="34" charset="0"/>
               </a:rPr>
               <a:t>A </a:t>
             </a:r>
             <a:r>
-              <a:rPr lang="en-US" sz="1100" b="1" dirty="0">
-                <a:latin typeface="+mn-lt"/>
-              </a:rPr>
-              <a:t>generative adversarial network (GAN) </a:t>
-            </a:r>
-            <a:r>
-              <a:rPr lang="en-US" sz="1100" dirty="0">
-                <a:latin typeface="+mn-lt"/>
-              </a:rPr>
-              <a:t>is a model in which two neural networks compete with each other to become more accurate in their predictions.  The two neural networks that make up a GAN are referred to as the generator and the discriminator. The goal of the generator is to artificially manufacture outputs that could easily be mistaken for real data. The goal of the discriminator is to identify which outputs it receives have been artificially created.</a:t>
-            </a:r>
-          </a:p>
-          <a:p>
-            <a:endParaRPr lang="en-US" sz="1100" b="1" i="0" dirty="0">
+              <a:rPr lang="en-US" sz="1100" b="1" i="0" dirty="0">
+                <a:solidFill>
+                  <a:srgbClr val="3C3C3B"/>
+                </a:solidFill>
+                <a:effectLst/>
+                <a:latin typeface="Calibri" panose="020F0502020204030204" pitchFamily="34" charset="0"/>
+                <a:cs typeface="Calibri" panose="020F0502020204030204" pitchFamily="34" charset="0"/>
+              </a:rPr>
+              <a:t>convolutional neural network (CNN) </a:t>
+            </a:r>
+            <a:r>
+              <a:rPr lang="en-US" sz="1100" b="0" i="0" dirty="0">
+                <a:solidFill>
+                  <a:srgbClr val="3C3C3B"/>
+                </a:solidFill>
+                <a:effectLst/>
+                <a:latin typeface="Calibri" panose="020F0502020204030204" pitchFamily="34" charset="0"/>
+                <a:cs typeface="Calibri" panose="020F0502020204030204" pitchFamily="34" charset="0"/>
+              </a:rPr>
+              <a:t>is a class of AI models that are predominantly used for image recognition.  In a fully connected neural network, each neuron in a layer is connected to every other neuron in the next layer.  CNNs, however, adopt a different strategy and do not employ a fully connected architecture. Instead, CNNs extract local features from images, which are then fed to the subsequent layers.  Some application of CNNs include:</a:t>
+            </a:r>
+          </a:p>
+          <a:p>
+            <a:endParaRPr lang="en-US" sz="1100" b="0" i="0" dirty="0">
               <a:solidFill>
                 <a:srgbClr val="3C3C3B"/>
               </a:solidFill>
               <a:effectLst/>
-              <a:latin typeface="+mn-lt"/>
+              <a:latin typeface="Calibri" panose="020F0502020204030204" pitchFamily="34" charset="0"/>
+              <a:cs typeface="Calibri" panose="020F0502020204030204" pitchFamily="34" charset="0"/>
             </a:endParaRPr>
           </a:p>
           <a:p>
-            <a:pPr algn="l"/>
-            <a:r>
-              <a:rPr lang="en-US" sz="1800" b="0" i="0" u="none" strike="noStrike" baseline="0" dirty="0">
-                <a:latin typeface="OpenSans"/>
-              </a:rPr>
-              <a:t>GANs are a big area of research, and there are many use cases for them. Some of the useful applications of GANs are as follows:</a:t>
-            </a:r>
-          </a:p>
-          <a:p>
-            <a:pPr algn="l"/>
-            <a:endParaRPr lang="en-US" sz="1800" b="0" i="0" u="none" strike="noStrike" baseline="0" dirty="0">
-              <a:latin typeface="OpenSans"/>
+            <a:pPr marL="233309" indent="-233309" defTabSz="933237">
+              <a:buFontTx/>
+              <a:buAutoNum type="arabicPeriod"/>
+              <a:defRPr/>
+            </a:pPr>
+            <a:r>
+              <a:rPr lang="en-US" sz="1100" b="0" i="0" dirty="0">
+                <a:solidFill>
+                  <a:srgbClr val="000000"/>
+                </a:solidFill>
+                <a:effectLst/>
+                <a:latin typeface="Calibri" panose="020F0502020204030204" pitchFamily="34" charset="0"/>
+                <a:cs typeface="Calibri" panose="020F0502020204030204" pitchFamily="34" charset="0"/>
+              </a:rPr>
+              <a:t>Image processing</a:t>
+            </a:r>
+          </a:p>
+          <a:p>
+            <a:pPr marL="233309" indent="-233309" defTabSz="933237">
+              <a:buFontTx/>
+              <a:buAutoNum type="arabicPeriod"/>
+              <a:defRPr/>
+            </a:pPr>
+            <a:r>
+              <a:rPr lang="en-US" sz="1100" b="0" i="0" dirty="0">
+                <a:solidFill>
+                  <a:srgbClr val="000000"/>
+                </a:solidFill>
+                <a:effectLst/>
+                <a:latin typeface="Calibri" panose="020F0502020204030204" pitchFamily="34" charset="0"/>
+                <a:cs typeface="Calibri" panose="020F0502020204030204" pitchFamily="34" charset="0"/>
+              </a:rPr>
+              <a:t>Computer Vision</a:t>
+            </a:r>
+          </a:p>
+          <a:p>
+            <a:pPr marL="233309" indent="-233309" defTabSz="933237">
+              <a:buFontTx/>
+              <a:buAutoNum type="arabicPeriod"/>
+              <a:defRPr/>
+            </a:pPr>
+            <a:r>
+              <a:rPr lang="en-US" sz="1100" b="0" i="0" dirty="0">
+                <a:solidFill>
+                  <a:srgbClr val="000000"/>
+                </a:solidFill>
+                <a:effectLst/>
+                <a:latin typeface="Calibri" panose="020F0502020204030204" pitchFamily="34" charset="0"/>
+                <a:cs typeface="Calibri" panose="020F0502020204030204" pitchFamily="34" charset="0"/>
+              </a:rPr>
+              <a:t>Speech Recognition</a:t>
+            </a:r>
+          </a:p>
+          <a:p>
+            <a:pPr marL="233309" indent="-233309" defTabSz="933237">
+              <a:buFontTx/>
+              <a:buAutoNum type="arabicPeriod"/>
+              <a:defRPr/>
+            </a:pPr>
+            <a:endParaRPr lang="en-US" b="0" i="0" dirty="0">
+              <a:solidFill>
+                <a:srgbClr val="000000"/>
+              </a:solidFill>
+              <a:effectLst/>
+              <a:latin typeface="Lato"/>
             </a:endParaRPr>
           </a:p>
           <a:p>
-            <a:pPr algn="l"/>
-            <a:r>
-              <a:rPr lang="en-US" sz="1800" b="0" i="0" u="none" strike="noStrike" baseline="0" dirty="0">
-                <a:latin typeface="OpenSans"/>
-              </a:rPr>
-              <a:t>• Image translation</a:t>
-            </a:r>
-          </a:p>
-          <a:p>
-            <a:pPr algn="l"/>
-            <a:r>
-              <a:rPr lang="en-US" sz="1800" b="0" i="0" u="none" strike="noStrike" baseline="0" dirty="0">
-                <a:latin typeface="OpenSans"/>
-              </a:rPr>
-              <a:t>• Text to image synthesis</a:t>
-            </a:r>
-          </a:p>
-          <a:p>
-            <a:pPr algn="l"/>
-            <a:r>
-              <a:rPr lang="en-US" sz="1800" b="0" i="0" u="none" strike="noStrike" baseline="0" dirty="0">
-                <a:latin typeface="OpenSans"/>
-              </a:rPr>
-              <a:t>• Generating videos</a:t>
-            </a:r>
-          </a:p>
-          <a:p>
-            <a:pPr algn="l"/>
-            <a:r>
-              <a:rPr lang="en-US" sz="1800" b="0" i="0" u="none" strike="noStrike" baseline="0" dirty="0">
-                <a:latin typeface="OpenSans"/>
-              </a:rPr>
-              <a:t>• The restoration of art</a:t>
-            </a:r>
-          </a:p>
-          <a:p>
-            <a:pPr algn="l"/>
-            <a:endParaRPr lang="en-US" sz="1800" b="0" i="0" u="none" strike="noStrike" baseline="0" dirty="0">
-              <a:latin typeface="OpenSans"/>
-            </a:endParaRPr>
+            <a:endParaRPr lang="en-US" dirty="0"/>
           </a:p>
         </p:txBody>
       </p:sp>
@@ -1209,7 +1080,7 @@
     </p:spTree>
     <p:extLst>
       <p:ext uri="{BB962C8B-B14F-4D97-AF65-F5344CB8AC3E}">
-        <p14:creationId xmlns:p14="http://schemas.microsoft.com/office/powerpoint/2010/main" val="2474625203"/>
+        <p14:creationId xmlns:p14="http://schemas.microsoft.com/office/powerpoint/2010/main" val="345247314"/>
       </p:ext>
     </p:extLst>
   </p:cSld>
@@ -1264,24 +1135,148 @@
           <a:lstStyle/>
           <a:p>
             <a:r>
-              <a:rPr lang="en-US" dirty="0"/>
-              <a:t>For additional practice, I recommend that you read the </a:t>
-            </a:r>
-            <a:r>
-              <a:rPr lang="en-US" i="1" dirty="0"/>
-              <a:t>Introduction to Tensorflow </a:t>
-            </a:r>
-            <a:r>
-              <a:rPr lang="en-US" dirty="0"/>
-              <a:t>as well as the </a:t>
-            </a:r>
-            <a:r>
-              <a:rPr lang="en-US" i="1" dirty="0"/>
-              <a:t>Linear Algebra with Tensorflow </a:t>
-            </a:r>
-            <a:r>
-              <a:rPr lang="en-US" dirty="0"/>
-              <a:t>sections, found in the latter half of chapter 1 of our textbook.  The exercises listed in this slide review the basic operations of linear algebra – matrix multiplication, etc…  The matrix multiplication video embedded in the exercise-1.03 Jupyter Notebook is also worth watching.</a:t>
+              <a:rPr lang="en-US" sz="1100" b="1" i="0" dirty="0">
+                <a:solidFill>
+                  <a:srgbClr val="3C3C3B"/>
+                </a:solidFill>
+                <a:effectLst/>
+                <a:latin typeface="Calibri" panose="020F0502020204030204" pitchFamily="34" charset="0"/>
+                <a:cs typeface="Calibri" panose="020F0502020204030204" pitchFamily="34" charset="0"/>
+              </a:rPr>
+              <a:t>Recurrent neural networks (RNNs) </a:t>
+            </a:r>
+            <a:r>
+              <a:rPr lang="en-US" sz="1100" b="0" i="0" dirty="0">
+                <a:solidFill>
+                  <a:srgbClr val="3C3C3B"/>
+                </a:solidFill>
+                <a:effectLst/>
+                <a:latin typeface="Calibri" panose="020F0502020204030204" pitchFamily="34" charset="0"/>
+                <a:cs typeface="Calibri" panose="020F0502020204030204" pitchFamily="34" charset="0"/>
+              </a:rPr>
+              <a:t>propagate data forward, but also backwards.  As pictured here, the red arrow indicates that the hidden layer connects back to itself, thereby allowing the network to remember what it has already done. </a:t>
+            </a:r>
+          </a:p>
+          <a:p>
+            <a:endParaRPr lang="en-US" sz="1100" b="0" i="0" dirty="0">
+              <a:solidFill>
+                <a:srgbClr val="3C3C3B"/>
+              </a:solidFill>
+              <a:effectLst/>
+              <a:latin typeface="Calibri" panose="020F0502020204030204" pitchFamily="34" charset="0"/>
+              <a:cs typeface="Calibri" panose="020F0502020204030204" pitchFamily="34" charset="0"/>
+            </a:endParaRPr>
+          </a:p>
+          <a:p>
+            <a:r>
+              <a:rPr lang="en-US" sz="1100" b="0" i="0" dirty="0">
+                <a:solidFill>
+                  <a:srgbClr val="3C3C3B"/>
+                </a:solidFill>
+                <a:effectLst/>
+                <a:latin typeface="Calibri" panose="020F0502020204030204" pitchFamily="34" charset="0"/>
+                <a:cs typeface="Calibri" panose="020F0502020204030204" pitchFamily="34" charset="0"/>
+              </a:rPr>
+              <a:t>Some application of RNNs include:</a:t>
+            </a:r>
+          </a:p>
+          <a:p>
+            <a:endParaRPr lang="en-US" sz="1100" b="0" i="0" dirty="0">
+              <a:solidFill>
+                <a:srgbClr val="3C3C3B"/>
+              </a:solidFill>
+              <a:effectLst/>
+              <a:latin typeface="Calibri" panose="020F0502020204030204" pitchFamily="34" charset="0"/>
+              <a:cs typeface="Calibri" panose="020F0502020204030204" pitchFamily="34" charset="0"/>
+            </a:endParaRPr>
+          </a:p>
+          <a:p>
+            <a:pPr marL="233309" indent="-233309">
+              <a:buFont typeface="Arial" panose="020B0604020202020204" pitchFamily="34" charset="0"/>
+              <a:buAutoNum type="arabicPeriod"/>
+            </a:pPr>
+            <a:r>
+              <a:rPr lang="en-US" sz="1100" b="0" i="0" dirty="0">
+                <a:solidFill>
+                  <a:srgbClr val="000000"/>
+                </a:solidFill>
+                <a:effectLst/>
+                <a:latin typeface="Calibri" panose="020F0502020204030204" pitchFamily="34" charset="0"/>
+                <a:cs typeface="Calibri" panose="020F0502020204030204" pitchFamily="34" charset="0"/>
+              </a:rPr>
+              <a:t>Text processing like auto suggest, grammar checks, etc.</a:t>
+            </a:r>
+          </a:p>
+          <a:p>
+            <a:pPr marL="233309" indent="-233309" defTabSz="933237">
+              <a:buFont typeface="Arial" panose="020B0604020202020204" pitchFamily="34" charset="0"/>
+              <a:buAutoNum type="arabicPeriod"/>
+              <a:defRPr/>
+            </a:pPr>
+            <a:r>
+              <a:rPr lang="en-US" sz="1100" b="0" i="0" dirty="0">
+                <a:solidFill>
+                  <a:srgbClr val="000000"/>
+                </a:solidFill>
+                <a:effectLst/>
+                <a:latin typeface="Calibri" panose="020F0502020204030204" pitchFamily="34" charset="0"/>
+                <a:cs typeface="Calibri" panose="020F0502020204030204" pitchFamily="34" charset="0"/>
+              </a:rPr>
+              <a:t>Text to speech processing</a:t>
+            </a:r>
+          </a:p>
+          <a:p>
+            <a:pPr marL="233309" indent="-233309" defTabSz="933237">
+              <a:buFont typeface="Arial" panose="020B0604020202020204" pitchFamily="34" charset="0"/>
+              <a:buAutoNum type="arabicPeriod"/>
+              <a:defRPr/>
+            </a:pPr>
+            <a:r>
+              <a:rPr lang="en-US" sz="1100" b="0" i="0" dirty="0">
+                <a:solidFill>
+                  <a:srgbClr val="000000"/>
+                </a:solidFill>
+                <a:effectLst/>
+                <a:latin typeface="Calibri" panose="020F0502020204030204" pitchFamily="34" charset="0"/>
+                <a:cs typeface="Calibri" panose="020F0502020204030204" pitchFamily="34" charset="0"/>
+              </a:rPr>
+              <a:t>Sentiment Analysis</a:t>
+            </a:r>
+          </a:p>
+          <a:p>
+            <a:pPr marL="233309" indent="-233309" defTabSz="933237">
+              <a:buFont typeface="Arial" panose="020B0604020202020204" pitchFamily="34" charset="0"/>
+              <a:buAutoNum type="arabicPeriod"/>
+              <a:defRPr/>
+            </a:pPr>
+            <a:r>
+              <a:rPr lang="en-US" sz="1100" b="0" i="0" dirty="0">
+                <a:solidFill>
+                  <a:srgbClr val="000000"/>
+                </a:solidFill>
+                <a:effectLst/>
+                <a:latin typeface="Calibri" panose="020F0502020204030204" pitchFamily="34" charset="0"/>
+                <a:cs typeface="Calibri" panose="020F0502020204030204" pitchFamily="34" charset="0"/>
+              </a:rPr>
+              <a:t>Time sequence projections</a:t>
+            </a:r>
+          </a:p>
+          <a:p>
+            <a:pPr marL="233309" indent="-233309" defTabSz="933237">
+              <a:buFont typeface="Arial" panose="020B0604020202020204" pitchFamily="34" charset="0"/>
+              <a:buAutoNum type="arabicPeriod"/>
+              <a:defRPr/>
+            </a:pPr>
+            <a:r>
+              <a:rPr lang="en-US" sz="1100" b="0" i="0" dirty="0">
+                <a:solidFill>
+                  <a:srgbClr val="000000"/>
+                </a:solidFill>
+                <a:effectLst/>
+                <a:latin typeface="Calibri" panose="020F0502020204030204" pitchFamily="34" charset="0"/>
+                <a:cs typeface="Calibri" panose="020F0502020204030204" pitchFamily="34" charset="0"/>
+              </a:rPr>
+              <a:t>Translation</a:t>
             </a:r>
           </a:p>
         </p:txBody>
@@ -1312,7 +1307,465 @@
     </p:spTree>
     <p:extLst>
       <p:ext uri="{BB962C8B-B14F-4D97-AF65-F5344CB8AC3E}">
+        <p14:creationId xmlns:p14="http://schemas.microsoft.com/office/powerpoint/2010/main" val="4149381120"/>
+      </p:ext>
+    </p:extLst>
+  </p:cSld>
+  <p:clrMapOvr>
+    <a:masterClrMapping/>
+  </p:clrMapOvr>
+</p:notes>
+</file>
+
+<file path=ppt/notesSlides/notesSlide14.xml><?xml version="1.0" encoding="utf-8"?>
+<p:notes xmlns:a="http://schemas.openxmlformats.org/drawingml/2006/main" xmlns:r="http://schemas.openxmlformats.org/officeDocument/2006/relationships" xmlns:p="http://schemas.openxmlformats.org/presentationml/2006/main">
+  <p:cSld>
+    <p:spTree>
+      <p:nvGrpSpPr>
+        <p:cNvPr id="1" name=""/>
+        <p:cNvGrpSpPr/>
+        <p:nvPr/>
+      </p:nvGrpSpPr>
+      <p:grpSpPr>
+        <a:xfrm>
+          <a:off x="0" y="0"/>
+          <a:ext cx="0" cy="0"/>
+          <a:chOff x="0" y="0"/>
+          <a:chExt cx="0" cy="0"/>
+        </a:xfrm>
+      </p:grpSpPr>
+      <p:sp>
+        <p:nvSpPr>
+          <p:cNvPr id="2" name="Slide Image Placeholder 1"/>
+          <p:cNvSpPr>
+            <a:spLocks noGrp="1" noRot="1" noChangeAspect="1"/>
+          </p:cNvSpPr>
+          <p:nvPr>
+            <p:ph type="sldImg"/>
+          </p:nvPr>
+        </p:nvSpPr>
+        <p:spPr/>
+      </p:sp>
+      <p:sp>
+        <p:nvSpPr>
+          <p:cNvPr id="3" name="Notes Placeholder 2"/>
+          <p:cNvSpPr>
+            <a:spLocks noGrp="1"/>
+          </p:cNvSpPr>
+          <p:nvPr>
+            <p:ph type="body" idx="1"/>
+          </p:nvPr>
+        </p:nvSpPr>
+        <p:spPr/>
+        <p:txBody>
+          <a:bodyPr/>
+          <a:lstStyle/>
+          <a:p>
+            <a:pPr marL="0" marR="0" lvl="0" indent="0" algn="l" defTabSz="914400" rtl="0" eaLnBrk="1" fontAlgn="auto" latinLnBrk="0" hangingPunct="1">
+              <a:lnSpc>
+                <a:spcPct val="100000"/>
+              </a:lnSpc>
+              <a:spcBef>
+                <a:spcPts val="0"/>
+              </a:spcBef>
+              <a:spcAft>
+                <a:spcPts val="0"/>
+              </a:spcAft>
+              <a:buClrTx/>
+              <a:buSzTx/>
+              <a:buFontTx/>
+              <a:buNone/>
+              <a:tabLst/>
+              <a:defRPr/>
+            </a:pPr>
+            <a:r>
+              <a:rPr lang="en-US" sz="1100" dirty="0">
+                <a:latin typeface="+mn-lt"/>
+              </a:rPr>
+              <a:t>A </a:t>
+            </a:r>
+            <a:r>
+              <a:rPr lang="en-US" sz="1100" b="1" dirty="0">
+                <a:latin typeface="+mn-lt"/>
+              </a:rPr>
+              <a:t>generative adversarial network (GAN) </a:t>
+            </a:r>
+            <a:r>
+              <a:rPr lang="en-US" sz="1100" dirty="0">
+                <a:latin typeface="+mn-lt"/>
+              </a:rPr>
+              <a:t>is a model in which two neural networks compete with each other to become more accurate in their predictions.  The two neural networks that make up a GAN are referred to as the generator and the discriminator. The goal of the generator is to artificially manufacture outputs that could easily be mistaken for real data. The goal of the discriminator is to identify which outputs it receives have been artificially created.</a:t>
+            </a:r>
+          </a:p>
+          <a:p>
+            <a:endParaRPr lang="en-US" sz="1100" b="1" i="0" dirty="0">
+              <a:solidFill>
+                <a:srgbClr val="3C3C3B"/>
+              </a:solidFill>
+              <a:effectLst/>
+              <a:latin typeface="+mn-lt"/>
+            </a:endParaRPr>
+          </a:p>
+          <a:p>
+            <a:pPr algn="l"/>
+            <a:r>
+              <a:rPr lang="en-US" sz="1800" b="0" i="0" u="none" strike="noStrike" baseline="0" dirty="0">
+                <a:latin typeface="OpenSans"/>
+              </a:rPr>
+              <a:t>GANs are a big area of research, and there are many use cases for them. Some of the useful applications of GANs are as follows:</a:t>
+            </a:r>
+          </a:p>
+          <a:p>
+            <a:pPr algn="l"/>
+            <a:endParaRPr lang="en-US" sz="1800" b="0" i="0" u="none" strike="noStrike" baseline="0" dirty="0">
+              <a:latin typeface="OpenSans"/>
+            </a:endParaRPr>
+          </a:p>
+          <a:p>
+            <a:pPr algn="l"/>
+            <a:r>
+              <a:rPr lang="en-US" sz="1800" b="0" i="0" u="none" strike="noStrike" baseline="0" dirty="0">
+                <a:latin typeface="OpenSans"/>
+              </a:rPr>
+              <a:t>• Image translation</a:t>
+            </a:r>
+          </a:p>
+          <a:p>
+            <a:pPr algn="l"/>
+            <a:r>
+              <a:rPr lang="en-US" sz="1800" b="0" i="0" u="none" strike="noStrike" baseline="0" dirty="0">
+                <a:latin typeface="OpenSans"/>
+              </a:rPr>
+              <a:t>• Text to image synthesis</a:t>
+            </a:r>
+          </a:p>
+          <a:p>
+            <a:pPr algn="l"/>
+            <a:r>
+              <a:rPr lang="en-US" sz="1800" b="0" i="0" u="none" strike="noStrike" baseline="0" dirty="0">
+                <a:latin typeface="OpenSans"/>
+              </a:rPr>
+              <a:t>• Generating videos</a:t>
+            </a:r>
+          </a:p>
+          <a:p>
+            <a:pPr algn="l"/>
+            <a:r>
+              <a:rPr lang="en-US" sz="1800" b="0" i="0" u="none" strike="noStrike" baseline="0" dirty="0">
+                <a:latin typeface="OpenSans"/>
+              </a:rPr>
+              <a:t>• The restoration of art</a:t>
+            </a:r>
+          </a:p>
+          <a:p>
+            <a:pPr algn="l"/>
+            <a:endParaRPr lang="en-US" sz="1800" b="0" i="0" u="none" strike="noStrike" baseline="0" dirty="0">
+              <a:latin typeface="OpenSans"/>
+            </a:endParaRPr>
+          </a:p>
+        </p:txBody>
+      </p:sp>
+      <p:sp>
+        <p:nvSpPr>
+          <p:cNvPr id="4" name="Slide Number Placeholder 3"/>
+          <p:cNvSpPr>
+            <a:spLocks noGrp="1"/>
+          </p:cNvSpPr>
+          <p:nvPr>
+            <p:ph type="sldNum" sz="quarter" idx="5"/>
+          </p:nvPr>
+        </p:nvSpPr>
+        <p:spPr/>
+        <p:txBody>
+          <a:bodyPr/>
+          <a:lstStyle/>
+          <a:p>
+            <a:fld id="{3148858F-F1DB-4027-9C85-CCA6849540DD}" type="slidenum">
+              <a:rPr lang="en-US" smtClean="0"/>
+              <a:t>14</a:t>
+            </a:fld>
+            <a:endParaRPr lang="en-US"/>
+          </a:p>
+        </p:txBody>
+      </p:sp>
+    </p:spTree>
+    <p:extLst>
+      <p:ext uri="{BB962C8B-B14F-4D97-AF65-F5344CB8AC3E}">
+        <p14:creationId xmlns:p14="http://schemas.microsoft.com/office/powerpoint/2010/main" val="2474625203"/>
+      </p:ext>
+    </p:extLst>
+  </p:cSld>
+  <p:clrMapOvr>
+    <a:masterClrMapping/>
+  </p:clrMapOvr>
+</p:notes>
+</file>
+
+<file path=ppt/notesSlides/notesSlide15.xml><?xml version="1.0" encoding="utf-8"?>
+<p:notes xmlns:a="http://schemas.openxmlformats.org/drawingml/2006/main" xmlns:r="http://schemas.openxmlformats.org/officeDocument/2006/relationships" xmlns:p="http://schemas.openxmlformats.org/presentationml/2006/main">
+  <p:cSld>
+    <p:spTree>
+      <p:nvGrpSpPr>
+        <p:cNvPr id="1" name=""/>
+        <p:cNvGrpSpPr/>
+        <p:nvPr/>
+      </p:nvGrpSpPr>
+      <p:grpSpPr>
+        <a:xfrm>
+          <a:off x="0" y="0"/>
+          <a:ext cx="0" cy="0"/>
+          <a:chOff x="0" y="0"/>
+          <a:chExt cx="0" cy="0"/>
+        </a:xfrm>
+      </p:grpSpPr>
+      <p:sp>
+        <p:nvSpPr>
+          <p:cNvPr id="2" name="Slide Image Placeholder 1"/>
+          <p:cNvSpPr>
+            <a:spLocks noGrp="1" noRot="1" noChangeAspect="1"/>
+          </p:cNvSpPr>
+          <p:nvPr>
+            <p:ph type="sldImg"/>
+          </p:nvPr>
+        </p:nvSpPr>
+        <p:spPr/>
+      </p:sp>
+      <p:sp>
+        <p:nvSpPr>
+          <p:cNvPr id="3" name="Notes Placeholder 2"/>
+          <p:cNvSpPr>
+            <a:spLocks noGrp="1"/>
+          </p:cNvSpPr>
+          <p:nvPr>
+            <p:ph type="body" idx="1"/>
+          </p:nvPr>
+        </p:nvSpPr>
+        <p:spPr/>
+        <p:txBody>
+          <a:bodyPr/>
+          <a:lstStyle/>
+          <a:p>
+            <a:r>
+              <a:rPr lang="en-US" dirty="0"/>
+              <a:t>For additional practice, I recommend that you read the </a:t>
+            </a:r>
+            <a:r>
+              <a:rPr lang="en-US" i="1" dirty="0"/>
+              <a:t>Introduction to Tensorflow </a:t>
+            </a:r>
+            <a:r>
+              <a:rPr lang="en-US" dirty="0"/>
+              <a:t>as well as the </a:t>
+            </a:r>
+            <a:r>
+              <a:rPr lang="en-US" i="1" dirty="0"/>
+              <a:t>Linear Algebra with Tensorflow </a:t>
+            </a:r>
+            <a:r>
+              <a:rPr lang="en-US" dirty="0"/>
+              <a:t>sections, found in the latter half of chapter 1 of our textbook.  The exercises listed in this slide review the basic operations of linear algebra – matrix multiplication, etc…  The matrix multiplication video embedded in the exercise-1.03 Jupyter Notebook is also worth watching.</a:t>
+            </a:r>
+          </a:p>
+        </p:txBody>
+      </p:sp>
+      <p:sp>
+        <p:nvSpPr>
+          <p:cNvPr id="4" name="Slide Number Placeholder 3"/>
+          <p:cNvSpPr>
+            <a:spLocks noGrp="1"/>
+          </p:cNvSpPr>
+          <p:nvPr>
+            <p:ph type="sldNum" sz="quarter" idx="5"/>
+          </p:nvPr>
+        </p:nvSpPr>
+        <p:spPr/>
+        <p:txBody>
+          <a:bodyPr/>
+          <a:lstStyle/>
+          <a:p>
+            <a:fld id="{3148858F-F1DB-4027-9C85-CCA6849540DD}" type="slidenum">
+              <a:rPr lang="en-US" smtClean="0"/>
+              <a:t>15</a:t>
+            </a:fld>
+            <a:endParaRPr lang="en-US"/>
+          </a:p>
+        </p:txBody>
+      </p:sp>
+    </p:spTree>
+    <p:extLst>
+      <p:ext uri="{BB962C8B-B14F-4D97-AF65-F5344CB8AC3E}">
         <p14:creationId xmlns:p14="http://schemas.microsoft.com/office/powerpoint/2010/main" val="1974960137"/>
+      </p:ext>
+    </p:extLst>
+  </p:cSld>
+  <p:clrMapOvr>
+    <a:masterClrMapping/>
+  </p:clrMapOvr>
+</p:notes>
+</file>
+
+<file path=ppt/notesSlides/notesSlide16.xml><?xml version="1.0" encoding="utf-8"?>
+<p:notes xmlns:a="http://schemas.openxmlformats.org/drawingml/2006/main" xmlns:r="http://schemas.openxmlformats.org/officeDocument/2006/relationships" xmlns:p="http://schemas.openxmlformats.org/presentationml/2006/main">
+  <p:cSld>
+    <p:spTree>
+      <p:nvGrpSpPr>
+        <p:cNvPr id="1" name=""/>
+        <p:cNvGrpSpPr/>
+        <p:nvPr/>
+      </p:nvGrpSpPr>
+      <p:grpSpPr>
+        <a:xfrm>
+          <a:off x="0" y="0"/>
+          <a:ext cx="0" cy="0"/>
+          <a:chOff x="0" y="0"/>
+          <a:chExt cx="0" cy="0"/>
+        </a:xfrm>
+      </p:grpSpPr>
+      <p:sp>
+        <p:nvSpPr>
+          <p:cNvPr id="2" name="Slide Image Placeholder 1"/>
+          <p:cNvSpPr>
+            <a:spLocks noGrp="1" noRot="1" noChangeAspect="1"/>
+          </p:cNvSpPr>
+          <p:nvPr>
+            <p:ph type="sldImg"/>
+          </p:nvPr>
+        </p:nvSpPr>
+        <p:spPr/>
+      </p:sp>
+      <p:sp>
+        <p:nvSpPr>
+          <p:cNvPr id="3" name="Notes Placeholder 2"/>
+          <p:cNvSpPr>
+            <a:spLocks noGrp="1"/>
+          </p:cNvSpPr>
+          <p:nvPr>
+            <p:ph type="body" idx="1"/>
+          </p:nvPr>
+        </p:nvSpPr>
+        <p:spPr/>
+        <p:txBody>
+          <a:bodyPr/>
+          <a:lstStyle/>
+          <a:p>
+            <a:endParaRPr lang="en-US" dirty="0"/>
+          </a:p>
+        </p:txBody>
+      </p:sp>
+      <p:sp>
+        <p:nvSpPr>
+          <p:cNvPr id="4" name="Slide Number Placeholder 3"/>
+          <p:cNvSpPr>
+            <a:spLocks noGrp="1"/>
+          </p:cNvSpPr>
+          <p:nvPr>
+            <p:ph type="sldNum" sz="quarter" idx="5"/>
+          </p:nvPr>
+        </p:nvSpPr>
+        <p:spPr/>
+        <p:txBody>
+          <a:bodyPr/>
+          <a:lstStyle/>
+          <a:p>
+            <a:fld id="{3148858F-F1DB-4027-9C85-CCA6849540DD}" type="slidenum">
+              <a:rPr lang="en-US" smtClean="0"/>
+              <a:t>16</a:t>
+            </a:fld>
+            <a:endParaRPr lang="en-US"/>
+          </a:p>
+        </p:txBody>
+      </p:sp>
+    </p:spTree>
+    <p:extLst>
+      <p:ext uri="{BB962C8B-B14F-4D97-AF65-F5344CB8AC3E}">
+        <p14:creationId xmlns:p14="http://schemas.microsoft.com/office/powerpoint/2010/main" val="3573760847"/>
+      </p:ext>
+    </p:extLst>
+  </p:cSld>
+  <p:clrMapOvr>
+    <a:masterClrMapping/>
+  </p:clrMapOvr>
+</p:notes>
+</file>
+
+<file path=ppt/notesSlides/notesSlide17.xml><?xml version="1.0" encoding="utf-8"?>
+<p:notes xmlns:a="http://schemas.openxmlformats.org/drawingml/2006/main" xmlns:r="http://schemas.openxmlformats.org/officeDocument/2006/relationships" xmlns:p="http://schemas.openxmlformats.org/presentationml/2006/main">
+  <p:cSld>
+    <p:spTree>
+      <p:nvGrpSpPr>
+        <p:cNvPr id="1" name=""/>
+        <p:cNvGrpSpPr/>
+        <p:nvPr/>
+      </p:nvGrpSpPr>
+      <p:grpSpPr>
+        <a:xfrm>
+          <a:off x="0" y="0"/>
+          <a:ext cx="0" cy="0"/>
+          <a:chOff x="0" y="0"/>
+          <a:chExt cx="0" cy="0"/>
+        </a:xfrm>
+      </p:grpSpPr>
+      <p:sp>
+        <p:nvSpPr>
+          <p:cNvPr id="2" name="Slide Image Placeholder 1"/>
+          <p:cNvSpPr>
+            <a:spLocks noGrp="1" noRot="1" noChangeAspect="1"/>
+          </p:cNvSpPr>
+          <p:nvPr>
+            <p:ph type="sldImg"/>
+          </p:nvPr>
+        </p:nvSpPr>
+        <p:spPr/>
+      </p:sp>
+      <p:sp>
+        <p:nvSpPr>
+          <p:cNvPr id="3" name="Notes Placeholder 2"/>
+          <p:cNvSpPr>
+            <a:spLocks noGrp="1"/>
+          </p:cNvSpPr>
+          <p:nvPr>
+            <p:ph type="body" idx="1"/>
+          </p:nvPr>
+        </p:nvSpPr>
+        <p:spPr/>
+        <p:txBody>
+          <a:bodyPr/>
+          <a:lstStyle/>
+          <a:p>
+            <a:r>
+              <a:rPr lang="en-US" dirty="0"/>
+              <a:t>Now for those of you who have not worked in a JupyterLab environment, we encourage you to watch our Introduction to JupyterLab video.</a:t>
+            </a:r>
+          </a:p>
+        </p:txBody>
+      </p:sp>
+      <p:sp>
+        <p:nvSpPr>
+          <p:cNvPr id="4" name="Slide Number Placeholder 3"/>
+          <p:cNvSpPr>
+            <a:spLocks noGrp="1"/>
+          </p:cNvSpPr>
+          <p:nvPr>
+            <p:ph type="sldNum" sz="quarter" idx="5"/>
+          </p:nvPr>
+        </p:nvSpPr>
+        <p:spPr/>
+        <p:txBody>
+          <a:bodyPr/>
+          <a:lstStyle/>
+          <a:p>
+            <a:fld id="{3148858F-F1DB-4027-9C85-CCA6849540DD}" type="slidenum">
+              <a:rPr lang="en-US" smtClean="0"/>
+              <a:t>17</a:t>
+            </a:fld>
+            <a:endParaRPr lang="en-US"/>
+          </a:p>
+        </p:txBody>
+      </p:sp>
+    </p:spTree>
+    <p:extLst>
+      <p:ext uri="{BB962C8B-B14F-4D97-AF65-F5344CB8AC3E}">
+        <p14:creationId xmlns:p14="http://schemas.microsoft.com/office/powerpoint/2010/main" val="1328824333"/>
       </p:ext>
     </p:extLst>
   </p:cSld>
@@ -1366,40 +1819,17 @@
           <a:bodyPr/>
           <a:lstStyle/>
           <a:p>
-            <a:pPr defTabSz="933237">
-              <a:defRPr/>
-            </a:pPr>
-            <a:r>
-              <a:rPr lang="en-US" sz="1100" b="0" i="0" dirty="0">
-                <a:solidFill>
-                  <a:srgbClr val="2D3B45"/>
-                </a:solidFill>
-                <a:effectLst/>
-                <a:latin typeface="+mn-lt"/>
-              </a:rPr>
-              <a:t>Our textbook for this seminar is </a:t>
-            </a:r>
-            <a:r>
-              <a:rPr lang="en-US" sz="1100" b="0" i="1" dirty="0">
-                <a:solidFill>
-                  <a:srgbClr val="2D3B45"/>
-                </a:solidFill>
-                <a:effectLst/>
-                <a:latin typeface="+mn-lt"/>
-              </a:rPr>
-              <a:t>The Deep Learning Workshop </a:t>
-            </a:r>
-            <a:r>
-              <a:rPr lang="en-US" sz="1100" b="0" i="0" dirty="0">
-                <a:solidFill>
-                  <a:srgbClr val="2D3B45"/>
-                </a:solidFill>
-                <a:effectLst/>
-                <a:latin typeface="+mn-lt"/>
-              </a:rPr>
-              <a:t>from Packt Publishing.  We will provide you with an electronic copy of this book which contains the exercises you will be working on in class as well as out-of-class.  If you are not a UF student or employee, we encourage you to purchase an electronic or paper copy of this text.</a:t>
-            </a:r>
-            <a:endParaRPr lang="en-US" dirty="0"/>
+            <a:endParaRPr lang="en-US" dirty="0">
+              <a:latin typeface="Palatino Linotype" panose="02040502050505030304" pitchFamily="18" charset="0"/>
+            </a:endParaRPr>
+          </a:p>
+          <a:p>
+            <a:r>
+              <a:rPr lang="en-US" dirty="0">
+                <a:latin typeface="Palatino Linotype" panose="02040502050505030304" pitchFamily="18" charset="0"/>
+              </a:rPr>
+              <a:t> </a:t>
+            </a:r>
           </a:p>
         </p:txBody>
       </p:sp>
@@ -1429,7 +1859,7 @@
     </p:spTree>
     <p:extLst>
       <p:ext uri="{BB962C8B-B14F-4D97-AF65-F5344CB8AC3E}">
-        <p14:creationId xmlns:p14="http://schemas.microsoft.com/office/powerpoint/2010/main" val="3755491919"/>
+        <p14:creationId xmlns:p14="http://schemas.microsoft.com/office/powerpoint/2010/main" val="2023840696"/>
       </p:ext>
     </p:extLst>
   </p:cSld>
@@ -1739,6 +2169,173 @@
           <a:bodyPr/>
           <a:lstStyle/>
           <a:p>
+            <a:pPr marL="228600" indent="-228600">
+              <a:buAutoNum type="arabicPeriod"/>
+            </a:pPr>
+            <a:r>
+              <a:rPr lang="en-US" sz="1200" b="0" i="0" kern="1200" dirty="0">
+                <a:solidFill>
+                  <a:schemeClr val="tx1"/>
+                </a:solidFill>
+                <a:effectLst/>
+                <a:latin typeface="+mn-lt"/>
+                <a:ea typeface="+mn-ea"/>
+                <a:cs typeface="+mn-cs"/>
+              </a:rPr>
+              <a:t>Review of content from What is AI workshop</a:t>
+            </a:r>
+          </a:p>
+          <a:p>
+            <a:pPr marL="228600" lvl="0" indent="-228600">
+              <a:buAutoNum type="arabicPeriod"/>
+            </a:pPr>
+            <a:r>
+              <a:rPr lang="en-US" sz="1200" b="0" i="0" kern="1200" dirty="0">
+                <a:solidFill>
+                  <a:schemeClr val="tx1"/>
+                </a:solidFill>
+                <a:effectLst/>
+                <a:latin typeface="+mn-lt"/>
+                <a:ea typeface="+mn-ea"/>
+                <a:cs typeface="+mn-cs"/>
+              </a:rPr>
+              <a:t>Expansive AI</a:t>
+            </a:r>
+          </a:p>
+          <a:p>
+            <a:pPr marL="685800" marR="0" lvl="1" indent="-228600" algn="l" defTabSz="914400" rtl="0" eaLnBrk="1" fontAlgn="auto" latinLnBrk="0" hangingPunct="1">
+              <a:lnSpc>
+                <a:spcPct val="100000"/>
+              </a:lnSpc>
+              <a:spcBef>
+                <a:spcPts val="0"/>
+              </a:spcBef>
+              <a:spcAft>
+                <a:spcPts val="0"/>
+              </a:spcAft>
+              <a:buClrTx/>
+              <a:buSzTx/>
+              <a:buFontTx/>
+              <a:buAutoNum type="arabicPeriod"/>
+              <a:tabLst/>
+              <a:defRPr/>
+            </a:pPr>
+            <a:r>
+              <a:rPr lang="en-US" sz="1200" b="0" i="0" kern="1200" dirty="0">
+                <a:solidFill>
+                  <a:schemeClr val="tx1"/>
+                </a:solidFill>
+                <a:effectLst/>
+                <a:latin typeface="+mn-lt"/>
+                <a:ea typeface="+mn-ea"/>
+                <a:cs typeface="+mn-cs"/>
+              </a:rPr>
+              <a:t>AI encompasses ML and DL</a:t>
+            </a:r>
+          </a:p>
+          <a:p>
+            <a:pPr marL="685800" marR="0" lvl="1" indent="-228600" algn="l" defTabSz="914400" rtl="0" eaLnBrk="1" fontAlgn="auto" latinLnBrk="0" hangingPunct="1">
+              <a:lnSpc>
+                <a:spcPct val="100000"/>
+              </a:lnSpc>
+              <a:spcBef>
+                <a:spcPts val="0"/>
+              </a:spcBef>
+              <a:spcAft>
+                <a:spcPts val="0"/>
+              </a:spcAft>
+              <a:buClrTx/>
+              <a:buSzTx/>
+              <a:buFontTx/>
+              <a:buAutoNum type="arabicPeriod"/>
+              <a:tabLst/>
+              <a:defRPr/>
+            </a:pPr>
+            <a:r>
+              <a:rPr lang="en-US" sz="1200" b="0" i="0" kern="1200" dirty="0">
+                <a:solidFill>
+                  <a:schemeClr val="tx1"/>
+                </a:solidFill>
+                <a:effectLst/>
+                <a:latin typeface="+mn-lt"/>
+                <a:ea typeface="+mn-ea"/>
+                <a:cs typeface="+mn-cs"/>
+              </a:rPr>
+              <a:t>Distinct domains</a:t>
+            </a:r>
+          </a:p>
+          <a:p>
+            <a:pPr marL="228600" indent="-228600">
+              <a:buAutoNum type="arabicPeriod"/>
+            </a:pPr>
+            <a:r>
+              <a:rPr lang="en-US" sz="1200" b="0" i="0" kern="1200" dirty="0">
+                <a:solidFill>
+                  <a:schemeClr val="tx1"/>
+                </a:solidFill>
+                <a:effectLst/>
+                <a:latin typeface="+mn-lt"/>
+                <a:ea typeface="+mn-ea"/>
+                <a:cs typeface="+mn-cs"/>
+              </a:rPr>
+              <a:t>Uneven progress since the 1950’s, with multiple ‘winters’ where interest and funding dried up</a:t>
+            </a:r>
+          </a:p>
+          <a:p>
+            <a:pPr marL="228600" lvl="0" indent="-228600">
+              <a:buAutoNum type="arabicPeriod"/>
+            </a:pPr>
+            <a:r>
+              <a:rPr lang="en-US" b="0" i="0" kern="1200" dirty="0">
+                <a:solidFill>
+                  <a:schemeClr val="tx1"/>
+                </a:solidFill>
+                <a:effectLst/>
+                <a:latin typeface="+mn-lt"/>
+                <a:ea typeface="+mn-ea"/>
+                <a:cs typeface="+mn-cs"/>
+              </a:rPr>
+              <a:t>Let’s review and revisit definitions</a:t>
+            </a:r>
+            <a:endParaRPr lang="en-US" b="0" i="0" dirty="0">
+              <a:solidFill>
+                <a:srgbClr val="202122"/>
+              </a:solidFill>
+              <a:effectLst/>
+              <a:latin typeface="Arial" panose="020B0604020202020204" pitchFamily="34" charset="0"/>
+            </a:endParaRPr>
+          </a:p>
+          <a:p>
+            <a:pPr marL="228600" indent="-228600">
+              <a:buAutoNum type="arabicPeriod"/>
+            </a:pPr>
+            <a:endParaRPr lang="en-US" sz="1200" b="0" i="0" kern="1200" dirty="0">
+              <a:solidFill>
+                <a:schemeClr val="tx1"/>
+              </a:solidFill>
+              <a:effectLst/>
+              <a:latin typeface="+mn-lt"/>
+              <a:ea typeface="+mn-ea"/>
+              <a:cs typeface="+mn-cs"/>
+            </a:endParaRPr>
+          </a:p>
+          <a:p>
+            <a:r>
+              <a:rPr lang="en-US" sz="1100" b="0" i="0" dirty="0">
+                <a:solidFill>
+                  <a:schemeClr val="tx1">
+                    <a:lumMod val="65000"/>
+                    <a:lumOff val="35000"/>
+                  </a:schemeClr>
+                </a:solidFill>
+                <a:effectLst/>
+                <a:latin typeface="Calibri" panose="020F0502020204030204" pitchFamily="34" charset="0"/>
+                <a:cs typeface="Calibri" panose="020F0502020204030204" pitchFamily="34" charset="0"/>
+              </a:rPr>
+              <a:t>=====</a:t>
+            </a:r>
+          </a:p>
+          <a:p>
             <a:r>
               <a:rPr lang="en-US" sz="1100" b="0" i="0" dirty="0">
                 <a:solidFill>
@@ -1905,10 +2502,250 @@
           <a:bodyPr/>
           <a:lstStyle/>
           <a:p>
+            <a:pPr marL="228600" marR="0" lvl="0" indent="-228600" algn="l" defTabSz="914400" rtl="0" eaLnBrk="1" fontAlgn="auto" latinLnBrk="0" hangingPunct="1">
+              <a:lnSpc>
+                <a:spcPct val="100000"/>
+              </a:lnSpc>
+              <a:spcBef>
+                <a:spcPts val="0"/>
+              </a:spcBef>
+              <a:spcAft>
+                <a:spcPts val="0"/>
+              </a:spcAft>
+              <a:buClrTx/>
+              <a:buSzTx/>
+              <a:buFontTx/>
+              <a:buAutoNum type="arabicPeriod"/>
+              <a:tabLst/>
+              <a:defRPr/>
+            </a:pPr>
+            <a:r>
+              <a:rPr lang="en-US" b="0" i="0" dirty="0">
+                <a:solidFill>
+                  <a:srgbClr val="202122"/>
+                </a:solidFill>
+                <a:effectLst/>
+                <a:latin typeface="Arial" panose="020B0604020202020204" pitchFamily="34" charset="0"/>
+              </a:rPr>
+              <a:t>Leading AI textbooks define the field of Artificial Intelligence as the study of “intelligent or rational agents” – any system that perceives its environment and takes actions that maximize its chance of achieving its goals.</a:t>
+            </a:r>
+          </a:p>
+          <a:p>
+            <a:pPr marL="228600" marR="0" lvl="0" indent="-228600" algn="l" defTabSz="914400" rtl="0" eaLnBrk="1" fontAlgn="auto" latinLnBrk="0" hangingPunct="1">
+              <a:lnSpc>
+                <a:spcPct val="100000"/>
+              </a:lnSpc>
+              <a:spcBef>
+                <a:spcPts val="0"/>
+              </a:spcBef>
+              <a:spcAft>
+                <a:spcPts val="0"/>
+              </a:spcAft>
+              <a:buClrTx/>
+              <a:buSzTx/>
+              <a:buFontTx/>
+              <a:buAutoNum type="arabicPeriod"/>
+              <a:tabLst/>
+              <a:defRPr/>
+            </a:pPr>
+            <a:r>
+              <a:rPr lang="en-US" b="0" i="0" dirty="0">
+                <a:solidFill>
+                  <a:srgbClr val="202122"/>
+                </a:solidFill>
+                <a:effectLst/>
+                <a:latin typeface="Arial" panose="020B0604020202020204" pitchFamily="34" charset="0"/>
+              </a:rPr>
+              <a:t>Restatement of Russell &amp; Norvig’s definition – </a:t>
+            </a:r>
+            <a:r>
+              <a:rPr lang="en-US" b="0" i="1" dirty="0">
+                <a:solidFill>
+                  <a:srgbClr val="202122"/>
+                </a:solidFill>
+                <a:effectLst/>
+                <a:latin typeface="Arial" panose="020B0604020202020204" pitchFamily="34" charset="0"/>
+              </a:rPr>
+              <a:t>Artificial Intelligence: A Modern Approach</a:t>
+            </a:r>
+            <a:r>
+              <a:rPr lang="en-US" b="0" i="0" dirty="0">
+                <a:solidFill>
+                  <a:srgbClr val="202122"/>
+                </a:solidFill>
+                <a:effectLst/>
+                <a:latin typeface="Arial" panose="020B0604020202020204" pitchFamily="34" charset="0"/>
+              </a:rPr>
+              <a:t>, 2</a:t>
+            </a:r>
+            <a:r>
+              <a:rPr lang="en-US" b="0" i="0" baseline="30000" dirty="0">
+                <a:solidFill>
+                  <a:srgbClr val="202122"/>
+                </a:solidFill>
+                <a:effectLst/>
+                <a:latin typeface="Arial" panose="020B0604020202020204" pitchFamily="34" charset="0"/>
+              </a:rPr>
+              <a:t>nd</a:t>
+            </a:r>
+            <a:r>
+              <a:rPr lang="en-US" b="0" i="0" dirty="0">
+                <a:solidFill>
+                  <a:srgbClr val="202122"/>
+                </a:solidFill>
+                <a:effectLst/>
+                <a:latin typeface="Arial" panose="020B0604020202020204" pitchFamily="34" charset="0"/>
+              </a:rPr>
+              <a:t> edition – most widely used introductory text.</a:t>
+            </a:r>
+          </a:p>
+          <a:p>
+            <a:pPr marL="228600" marR="0" lvl="0" indent="-228600" algn="l" defTabSz="914400" rtl="0" eaLnBrk="1" fontAlgn="auto" latinLnBrk="0" hangingPunct="1">
+              <a:lnSpc>
+                <a:spcPct val="100000"/>
+              </a:lnSpc>
+              <a:spcBef>
+                <a:spcPts val="0"/>
+              </a:spcBef>
+              <a:spcAft>
+                <a:spcPts val="0"/>
+              </a:spcAft>
+              <a:buClrTx/>
+              <a:buSzTx/>
+              <a:buFontTx/>
+              <a:buAutoNum type="arabicPeriod"/>
+              <a:tabLst/>
+              <a:defRPr/>
+            </a:pPr>
+            <a:r>
+              <a:rPr lang="en-US" b="0" i="0" dirty="0">
+                <a:solidFill>
+                  <a:srgbClr val="202122"/>
+                </a:solidFill>
+                <a:effectLst/>
+                <a:latin typeface="Arial" panose="020B0604020202020204" pitchFamily="34" charset="0"/>
+              </a:rPr>
+              <a:t>AI system performance = humans in many cases.  </a:t>
+            </a:r>
+          </a:p>
+          <a:p>
+            <a:pPr marL="228600" marR="0" lvl="0" indent="-228600" algn="l" defTabSz="914400" rtl="0" eaLnBrk="1" fontAlgn="auto" latinLnBrk="0" hangingPunct="1">
+              <a:lnSpc>
+                <a:spcPct val="100000"/>
+              </a:lnSpc>
+              <a:spcBef>
+                <a:spcPts val="0"/>
+              </a:spcBef>
+              <a:spcAft>
+                <a:spcPts val="0"/>
+              </a:spcAft>
+              <a:buClrTx/>
+              <a:buSzTx/>
+              <a:buFontTx/>
+              <a:buAutoNum type="arabicPeriod"/>
+              <a:tabLst/>
+              <a:defRPr/>
+            </a:pPr>
+            <a:r>
+              <a:rPr lang="en-US" b="0" i="0" dirty="0">
+                <a:solidFill>
+                  <a:srgbClr val="202122"/>
+                </a:solidFill>
+                <a:effectLst/>
+                <a:latin typeface="Arial" panose="020B0604020202020204" pitchFamily="34" charset="0"/>
+              </a:rPr>
+              <a:t>Broad array of applications.</a:t>
+            </a:r>
+          </a:p>
+          <a:p>
+            <a:endParaRPr lang="en-US" sz="1200" b="0" i="0" kern="1200" dirty="0">
+              <a:solidFill>
+                <a:schemeClr val="tx1"/>
+              </a:solidFill>
+              <a:effectLst/>
+              <a:latin typeface="+mn-lt"/>
+              <a:ea typeface="+mn-ea"/>
+              <a:cs typeface="+mn-cs"/>
+            </a:endParaRPr>
+          </a:p>
+          <a:p>
+            <a:r>
+              <a:rPr lang="en-US" sz="1200" b="0" i="0" kern="1200" dirty="0">
+                <a:solidFill>
+                  <a:schemeClr val="tx1"/>
+                </a:solidFill>
+                <a:effectLst/>
+                <a:latin typeface="+mn-lt"/>
+                <a:ea typeface="+mn-ea"/>
+                <a:cs typeface="+mn-cs"/>
+              </a:rPr>
+              <a:t>=====</a:t>
+            </a:r>
+          </a:p>
+          <a:p>
+            <a:pPr marL="0" marR="0" lvl="0" indent="0" algn="l" defTabSz="914400" rtl="0" eaLnBrk="1" fontAlgn="auto" latinLnBrk="0" hangingPunct="1">
+              <a:lnSpc>
+                <a:spcPct val="100000"/>
+              </a:lnSpc>
+              <a:spcBef>
+                <a:spcPts val="0"/>
+              </a:spcBef>
+              <a:spcAft>
+                <a:spcPts val="0"/>
+              </a:spcAft>
+              <a:buClrTx/>
+              <a:buSzTx/>
+              <a:buFontTx/>
+              <a:buNone/>
+              <a:tabLst/>
+              <a:defRPr/>
+            </a:pPr>
+            <a:r>
+              <a:rPr lang="en-US" b="0" i="0" dirty="0">
+                <a:solidFill>
+                  <a:srgbClr val="202122"/>
+                </a:solidFill>
+                <a:effectLst/>
+                <a:latin typeface="Arial" panose="020B0604020202020204" pitchFamily="34" charset="0"/>
+              </a:rPr>
+              <a:t>Leading AI textbooks define the field of Artificial Intelligence as the study of “intelligent agents”: any system that perceives its environment and takes actions that maximize its chance of achieving its goals.  Such systems are now able to perform tasks humans are good at; </a:t>
+            </a:r>
+            <a:r>
+              <a:rPr lang="en-US" sz="1200" b="0" i="0" kern="1200" dirty="0">
+                <a:solidFill>
+                  <a:schemeClr val="tx1"/>
+                </a:solidFill>
+                <a:effectLst/>
+                <a:latin typeface="+mn-lt"/>
+                <a:ea typeface="+mn-ea"/>
+                <a:cs typeface="+mn-cs"/>
+              </a:rPr>
+              <a:t>for example, recognizing objects, making sense of speech, and decision making in a constrained environment.  A</a:t>
+            </a:r>
             <a:r>
               <a:rPr lang="en-US" dirty="0"/>
-              <a:t>Now for those of you who have not worked in a JupyterLab environment, we encourage you to watch our Introduction to JupyterLab video.</a:t>
-            </a:r>
+              <a:t>s our computer programs have become more sophisticated, our ideas of which tasks require human intelligence have evolved. Thus, AI is now used in a wide variety of tasks.</a:t>
+            </a:r>
+            <a:endParaRPr lang="en-US" sz="1200" b="0" i="0" kern="1200" dirty="0">
+              <a:solidFill>
+                <a:schemeClr val="tx1"/>
+              </a:solidFill>
+              <a:effectLst/>
+              <a:latin typeface="+mn-lt"/>
+              <a:ea typeface="+mn-ea"/>
+              <a:cs typeface="+mn-cs"/>
+            </a:endParaRPr>
+          </a:p>
+          <a:p>
+            <a:endParaRPr lang="en-US" sz="1200" b="0" i="0" kern="1200" dirty="0">
+              <a:solidFill>
+                <a:schemeClr val="tx1"/>
+              </a:solidFill>
+              <a:effectLst/>
+              <a:latin typeface="+mn-lt"/>
+              <a:ea typeface="+mn-ea"/>
+              <a:cs typeface="+mn-cs"/>
+            </a:endParaRPr>
           </a:p>
         </p:txBody>
       </p:sp>
@@ -1938,7 +2775,7 @@
     </p:spTree>
     <p:extLst>
       <p:ext uri="{BB962C8B-B14F-4D97-AF65-F5344CB8AC3E}">
-        <p14:creationId xmlns:p14="http://schemas.microsoft.com/office/powerpoint/2010/main" val="1328824333"/>
+        <p14:creationId xmlns:p14="http://schemas.microsoft.com/office/powerpoint/2010/main" val="4120710171"/>
       </p:ext>
     </p:extLst>
   </p:cSld>
@@ -1993,17 +2830,176 @@
           <a:lstStyle/>
           <a:p>
             <a:r>
-              <a:rPr lang="en-US" dirty="0"/>
-              <a:t>The exercise for this </a:t>
-            </a:r>
-            <a:r>
-              <a:rPr lang="en-US"/>
-              <a:t>learning experience </a:t>
-            </a:r>
-            <a:r>
-              <a:rPr lang="en-US" dirty="0"/>
-              <a:t>starts on page 7 of the textbook.  For additional information, please watch the exercise 1.01 orientation video.</a:t>
-            </a:r>
+              <a:rPr lang="en-US" sz="1200" b="0" i="0" kern="1200" dirty="0">
+                <a:solidFill>
+                  <a:schemeClr val="tx1"/>
+                </a:solidFill>
+                <a:effectLst/>
+                <a:latin typeface="+mn-lt"/>
+                <a:ea typeface="+mn-ea"/>
+                <a:cs typeface="+mn-cs"/>
+              </a:rPr>
+              <a:t>… and here’s a definition of machine learning coined by Arthur Samuel in 1959.  This is concise and one of my personal favorites.  However, I also like this second definition: </a:t>
+            </a:r>
+            <a:r>
+              <a:rPr lang="en-US" sz="1200" b="0" i="1" kern="1200" dirty="0">
+                <a:solidFill>
+                  <a:schemeClr val="tx1"/>
+                </a:solidFill>
+                <a:effectLst/>
+                <a:latin typeface="+mn-lt"/>
+                <a:ea typeface="+mn-ea"/>
+                <a:cs typeface="+mn-cs"/>
+              </a:rPr>
+              <a:t>Machine learning is the science (and art) of programming computers so they can learn from data</a:t>
+            </a:r>
+            <a:r>
+              <a:rPr lang="en-US" sz="1200" b="0" i="0" kern="1200" dirty="0">
+                <a:solidFill>
+                  <a:schemeClr val="tx1"/>
+                </a:solidFill>
+                <a:effectLst/>
+                <a:latin typeface="+mn-lt"/>
+                <a:ea typeface="+mn-ea"/>
+                <a:cs typeface="+mn-cs"/>
+              </a:rPr>
+              <a:t>.  </a:t>
+            </a:r>
+          </a:p>
+          <a:p>
+            <a:endParaRPr lang="en-US" sz="1200" b="0" i="0" kern="1200" dirty="0">
+              <a:solidFill>
+                <a:schemeClr val="tx1"/>
+              </a:solidFill>
+              <a:effectLst/>
+              <a:latin typeface="+mn-lt"/>
+              <a:ea typeface="+mn-ea"/>
+              <a:cs typeface="+mn-cs"/>
+            </a:endParaRPr>
+          </a:p>
+          <a:p>
+            <a:r>
+              <a:rPr lang="en-US" sz="1200" b="0" i="0" kern="1200" dirty="0">
+                <a:solidFill>
+                  <a:schemeClr val="tx1"/>
+                </a:solidFill>
+                <a:effectLst/>
+                <a:latin typeface="+mn-lt"/>
+                <a:ea typeface="+mn-ea"/>
+                <a:cs typeface="+mn-cs"/>
+              </a:rPr>
+              <a:t>Now, the key word in that second definition is </a:t>
+            </a:r>
+            <a:r>
+              <a:rPr lang="en-US" sz="1200" b="1" i="0" kern="1200" dirty="0">
+                <a:solidFill>
+                  <a:schemeClr val="tx1"/>
+                </a:solidFill>
+                <a:effectLst/>
+                <a:latin typeface="+mn-lt"/>
+                <a:ea typeface="+mn-ea"/>
+                <a:cs typeface="+mn-cs"/>
+              </a:rPr>
+              <a:t>data</a:t>
+            </a:r>
+            <a:r>
+              <a:rPr lang="en-US" sz="1200" b="0" i="0" kern="1200" dirty="0">
+                <a:solidFill>
+                  <a:schemeClr val="tx1"/>
+                </a:solidFill>
+                <a:effectLst/>
+                <a:latin typeface="+mn-lt"/>
+                <a:ea typeface="+mn-ea"/>
+                <a:cs typeface="+mn-cs"/>
+              </a:rPr>
+              <a:t>.  In fact, deep learning is not possible without data.  In the second half of today’s presentation, we will talk about the various types of data and the AI techniques used on them.  But first, let’s dive into the details of our Practicum AI workshop program.</a:t>
+            </a:r>
+          </a:p>
+          <a:p>
+            <a:endParaRPr lang="en-US" sz="1200" b="0" i="0" kern="1200" dirty="0">
+              <a:solidFill>
+                <a:schemeClr val="tx1"/>
+              </a:solidFill>
+              <a:effectLst/>
+              <a:latin typeface="+mn-lt"/>
+              <a:ea typeface="+mn-ea"/>
+              <a:cs typeface="+mn-cs"/>
+            </a:endParaRPr>
+          </a:p>
+          <a:p>
+            <a:r>
+              <a:rPr lang="en-US" sz="1200" b="0" i="0" kern="1200" dirty="0">
+                <a:solidFill>
+                  <a:schemeClr val="tx1"/>
+                </a:solidFill>
+                <a:effectLst/>
+                <a:latin typeface="+mn-lt"/>
+                <a:ea typeface="+mn-ea"/>
+                <a:cs typeface="+mn-cs"/>
+              </a:rPr>
+              <a:t>=====</a:t>
+            </a:r>
+          </a:p>
+          <a:p>
+            <a:pPr marL="0" marR="0" lvl="0" indent="0" algn="l" defTabSz="914400" rtl="0" eaLnBrk="1" fontAlgn="auto" latinLnBrk="0" hangingPunct="1">
+              <a:lnSpc>
+                <a:spcPct val="100000"/>
+              </a:lnSpc>
+              <a:spcBef>
+                <a:spcPts val="0"/>
+              </a:spcBef>
+              <a:spcAft>
+                <a:spcPts val="0"/>
+              </a:spcAft>
+              <a:buClrTx/>
+              <a:buSzTx/>
+              <a:buFontTx/>
+              <a:buNone/>
+              <a:tabLst/>
+              <a:defRPr/>
+            </a:pPr>
+            <a:r>
+              <a:rPr lang="en-US" b="0" i="0" dirty="0">
+                <a:solidFill>
+                  <a:srgbClr val="202122"/>
+                </a:solidFill>
+                <a:effectLst/>
+                <a:latin typeface="Arial" panose="020B0604020202020204" pitchFamily="34" charset="0"/>
+              </a:rPr>
+              <a:t>Machine Learning </a:t>
+            </a:r>
+            <a:r>
+              <a:rPr lang="en-US" b="0" i="0" dirty="0">
+                <a:solidFill>
+                  <a:srgbClr val="000000"/>
+                </a:solidFill>
+                <a:effectLst/>
+                <a:latin typeface="DINPro"/>
+              </a:rPr>
+              <a:t>algorithms parse data, learn from it, and then make a prediction about something in the world. So rather than hand-coding software routines with a specific set of instructions to accomplish a particular task, the machine is “trained” using large amounts of data and algorithms that give it the ability to learn how to perform the task.</a:t>
+            </a:r>
+          </a:p>
+          <a:p>
+            <a:endParaRPr lang="en-US" sz="1200" b="0" i="0" kern="1200" dirty="0">
+              <a:solidFill>
+                <a:schemeClr val="tx1"/>
+              </a:solidFill>
+              <a:effectLst/>
+              <a:latin typeface="+mn-lt"/>
+              <a:ea typeface="+mn-ea"/>
+              <a:cs typeface="+mn-cs"/>
+            </a:endParaRPr>
+          </a:p>
+          <a:p>
+            <a:endParaRPr lang="en-US" sz="1200" b="0" i="0" kern="1200" dirty="0">
+              <a:solidFill>
+                <a:schemeClr val="tx1"/>
+              </a:solidFill>
+              <a:effectLst/>
+              <a:latin typeface="+mn-lt"/>
+              <a:ea typeface="+mn-ea"/>
+              <a:cs typeface="+mn-cs"/>
+            </a:endParaRPr>
           </a:p>
         </p:txBody>
       </p:sp>
@@ -2033,7 +3029,7 @@
     </p:spTree>
     <p:extLst>
       <p:ext uri="{BB962C8B-B14F-4D97-AF65-F5344CB8AC3E}">
-        <p14:creationId xmlns:p14="http://schemas.microsoft.com/office/powerpoint/2010/main" val="2279087846"/>
+        <p14:creationId xmlns:p14="http://schemas.microsoft.com/office/powerpoint/2010/main" val="2710535571"/>
       </p:ext>
     </p:extLst>
   </p:cSld>
@@ -2087,10 +3083,182 @@
           <a:bodyPr/>
           <a:lstStyle/>
           <a:p>
-            <a:r>
-              <a:rPr lang="en-US" dirty="0"/>
-              <a:t>There are a variety of neural network types and innovation is ongoing in this area.  So, I’d like to conclude this presentation with a brief overview of some of the more popular architectures, including their various applications.</a:t>
-            </a:r>
+            <a:pPr marL="228600" indent="-228600">
+              <a:buAutoNum type="arabicPeriod"/>
+            </a:pPr>
+            <a:r>
+              <a:rPr lang="en-US" sz="1200" b="0" i="0" kern="1200" dirty="0">
+                <a:solidFill>
+                  <a:schemeClr val="tx1"/>
+                </a:solidFill>
+                <a:effectLst/>
+                <a:latin typeface="+mn-lt"/>
+                <a:ea typeface="+mn-ea"/>
+                <a:cs typeface="+mn-cs"/>
+              </a:rPr>
+              <a:t>Deep learning is a subfield of machine learning with a focus on </a:t>
+            </a:r>
+            <a:r>
+              <a:rPr lang="en-US" sz="1200" b="1" i="0" kern="1200" dirty="0">
+                <a:solidFill>
+                  <a:schemeClr val="tx1"/>
+                </a:solidFill>
+                <a:effectLst/>
+                <a:latin typeface="+mn-lt"/>
+                <a:ea typeface="+mn-ea"/>
+                <a:cs typeface="+mn-cs"/>
+              </a:rPr>
+              <a:t>neural networks</a:t>
+            </a:r>
+          </a:p>
+          <a:p>
+            <a:pPr marL="228600" indent="-228600">
+              <a:buAutoNum type="arabicPeriod"/>
+            </a:pPr>
+            <a:r>
+              <a:rPr lang="en-US" sz="1200" b="0" i="0" kern="1200" dirty="0">
+                <a:solidFill>
+                  <a:schemeClr val="tx1"/>
+                </a:solidFill>
+                <a:effectLst/>
+                <a:latin typeface="+mn-lt"/>
+                <a:ea typeface="+mn-ea"/>
+                <a:cs typeface="+mn-cs"/>
+              </a:rPr>
+              <a:t>A neural network is a special type of learning algorithm, inspired by the billions of interconnected neurons in the human brain.</a:t>
+            </a:r>
+          </a:p>
+          <a:p>
+            <a:pPr marL="228600" indent="-228600">
+              <a:buAutoNum type="arabicPeriod"/>
+            </a:pPr>
+            <a:r>
+              <a:rPr lang="en-US" sz="1200" b="0" i="0" kern="1200" dirty="0">
+                <a:solidFill>
+                  <a:schemeClr val="tx1"/>
+                </a:solidFill>
+                <a:effectLst/>
+                <a:latin typeface="+mn-lt"/>
+                <a:ea typeface="+mn-ea"/>
+                <a:cs typeface="+mn-cs"/>
+              </a:rPr>
+              <a:t>In a NN, neurons grouped together in layers – image of a multi-layered cake – if you have many layers, the cake is “deep” when viewed from above.</a:t>
+            </a:r>
+          </a:p>
+          <a:p>
+            <a:pPr marL="228600" indent="-228600">
+              <a:buAutoNum type="arabicPeriod"/>
+            </a:pPr>
+            <a:r>
+              <a:rPr lang="en-US" sz="1200" b="0" i="0" kern="1200" dirty="0">
+                <a:solidFill>
+                  <a:schemeClr val="tx1"/>
+                </a:solidFill>
+                <a:effectLst/>
+                <a:latin typeface="+mn-lt"/>
+                <a:ea typeface="+mn-ea"/>
+                <a:cs typeface="+mn-cs"/>
+              </a:rPr>
+              <a:t>Since 2010, deep learning became possible because:</a:t>
+            </a:r>
+          </a:p>
+          <a:p>
+            <a:pPr marL="685800" lvl="1" indent="-228600">
+              <a:buAutoNum type="arabicPeriod"/>
+            </a:pPr>
+            <a:r>
+              <a:rPr lang="en-US" sz="1200" b="0" i="0" kern="1200" dirty="0">
+                <a:solidFill>
+                  <a:schemeClr val="tx1"/>
+                </a:solidFill>
+                <a:effectLst/>
+                <a:latin typeface="+mn-lt"/>
+                <a:ea typeface="+mn-ea"/>
+                <a:cs typeface="+mn-cs"/>
+              </a:rPr>
+              <a:t>Enhanced hardware – GPUs from Nvidia and other suppliers</a:t>
+            </a:r>
+          </a:p>
+          <a:p>
+            <a:pPr marL="685800" lvl="1" indent="-228600">
+              <a:buAutoNum type="arabicPeriod"/>
+            </a:pPr>
+            <a:r>
+              <a:rPr lang="en-US" sz="1200" b="0" i="0" kern="1200" dirty="0">
+                <a:solidFill>
+                  <a:schemeClr val="tx1"/>
+                </a:solidFill>
+                <a:effectLst/>
+                <a:latin typeface="+mn-lt"/>
+                <a:ea typeface="+mn-ea"/>
+                <a:cs typeface="+mn-cs"/>
+              </a:rPr>
+              <a:t>Open AI software frameworks – Tensorflow, Pytorch, Keras, etc…</a:t>
+            </a:r>
+          </a:p>
+          <a:p>
+            <a:pPr marL="685800" lvl="1" indent="-228600">
+              <a:buAutoNum type="arabicPeriod"/>
+            </a:pPr>
+            <a:r>
+              <a:rPr lang="en-US" sz="1200" b="0" i="0" kern="1200" dirty="0">
+                <a:solidFill>
+                  <a:schemeClr val="tx1"/>
+                </a:solidFill>
+                <a:effectLst/>
+                <a:latin typeface="+mn-lt"/>
+                <a:ea typeface="+mn-ea"/>
+                <a:cs typeface="+mn-cs"/>
+              </a:rPr>
+              <a:t>Big Data</a:t>
+            </a:r>
+          </a:p>
+          <a:p>
+            <a:pPr marL="228600" indent="-228600">
+              <a:buAutoNum type="arabicPeriod"/>
+            </a:pPr>
+            <a:endParaRPr lang="en-US" sz="1200" b="0" i="0" kern="1200" dirty="0">
+              <a:solidFill>
+                <a:schemeClr val="tx1"/>
+              </a:solidFill>
+              <a:effectLst/>
+              <a:latin typeface="+mn-lt"/>
+              <a:ea typeface="+mn-ea"/>
+              <a:cs typeface="+mn-cs"/>
+            </a:endParaRPr>
+          </a:p>
+          <a:p>
+            <a:endParaRPr lang="en-US" sz="1200" b="0" i="0" kern="1200" dirty="0">
+              <a:solidFill>
+                <a:schemeClr val="tx1"/>
+              </a:solidFill>
+              <a:effectLst/>
+              <a:latin typeface="+mn-lt"/>
+              <a:ea typeface="+mn-ea"/>
+              <a:cs typeface="+mn-cs"/>
+            </a:endParaRPr>
+          </a:p>
+          <a:p>
+            <a:endParaRPr lang="en-US" sz="1200" b="0" i="0" kern="1200" dirty="0">
+              <a:solidFill>
+                <a:schemeClr val="tx1"/>
+              </a:solidFill>
+              <a:effectLst/>
+              <a:latin typeface="+mn-lt"/>
+              <a:ea typeface="+mn-ea"/>
+              <a:cs typeface="+mn-cs"/>
+            </a:endParaRPr>
+          </a:p>
+          <a:p>
+            <a:endParaRPr lang="en-US" sz="1200" b="0" i="0" kern="1200" dirty="0">
+              <a:solidFill>
+                <a:schemeClr val="tx1"/>
+              </a:solidFill>
+              <a:effectLst/>
+              <a:latin typeface="+mn-lt"/>
+              <a:ea typeface="+mn-ea"/>
+              <a:cs typeface="+mn-cs"/>
+            </a:endParaRPr>
           </a:p>
         </p:txBody>
       </p:sp>
@@ -2120,7 +3288,7 @@
     </p:spTree>
     <p:extLst>
       <p:ext uri="{BB962C8B-B14F-4D97-AF65-F5344CB8AC3E}">
-        <p14:creationId xmlns:p14="http://schemas.microsoft.com/office/powerpoint/2010/main" val="3873866018"/>
+        <p14:creationId xmlns:p14="http://schemas.microsoft.com/office/powerpoint/2010/main" val="658380389"/>
       </p:ext>
     </p:extLst>
   </p:cSld>
@@ -2175,113 +3343,17 @@
           <a:lstStyle/>
           <a:p>
             <a:r>
-              <a:rPr lang="en-US" sz="1100" b="0" i="0" dirty="0">
-                <a:solidFill>
-                  <a:srgbClr val="3C3C3B"/>
-                </a:solidFill>
-                <a:effectLst/>
-                <a:latin typeface="+mn-lt"/>
-              </a:rPr>
-              <a:t>The </a:t>
-            </a:r>
-            <a:r>
-              <a:rPr lang="en-US" sz="1100" b="1" i="0" dirty="0">
-                <a:solidFill>
-                  <a:srgbClr val="3C3C3B"/>
-                </a:solidFill>
-                <a:effectLst/>
-                <a:latin typeface="+mn-lt"/>
-              </a:rPr>
-              <a:t>multi-layer perceptron</a:t>
-            </a:r>
-            <a:r>
-              <a:rPr lang="en-US" sz="1100" b="0" i="0" dirty="0">
-                <a:solidFill>
-                  <a:srgbClr val="3C3C3B"/>
-                </a:solidFill>
-                <a:effectLst/>
-                <a:latin typeface="+mn-lt"/>
-              </a:rPr>
-              <a:t> (</a:t>
-            </a:r>
-            <a:r>
-              <a:rPr lang="en-US" sz="1100" b="1" i="0" dirty="0">
-                <a:solidFill>
-                  <a:srgbClr val="3C3C3B"/>
-                </a:solidFill>
-                <a:effectLst/>
-                <a:latin typeface="+mn-lt"/>
-              </a:rPr>
-              <a:t>MLP</a:t>
-            </a:r>
-            <a:r>
-              <a:rPr lang="en-US" sz="1100" b="0" i="0" dirty="0">
-                <a:solidFill>
-                  <a:srgbClr val="3C3C3B"/>
-                </a:solidFill>
-                <a:effectLst/>
-                <a:latin typeface="+mn-lt"/>
-              </a:rPr>
-              <a:t>) is a basic type of neural network. An MLP is also known as a feed-forward network.  Applications of the multi-layer perceptron include:</a:t>
-            </a:r>
-          </a:p>
-          <a:p>
-            <a:endParaRPr lang="en-US" sz="1100" b="0" i="0" dirty="0">
-              <a:solidFill>
-                <a:srgbClr val="3C3C3B"/>
-              </a:solidFill>
-              <a:effectLst/>
-              <a:latin typeface="+mn-lt"/>
-            </a:endParaRPr>
-          </a:p>
-          <a:p>
-            <a:pPr marL="233309" indent="-233309" defTabSz="933237">
-              <a:buFontTx/>
-              <a:buAutoNum type="arabicPeriod"/>
-              <a:defRPr/>
-            </a:pPr>
-            <a:r>
-              <a:rPr lang="en-US" sz="1100" b="0" i="0" dirty="0">
-                <a:solidFill>
-                  <a:srgbClr val="000000"/>
-                </a:solidFill>
-                <a:effectLst/>
-                <a:latin typeface="+mn-lt"/>
-              </a:rPr>
-              <a:t>Complex Classification</a:t>
-            </a:r>
-          </a:p>
-          <a:p>
-            <a:pPr marL="233309" indent="-233309" defTabSz="933237">
-              <a:buFontTx/>
-              <a:buAutoNum type="arabicPeriod"/>
-              <a:defRPr/>
-            </a:pPr>
-            <a:r>
-              <a:rPr lang="en-US" sz="1100" b="0" i="0" dirty="0">
-                <a:solidFill>
-                  <a:srgbClr val="000000"/>
-                </a:solidFill>
-                <a:effectLst/>
-                <a:latin typeface="+mn-lt"/>
-              </a:rPr>
-              <a:t>Machine Translation</a:t>
-            </a:r>
-          </a:p>
-          <a:p>
-            <a:pPr defTabSz="933237">
-              <a:defRPr/>
-            </a:pPr>
-            <a:endParaRPr lang="en-US" b="0" i="0" dirty="0">
-              <a:solidFill>
-                <a:srgbClr val="000000"/>
-              </a:solidFill>
-              <a:effectLst/>
-              <a:latin typeface="Lato"/>
-            </a:endParaRPr>
-          </a:p>
-          <a:p>
-            <a:endParaRPr lang="en-US" dirty="0"/>
+              <a:rPr lang="en-US" dirty="0"/>
+              <a:t>The exercise for this </a:t>
+            </a:r>
+            <a:r>
+              <a:rPr lang="en-US"/>
+              <a:t>learning experience </a:t>
+            </a:r>
+            <a:r>
+              <a:rPr lang="en-US" dirty="0"/>
+              <a:t>starts on page 7 of the textbook.  For additional information, please watch the exercise 1.01 orientation video.</a:t>
+            </a:r>
           </a:p>
         </p:txBody>
       </p:sp>
@@ -2311,7 +3383,7 @@
     </p:spTree>
     <p:extLst>
       <p:ext uri="{BB962C8B-B14F-4D97-AF65-F5344CB8AC3E}">
-        <p14:creationId xmlns:p14="http://schemas.microsoft.com/office/powerpoint/2010/main" val="473801370"/>
+        <p14:creationId xmlns:p14="http://schemas.microsoft.com/office/powerpoint/2010/main" val="2279087846"/>
       </p:ext>
     </p:extLst>
   </p:cSld>
@@ -2468,7 +3540,7 @@
           <a:p>
             <a:fld id="{C3F78080-8D0A-4BE8-A5B4-CB115102D524}" type="datetimeFigureOut">
               <a:rPr lang="en-US" smtClean="0"/>
-              <a:t>10/20/2021</a:t>
+              <a:t>3/18/2022</a:t>
             </a:fld>
             <a:endParaRPr lang="en-US"/>
           </a:p>
@@ -2666,7 +3738,7 @@
           <a:p>
             <a:fld id="{C3F78080-8D0A-4BE8-A5B4-CB115102D524}" type="datetimeFigureOut">
               <a:rPr lang="en-US" smtClean="0"/>
-              <a:t>10/20/2021</a:t>
+              <a:t>3/18/2022</a:t>
             </a:fld>
             <a:endParaRPr lang="en-US"/>
           </a:p>
@@ -2874,7 +3946,7 @@
           <a:p>
             <a:fld id="{C3F78080-8D0A-4BE8-A5B4-CB115102D524}" type="datetimeFigureOut">
               <a:rPr lang="en-US" smtClean="0"/>
-              <a:t>10/20/2021</a:t>
+              <a:t>3/18/2022</a:t>
             </a:fld>
             <a:endParaRPr lang="en-US"/>
           </a:p>
@@ -3072,7 +4144,7 @@
           <a:p>
             <a:fld id="{C3F78080-8D0A-4BE8-A5B4-CB115102D524}" type="datetimeFigureOut">
               <a:rPr lang="en-US" smtClean="0"/>
-              <a:t>10/20/2021</a:t>
+              <a:t>3/18/2022</a:t>
             </a:fld>
             <a:endParaRPr lang="en-US"/>
           </a:p>
@@ -3347,7 +4419,7 @@
           <a:p>
             <a:fld id="{C3F78080-8D0A-4BE8-A5B4-CB115102D524}" type="datetimeFigureOut">
               <a:rPr lang="en-US" smtClean="0"/>
-              <a:t>10/20/2021</a:t>
+              <a:t>3/18/2022</a:t>
             </a:fld>
             <a:endParaRPr lang="en-US"/>
           </a:p>
@@ -3612,7 +4684,7 @@
           <a:p>
             <a:fld id="{C3F78080-8D0A-4BE8-A5B4-CB115102D524}" type="datetimeFigureOut">
               <a:rPr lang="en-US" smtClean="0"/>
-              <a:t>10/20/2021</a:t>
+              <a:t>3/18/2022</a:t>
             </a:fld>
             <a:endParaRPr lang="en-US"/>
           </a:p>
@@ -4024,7 +5096,7 @@
           <a:p>
             <a:fld id="{C3F78080-8D0A-4BE8-A5B4-CB115102D524}" type="datetimeFigureOut">
               <a:rPr lang="en-US" smtClean="0"/>
-              <a:t>10/20/2021</a:t>
+              <a:t>3/18/2022</a:t>
             </a:fld>
             <a:endParaRPr lang="en-US"/>
           </a:p>
@@ -4165,7 +5237,7 @@
           <a:p>
             <a:fld id="{C3F78080-8D0A-4BE8-A5B4-CB115102D524}" type="datetimeFigureOut">
               <a:rPr lang="en-US" smtClean="0"/>
-              <a:t>10/20/2021</a:t>
+              <a:t>3/18/2022</a:t>
             </a:fld>
             <a:endParaRPr lang="en-US"/>
           </a:p>
@@ -4278,7 +5350,7 @@
           <a:p>
             <a:fld id="{C3F78080-8D0A-4BE8-A5B4-CB115102D524}" type="datetimeFigureOut">
               <a:rPr lang="en-US" smtClean="0"/>
-              <a:t>10/20/2021</a:t>
+              <a:t>3/18/2022</a:t>
             </a:fld>
             <a:endParaRPr lang="en-US"/>
           </a:p>
@@ -4589,7 +5661,7 @@
           <a:p>
             <a:fld id="{C3F78080-8D0A-4BE8-A5B4-CB115102D524}" type="datetimeFigureOut">
               <a:rPr lang="en-US" smtClean="0"/>
-              <a:t>10/20/2021</a:t>
+              <a:t>3/18/2022</a:t>
             </a:fld>
             <a:endParaRPr lang="en-US"/>
           </a:p>
@@ -4877,7 +5949,7 @@
           <a:p>
             <a:fld id="{C3F78080-8D0A-4BE8-A5B4-CB115102D524}" type="datetimeFigureOut">
               <a:rPr lang="en-US" smtClean="0"/>
-              <a:t>10/20/2021</a:t>
+              <a:t>3/18/2022</a:t>
             </a:fld>
             <a:endParaRPr lang="en-US"/>
           </a:p>
@@ -5118,7 +6190,7 @@
           <a:p>
             <a:fld id="{C3F78080-8D0A-4BE8-A5B4-CB115102D524}" type="datetimeFigureOut">
               <a:rPr lang="en-US" smtClean="0"/>
-              <a:t>10/20/2021</a:t>
+              <a:t>3/18/2022</a:t>
             </a:fld>
             <a:endParaRPr lang="en-US"/>
           </a:p>
@@ -5649,6 +6721,333 @@
           <a:chExt cx="0" cy="0"/>
         </a:xfrm>
       </p:grpSpPr>
+      <p:sp>
+        <p:nvSpPr>
+          <p:cNvPr id="2" name="Title 1">
+            <a:extLst>
+              <a:ext uri="{FF2B5EF4-FFF2-40B4-BE49-F238E27FC236}">
+                <a16:creationId xmlns:a16="http://schemas.microsoft.com/office/drawing/2014/main" id="{0F853981-B13F-4917-804F-EBF0D4819E7E}"/>
+              </a:ext>
+            </a:extLst>
+          </p:cNvPr>
+          <p:cNvSpPr>
+            <a:spLocks noGrp="1"/>
+          </p:cNvSpPr>
+          <p:nvPr>
+            <p:ph type="title"/>
+          </p:nvPr>
+        </p:nvSpPr>
+        <p:spPr>
+          <a:xfrm>
+            <a:off x="0" y="2953213"/>
+            <a:ext cx="12192000" cy="951574"/>
+          </a:xfrm>
+          <a:noFill/>
+        </p:spPr>
+        <p:txBody>
+          <a:bodyPr>
+            <a:normAutofit fontScale="90000"/>
+          </a:bodyPr>
+          <a:lstStyle/>
+          <a:p>
+            <a:pPr algn="ctr"/>
+            <a:br>
+              <a:rPr lang="en-US" sz="4400" dirty="0">
+                <a:solidFill>
+                  <a:schemeClr val="tx1">
+                    <a:lumMod val="65000"/>
+                    <a:lumOff val="35000"/>
+                  </a:schemeClr>
+                </a:solidFill>
+              </a:rPr>
+            </a:br>
+            <a:br>
+              <a:rPr lang="en-US" sz="4400" dirty="0">
+                <a:solidFill>
+                  <a:schemeClr val="tx1">
+                    <a:lumMod val="65000"/>
+                    <a:lumOff val="35000"/>
+                  </a:schemeClr>
+                </a:solidFill>
+              </a:rPr>
+            </a:br>
+            <a:br>
+              <a:rPr lang="en-US" sz="4400" dirty="0">
+                <a:solidFill>
+                  <a:schemeClr val="tx1">
+                    <a:lumMod val="65000"/>
+                    <a:lumOff val="35000"/>
+                  </a:schemeClr>
+                </a:solidFill>
+              </a:rPr>
+            </a:br>
+            <a:br>
+              <a:rPr lang="en-US" sz="4400" dirty="0">
+                <a:solidFill>
+                  <a:schemeClr val="tx1">
+                    <a:lumMod val="65000"/>
+                    <a:lumOff val="35000"/>
+                  </a:schemeClr>
+                </a:solidFill>
+              </a:rPr>
+            </a:br>
+            <a:br>
+              <a:rPr lang="en-US" sz="4400" dirty="0">
+                <a:solidFill>
+                  <a:schemeClr val="tx1">
+                    <a:lumMod val="65000"/>
+                    <a:lumOff val="35000"/>
+                  </a:schemeClr>
+                </a:solidFill>
+              </a:rPr>
+            </a:br>
+            <a:br>
+              <a:rPr lang="en-US" sz="4400" dirty="0">
+                <a:solidFill>
+                  <a:schemeClr val="tx1">
+                    <a:lumMod val="65000"/>
+                    <a:lumOff val="35000"/>
+                  </a:schemeClr>
+                </a:solidFill>
+              </a:rPr>
+            </a:br>
+            <a:br>
+              <a:rPr lang="en-US" sz="4400" dirty="0">
+                <a:solidFill>
+                  <a:schemeClr val="tx1">
+                    <a:lumMod val="65000"/>
+                    <a:lumOff val="35000"/>
+                  </a:schemeClr>
+                </a:solidFill>
+              </a:rPr>
+            </a:br>
+            <a:br>
+              <a:rPr lang="en-US" sz="4400" dirty="0">
+                <a:solidFill>
+                  <a:schemeClr val="tx1">
+                    <a:lumMod val="65000"/>
+                    <a:lumOff val="35000"/>
+                  </a:schemeClr>
+                </a:solidFill>
+              </a:rPr>
+            </a:br>
+            <a:r>
+              <a:rPr lang="en-US" sz="4400" dirty="0">
+                <a:solidFill>
+                  <a:schemeClr val="tx1">
+                    <a:lumMod val="65000"/>
+                    <a:lumOff val="35000"/>
+                  </a:schemeClr>
+                </a:solidFill>
+              </a:rPr>
+              <a:t>     </a:t>
+            </a:r>
+            <a:r>
+              <a:rPr lang="en-US" sz="6700" dirty="0">
+                <a:solidFill>
+                  <a:schemeClr val="tx1">
+                    <a:lumMod val="65000"/>
+                    <a:lumOff val="35000"/>
+                  </a:schemeClr>
+                </a:solidFill>
+                <a:latin typeface="Palatino Linotype" panose="02040502050505030304" pitchFamily="18" charset="0"/>
+              </a:rPr>
+              <a:t>Neural Network Architectures</a:t>
+            </a:r>
+            <a:endParaRPr lang="en-US" sz="6700" dirty="0">
+              <a:solidFill>
+                <a:schemeClr val="tx1">
+                  <a:lumMod val="65000"/>
+                  <a:lumOff val="35000"/>
+                </a:schemeClr>
+              </a:solidFill>
+              <a:latin typeface="Palatino Linotype" panose="02040502050505030304" pitchFamily="18" charset="0"/>
+              <a:cs typeface="Segoe UI Light" panose="020B0502040204020203" pitchFamily="34" charset="0"/>
+            </a:endParaRPr>
+          </a:p>
+        </p:txBody>
+      </p:sp>
+      <p:sp>
+        <p:nvSpPr>
+          <p:cNvPr id="3" name="Text Placeholder 2">
+            <a:extLst>
+              <a:ext uri="{FF2B5EF4-FFF2-40B4-BE49-F238E27FC236}">
+                <a16:creationId xmlns:a16="http://schemas.microsoft.com/office/drawing/2014/main" id="{098BC2D2-CCF7-4C63-8489-B46BF394FCA2}"/>
+              </a:ext>
+            </a:extLst>
+          </p:cNvPr>
+          <p:cNvSpPr>
+            <a:spLocks noGrp="1"/>
+          </p:cNvSpPr>
+          <p:nvPr>
+            <p:ph type="body" idx="1"/>
+          </p:nvPr>
+        </p:nvSpPr>
+        <p:spPr>
+          <a:xfrm>
+            <a:off x="0" y="4285400"/>
+            <a:ext cx="12192000" cy="518830"/>
+          </a:xfrm>
+        </p:spPr>
+        <p:txBody>
+          <a:bodyPr>
+            <a:normAutofit/>
+          </a:bodyPr>
+          <a:lstStyle/>
+          <a:p>
+            <a:endParaRPr lang="en-US" dirty="0">
+              <a:latin typeface="Palatino Linotype" panose="02040502050505030304" pitchFamily="18" charset="0"/>
+              <a:cs typeface="Segoe UI" panose="020B0502040204020203" pitchFamily="34" charset="0"/>
+            </a:endParaRPr>
+          </a:p>
+          <a:p>
+            <a:endParaRPr lang="en-US" dirty="0">
+              <a:latin typeface="Palatino Linotype" panose="02040502050505030304" pitchFamily="18" charset="0"/>
+              <a:cs typeface="Segoe UI" panose="020B0502040204020203" pitchFamily="34" charset="0"/>
+            </a:endParaRPr>
+          </a:p>
+          <a:p>
+            <a:endParaRPr lang="en-US" dirty="0">
+              <a:latin typeface="Palatino Linotype" panose="02040502050505030304" pitchFamily="18" charset="0"/>
+              <a:cs typeface="Segoe UI" panose="020B0502040204020203" pitchFamily="34" charset="0"/>
+            </a:endParaRPr>
+          </a:p>
+          <a:p>
+            <a:endParaRPr lang="en-US" dirty="0">
+              <a:latin typeface="Palatino Linotype" panose="02040502050505030304" pitchFamily="18" charset="0"/>
+              <a:cs typeface="Segoe UI" panose="020B0502040204020203" pitchFamily="34" charset="0"/>
+            </a:endParaRPr>
+          </a:p>
+          <a:p>
+            <a:endParaRPr lang="en-US" dirty="0">
+              <a:latin typeface="Palatino Linotype" panose="02040502050505030304" pitchFamily="18" charset="0"/>
+              <a:cs typeface="Segoe UI" panose="020B0502040204020203" pitchFamily="34" charset="0"/>
+            </a:endParaRPr>
+          </a:p>
+        </p:txBody>
+      </p:sp>
+    </p:spTree>
+    <p:extLst>
+      <p:ext uri="{BB962C8B-B14F-4D97-AF65-F5344CB8AC3E}">
+        <p14:creationId xmlns:p14="http://schemas.microsoft.com/office/powerpoint/2010/main" val="2101828597"/>
+      </p:ext>
+    </p:extLst>
+  </p:cSld>
+  <p:clrMapOvr>
+    <a:masterClrMapping/>
+  </p:clrMapOvr>
+  <mc:AlternateContent xmlns:mc="http://schemas.openxmlformats.org/markup-compatibility/2006" xmlns:p14="http://schemas.microsoft.com/office/powerpoint/2010/main">
+    <mc:Choice Requires="p14">
+      <p:transition spd="med" p14:dur="700">
+        <p:fade/>
+      </p:transition>
+    </mc:Choice>
+    <mc:Fallback xmlns="">
+      <p:transition spd="med">
+        <p:fade/>
+      </p:transition>
+    </mc:Fallback>
+  </mc:AlternateContent>
+</p:sld>
+</file>
+
+<file path=ppt/slides/slide11.xml><?xml version="1.0" encoding="utf-8"?>
+<p:sld xmlns:a="http://schemas.openxmlformats.org/drawingml/2006/main" xmlns:r="http://schemas.openxmlformats.org/officeDocument/2006/relationships" xmlns:p="http://schemas.openxmlformats.org/presentationml/2006/main">
+  <p:cSld>
+    <p:bg>
+      <p:bgPr>
+        <a:solidFill>
+          <a:schemeClr val="bg1"/>
+        </a:solidFill>
+        <a:effectLst/>
+      </p:bgPr>
+    </p:bg>
+    <p:spTree>
+      <p:nvGrpSpPr>
+        <p:cNvPr id="1" name=""/>
+        <p:cNvGrpSpPr/>
+        <p:nvPr/>
+      </p:nvGrpSpPr>
+      <p:grpSpPr>
+        <a:xfrm>
+          <a:off x="0" y="0"/>
+          <a:ext cx="0" cy="0"/>
+          <a:chOff x="0" y="0"/>
+          <a:chExt cx="0" cy="0"/>
+        </a:xfrm>
+      </p:grpSpPr>
+      <p:pic>
+        <p:nvPicPr>
+          <p:cNvPr id="4" name="Picture 3">
+            <a:extLst>
+              <a:ext uri="{FF2B5EF4-FFF2-40B4-BE49-F238E27FC236}">
+                <a16:creationId xmlns:a16="http://schemas.microsoft.com/office/drawing/2014/main" id="{D9E8786A-DC4B-41D1-94C9-80F444DEC6FA}"/>
+              </a:ext>
+            </a:extLst>
+          </p:cNvPr>
+          <p:cNvPicPr>
+            <a:picLocks noChangeAspect="1"/>
+          </p:cNvPicPr>
+          <p:nvPr/>
+        </p:nvPicPr>
+        <p:blipFill>
+          <a:blip r:embed="rId3"/>
+          <a:stretch>
+            <a:fillRect/>
+          </a:stretch>
+        </p:blipFill>
+        <p:spPr>
+          <a:xfrm>
+            <a:off x="2806558" y="1208627"/>
+            <a:ext cx="6578883" cy="4440746"/>
+          </a:xfrm>
+          <a:prstGeom prst="rect">
+            <a:avLst/>
+          </a:prstGeom>
+        </p:spPr>
+      </p:pic>
+    </p:spTree>
+    <p:extLst>
+      <p:ext uri="{BB962C8B-B14F-4D97-AF65-F5344CB8AC3E}">
+        <p14:creationId xmlns:p14="http://schemas.microsoft.com/office/powerpoint/2010/main" val="844444607"/>
+      </p:ext>
+    </p:extLst>
+  </p:cSld>
+  <p:clrMapOvr>
+    <a:masterClrMapping/>
+  </p:clrMapOvr>
+  <mc:AlternateContent xmlns:mc="http://schemas.openxmlformats.org/markup-compatibility/2006" xmlns:p14="http://schemas.microsoft.com/office/powerpoint/2010/main">
+    <mc:Choice Requires="p14">
+      <p:transition spd="med" p14:dur="700">
+        <p:fade/>
+      </p:transition>
+    </mc:Choice>
+    <mc:Fallback xmlns="">
+      <p:transition spd="med">
+        <p:fade/>
+      </p:transition>
+    </mc:Fallback>
+  </mc:AlternateContent>
+</p:sld>
+</file>
+
+<file path=ppt/slides/slide12.xml><?xml version="1.0" encoding="utf-8"?>
+<p:sld xmlns:a="http://schemas.openxmlformats.org/drawingml/2006/main" xmlns:r="http://schemas.openxmlformats.org/officeDocument/2006/relationships" xmlns:p="http://schemas.openxmlformats.org/presentationml/2006/main">
+  <p:cSld>
+    <p:spTree>
+      <p:nvGrpSpPr>
+        <p:cNvPr id="1" name=""/>
+        <p:cNvGrpSpPr/>
+        <p:nvPr/>
+      </p:nvGrpSpPr>
+      <p:grpSpPr>
+        <a:xfrm>
+          <a:off x="0" y="0"/>
+          <a:ext cx="0" cy="0"/>
+          <a:chOff x="0" y="0"/>
+          <a:chExt cx="0" cy="0"/>
+        </a:xfrm>
+      </p:grpSpPr>
       <p:pic>
         <p:nvPicPr>
           <p:cNvPr id="3" name="Picture 2">
@@ -5704,7 +7103,7 @@
 </p:sld>
 </file>
 
-<file path=ppt/slides/slide11.xml><?xml version="1.0" encoding="utf-8"?>
+<file path=ppt/slides/slide13.xml><?xml version="1.0" encoding="utf-8"?>
 <p:sld xmlns:a="http://schemas.openxmlformats.org/drawingml/2006/main" xmlns:r="http://schemas.openxmlformats.org/officeDocument/2006/relationships" xmlns:p="http://schemas.openxmlformats.org/presentationml/2006/main">
   <p:cSld>
     <p:spTree>
@@ -5776,7 +7175,7 @@
 </p:sld>
 </file>
 
-<file path=ppt/slides/slide12.xml><?xml version="1.0" encoding="utf-8"?>
+<file path=ppt/slides/slide14.xml><?xml version="1.0" encoding="utf-8"?>
 <p:sld xmlns:a="http://schemas.openxmlformats.org/drawingml/2006/main" xmlns:r="http://schemas.openxmlformats.org/officeDocument/2006/relationships" xmlns:p="http://schemas.openxmlformats.org/presentationml/2006/main">
   <p:cSld>
     <p:spTree>
@@ -5848,7 +7247,7 @@
 </p:sld>
 </file>
 
-<file path=ppt/slides/slide13.xml><?xml version="1.0" encoding="utf-8"?>
+<file path=ppt/slides/slide15.xml><?xml version="1.0" encoding="utf-8"?>
 <p:sld xmlns:a="http://schemas.openxmlformats.org/drawingml/2006/main" xmlns:r="http://schemas.openxmlformats.org/officeDocument/2006/relationships" xmlns:p="http://schemas.openxmlformats.org/presentationml/2006/main">
   <p:cSld>
     <p:spTree>
@@ -6031,7 +7430,49 @@
 </p:sld>
 </file>
 
-<file path=ppt/slides/slide2.xml><?xml version="1.0" encoding="utf-8"?>
+<file path=ppt/slides/slide16.xml><?xml version="1.0" encoding="utf-8"?>
+<p:sld xmlns:a="http://schemas.openxmlformats.org/drawingml/2006/main" xmlns:r="http://schemas.openxmlformats.org/officeDocument/2006/relationships" xmlns:p="http://schemas.openxmlformats.org/presentationml/2006/main">
+  <p:cSld>
+    <p:spTree>
+      <p:nvGrpSpPr>
+        <p:cNvPr id="1" name=""/>
+        <p:cNvGrpSpPr/>
+        <p:nvPr/>
+      </p:nvGrpSpPr>
+      <p:grpSpPr>
+        <a:xfrm>
+          <a:off x="0" y="0"/>
+          <a:ext cx="0" cy="0"/>
+          <a:chOff x="0" y="0"/>
+          <a:chExt cx="0" cy="0"/>
+        </a:xfrm>
+      </p:grpSpPr>
+    </p:spTree>
+    <p:extLst>
+      <p:ext uri="{BB962C8B-B14F-4D97-AF65-F5344CB8AC3E}">
+        <p14:creationId xmlns:p14="http://schemas.microsoft.com/office/powerpoint/2010/main" val="1856205587"/>
+      </p:ext>
+    </p:extLst>
+  </p:cSld>
+  <p:clrMapOvr>
+    <a:masterClrMapping/>
+  </p:clrMapOvr>
+  <mc:AlternateContent xmlns:mc="http://schemas.openxmlformats.org/markup-compatibility/2006" xmlns:p14="http://schemas.microsoft.com/office/powerpoint/2010/main">
+    <mc:Choice Requires="p14">
+      <p:transition spd="med" p14:dur="700">
+        <p:fade/>
+      </p:transition>
+    </mc:Choice>
+    <mc:Fallback xmlns="">
+      <p:transition spd="med">
+        <p:fade/>
+      </p:transition>
+    </mc:Fallback>
+  </mc:AlternateContent>
+</p:sld>
+</file>
+
+<file path=ppt/slides/slide17.xml><?xml version="1.0" encoding="utf-8"?>
 <p:sld xmlns:a="http://schemas.openxmlformats.org/drawingml/2006/main" xmlns:r="http://schemas.openxmlformats.org/officeDocument/2006/relationships" xmlns:p="http://schemas.openxmlformats.org/presentationml/2006/main">
   <p:cSld>
     <p:spTree>
@@ -6050,10 +7491,10 @@
       </p:grpSpPr>
       <p:pic>
         <p:nvPicPr>
-          <p:cNvPr id="1026" name="Picture 2">
+          <p:cNvPr id="1028" name="Picture 4" descr="Project Jupyter - Wikipedia">
             <a:extLst>
               <a:ext uri="{FF2B5EF4-FFF2-40B4-BE49-F238E27FC236}">
-                <a16:creationId xmlns:a16="http://schemas.microsoft.com/office/drawing/2014/main" id="{C5654A88-5BCE-4533-8B40-338E944E9774}"/>
+                <a16:creationId xmlns:a16="http://schemas.microsoft.com/office/drawing/2014/main" id="{D47FA80A-C63A-4289-A2E5-C40C439B39C6}"/>
               </a:ext>
             </a:extLst>
           </p:cNvPr>
@@ -6077,8 +7518,8 @@
         </p:blipFill>
         <p:spPr bwMode="auto">
           <a:xfrm>
-            <a:off x="4756032" y="1778793"/>
-            <a:ext cx="2679935" cy="3300413"/>
+            <a:off x="4651516" y="1754685"/>
+            <a:ext cx="2888968" cy="3348629"/>
           </a:xfrm>
           <a:prstGeom prst="rect">
             <a:avLst/>
@@ -6098,7 +7539,129 @@
     </p:spTree>
     <p:extLst>
       <p:ext uri="{BB962C8B-B14F-4D97-AF65-F5344CB8AC3E}">
-        <p14:creationId xmlns:p14="http://schemas.microsoft.com/office/powerpoint/2010/main" val="954088865"/>
+        <p14:creationId xmlns:p14="http://schemas.microsoft.com/office/powerpoint/2010/main" val="3356134786"/>
+      </p:ext>
+    </p:extLst>
+  </p:cSld>
+  <p:clrMapOvr>
+    <a:masterClrMapping/>
+  </p:clrMapOvr>
+  <mc:AlternateContent xmlns:mc="http://schemas.openxmlformats.org/markup-compatibility/2006" xmlns:p14="http://schemas.microsoft.com/office/powerpoint/2010/main">
+    <mc:Choice Requires="p14">
+      <p:transition spd="med" p14:dur="700">
+        <p:fade/>
+      </p:transition>
+    </mc:Choice>
+    <mc:Fallback xmlns="">
+      <p:transition spd="med">
+        <p:fade/>
+      </p:transition>
+    </mc:Fallback>
+  </mc:AlternateContent>
+</p:sld>
+</file>
+
+<file path=ppt/slides/slide2.xml><?xml version="1.0" encoding="utf-8"?>
+<p:sld xmlns:a="http://schemas.openxmlformats.org/drawingml/2006/main" xmlns:r="http://schemas.openxmlformats.org/officeDocument/2006/relationships" xmlns:p="http://schemas.openxmlformats.org/presentationml/2006/main">
+  <p:cSld>
+    <p:spTree>
+      <p:nvGrpSpPr>
+        <p:cNvPr id="1" name=""/>
+        <p:cNvGrpSpPr/>
+        <p:nvPr/>
+      </p:nvGrpSpPr>
+      <p:grpSpPr>
+        <a:xfrm>
+          <a:off x="0" y="0"/>
+          <a:ext cx="0" cy="0"/>
+          <a:chOff x="0" y="0"/>
+          <a:chExt cx="0" cy="0"/>
+        </a:xfrm>
+      </p:grpSpPr>
+      <p:sp>
+        <p:nvSpPr>
+          <p:cNvPr id="11" name="TextBox 10">
+            <a:extLst>
+              <a:ext uri="{FF2B5EF4-FFF2-40B4-BE49-F238E27FC236}">
+                <a16:creationId xmlns:a16="http://schemas.microsoft.com/office/drawing/2014/main" id="{032EA95D-BE72-4FC1-87D5-1F0489EE2C7E}"/>
+              </a:ext>
+            </a:extLst>
+          </p:cNvPr>
+          <p:cNvSpPr txBox="1"/>
+          <p:nvPr/>
+        </p:nvSpPr>
+        <p:spPr>
+          <a:xfrm>
+            <a:off x="11430" y="6550223"/>
+            <a:ext cx="12192000" cy="307777"/>
+          </a:xfrm>
+          <a:prstGeom prst="rect">
+            <a:avLst/>
+          </a:prstGeom>
+          <a:noFill/>
+        </p:spPr>
+        <p:txBody>
+          <a:bodyPr wrap="square" rtlCol="0">
+            <a:spAutoFit/>
+          </a:bodyPr>
+          <a:lstStyle/>
+          <a:p>
+            <a:r>
+              <a:rPr lang="en-US" sz="1400" dirty="0">
+                <a:solidFill>
+                  <a:schemeClr val="tx1">
+                    <a:lumMod val="65000"/>
+                    <a:lumOff val="35000"/>
+                  </a:schemeClr>
+                </a:solidFill>
+                <a:latin typeface="+mj-lt"/>
+                <a:ea typeface="Verdana" panose="020B0604030504040204" pitchFamily="34" charset="0"/>
+              </a:rPr>
+              <a:t>Image Credit: https://cktechcheck.com/</a:t>
+            </a:r>
+          </a:p>
+        </p:txBody>
+      </p:sp>
+      <p:pic>
+        <p:nvPicPr>
+          <p:cNvPr id="3" name="Picture 2" descr="A green and white logo&#10;&#10;Description automatically generated with low confidence">
+            <a:extLst>
+              <a:ext uri="{FF2B5EF4-FFF2-40B4-BE49-F238E27FC236}">
+                <a16:creationId xmlns:a16="http://schemas.microsoft.com/office/drawing/2014/main" id="{845735AC-AF18-4257-A9FE-DE0BE6D668A3}"/>
+              </a:ext>
+            </a:extLst>
+          </p:cNvPr>
+          <p:cNvPicPr>
+            <a:picLocks noChangeAspect="1"/>
+          </p:cNvPicPr>
+          <p:nvPr/>
+        </p:nvPicPr>
+        <p:blipFill>
+          <a:blip r:embed="rId3">
+            <a:extLst>
+              <a:ext uri="{28A0092B-C50C-407E-A947-70E740481C1C}">
+                <a14:useLocalDpi xmlns:a14="http://schemas.microsoft.com/office/drawing/2010/main" val="0"/>
+              </a:ext>
+            </a:extLst>
+          </a:blip>
+          <a:stretch>
+            <a:fillRect/>
+          </a:stretch>
+        </p:blipFill>
+        <p:spPr>
+          <a:xfrm>
+            <a:off x="2347157" y="2219696"/>
+            <a:ext cx="7497685" cy="2418608"/>
+          </a:xfrm>
+          <a:prstGeom prst="rect">
+            <a:avLst/>
+          </a:prstGeom>
+        </p:spPr>
+      </p:pic>
+    </p:spTree>
+    <p:extLst>
+      <p:ext uri="{BB962C8B-B14F-4D97-AF65-F5344CB8AC3E}">
+        <p14:creationId xmlns:p14="http://schemas.microsoft.com/office/powerpoint/2010/main" val="2944933400"/>
       </p:ext>
     </p:extLst>
   </p:cSld>
@@ -6870,57 +8433,131 @@
           <a:chExt cx="0" cy="0"/>
         </a:xfrm>
       </p:grpSpPr>
-      <p:pic>
-        <p:nvPicPr>
-          <p:cNvPr id="1028" name="Picture 4" descr="Project Jupyter - Wikipedia">
+      <p:sp>
+        <p:nvSpPr>
+          <p:cNvPr id="2" name="Title 1">
             <a:extLst>
               <a:ext uri="{FF2B5EF4-FFF2-40B4-BE49-F238E27FC236}">
-                <a16:creationId xmlns:a16="http://schemas.microsoft.com/office/drawing/2014/main" id="{D47FA80A-C63A-4289-A2E5-C40C439B39C6}"/>
+                <a16:creationId xmlns:a16="http://schemas.microsoft.com/office/drawing/2014/main" id="{8306FF31-301F-43F0-8202-A782726E446A}"/>
               </a:ext>
             </a:extLst>
           </p:cNvPr>
-          <p:cNvPicPr>
-            <a:picLocks noChangeAspect="1" noChangeArrowheads="1"/>
-          </p:cNvPicPr>
-          <p:nvPr/>
-        </p:nvPicPr>
-        <p:blipFill>
-          <a:blip r:embed="rId3">
+          <p:cNvSpPr>
+            <a:spLocks noGrp="1"/>
+          </p:cNvSpPr>
+          <p:nvPr>
+            <p:ph type="title"/>
+          </p:nvPr>
+        </p:nvSpPr>
+        <p:spPr>
+          <a:xfrm>
+            <a:off x="618697" y="365127"/>
+            <a:ext cx="10735103" cy="827416"/>
+          </a:xfrm>
+        </p:spPr>
+        <p:txBody>
+          <a:bodyPr>
+            <a:normAutofit/>
+          </a:bodyPr>
+          <a:lstStyle/>
+          <a:p>
+            <a:pPr algn="ctr"/>
+            <a:r>
+              <a:rPr lang="en-US" sz="3600" dirty="0">
+                <a:latin typeface="Palatino Linotype" panose="02040502050505030304" pitchFamily="18" charset="0"/>
+                <a:cs typeface="Segoe UI Light" panose="020B0502040204020203" pitchFamily="34" charset="0"/>
+              </a:rPr>
+              <a:t>Artificial Intelligence</a:t>
+            </a:r>
+          </a:p>
+        </p:txBody>
+      </p:sp>
+      <p:sp>
+        <p:nvSpPr>
+          <p:cNvPr id="4" name="Content Placeholder 3">
             <a:extLst>
-              <a:ext uri="{28A0092B-C50C-407E-A947-70E740481C1C}">
-                <a14:useLocalDpi xmlns:a14="http://schemas.microsoft.com/office/drawing/2010/main" val="0"/>
+              <a:ext uri="{FF2B5EF4-FFF2-40B4-BE49-F238E27FC236}">
+                <a16:creationId xmlns:a16="http://schemas.microsoft.com/office/drawing/2014/main" id="{4E4AB757-90A1-4A72-AC15-A8FE775EA8EA}"/>
               </a:ext>
             </a:extLst>
-          </a:blip>
-          <a:srcRect/>
-          <a:stretch>
-            <a:fillRect/>
-          </a:stretch>
-        </p:blipFill>
-        <p:spPr bwMode="auto">
+          </p:cNvPr>
+          <p:cNvSpPr>
+            <a:spLocks noGrp="1"/>
+          </p:cNvSpPr>
+          <p:nvPr>
+            <p:ph idx="1"/>
+          </p:nvPr>
+        </p:nvSpPr>
+        <p:spPr>
           <a:xfrm>
-            <a:off x="4651516" y="1754685"/>
-            <a:ext cx="2888968" cy="3348629"/>
+            <a:off x="838200" y="1490346"/>
+            <a:ext cx="10515600" cy="4351338"/>
           </a:xfrm>
-          <a:prstGeom prst="rect">
-            <a:avLst/>
-          </a:prstGeom>
-          <a:noFill/>
-          <a:extLst>
-            <a:ext uri="{909E8E84-426E-40DD-AFC4-6F175D3DCCD1}">
-              <a14:hiddenFill xmlns:a14="http://schemas.microsoft.com/office/drawing/2010/main">
-                <a:solidFill>
-                  <a:srgbClr val="FFFFFF"/>
-                </a:solidFill>
-              </a14:hiddenFill>
-            </a:ext>
-          </a:extLst>
         </p:spPr>
-      </p:pic>
+        <p:txBody>
+          <a:bodyPr/>
+          <a:lstStyle/>
+          <a:p>
+            <a:pPr marL="0" indent="0">
+              <a:buNone/>
+            </a:pPr>
+            <a:endParaRPr lang="en-US" b="0" i="0" dirty="0">
+              <a:solidFill>
+                <a:srgbClr val="202122"/>
+              </a:solidFill>
+              <a:effectLst/>
+              <a:latin typeface="Palatino Linotype" panose="02040502050505030304" pitchFamily="18" charset="0"/>
+            </a:endParaRPr>
+          </a:p>
+          <a:p>
+            <a:pPr marL="0" indent="0">
+              <a:buNone/>
+            </a:pPr>
+            <a:endParaRPr lang="en-US" dirty="0">
+              <a:solidFill>
+                <a:srgbClr val="202122"/>
+              </a:solidFill>
+              <a:latin typeface="Palatino Linotype" panose="02040502050505030304" pitchFamily="18" charset="0"/>
+            </a:endParaRPr>
+          </a:p>
+          <a:p>
+            <a:pPr marL="0" indent="0">
+              <a:buNone/>
+            </a:pPr>
+            <a:r>
+              <a:rPr lang="en-US" b="0" i="0" dirty="0">
+                <a:solidFill>
+                  <a:srgbClr val="202122"/>
+                </a:solidFill>
+                <a:effectLst/>
+                <a:latin typeface="Palatino Linotype" panose="02040502050505030304" pitchFamily="18" charset="0"/>
+              </a:rPr>
+              <a:t>Artificial Intelligence is the study of “rational agents”: any system that perceives its environment and takes actions that maximize its chance of achieving its goals.</a:t>
+            </a:r>
+          </a:p>
+          <a:p>
+            <a:pPr marL="0" indent="0">
+              <a:buNone/>
+            </a:pPr>
+            <a:r>
+              <a:rPr lang="en-US" dirty="0">
+                <a:solidFill>
+                  <a:srgbClr val="202122"/>
+                </a:solidFill>
+                <a:latin typeface="Palatino Linotype" panose="02040502050505030304" pitchFamily="18" charset="0"/>
+              </a:rPr>
+              <a:t>						-- Russell &amp; Norvig (2003)</a:t>
+            </a:r>
+            <a:endParaRPr lang="en-US" dirty="0">
+              <a:latin typeface="Palatino Linotype" panose="02040502050505030304" pitchFamily="18" charset="0"/>
+            </a:endParaRPr>
+          </a:p>
+        </p:txBody>
+      </p:sp>
     </p:spTree>
     <p:extLst>
       <p:ext uri="{BB962C8B-B14F-4D97-AF65-F5344CB8AC3E}">
-        <p14:creationId xmlns:p14="http://schemas.microsoft.com/office/powerpoint/2010/main" val="3356134786"/>
+        <p14:creationId xmlns:p14="http://schemas.microsoft.com/office/powerpoint/2010/main" val="2515421536"/>
       </p:ext>
     </p:extLst>
   </p:cSld>
@@ -6964,7 +8601,7 @@
           <p:cNvPr id="2" name="Title 1">
             <a:extLst>
               <a:ext uri="{FF2B5EF4-FFF2-40B4-BE49-F238E27FC236}">
-                <a16:creationId xmlns:a16="http://schemas.microsoft.com/office/drawing/2014/main" id="{0F853981-B13F-4917-804F-EBF0D4819E7E}"/>
+                <a16:creationId xmlns:a16="http://schemas.microsoft.com/office/drawing/2014/main" id="{8306FF31-301F-43F0-8202-A782726E446A}"/>
               </a:ext>
             </a:extLst>
           </p:cNvPr>
@@ -6977,168 +8614,115 @@
         </p:nvSpPr>
         <p:spPr>
           <a:xfrm>
-            <a:off x="0" y="3076806"/>
-            <a:ext cx="12192000" cy="704387"/>
+            <a:off x="618697" y="365127"/>
+            <a:ext cx="10735103" cy="827416"/>
           </a:xfrm>
-          <a:noFill/>
         </p:spPr>
         <p:txBody>
           <a:bodyPr>
-            <a:noAutofit/>
+            <a:normAutofit/>
           </a:bodyPr>
           <a:lstStyle/>
           <a:p>
             <a:pPr algn="ctr"/>
-            <a:br>
+            <a:r>
               <a:rPr lang="en-US" sz="3600" dirty="0">
-                <a:solidFill>
-                  <a:schemeClr val="tx1">
-                    <a:lumMod val="65000"/>
-                    <a:lumOff val="35000"/>
-                  </a:schemeClr>
-                </a:solidFill>
-              </a:rPr>
-            </a:br>
-            <a:br>
-              <a:rPr lang="en-US" sz="3600" dirty="0">
-                <a:solidFill>
-                  <a:schemeClr val="tx1">
-                    <a:lumMod val="65000"/>
-                    <a:lumOff val="35000"/>
-                  </a:schemeClr>
-                </a:solidFill>
-              </a:rPr>
-            </a:br>
-            <a:br>
-              <a:rPr lang="en-US" sz="3600" dirty="0">
-                <a:solidFill>
-                  <a:schemeClr val="tx1">
-                    <a:lumMod val="65000"/>
-                    <a:lumOff val="35000"/>
-                  </a:schemeClr>
-                </a:solidFill>
-              </a:rPr>
-            </a:br>
-            <a:br>
-              <a:rPr lang="en-US" sz="3600" dirty="0">
-                <a:solidFill>
-                  <a:schemeClr val="tx1">
-                    <a:lumMod val="65000"/>
-                    <a:lumOff val="35000"/>
-                  </a:schemeClr>
-                </a:solidFill>
-              </a:rPr>
-            </a:br>
-            <a:br>
-              <a:rPr lang="en-US" sz="3600" dirty="0">
-                <a:solidFill>
-                  <a:schemeClr val="tx1">
-                    <a:lumMod val="65000"/>
-                    <a:lumOff val="35000"/>
-                  </a:schemeClr>
-                </a:solidFill>
-              </a:rPr>
-            </a:br>
-            <a:br>
-              <a:rPr lang="en-US" sz="3600" dirty="0">
-                <a:solidFill>
-                  <a:schemeClr val="tx1">
-                    <a:lumMod val="65000"/>
-                    <a:lumOff val="35000"/>
-                  </a:schemeClr>
-                </a:solidFill>
-              </a:rPr>
-            </a:br>
-            <a:br>
-              <a:rPr lang="en-US" sz="3600" dirty="0">
-                <a:solidFill>
-                  <a:schemeClr val="tx1">
-                    <a:lumMod val="65000"/>
-                    <a:lumOff val="35000"/>
-                  </a:schemeClr>
-                </a:solidFill>
-              </a:rPr>
-            </a:br>
-            <a:br>
-              <a:rPr lang="en-US" sz="3600" dirty="0">
-                <a:solidFill>
-                  <a:schemeClr val="tx1">
-                    <a:lumMod val="65000"/>
-                    <a:lumOff val="35000"/>
-                  </a:schemeClr>
-                </a:solidFill>
-              </a:rPr>
-            </a:br>
-            <a:r>
-              <a:rPr lang="en-US" sz="3600" dirty="0">
-                <a:solidFill>
-                  <a:schemeClr val="tx1">
-                    <a:lumMod val="65000"/>
-                    <a:lumOff val="35000"/>
-                  </a:schemeClr>
-                </a:solidFill>
-              </a:rPr>
-              <a:t>     </a:t>
-            </a:r>
-            <a:r>
-              <a:rPr lang="en-US" sz="3600" dirty="0">
-                <a:solidFill>
-                  <a:schemeClr val="tx1">
-                    <a:lumMod val="65000"/>
-                    <a:lumOff val="35000"/>
-                  </a:schemeClr>
-                </a:solidFill>
                 <a:latin typeface="Palatino Linotype" panose="02040502050505030304" pitchFamily="18" charset="0"/>
-              </a:rPr>
-              <a:t>1.01 (Image &amp; Speech Recognition Demo)</a:t>
-            </a:r>
-            <a:endParaRPr lang="en-US" sz="3600" dirty="0">
-              <a:solidFill>
-                <a:schemeClr val="tx1">
-                  <a:lumMod val="65000"/>
-                  <a:lumOff val="35000"/>
-                </a:schemeClr>
-              </a:solidFill>
-              <a:latin typeface="Palatino Linotype" panose="02040502050505030304" pitchFamily="18" charset="0"/>
-              <a:cs typeface="Segoe UI Light" panose="020B0502040204020203" pitchFamily="34" charset="0"/>
-            </a:endParaRPr>
-          </a:p>
-        </p:txBody>
-      </p:sp>
-      <p:pic>
-        <p:nvPicPr>
-          <p:cNvPr id="4" name="Picture 3">
+                <a:cs typeface="Segoe UI Light" panose="020B0502040204020203" pitchFamily="34" charset="0"/>
+              </a:rPr>
+              <a:t>Machine Learning</a:t>
+            </a:r>
+          </a:p>
+        </p:txBody>
+      </p:sp>
+      <p:sp>
+        <p:nvSpPr>
+          <p:cNvPr id="4" name="Content Placeholder 3">
             <a:extLst>
               <a:ext uri="{FF2B5EF4-FFF2-40B4-BE49-F238E27FC236}">
-                <a16:creationId xmlns:a16="http://schemas.microsoft.com/office/drawing/2014/main" id="{539F426C-5A30-441C-B0C2-04ADFC8CE324}"/>
+                <a16:creationId xmlns:a16="http://schemas.microsoft.com/office/drawing/2014/main" id="{4E4AB757-90A1-4A72-AC15-A8FE775EA8EA}"/>
               </a:ext>
             </a:extLst>
           </p:cNvPr>
-          <p:cNvPicPr>
-            <a:picLocks noChangeAspect="1"/>
-          </p:cNvPicPr>
-          <p:nvPr/>
-        </p:nvPicPr>
-        <p:blipFill>
-          <a:blip r:embed="rId3"/>
-          <a:stretch>
-            <a:fillRect/>
-          </a:stretch>
-        </p:blipFill>
+          <p:cNvSpPr>
+            <a:spLocks noGrp="1"/>
+          </p:cNvSpPr>
+          <p:nvPr>
+            <p:ph idx="1"/>
+          </p:nvPr>
+        </p:nvSpPr>
         <p:spPr>
           <a:xfrm>
-            <a:off x="0" y="365760"/>
-            <a:ext cx="3233668" cy="805144"/>
+            <a:off x="838200" y="1490346"/>
+            <a:ext cx="10515600" cy="4351338"/>
           </a:xfrm>
-          <a:prstGeom prst="rect">
-            <a:avLst/>
-          </a:prstGeom>
         </p:spPr>
-      </p:pic>
+        <p:txBody>
+          <a:bodyPr/>
+          <a:lstStyle/>
+          <a:p>
+            <a:pPr marL="0" indent="0">
+              <a:buNone/>
+            </a:pPr>
+            <a:endParaRPr lang="en-US" dirty="0"/>
+          </a:p>
+          <a:p>
+            <a:pPr marL="0" indent="0">
+              <a:buNone/>
+            </a:pPr>
+            <a:r>
+              <a:rPr lang="en-US" sz="2800" dirty="0">
+                <a:latin typeface="Palatino Linotype" panose="02040502050505030304" pitchFamily="18" charset="0"/>
+              </a:rPr>
+              <a:t>Machine learning is the field of study that gives computers the ability to learn without being explicitly programmed.</a:t>
+            </a:r>
+          </a:p>
+          <a:p>
+            <a:pPr marL="0" indent="0">
+              <a:buNone/>
+            </a:pPr>
+            <a:r>
+              <a:rPr lang="en-US" sz="2800" dirty="0">
+                <a:latin typeface="Palatino Linotype" panose="02040502050505030304" pitchFamily="18" charset="0"/>
+              </a:rPr>
+              <a:t>						-- Arthur Samuel (1959)</a:t>
+            </a:r>
+          </a:p>
+          <a:p>
+            <a:pPr marL="0" indent="0">
+              <a:buFont typeface="Arial" panose="020B0604020202020204" pitchFamily="34" charset="0"/>
+              <a:buNone/>
+            </a:pPr>
+            <a:endParaRPr lang="en-US" dirty="0">
+              <a:latin typeface="Palatino Linotype" panose="02040502050505030304" pitchFamily="18" charset="0"/>
+            </a:endParaRPr>
+          </a:p>
+          <a:p>
+            <a:pPr marL="0" indent="0">
+              <a:buFont typeface="Arial" panose="020B0604020202020204" pitchFamily="34" charset="0"/>
+              <a:buNone/>
+            </a:pPr>
+            <a:r>
+              <a:rPr lang="en-US" dirty="0">
+                <a:latin typeface="Palatino Linotype" panose="02040502050505030304" pitchFamily="18" charset="0"/>
+              </a:rPr>
+              <a:t>Machine learning is the science and art of programming computers so they can learn from data.</a:t>
+            </a:r>
+          </a:p>
+          <a:p>
+            <a:pPr marL="0" indent="0" algn="ctr">
+              <a:buNone/>
+            </a:pPr>
+            <a:endParaRPr lang="en-US" dirty="0">
+              <a:latin typeface="+mj-lt"/>
+            </a:endParaRPr>
+          </a:p>
+        </p:txBody>
+      </p:sp>
     </p:spTree>
     <p:extLst>
       <p:ext uri="{BB962C8B-B14F-4D97-AF65-F5344CB8AC3E}">
-        <p14:creationId xmlns:p14="http://schemas.microsoft.com/office/powerpoint/2010/main" val="300486163"/>
+        <p14:creationId xmlns:p14="http://schemas.microsoft.com/office/powerpoint/2010/main" val="1876161777"/>
       </p:ext>
     </p:extLst>
   </p:cSld>
@@ -7182,7 +8766,7 @@
           <p:cNvPr id="2" name="Title 1">
             <a:extLst>
               <a:ext uri="{FF2B5EF4-FFF2-40B4-BE49-F238E27FC236}">
-                <a16:creationId xmlns:a16="http://schemas.microsoft.com/office/drawing/2014/main" id="{0F853981-B13F-4917-804F-EBF0D4819E7E}"/>
+                <a16:creationId xmlns:a16="http://schemas.microsoft.com/office/drawing/2014/main" id="{8306FF31-301F-43F0-8202-A782726E446A}"/>
               </a:ext>
             </a:extLst>
           </p:cNvPr>
@@ -7195,189 +8779,156 @@
         </p:nvSpPr>
         <p:spPr>
           <a:xfrm>
-            <a:off x="0" y="2953213"/>
-            <a:ext cx="12192000" cy="951574"/>
+            <a:off x="618697" y="365127"/>
+            <a:ext cx="10735103" cy="827416"/>
           </a:xfrm>
+        </p:spPr>
+        <p:txBody>
+          <a:bodyPr>
+            <a:normAutofit/>
+          </a:bodyPr>
+          <a:lstStyle/>
+          <a:p>
+            <a:pPr algn="ctr"/>
+            <a:r>
+              <a:rPr lang="en-US" sz="3600" dirty="0">
+                <a:latin typeface="Palatino Linotype" panose="02040502050505030304" pitchFamily="18" charset="0"/>
+                <a:cs typeface="Segoe UI Light" panose="020B0502040204020203" pitchFamily="34" charset="0"/>
+              </a:rPr>
+              <a:t>Deep Learning</a:t>
+            </a:r>
+          </a:p>
+        </p:txBody>
+      </p:sp>
+      <p:pic>
+        <p:nvPicPr>
+          <p:cNvPr id="1026" name="Picture 2" descr="Rainbow Layer Cake Recipe - BettyCrocker.com">
+            <a:extLst>
+              <a:ext uri="{FF2B5EF4-FFF2-40B4-BE49-F238E27FC236}">
+                <a16:creationId xmlns:a16="http://schemas.microsoft.com/office/drawing/2014/main" id="{6B01A55C-3E3D-4A68-8148-EBA141EEF8DA}"/>
+              </a:ext>
+            </a:extLst>
+          </p:cNvPr>
+          <p:cNvPicPr>
+            <a:picLocks noChangeAspect="1" noChangeArrowheads="1"/>
+          </p:cNvPicPr>
+          <p:nvPr/>
+        </p:nvPicPr>
+        <p:blipFill>
+          <a:blip r:embed="rId3">
+            <a:extLst>
+              <a:ext uri="{28A0092B-C50C-407E-A947-70E740481C1C}">
+                <a14:useLocalDpi xmlns:a14="http://schemas.microsoft.com/office/drawing/2010/main" val="0"/>
+              </a:ext>
+            </a:extLst>
+          </a:blip>
+          <a:srcRect/>
+          <a:stretch>
+            <a:fillRect/>
+          </a:stretch>
+        </p:blipFill>
+        <p:spPr bwMode="auto">
+          <a:xfrm>
+            <a:off x="3542880" y="2054605"/>
+            <a:ext cx="4886736" cy="2748789"/>
+          </a:xfrm>
+          <a:prstGeom prst="rect">
+            <a:avLst/>
+          </a:prstGeom>
+          <a:noFill/>
+          <a:ln w="6350">
+            <a:solidFill>
+              <a:schemeClr val="tx1">
+                <a:lumMod val="65000"/>
+                <a:lumOff val="35000"/>
+              </a:schemeClr>
+            </a:solidFill>
+          </a:ln>
+          <a:effectLst>
+            <a:outerShdw blurRad="50800" dist="38100" dir="2700000" algn="tl" rotWithShape="0">
+              <a:prstClr val="black">
+                <a:alpha val="40000"/>
+              </a:prstClr>
+            </a:outerShdw>
+          </a:effectLst>
+          <a:extLst>
+            <a:ext uri="{909E8E84-426E-40DD-AFC4-6F175D3DCCD1}">
+              <a14:hiddenFill xmlns:a14="http://schemas.microsoft.com/office/drawing/2010/main">
+                <a:solidFill>
+                  <a:srgbClr val="FFFFFF"/>
+                </a:solidFill>
+              </a14:hiddenFill>
+            </a:ext>
+          </a:extLst>
+        </p:spPr>
+      </p:pic>
+      <p:sp>
+        <p:nvSpPr>
+          <p:cNvPr id="4" name="TextBox 3">
+            <a:extLst>
+              <a:ext uri="{FF2B5EF4-FFF2-40B4-BE49-F238E27FC236}">
+                <a16:creationId xmlns:a16="http://schemas.microsoft.com/office/drawing/2014/main" id="{0B25E44E-8C42-4246-94DF-CC612E8605BA}"/>
+              </a:ext>
+            </a:extLst>
+          </p:cNvPr>
+          <p:cNvSpPr txBox="1"/>
+          <p:nvPr/>
+        </p:nvSpPr>
+        <p:spPr>
+          <a:xfrm>
+            <a:off x="0" y="6550223"/>
+            <a:ext cx="12192000" cy="307777"/>
+          </a:xfrm>
+          <a:prstGeom prst="rect">
+            <a:avLst/>
+          </a:prstGeom>
           <a:noFill/>
         </p:spPr>
         <p:txBody>
-          <a:bodyPr>
-            <a:normAutofit fontScale="90000"/>
+          <a:bodyPr wrap="square" rtlCol="0">
+            <a:spAutoFit/>
           </a:bodyPr>
           <a:lstStyle/>
           <a:p>
-            <a:pPr algn="ctr"/>
-            <a:br>
-              <a:rPr lang="en-US" sz="4400" dirty="0">
+            <a:r>
+              <a:rPr lang="en-US" sz="1400" dirty="0">
                 <a:solidFill>
                   <a:schemeClr val="tx1">
                     <a:lumMod val="65000"/>
                     <a:lumOff val="35000"/>
                   </a:schemeClr>
                 </a:solidFill>
-              </a:rPr>
-            </a:br>
-            <a:br>
-              <a:rPr lang="en-US" sz="4400" dirty="0">
+                <a:latin typeface="+mj-lt"/>
+                <a:ea typeface="Verdana" panose="020B0604030504040204" pitchFamily="34" charset="0"/>
+              </a:rPr>
+              <a:t>Image Credit: </a:t>
+            </a:r>
+            <a:r>
+              <a:rPr lang="en-US" sz="1400" b="0" i="0" u="none" strike="noStrike" kern="1200" cap="none" dirty="0">
+                <a:ln>
+                  <a:noFill/>
+                </a:ln>
                 <a:solidFill>
                   <a:schemeClr val="tx1">
                     <a:lumMod val="65000"/>
                     <a:lumOff val="35000"/>
                   </a:schemeClr>
                 </a:solidFill>
-              </a:rPr>
-            </a:br>
-            <a:br>
-              <a:rPr lang="en-US" sz="4400" dirty="0">
-                <a:solidFill>
-                  <a:schemeClr val="tx1">
-                    <a:lumMod val="65000"/>
-                    <a:lumOff val="35000"/>
-                  </a:schemeClr>
-                </a:solidFill>
-              </a:rPr>
-            </a:br>
-            <a:br>
-              <a:rPr lang="en-US" sz="4400" dirty="0">
-                <a:solidFill>
-                  <a:schemeClr val="tx1">
-                    <a:lumMod val="65000"/>
-                    <a:lumOff val="35000"/>
-                  </a:schemeClr>
-                </a:solidFill>
-              </a:rPr>
-            </a:br>
-            <a:br>
-              <a:rPr lang="en-US" sz="4400" dirty="0">
-                <a:solidFill>
-                  <a:schemeClr val="tx1">
-                    <a:lumMod val="65000"/>
-                    <a:lumOff val="35000"/>
-                  </a:schemeClr>
-                </a:solidFill>
-              </a:rPr>
-            </a:br>
-            <a:br>
-              <a:rPr lang="en-US" sz="4400" dirty="0">
-                <a:solidFill>
-                  <a:schemeClr val="tx1">
-                    <a:lumMod val="65000"/>
-                    <a:lumOff val="35000"/>
-                  </a:schemeClr>
-                </a:solidFill>
-              </a:rPr>
-            </a:br>
-            <a:br>
-              <a:rPr lang="en-US" sz="4400" dirty="0">
-                <a:solidFill>
-                  <a:schemeClr val="tx1">
-                    <a:lumMod val="65000"/>
-                    <a:lumOff val="35000"/>
-                  </a:schemeClr>
-                </a:solidFill>
-              </a:rPr>
-            </a:br>
-            <a:br>
-              <a:rPr lang="en-US" sz="4400" dirty="0">
-                <a:solidFill>
-                  <a:schemeClr val="tx1">
-                    <a:lumMod val="65000"/>
-                    <a:lumOff val="35000"/>
-                  </a:schemeClr>
-                </a:solidFill>
-              </a:rPr>
-            </a:br>
-            <a:r>
-              <a:rPr lang="en-US" sz="4400" dirty="0">
-                <a:solidFill>
-                  <a:schemeClr val="tx1">
-                    <a:lumMod val="65000"/>
-                    <a:lumOff val="35000"/>
-                  </a:schemeClr>
-                </a:solidFill>
-              </a:rPr>
-              <a:t>     </a:t>
-            </a:r>
-            <a:r>
-              <a:rPr lang="en-US" sz="6700" dirty="0">
-                <a:solidFill>
-                  <a:schemeClr val="tx1">
-                    <a:lumMod val="65000"/>
-                    <a:lumOff val="35000"/>
-                  </a:schemeClr>
-                </a:solidFill>
-                <a:latin typeface="Palatino Linotype" panose="02040502050505030304" pitchFamily="18" charset="0"/>
-              </a:rPr>
-              <a:t>Neural Network Architectures</a:t>
-            </a:r>
-            <a:endParaRPr lang="en-US" sz="6700" dirty="0">
+                <a:latin typeface="+mj-lt"/>
+                <a:ea typeface="Arial" pitchFamily="34"/>
+                <a:cs typeface="Arial" pitchFamily="34"/>
+              </a:rPr>
+              <a:t>https://www.bettycrocker.com/recipes/rainbow-layer-cake/4969fed8-141e-45f5-9a04-e03addd20fbb</a:t>
+            </a:r>
+            <a:endParaRPr lang="en-US" sz="1400" dirty="0">
               <a:solidFill>
                 <a:schemeClr val="tx1">
                   <a:lumMod val="65000"/>
                   <a:lumOff val="35000"/>
                 </a:schemeClr>
               </a:solidFill>
-              <a:latin typeface="Palatino Linotype" panose="02040502050505030304" pitchFamily="18" charset="0"/>
-              <a:cs typeface="Segoe UI Light" panose="020B0502040204020203" pitchFamily="34" charset="0"/>
-            </a:endParaRPr>
-          </a:p>
-        </p:txBody>
-      </p:sp>
-      <p:sp>
-        <p:nvSpPr>
-          <p:cNvPr id="3" name="Text Placeholder 2">
-            <a:extLst>
-              <a:ext uri="{FF2B5EF4-FFF2-40B4-BE49-F238E27FC236}">
-                <a16:creationId xmlns:a16="http://schemas.microsoft.com/office/drawing/2014/main" id="{098BC2D2-CCF7-4C63-8489-B46BF394FCA2}"/>
-              </a:ext>
-            </a:extLst>
-          </p:cNvPr>
-          <p:cNvSpPr>
-            <a:spLocks noGrp="1"/>
-          </p:cNvSpPr>
-          <p:nvPr>
-            <p:ph type="body" idx="1"/>
-          </p:nvPr>
-        </p:nvSpPr>
-        <p:spPr>
-          <a:xfrm>
-            <a:off x="0" y="4285400"/>
-            <a:ext cx="12192000" cy="518830"/>
-          </a:xfrm>
-        </p:spPr>
-        <p:txBody>
-          <a:bodyPr>
-            <a:normAutofit/>
-          </a:bodyPr>
-          <a:lstStyle/>
-          <a:p>
-            <a:endParaRPr lang="en-US" dirty="0">
-              <a:latin typeface="Palatino Linotype" panose="02040502050505030304" pitchFamily="18" charset="0"/>
-              <a:cs typeface="Segoe UI" panose="020B0502040204020203" pitchFamily="34" charset="0"/>
-            </a:endParaRPr>
-          </a:p>
-          <a:p>
-            <a:endParaRPr lang="en-US" dirty="0">
-              <a:latin typeface="Palatino Linotype" panose="02040502050505030304" pitchFamily="18" charset="0"/>
-              <a:cs typeface="Segoe UI" panose="020B0502040204020203" pitchFamily="34" charset="0"/>
-            </a:endParaRPr>
-          </a:p>
-          <a:p>
-            <a:endParaRPr lang="en-US" dirty="0">
-              <a:latin typeface="Palatino Linotype" panose="02040502050505030304" pitchFamily="18" charset="0"/>
-              <a:cs typeface="Segoe UI" panose="020B0502040204020203" pitchFamily="34" charset="0"/>
-            </a:endParaRPr>
-          </a:p>
-          <a:p>
-            <a:endParaRPr lang="en-US" dirty="0">
-              <a:latin typeface="Palatino Linotype" panose="02040502050505030304" pitchFamily="18" charset="0"/>
-              <a:cs typeface="Segoe UI" panose="020B0502040204020203" pitchFamily="34" charset="0"/>
-            </a:endParaRPr>
-          </a:p>
-          <a:p>
-            <a:endParaRPr lang="en-US" dirty="0">
-              <a:latin typeface="Palatino Linotype" panose="02040502050505030304" pitchFamily="18" charset="0"/>
-              <a:cs typeface="Segoe UI" panose="020B0502040204020203" pitchFamily="34" charset="0"/>
+              <a:latin typeface="+mj-lt"/>
+              <a:ea typeface="Verdana" panose="020B0604030504040204" pitchFamily="34" charset="0"/>
             </a:endParaRPr>
           </a:p>
         </p:txBody>
@@ -7385,7 +8936,7 @@
     </p:spTree>
     <p:extLst>
       <p:ext uri="{BB962C8B-B14F-4D97-AF65-F5344CB8AC3E}">
-        <p14:creationId xmlns:p14="http://schemas.microsoft.com/office/powerpoint/2010/main" val="2101828597"/>
+        <p14:creationId xmlns:p14="http://schemas.microsoft.com/office/powerpoint/2010/main" val="888845023"/>
       </p:ext>
     </p:extLst>
   </p:cSld>
@@ -7410,14 +8961,6 @@
 <file path=ppt/slides/slide9.xml><?xml version="1.0" encoding="utf-8"?>
 <p:sld xmlns:a="http://schemas.openxmlformats.org/drawingml/2006/main" xmlns:r="http://schemas.openxmlformats.org/officeDocument/2006/relationships" xmlns:p="http://schemas.openxmlformats.org/presentationml/2006/main">
   <p:cSld>
-    <p:bg>
-      <p:bgPr>
-        <a:solidFill>
-          <a:schemeClr val="bg1"/>
-        </a:solidFill>
-        <a:effectLst/>
-      </p:bgPr>
-    </p:bg>
     <p:spTree>
       <p:nvGrpSpPr>
         <p:cNvPr id="1" name=""/>
@@ -7432,12 +8975,158 @@
           <a:chExt cx="0" cy="0"/>
         </a:xfrm>
       </p:grpSpPr>
+      <p:sp>
+        <p:nvSpPr>
+          <p:cNvPr id="2" name="Title 1">
+            <a:extLst>
+              <a:ext uri="{FF2B5EF4-FFF2-40B4-BE49-F238E27FC236}">
+                <a16:creationId xmlns:a16="http://schemas.microsoft.com/office/drawing/2014/main" id="{0F853981-B13F-4917-804F-EBF0D4819E7E}"/>
+              </a:ext>
+            </a:extLst>
+          </p:cNvPr>
+          <p:cNvSpPr>
+            <a:spLocks noGrp="1"/>
+          </p:cNvSpPr>
+          <p:nvPr>
+            <p:ph type="title"/>
+          </p:nvPr>
+        </p:nvSpPr>
+        <p:spPr>
+          <a:xfrm>
+            <a:off x="0" y="3076806"/>
+            <a:ext cx="12192000" cy="704387"/>
+          </a:xfrm>
+          <a:noFill/>
+        </p:spPr>
+        <p:txBody>
+          <a:bodyPr>
+            <a:noAutofit/>
+          </a:bodyPr>
+          <a:lstStyle/>
+          <a:p>
+            <a:pPr algn="ctr"/>
+            <a:br>
+              <a:rPr lang="en-US" sz="3600" dirty="0">
+                <a:solidFill>
+                  <a:schemeClr val="tx1">
+                    <a:lumMod val="65000"/>
+                    <a:lumOff val="35000"/>
+                  </a:schemeClr>
+                </a:solidFill>
+              </a:rPr>
+            </a:br>
+            <a:br>
+              <a:rPr lang="en-US" sz="3600" dirty="0">
+                <a:solidFill>
+                  <a:schemeClr val="tx1">
+                    <a:lumMod val="65000"/>
+                    <a:lumOff val="35000"/>
+                  </a:schemeClr>
+                </a:solidFill>
+              </a:rPr>
+            </a:br>
+            <a:br>
+              <a:rPr lang="en-US" sz="3600" dirty="0">
+                <a:solidFill>
+                  <a:schemeClr val="tx1">
+                    <a:lumMod val="65000"/>
+                    <a:lumOff val="35000"/>
+                  </a:schemeClr>
+                </a:solidFill>
+              </a:rPr>
+            </a:br>
+            <a:br>
+              <a:rPr lang="en-US" sz="3600" dirty="0">
+                <a:solidFill>
+                  <a:schemeClr val="tx1">
+                    <a:lumMod val="65000"/>
+                    <a:lumOff val="35000"/>
+                  </a:schemeClr>
+                </a:solidFill>
+              </a:rPr>
+            </a:br>
+            <a:br>
+              <a:rPr lang="en-US" sz="3600" dirty="0">
+                <a:solidFill>
+                  <a:schemeClr val="tx1">
+                    <a:lumMod val="65000"/>
+                    <a:lumOff val="35000"/>
+                  </a:schemeClr>
+                </a:solidFill>
+              </a:rPr>
+            </a:br>
+            <a:br>
+              <a:rPr lang="en-US" sz="3600" dirty="0">
+                <a:solidFill>
+                  <a:schemeClr val="tx1">
+                    <a:lumMod val="65000"/>
+                    <a:lumOff val="35000"/>
+                  </a:schemeClr>
+                </a:solidFill>
+              </a:rPr>
+            </a:br>
+            <a:br>
+              <a:rPr lang="en-US" sz="3600" dirty="0">
+                <a:solidFill>
+                  <a:schemeClr val="tx1">
+                    <a:lumMod val="65000"/>
+                    <a:lumOff val="35000"/>
+                  </a:schemeClr>
+                </a:solidFill>
+              </a:rPr>
+            </a:br>
+            <a:br>
+              <a:rPr lang="en-US" sz="3600" dirty="0">
+                <a:solidFill>
+                  <a:schemeClr val="tx1">
+                    <a:lumMod val="65000"/>
+                    <a:lumOff val="35000"/>
+                  </a:schemeClr>
+                </a:solidFill>
+              </a:rPr>
+            </a:br>
+            <a:r>
+              <a:rPr lang="en-US" sz="3600" dirty="0">
+                <a:solidFill>
+                  <a:schemeClr val="tx1">
+                    <a:lumMod val="65000"/>
+                    <a:lumOff val="35000"/>
+                  </a:schemeClr>
+                </a:solidFill>
+              </a:rPr>
+              <a:t>     </a:t>
+            </a:r>
+            <a:r>
+              <a:rPr lang="en-US" sz="3600" dirty="0">
+                <a:solidFill>
+                  <a:schemeClr val="tx1">
+                    <a:lumMod val="65000"/>
+                    <a:lumOff val="35000"/>
+                  </a:schemeClr>
+                </a:solidFill>
+                <a:latin typeface="Palatino Linotype" panose="02040502050505030304" pitchFamily="18" charset="0"/>
+              </a:rPr>
+              <a:t>1.01 (Image &amp; Speech Recognition Demo)</a:t>
+            </a:r>
+            <a:endParaRPr lang="en-US" sz="3600" dirty="0">
+              <a:solidFill>
+                <a:schemeClr val="tx1">
+                  <a:lumMod val="65000"/>
+                  <a:lumOff val="35000"/>
+                </a:schemeClr>
+              </a:solidFill>
+              <a:latin typeface="Palatino Linotype" panose="02040502050505030304" pitchFamily="18" charset="0"/>
+              <a:cs typeface="Segoe UI Light" panose="020B0502040204020203" pitchFamily="34" charset="0"/>
+            </a:endParaRPr>
+          </a:p>
+        </p:txBody>
+      </p:sp>
       <p:pic>
         <p:nvPicPr>
           <p:cNvPr id="4" name="Picture 3">
             <a:extLst>
               <a:ext uri="{FF2B5EF4-FFF2-40B4-BE49-F238E27FC236}">
-                <a16:creationId xmlns:a16="http://schemas.microsoft.com/office/drawing/2014/main" id="{D9E8786A-DC4B-41D1-94C9-80F444DEC6FA}"/>
+                <a16:creationId xmlns:a16="http://schemas.microsoft.com/office/drawing/2014/main" id="{539F426C-5A30-441C-B0C2-04ADFC8CE324}"/>
               </a:ext>
             </a:extLst>
           </p:cNvPr>
@@ -7454,8 +9143,8 @@
         </p:blipFill>
         <p:spPr>
           <a:xfrm>
-            <a:off x="2806558" y="1208627"/>
-            <a:ext cx="6578883" cy="4440746"/>
+            <a:off x="0" y="365760"/>
+            <a:ext cx="3233668" cy="805144"/>
           </a:xfrm>
           <a:prstGeom prst="rect">
             <a:avLst/>
@@ -7465,7 +9154,7 @@
     </p:spTree>
     <p:extLst>
       <p:ext uri="{BB962C8B-B14F-4D97-AF65-F5344CB8AC3E}">
-        <p14:creationId xmlns:p14="http://schemas.microsoft.com/office/powerpoint/2010/main" val="844444607"/>
+        <p14:creationId xmlns:p14="http://schemas.microsoft.com/office/powerpoint/2010/main" val="300486163"/>
       </p:ext>
     </p:extLst>
   </p:cSld>

</xml_diff>

<commit_message>
Edits from 03.21.22 practice reading.
</commit_message>
<xml_diff>
--- a/presentations/01_deep_learn_intro.pptx
+++ b/presentations/01_deep_learn_intro.pptx
@@ -5,7 +5,7 @@
     <p:sldMasterId id="2147483648" r:id="rId1"/>
   </p:sldMasterIdLst>
   <p:notesMasterIdLst>
-    <p:notesMasterId r:id="rId19"/>
+    <p:notesMasterId r:id="rId22"/>
   </p:notesMasterIdLst>
   <p:sldIdLst>
     <p:sldId id="326" r:id="rId2"/>
@@ -17,14 +17,17 @@
     <p:sldId id="335" r:id="rId8"/>
     <p:sldId id="281" r:id="rId9"/>
     <p:sldId id="325" r:id="rId10"/>
-    <p:sldId id="301" r:id="rId11"/>
-    <p:sldId id="290" r:id="rId12"/>
-    <p:sldId id="295" r:id="rId13"/>
-    <p:sldId id="296" r:id="rId14"/>
-    <p:sldId id="297" r:id="rId15"/>
-    <p:sldId id="305" r:id="rId16"/>
-    <p:sldId id="347" r:id="rId17"/>
-    <p:sldId id="302" r:id="rId18"/>
+    <p:sldId id="348" r:id="rId11"/>
+    <p:sldId id="324" r:id="rId12"/>
+    <p:sldId id="287" r:id="rId13"/>
+    <p:sldId id="301" r:id="rId14"/>
+    <p:sldId id="290" r:id="rId15"/>
+    <p:sldId id="295" r:id="rId16"/>
+    <p:sldId id="296" r:id="rId17"/>
+    <p:sldId id="297" r:id="rId18"/>
+    <p:sldId id="305" r:id="rId19"/>
+    <p:sldId id="347" r:id="rId20"/>
+    <p:sldId id="302" r:id="rId21"/>
   </p:sldIdLst>
   <p:sldSz cx="12192000" cy="6858000"/>
   <p:notesSz cx="7023100" cy="9309100"/>
@@ -224,7 +227,7 @@
           <a:p>
             <a:fld id="{FD93C9B2-20F6-4DB1-B471-224337D0AC79}" type="datetimeFigureOut">
               <a:rPr lang="en-US" smtClean="0"/>
-              <a:t>3/18/2022</a:t>
+              <a:t>3/21/2022</a:t>
             </a:fld>
             <a:endParaRPr lang="en-US"/>
           </a:p>
@@ -659,10 +662,186 @@
           <a:bodyPr/>
           <a:lstStyle/>
           <a:p>
-            <a:r>
-              <a:rPr lang="en-US" dirty="0"/>
-              <a:t>There are a variety of neural network types and innovation is ongoing in this area.  So, I’d like to conclude this presentation with a brief overview of some of the more popular architectures, including their various applications.</a:t>
-            </a:r>
+            <a:pPr marL="0" marR="0" lvl="0" indent="0" algn="l" defTabSz="914400" rtl="0" eaLnBrk="1" fontAlgn="auto" latinLnBrk="0" hangingPunct="1">
+              <a:lnSpc>
+                <a:spcPct val="100000"/>
+              </a:lnSpc>
+              <a:spcBef>
+                <a:spcPts val="0"/>
+              </a:spcBef>
+              <a:spcAft>
+                <a:spcPts val="0"/>
+              </a:spcAft>
+              <a:buClrTx/>
+              <a:buSzTx/>
+              <a:buFontTx/>
+              <a:buNone/>
+              <a:tabLst/>
+              <a:defRPr/>
+            </a:pPr>
+            <a:r>
+              <a:rPr lang="en-US" sz="1200" b="0" i="0" kern="1200" dirty="0">
+                <a:solidFill>
+                  <a:schemeClr val="tx1"/>
+                </a:solidFill>
+                <a:effectLst/>
+                <a:latin typeface="+mn-lt"/>
+                <a:ea typeface="+mn-ea"/>
+                <a:cs typeface="+mn-cs"/>
+              </a:rPr>
+              <a:t>I want to introduce you to the different kinds of A.I. learning systems.  There are three principal types of machine / deep learning systems (supervised, unsupervised, and reinforcement).  </a:t>
+            </a:r>
+          </a:p>
+          <a:p>
+            <a:pPr marL="0" indent="0">
+              <a:buNone/>
+            </a:pPr>
+            <a:endParaRPr lang="en-US" sz="1200" dirty="0">
+              <a:latin typeface="Palatino Linotype" panose="02040502050505030304" pitchFamily="18" charset="0"/>
+            </a:endParaRPr>
+          </a:p>
+          <a:p>
+            <a:pPr marL="228600" indent="-228600">
+              <a:buAutoNum type="arabicPeriod"/>
+            </a:pPr>
+            <a:r>
+              <a:rPr lang="en-US" sz="1200" dirty="0">
+                <a:latin typeface="Palatino Linotype" panose="02040502050505030304" pitchFamily="18" charset="0"/>
+              </a:rPr>
+              <a:t>Supervised Learning is </a:t>
+            </a:r>
+            <a:r>
+              <a:rPr lang="en-US" sz="1200" dirty="0">
+                <a:solidFill>
+                  <a:srgbClr val="80BE63"/>
+                </a:solidFill>
+                <a:latin typeface="Palatino Linotype" panose="02040502050505030304" pitchFamily="18" charset="0"/>
+              </a:rPr>
+              <a:t>Task Driven</a:t>
+            </a:r>
+            <a:r>
+              <a:rPr lang="en-US" sz="1200" dirty="0">
+                <a:solidFill>
+                  <a:srgbClr val="0021A5"/>
+                </a:solidFill>
+                <a:latin typeface="Palatino Linotype" panose="02040502050505030304" pitchFamily="18" charset="0"/>
+              </a:rPr>
+              <a:t> </a:t>
+            </a:r>
+            <a:r>
+              <a:rPr lang="en-US" sz="1200" dirty="0">
+                <a:latin typeface="Palatino Linotype" panose="02040502050505030304" pitchFamily="18" charset="0"/>
+              </a:rPr>
+              <a:t>(Predict next value)</a:t>
+            </a:r>
+          </a:p>
+          <a:p>
+            <a:pPr marL="228600" indent="-228600">
+              <a:buAutoNum type="arabicPeriod"/>
+            </a:pPr>
+            <a:r>
+              <a:rPr lang="en-US" sz="1200" dirty="0">
+                <a:latin typeface="Palatino Linotype" panose="02040502050505030304" pitchFamily="18" charset="0"/>
+              </a:rPr>
+              <a:t>Unsupervised Learning is </a:t>
+            </a:r>
+            <a:r>
+              <a:rPr lang="en-US" sz="1200" dirty="0">
+                <a:solidFill>
+                  <a:srgbClr val="80BE63"/>
+                </a:solidFill>
+                <a:latin typeface="Palatino Linotype" panose="02040502050505030304" pitchFamily="18" charset="0"/>
+              </a:rPr>
+              <a:t>Data Driven</a:t>
+            </a:r>
+            <a:r>
+              <a:rPr lang="en-US" sz="1200" dirty="0">
+                <a:solidFill>
+                  <a:srgbClr val="0021A5"/>
+                </a:solidFill>
+                <a:latin typeface="Palatino Linotype" panose="02040502050505030304" pitchFamily="18" charset="0"/>
+              </a:rPr>
+              <a:t> </a:t>
+            </a:r>
+            <a:r>
+              <a:rPr lang="en-US" sz="1200" dirty="0">
+                <a:latin typeface="Palatino Linotype" panose="02040502050505030304" pitchFamily="18" charset="0"/>
+              </a:rPr>
+              <a:t>(Identify Clusters)</a:t>
+            </a:r>
+          </a:p>
+          <a:p>
+            <a:pPr marL="228600" indent="-228600">
+              <a:buAutoNum type="arabicPeriod"/>
+            </a:pPr>
+            <a:r>
+              <a:rPr lang="en-US" sz="1200" dirty="0">
+                <a:latin typeface="Palatino Linotype" panose="02040502050505030304" pitchFamily="18" charset="0"/>
+              </a:rPr>
+              <a:t>Reinforcement Learning is </a:t>
+            </a:r>
+            <a:r>
+              <a:rPr lang="en-US" sz="1200" dirty="0">
+                <a:solidFill>
+                  <a:srgbClr val="80BE63"/>
+                </a:solidFill>
+                <a:latin typeface="Palatino Linotype" panose="02040502050505030304" pitchFamily="18" charset="0"/>
+              </a:rPr>
+              <a:t>Experience Driven </a:t>
+            </a:r>
+            <a:r>
+              <a:rPr lang="en-US" sz="1200" dirty="0">
+                <a:latin typeface="Palatino Linotype" panose="02040502050505030304" pitchFamily="18" charset="0"/>
+              </a:rPr>
+              <a:t>(Learn from Mistakes)</a:t>
+            </a:r>
+          </a:p>
+          <a:p>
+            <a:endParaRPr lang="en-US" sz="1200" b="0" i="0" kern="1200" dirty="0">
+              <a:solidFill>
+                <a:schemeClr val="tx1"/>
+              </a:solidFill>
+              <a:effectLst/>
+              <a:latin typeface="+mn-lt"/>
+              <a:ea typeface="+mn-ea"/>
+              <a:cs typeface="+mn-cs"/>
+            </a:endParaRPr>
+          </a:p>
+          <a:p>
+            <a:r>
+              <a:rPr lang="en-US" sz="1200" b="0" i="0" kern="1200" dirty="0">
+                <a:solidFill>
+                  <a:schemeClr val="tx1"/>
+                </a:solidFill>
+                <a:effectLst/>
+                <a:latin typeface="+mn-lt"/>
+                <a:ea typeface="+mn-ea"/>
+                <a:cs typeface="+mn-cs"/>
+              </a:rPr>
+              <a:t>Let’s dive into the details…</a:t>
+            </a:r>
+          </a:p>
+          <a:p>
+            <a:endParaRPr lang="en-US" sz="1200" b="0" i="0" kern="1200" dirty="0">
+              <a:solidFill>
+                <a:schemeClr val="tx1"/>
+              </a:solidFill>
+              <a:effectLst/>
+              <a:latin typeface="+mn-lt"/>
+              <a:ea typeface="+mn-ea"/>
+              <a:cs typeface="+mn-cs"/>
+            </a:endParaRPr>
+          </a:p>
+          <a:p>
+            <a:endParaRPr lang="en-US" sz="1200" b="0" i="0" kern="1200" dirty="0">
+              <a:solidFill>
+                <a:schemeClr val="tx1"/>
+              </a:solidFill>
+              <a:effectLst/>
+              <a:latin typeface="+mn-lt"/>
+              <a:ea typeface="+mn-ea"/>
+              <a:cs typeface="+mn-cs"/>
+            </a:endParaRPr>
           </a:p>
         </p:txBody>
       </p:sp>
@@ -692,7 +871,7 @@
     </p:spTree>
     <p:extLst>
       <p:ext uri="{BB962C8B-B14F-4D97-AF65-F5344CB8AC3E}">
-        <p14:creationId xmlns:p14="http://schemas.microsoft.com/office/powerpoint/2010/main" val="3873866018"/>
+        <p14:creationId xmlns:p14="http://schemas.microsoft.com/office/powerpoint/2010/main" val="2830584034"/>
       </p:ext>
     </p:extLst>
   </p:cSld>
@@ -746,113 +925,56 @@
           <a:bodyPr/>
           <a:lstStyle/>
           <a:p>
-            <a:r>
-              <a:rPr lang="en-US" sz="1100" b="0" i="0" dirty="0">
-                <a:solidFill>
-                  <a:srgbClr val="3C3C3B"/>
-                </a:solidFill>
-                <a:effectLst/>
-                <a:latin typeface="+mn-lt"/>
-              </a:rPr>
-              <a:t>The </a:t>
-            </a:r>
-            <a:r>
-              <a:rPr lang="en-US" sz="1100" b="1" i="0" dirty="0">
-                <a:solidFill>
-                  <a:srgbClr val="3C3C3B"/>
-                </a:solidFill>
-                <a:effectLst/>
-                <a:latin typeface="+mn-lt"/>
-              </a:rPr>
-              <a:t>multi-layer perceptron</a:t>
-            </a:r>
-            <a:r>
-              <a:rPr lang="en-US" sz="1100" b="0" i="0" dirty="0">
-                <a:solidFill>
-                  <a:srgbClr val="3C3C3B"/>
-                </a:solidFill>
-                <a:effectLst/>
-                <a:latin typeface="+mn-lt"/>
-              </a:rPr>
-              <a:t> (</a:t>
-            </a:r>
-            <a:r>
-              <a:rPr lang="en-US" sz="1100" b="1" i="0" dirty="0">
-                <a:solidFill>
-                  <a:srgbClr val="3C3C3B"/>
-                </a:solidFill>
-                <a:effectLst/>
-                <a:latin typeface="+mn-lt"/>
-              </a:rPr>
-              <a:t>MLP</a:t>
-            </a:r>
-            <a:r>
-              <a:rPr lang="en-US" sz="1100" b="0" i="0" dirty="0">
-                <a:solidFill>
-                  <a:srgbClr val="3C3C3B"/>
-                </a:solidFill>
-                <a:effectLst/>
-                <a:latin typeface="+mn-lt"/>
-              </a:rPr>
-              <a:t>) is a basic type of neural network. An MLP is also known as a feed-forward network.  Applications of the multi-layer perceptron include:</a:t>
-            </a:r>
-          </a:p>
-          <a:p>
-            <a:endParaRPr lang="en-US" sz="1100" b="0" i="0" dirty="0">
-              <a:solidFill>
-                <a:srgbClr val="3C3C3B"/>
-              </a:solidFill>
-              <a:effectLst/>
-              <a:latin typeface="+mn-lt"/>
+            <a:pPr marL="0" indent="0" algn="l">
+              <a:buNone/>
+            </a:pPr>
+            <a:r>
+              <a:rPr lang="en-US" sz="1800" b="0" i="0" u="none" strike="noStrike" baseline="0" dirty="0">
+                <a:latin typeface="OpenSans"/>
+              </a:rPr>
+              <a:t>And another look at the three types of ML/DL learning systems:</a:t>
+            </a:r>
+          </a:p>
+          <a:p>
+            <a:pPr marL="0" indent="0" algn="l">
+              <a:buNone/>
+            </a:pPr>
+            <a:endParaRPr lang="en-US" sz="1800" b="0" i="0" u="none" strike="noStrike" baseline="0" dirty="0">
+              <a:latin typeface="OpenSans"/>
             </a:endParaRPr>
           </a:p>
           <a:p>
-            <a:pPr marL="233309" indent="-233309" defTabSz="933237">
-              <a:buFontTx/>
-              <a:buAutoNum type="arabicPeriod"/>
-              <a:defRPr/>
+            <a:pPr marL="0" indent="0" algn="l">
+              <a:buNone/>
             </a:pPr>
             <a:r>
-              <a:rPr lang="en-US" sz="1100" b="0" i="0" dirty="0">
-                <a:solidFill>
-                  <a:srgbClr val="000000"/>
-                </a:solidFill>
-                <a:effectLst/>
-                <a:latin typeface="+mn-lt"/>
-              </a:rPr>
-              <a:t>Complex Classification</a:t>
-            </a:r>
-          </a:p>
-          <a:p>
-            <a:pPr marL="233309" indent="-233309" defTabSz="933237">
-              <a:buFontTx/>
-              <a:buAutoNum type="arabicPeriod"/>
-              <a:defRPr/>
+              <a:rPr lang="en-US" sz="1800" b="0" i="0" u="none" strike="noStrike" baseline="0" dirty="0">
+                <a:latin typeface="OpenSans"/>
+              </a:rPr>
+              <a:t>1. Supervised learning minimizes the error of the output of the model with respect to a target (label) specified in the training set.</a:t>
+            </a:r>
+          </a:p>
+          <a:p>
+            <a:pPr marL="0" indent="0" algn="l">
+              <a:buNone/>
             </a:pPr>
             <a:r>
-              <a:rPr lang="en-US" sz="1100" b="0" i="0" dirty="0">
-                <a:solidFill>
-                  <a:srgbClr val="000000"/>
-                </a:solidFill>
-                <a:effectLst/>
-                <a:latin typeface="+mn-lt"/>
-              </a:rPr>
-              <a:t>Machine Translation</a:t>
-            </a:r>
-          </a:p>
-          <a:p>
-            <a:pPr defTabSz="933237">
-              <a:defRPr/>
+              <a:rPr lang="en-US" sz="1800" b="0" i="0" u="none" strike="noStrike" baseline="0" dirty="0">
+                <a:latin typeface="OpenSans"/>
+              </a:rPr>
+              <a:t>2. Reinforcement Learning maximizes the reward signal of the actions.</a:t>
+            </a:r>
+          </a:p>
+          <a:p>
+            <a:pPr marL="0" indent="0" algn="l">
+              <a:buNone/>
             </a:pPr>
-            <a:endParaRPr lang="en-US" b="0" i="0" dirty="0">
-              <a:solidFill>
-                <a:srgbClr val="000000"/>
-              </a:solidFill>
-              <a:effectLst/>
-              <a:latin typeface="Lato"/>
-            </a:endParaRPr>
-          </a:p>
-          <a:p>
+            <a:r>
+              <a:rPr lang="en-US" sz="1800" b="0" i="0" u="none" strike="noStrike" baseline="0" dirty="0">
+                <a:latin typeface="OpenSans"/>
+              </a:rPr>
+              <a:t>3. Unsupervised learning has no target and no reward; it tries to learn a data representation that can be useful.</a:t>
+            </a:r>
             <a:endParaRPr lang="en-US" dirty="0"/>
           </a:p>
         </p:txBody>
@@ -883,7 +1005,7 @@
     </p:spTree>
     <p:extLst>
       <p:ext uri="{BB962C8B-B14F-4D97-AF65-F5344CB8AC3E}">
-        <p14:creationId xmlns:p14="http://schemas.microsoft.com/office/powerpoint/2010/main" val="473801370"/>
+        <p14:creationId xmlns:p14="http://schemas.microsoft.com/office/powerpoint/2010/main" val="2887563307"/>
       </p:ext>
     </p:extLst>
   </p:cSld>
@@ -938,119 +1060,47 @@
           <a:lstStyle/>
           <a:p>
             <a:r>
-              <a:rPr lang="en-US" sz="1100" b="0" i="0" dirty="0">
-                <a:solidFill>
-                  <a:srgbClr val="3C3C3B"/>
-                </a:solidFill>
-                <a:effectLst/>
-                <a:latin typeface="Calibri" panose="020F0502020204030204" pitchFamily="34" charset="0"/>
-                <a:cs typeface="Calibri" panose="020F0502020204030204" pitchFamily="34" charset="0"/>
-              </a:rPr>
-              <a:t>A </a:t>
-            </a:r>
-            <a:r>
-              <a:rPr lang="en-US" sz="1100" b="1" i="0" dirty="0">
-                <a:solidFill>
-                  <a:srgbClr val="3C3C3B"/>
-                </a:solidFill>
-                <a:effectLst/>
-                <a:latin typeface="Calibri" panose="020F0502020204030204" pitchFamily="34" charset="0"/>
-                <a:cs typeface="Calibri" panose="020F0502020204030204" pitchFamily="34" charset="0"/>
-              </a:rPr>
-              <a:t>convolutional neural network (CNN) </a:t>
-            </a:r>
-            <a:r>
-              <a:rPr lang="en-US" sz="1100" b="0" i="0" dirty="0">
-                <a:solidFill>
-                  <a:srgbClr val="3C3C3B"/>
-                </a:solidFill>
-                <a:effectLst/>
-                <a:latin typeface="Calibri" panose="020F0502020204030204" pitchFamily="34" charset="0"/>
-                <a:cs typeface="Calibri" panose="020F0502020204030204" pitchFamily="34" charset="0"/>
-              </a:rPr>
-              <a:t>is a class of AI models that are predominantly used for image recognition.  In a fully connected neural network, each neuron in a layer is connected to every other neuron in the next layer.  CNNs, however, adopt a different strategy and do not employ a fully connected architecture. Instead, CNNs extract local features from images, which are then fed to the subsequent layers.  Some application of CNNs include:</a:t>
-            </a:r>
-          </a:p>
-          <a:p>
-            <a:endParaRPr lang="en-US" sz="1100" b="0" i="0" dirty="0">
-              <a:solidFill>
-                <a:srgbClr val="3C3C3B"/>
-              </a:solidFill>
-              <a:effectLst/>
-              <a:latin typeface="Calibri" panose="020F0502020204030204" pitchFamily="34" charset="0"/>
-              <a:cs typeface="Calibri" panose="020F0502020204030204" pitchFamily="34" charset="0"/>
-            </a:endParaRPr>
-          </a:p>
-          <a:p>
-            <a:pPr marL="233309" indent="-233309" defTabSz="933237">
+              <a:rPr lang="en-US" sz="1200" b="0" i="0" u="none" strike="noStrike" kern="1200" baseline="0" dirty="0">
+                <a:solidFill>
+                  <a:schemeClr val="tx1"/>
+                </a:solidFill>
+                <a:latin typeface="+mn-lt"/>
+                <a:ea typeface="+mn-ea"/>
+                <a:cs typeface="+mn-cs"/>
+              </a:rPr>
+              <a:t>And finally, this image summarizes some of the primary ways in which AI is being used today.   I present these applications because background knowledge is key to helping you imagine AI possibilities in your domain.  And it’s the reason why I asked Jim Cusick to provide additional bibliographic support.  Of course, the challenge is to take an application in another area and then modify it, so it works in yours.  I believe this is where a lot of innovation is going to happen in the near future.  </a:t>
+            </a:r>
+          </a:p>
+          <a:p>
+            <a:pPr marL="0" marR="0" lvl="0" indent="0" algn="l" defTabSz="914400" rtl="0" eaLnBrk="1" fontAlgn="auto" latinLnBrk="0" hangingPunct="1">
+              <a:lnSpc>
+                <a:spcPct val="100000"/>
+              </a:lnSpc>
+              <a:spcBef>
+                <a:spcPts val="0"/>
+              </a:spcBef>
+              <a:spcAft>
+                <a:spcPts val="0"/>
+              </a:spcAft>
+              <a:buClrTx/>
+              <a:buSzTx/>
               <a:buFontTx/>
-              <a:buAutoNum type="arabicPeriod"/>
+              <a:buNone/>
+              <a:tabLst/>
               <a:defRPr/>
             </a:pPr>
             <a:r>
-              <a:rPr lang="en-US" sz="1100" b="0" i="0" dirty="0">
-                <a:solidFill>
-                  <a:srgbClr val="000000"/>
+              <a:rPr lang="en-US" sz="1200" b="0" i="0" kern="1200" dirty="0">
+                <a:solidFill>
+                  <a:schemeClr val="tx1"/>
                 </a:solidFill>
                 <a:effectLst/>
-                <a:latin typeface="Calibri" panose="020F0502020204030204" pitchFamily="34" charset="0"/>
-                <a:cs typeface="Calibri" panose="020F0502020204030204" pitchFamily="34" charset="0"/>
-              </a:rPr>
-              <a:t>Image processing</a:t>
-            </a:r>
-          </a:p>
-          <a:p>
-            <a:pPr marL="233309" indent="-233309" defTabSz="933237">
-              <a:buFontTx/>
-              <a:buAutoNum type="arabicPeriod"/>
-              <a:defRPr/>
-            </a:pPr>
-            <a:r>
-              <a:rPr lang="en-US" sz="1100" b="0" i="0" dirty="0">
-                <a:solidFill>
-                  <a:srgbClr val="000000"/>
-                </a:solidFill>
-                <a:effectLst/>
-                <a:latin typeface="Calibri" panose="020F0502020204030204" pitchFamily="34" charset="0"/>
-                <a:cs typeface="Calibri" panose="020F0502020204030204" pitchFamily="34" charset="0"/>
-              </a:rPr>
-              <a:t>Computer Vision</a:t>
-            </a:r>
-          </a:p>
-          <a:p>
-            <a:pPr marL="233309" indent="-233309" defTabSz="933237">
-              <a:buFontTx/>
-              <a:buAutoNum type="arabicPeriod"/>
-              <a:defRPr/>
-            </a:pPr>
-            <a:r>
-              <a:rPr lang="en-US" sz="1100" b="0" i="0" dirty="0">
-                <a:solidFill>
-                  <a:srgbClr val="000000"/>
-                </a:solidFill>
-                <a:effectLst/>
-                <a:latin typeface="Calibri" panose="020F0502020204030204" pitchFamily="34" charset="0"/>
-                <a:cs typeface="Calibri" panose="020F0502020204030204" pitchFamily="34" charset="0"/>
-              </a:rPr>
-              <a:t>Speech Recognition</a:t>
-            </a:r>
-          </a:p>
-          <a:p>
-            <a:pPr marL="233309" indent="-233309" defTabSz="933237">
-              <a:buFontTx/>
-              <a:buAutoNum type="arabicPeriod"/>
-              <a:defRPr/>
-            </a:pPr>
-            <a:endParaRPr lang="en-US" b="0" i="0" dirty="0">
-              <a:solidFill>
-                <a:srgbClr val="000000"/>
-              </a:solidFill>
-              <a:effectLst/>
-              <a:latin typeface="Lato"/>
-            </a:endParaRPr>
-          </a:p>
-          <a:p>
-            <a:endParaRPr lang="en-US" dirty="0"/>
+                <a:latin typeface="+mn-lt"/>
+                <a:ea typeface="+mn-ea"/>
+                <a:cs typeface="+mn-cs"/>
+              </a:rPr>
+              <a:t> </a:t>
+            </a:r>
           </a:p>
         </p:txBody>
       </p:sp>
@@ -1080,7 +1130,7 @@
     </p:spTree>
     <p:extLst>
       <p:ext uri="{BB962C8B-B14F-4D97-AF65-F5344CB8AC3E}">
-        <p14:creationId xmlns:p14="http://schemas.microsoft.com/office/powerpoint/2010/main" val="345247314"/>
+        <p14:creationId xmlns:p14="http://schemas.microsoft.com/office/powerpoint/2010/main" val="2041406944"/>
       </p:ext>
     </p:extLst>
   </p:cSld>
@@ -1135,148 +1185,8 @@
           <a:lstStyle/>
           <a:p>
             <a:r>
-              <a:rPr lang="en-US" sz="1100" b="1" i="0" dirty="0">
-                <a:solidFill>
-                  <a:srgbClr val="3C3C3B"/>
-                </a:solidFill>
-                <a:effectLst/>
-                <a:latin typeface="Calibri" panose="020F0502020204030204" pitchFamily="34" charset="0"/>
-                <a:cs typeface="Calibri" panose="020F0502020204030204" pitchFamily="34" charset="0"/>
-              </a:rPr>
-              <a:t>Recurrent neural networks (RNNs) </a:t>
-            </a:r>
-            <a:r>
-              <a:rPr lang="en-US" sz="1100" b="0" i="0" dirty="0">
-                <a:solidFill>
-                  <a:srgbClr val="3C3C3B"/>
-                </a:solidFill>
-                <a:effectLst/>
-                <a:latin typeface="Calibri" panose="020F0502020204030204" pitchFamily="34" charset="0"/>
-                <a:cs typeface="Calibri" panose="020F0502020204030204" pitchFamily="34" charset="0"/>
-              </a:rPr>
-              <a:t>propagate data forward, but also backwards.  As pictured here, the red arrow indicates that the hidden layer connects back to itself, thereby allowing the network to remember what it has already done. </a:t>
-            </a:r>
-          </a:p>
-          <a:p>
-            <a:endParaRPr lang="en-US" sz="1100" b="0" i="0" dirty="0">
-              <a:solidFill>
-                <a:srgbClr val="3C3C3B"/>
-              </a:solidFill>
-              <a:effectLst/>
-              <a:latin typeface="Calibri" panose="020F0502020204030204" pitchFamily="34" charset="0"/>
-              <a:cs typeface="Calibri" panose="020F0502020204030204" pitchFamily="34" charset="0"/>
-            </a:endParaRPr>
-          </a:p>
-          <a:p>
-            <a:r>
-              <a:rPr lang="en-US" sz="1100" b="0" i="0" dirty="0">
-                <a:solidFill>
-                  <a:srgbClr val="3C3C3B"/>
-                </a:solidFill>
-                <a:effectLst/>
-                <a:latin typeface="Calibri" panose="020F0502020204030204" pitchFamily="34" charset="0"/>
-                <a:cs typeface="Calibri" panose="020F0502020204030204" pitchFamily="34" charset="0"/>
-              </a:rPr>
-              <a:t>Some application of RNNs include:</a:t>
-            </a:r>
-          </a:p>
-          <a:p>
-            <a:endParaRPr lang="en-US" sz="1100" b="0" i="0" dirty="0">
-              <a:solidFill>
-                <a:srgbClr val="3C3C3B"/>
-              </a:solidFill>
-              <a:effectLst/>
-              <a:latin typeface="Calibri" panose="020F0502020204030204" pitchFamily="34" charset="0"/>
-              <a:cs typeface="Calibri" panose="020F0502020204030204" pitchFamily="34" charset="0"/>
-            </a:endParaRPr>
-          </a:p>
-          <a:p>
-            <a:pPr marL="233309" indent="-233309">
-              <a:buFont typeface="Arial" panose="020B0604020202020204" pitchFamily="34" charset="0"/>
-              <a:buAutoNum type="arabicPeriod"/>
-            </a:pPr>
-            <a:r>
-              <a:rPr lang="en-US" sz="1100" b="0" i="0" dirty="0">
-                <a:solidFill>
-                  <a:srgbClr val="000000"/>
-                </a:solidFill>
-                <a:effectLst/>
-                <a:latin typeface="Calibri" panose="020F0502020204030204" pitchFamily="34" charset="0"/>
-                <a:cs typeface="Calibri" panose="020F0502020204030204" pitchFamily="34" charset="0"/>
-              </a:rPr>
-              <a:t>Text processing like auto suggest, grammar checks, etc.</a:t>
-            </a:r>
-          </a:p>
-          <a:p>
-            <a:pPr marL="233309" indent="-233309" defTabSz="933237">
-              <a:buFont typeface="Arial" panose="020B0604020202020204" pitchFamily="34" charset="0"/>
-              <a:buAutoNum type="arabicPeriod"/>
-              <a:defRPr/>
-            </a:pPr>
-            <a:r>
-              <a:rPr lang="en-US" sz="1100" b="0" i="0" dirty="0">
-                <a:solidFill>
-                  <a:srgbClr val="000000"/>
-                </a:solidFill>
-                <a:effectLst/>
-                <a:latin typeface="Calibri" panose="020F0502020204030204" pitchFamily="34" charset="0"/>
-                <a:cs typeface="Calibri" panose="020F0502020204030204" pitchFamily="34" charset="0"/>
-              </a:rPr>
-              <a:t>Text to speech processing</a:t>
-            </a:r>
-          </a:p>
-          <a:p>
-            <a:pPr marL="233309" indent="-233309" defTabSz="933237">
-              <a:buFont typeface="Arial" panose="020B0604020202020204" pitchFamily="34" charset="0"/>
-              <a:buAutoNum type="arabicPeriod"/>
-              <a:defRPr/>
-            </a:pPr>
-            <a:r>
-              <a:rPr lang="en-US" sz="1100" b="0" i="0" dirty="0">
-                <a:solidFill>
-                  <a:srgbClr val="000000"/>
-                </a:solidFill>
-                <a:effectLst/>
-                <a:latin typeface="Calibri" panose="020F0502020204030204" pitchFamily="34" charset="0"/>
-                <a:cs typeface="Calibri" panose="020F0502020204030204" pitchFamily="34" charset="0"/>
-              </a:rPr>
-              <a:t>Sentiment Analysis</a:t>
-            </a:r>
-          </a:p>
-          <a:p>
-            <a:pPr marL="233309" indent="-233309" defTabSz="933237">
-              <a:buFont typeface="Arial" panose="020B0604020202020204" pitchFamily="34" charset="0"/>
-              <a:buAutoNum type="arabicPeriod"/>
-              <a:defRPr/>
-            </a:pPr>
-            <a:r>
-              <a:rPr lang="en-US" sz="1100" b="0" i="0" dirty="0">
-                <a:solidFill>
-                  <a:srgbClr val="000000"/>
-                </a:solidFill>
-                <a:effectLst/>
-                <a:latin typeface="Calibri" panose="020F0502020204030204" pitchFamily="34" charset="0"/>
-                <a:cs typeface="Calibri" panose="020F0502020204030204" pitchFamily="34" charset="0"/>
-              </a:rPr>
-              <a:t>Time sequence projections</a:t>
-            </a:r>
-          </a:p>
-          <a:p>
-            <a:pPr marL="233309" indent="-233309" defTabSz="933237">
-              <a:buFont typeface="Arial" panose="020B0604020202020204" pitchFamily="34" charset="0"/>
-              <a:buAutoNum type="arabicPeriod"/>
-              <a:defRPr/>
-            </a:pPr>
-            <a:r>
-              <a:rPr lang="en-US" sz="1100" b="0" i="0" dirty="0">
-                <a:solidFill>
-                  <a:srgbClr val="000000"/>
-                </a:solidFill>
-                <a:effectLst/>
-                <a:latin typeface="Calibri" panose="020F0502020204030204" pitchFamily="34" charset="0"/>
-                <a:cs typeface="Calibri" panose="020F0502020204030204" pitchFamily="34" charset="0"/>
-              </a:rPr>
-              <a:t>Translation</a:t>
+              <a:rPr lang="en-US" dirty="0"/>
+              <a:t>There are a variety of neural network types and innovation is ongoing in this area.  So, I’d like to conclude this presentation with a brief overview of some of the more popular architectures, including their various applications.</a:t>
             </a:r>
           </a:p>
         </p:txBody>
@@ -1307,7 +1217,7 @@
     </p:spTree>
     <p:extLst>
       <p:ext uri="{BB962C8B-B14F-4D97-AF65-F5344CB8AC3E}">
-        <p14:creationId xmlns:p14="http://schemas.microsoft.com/office/powerpoint/2010/main" val="4149381120"/>
+        <p14:creationId xmlns:p14="http://schemas.microsoft.com/office/powerpoint/2010/main" val="3873866018"/>
       </p:ext>
     </p:extLst>
   </p:cSld>
@@ -1379,26 +1289,49 @@
               <a:defRPr/>
             </a:pPr>
             <a:r>
-              <a:rPr lang="en-US" sz="1100" dirty="0">
+              <a:rPr lang="en-US" sz="1100" b="0" i="0" dirty="0">
+                <a:solidFill>
+                  <a:srgbClr val="3C3C3B"/>
+                </a:solidFill>
+                <a:effectLst/>
                 <a:latin typeface="+mn-lt"/>
               </a:rPr>
-              <a:t>A </a:t>
-            </a:r>
-            <a:r>
-              <a:rPr lang="en-US" sz="1100" b="1" dirty="0">
+              <a:t>A </a:t>
+            </a:r>
+            <a:r>
+              <a:rPr lang="en-US" sz="1100" b="1" i="0" dirty="0">
+                <a:solidFill>
+                  <a:srgbClr val="3C3C3B"/>
+                </a:solidFill>
+                <a:effectLst/>
                 <a:latin typeface="+mn-lt"/>
               </a:rPr>
-              <a:t>generative adversarial network (GAN) </a:t>
-            </a:r>
-            <a:r>
-              <a:rPr lang="en-US" sz="1100" dirty="0">
+              <a:t>fully connected network </a:t>
+            </a:r>
+            <a:r>
+              <a:rPr lang="en-US" sz="1100" b="0" i="0" dirty="0">
+                <a:solidFill>
+                  <a:srgbClr val="3C3C3B"/>
+                </a:solidFill>
+                <a:effectLst/>
                 <a:latin typeface="+mn-lt"/>
               </a:rPr>
-              <a:t>is a model in which two neural networks compete with each other to become more accurate in their predictions.  The two neural networks that make up a GAN are referred to as the generator and the discriminator. The goal of the generator is to artificially manufacture outputs that could easily be mistaken for real data. The goal of the discriminator is to identify which outputs it receives have been artificially created.</a:t>
-            </a:r>
-          </a:p>
-          <a:p>
-            <a:endParaRPr lang="en-US" sz="1100" b="1" i="0" dirty="0">
+              <a:t>is the most basic kind of neural network, also known as feed-forward networks. </a:t>
+            </a:r>
+            <a:r>
+              <a:rPr lang="en-US" sz="1100" b="0" i="0" dirty="0">
+                <a:solidFill>
+                  <a:srgbClr val="3C3C3B"/>
+                </a:solidFill>
+                <a:effectLst/>
+                <a:latin typeface="Calibri" panose="020F0502020204030204" pitchFamily="34" charset="0"/>
+                <a:cs typeface="Calibri" panose="020F0502020204030204" pitchFamily="34" charset="0"/>
+              </a:rPr>
+              <a:t>Some application include:</a:t>
+            </a:r>
+          </a:p>
+          <a:p>
+            <a:endParaRPr lang="en-US" sz="1100" b="0" i="0" dirty="0">
               <a:solidFill>
                 <a:srgbClr val="3C3C3B"/>
               </a:solidFill>
@@ -1407,61 +1340,62 @@
             </a:endParaRPr>
           </a:p>
           <a:p>
-            <a:pPr algn="l"/>
-            <a:r>
-              <a:rPr lang="en-US" sz="1800" b="0" i="0" u="none" strike="noStrike" baseline="0" dirty="0">
-                <a:latin typeface="OpenSans"/>
-              </a:rPr>
-              <a:t>GANs are a big area of research, and there are many use cases for them. Some of the useful applications of GANs are as follows:</a:t>
-            </a:r>
-          </a:p>
-          <a:p>
-            <a:pPr algn="l"/>
-            <a:endParaRPr lang="en-US" sz="1800" b="0" i="0" u="none" strike="noStrike" baseline="0" dirty="0">
-              <a:latin typeface="OpenSans"/>
+            <a:endParaRPr lang="en-US" sz="1100" b="0" i="0" dirty="0">
+              <a:solidFill>
+                <a:srgbClr val="3C3C3B"/>
+              </a:solidFill>
+              <a:effectLst/>
+              <a:latin typeface="+mn-lt"/>
             </a:endParaRPr>
           </a:p>
           <a:p>
-            <a:pPr algn="l"/>
-            <a:r>
-              <a:rPr lang="en-US" sz="1800" b="0" i="0" u="none" strike="noStrike" baseline="0" dirty="0">
-                <a:latin typeface="OpenSans"/>
-              </a:rPr>
-              <a:t>• Image translation</a:t>
-            </a:r>
-          </a:p>
-          <a:p>
-            <a:pPr algn="l"/>
-            <a:r>
-              <a:rPr lang="en-US" sz="1800" b="0" i="0" u="none" strike="noStrike" baseline="0" dirty="0">
-                <a:latin typeface="OpenSans"/>
-              </a:rPr>
-              <a:t>• Text to image synthesis</a:t>
-            </a:r>
-          </a:p>
-          <a:p>
-            <a:pPr algn="l"/>
-            <a:r>
-              <a:rPr lang="en-US" sz="1800" b="0" i="0" u="none" strike="noStrike" baseline="0" dirty="0">
-                <a:latin typeface="OpenSans"/>
-              </a:rPr>
-              <a:t>• Generating videos</a:t>
-            </a:r>
-          </a:p>
-          <a:p>
-            <a:pPr algn="l"/>
-            <a:r>
-              <a:rPr lang="en-US" sz="1800" b="0" i="0" u="none" strike="noStrike" baseline="0" dirty="0">
-                <a:latin typeface="OpenSans"/>
-              </a:rPr>
-              <a:t>• The restoration of art</a:t>
-            </a:r>
-          </a:p>
-          <a:p>
-            <a:pPr algn="l"/>
-            <a:endParaRPr lang="en-US" sz="1800" b="0" i="0" u="none" strike="noStrike" baseline="0" dirty="0">
-              <a:latin typeface="OpenSans"/>
+            <a:pPr marL="233309" indent="-233309" defTabSz="933237">
+              <a:buFontTx/>
+              <a:buAutoNum type="arabicPeriod"/>
+              <a:defRPr/>
+            </a:pPr>
+            <a:r>
+              <a:rPr lang="en-US" sz="1100" b="0" i="0" dirty="0">
+                <a:solidFill>
+                  <a:srgbClr val="000000"/>
+                </a:solidFill>
+                <a:effectLst/>
+                <a:latin typeface="+mn-lt"/>
+              </a:rPr>
+              <a:t>Complex Classification</a:t>
+            </a:r>
+          </a:p>
+          <a:p>
+            <a:pPr marL="233309" indent="-233309" defTabSz="933237">
+              <a:buFontTx/>
+              <a:buAutoNum type="arabicPeriod"/>
+              <a:defRPr/>
+            </a:pPr>
+            <a:r>
+              <a:rPr lang="en-US" sz="1100" b="0" i="0" dirty="0">
+                <a:solidFill>
+                  <a:srgbClr val="000000"/>
+                </a:solidFill>
+                <a:effectLst/>
+                <a:latin typeface="+mn-lt"/>
+              </a:rPr>
+              <a:t>Machine Translation</a:t>
+            </a:r>
+          </a:p>
+          <a:p>
+            <a:pPr defTabSz="933237">
+              <a:defRPr/>
+            </a:pPr>
+            <a:endParaRPr lang="en-US" b="0" i="0" dirty="0">
+              <a:solidFill>
+                <a:srgbClr val="000000"/>
+              </a:solidFill>
+              <a:effectLst/>
+              <a:latin typeface="Lato"/>
             </a:endParaRPr>
+          </a:p>
+          <a:p>
+            <a:endParaRPr lang="en-US" dirty="0"/>
           </a:p>
         </p:txBody>
       </p:sp>
@@ -1491,7 +1425,7 @@
     </p:spTree>
     <p:extLst>
       <p:ext uri="{BB962C8B-B14F-4D97-AF65-F5344CB8AC3E}">
-        <p14:creationId xmlns:p14="http://schemas.microsoft.com/office/powerpoint/2010/main" val="2474625203"/>
+        <p14:creationId xmlns:p14="http://schemas.microsoft.com/office/powerpoint/2010/main" val="473801370"/>
       </p:ext>
     </p:extLst>
   </p:cSld>
@@ -1546,25 +1480,142 @@
           <a:lstStyle/>
           <a:p>
             <a:r>
-              <a:rPr lang="en-US" dirty="0"/>
-              <a:t>For additional practice, I recommend that you read the </a:t>
-            </a:r>
-            <a:r>
-              <a:rPr lang="en-US" i="1" dirty="0"/>
-              <a:t>Introduction to Tensorflow </a:t>
-            </a:r>
-            <a:r>
-              <a:rPr lang="en-US" dirty="0"/>
-              <a:t>as well as the </a:t>
-            </a:r>
-            <a:r>
-              <a:rPr lang="en-US" i="1" dirty="0"/>
-              <a:t>Linear Algebra with Tensorflow </a:t>
-            </a:r>
-            <a:r>
-              <a:rPr lang="en-US" dirty="0"/>
-              <a:t>sections, found in the latter half of chapter 1 of our textbook.  The exercises listed in this slide review the basic operations of linear algebra – matrix multiplication, etc…  The matrix multiplication video embedded in the exercise-1.03 Jupyter Notebook is also worth watching.</a:t>
-            </a:r>
+              <a:rPr lang="en-US" sz="1100" b="0" i="0" dirty="0">
+                <a:solidFill>
+                  <a:srgbClr val="3C3C3B"/>
+                </a:solidFill>
+                <a:effectLst/>
+                <a:latin typeface="Calibri" panose="020F0502020204030204" pitchFamily="34" charset="0"/>
+                <a:cs typeface="Calibri" panose="020F0502020204030204" pitchFamily="34" charset="0"/>
+              </a:rPr>
+              <a:t>A </a:t>
+            </a:r>
+            <a:r>
+              <a:rPr lang="en-US" sz="1100" b="1" i="0" dirty="0">
+                <a:solidFill>
+                  <a:srgbClr val="3C3C3B"/>
+                </a:solidFill>
+                <a:effectLst/>
+                <a:latin typeface="Calibri" panose="020F0502020204030204" pitchFamily="34" charset="0"/>
+                <a:cs typeface="Calibri" panose="020F0502020204030204" pitchFamily="34" charset="0"/>
+              </a:rPr>
+              <a:t>convolutional neural network (CNN) </a:t>
+            </a:r>
+            <a:r>
+              <a:rPr lang="en-US" sz="1100" b="0" i="0" dirty="0">
+                <a:solidFill>
+                  <a:srgbClr val="3C3C3B"/>
+                </a:solidFill>
+                <a:effectLst/>
+                <a:latin typeface="Calibri" panose="020F0502020204030204" pitchFamily="34" charset="0"/>
+                <a:cs typeface="Calibri" panose="020F0502020204030204" pitchFamily="34" charset="0"/>
+              </a:rPr>
+              <a:t>is a class of AI models used primarily for image recognition tasks.  In a fully connected network, each neuron in a layer is connected to every other neuron in the next layer (previous slide).  CNNs, however, adopt a different strategy and do not use a fully connected architecture.  As well, CNNs are typically constructed with one or more convolution and/or pooling layers.  These specialized layers allow the model to extract local features from images which are then fed to the subsequent layers.  </a:t>
+            </a:r>
+          </a:p>
+          <a:p>
+            <a:endParaRPr lang="en-US" sz="1100" b="0" i="0" dirty="0">
+              <a:solidFill>
+                <a:srgbClr val="3C3C3B"/>
+              </a:solidFill>
+              <a:effectLst/>
+              <a:latin typeface="Calibri" panose="020F0502020204030204" pitchFamily="34" charset="0"/>
+              <a:cs typeface="Calibri" panose="020F0502020204030204" pitchFamily="34" charset="0"/>
+            </a:endParaRPr>
+          </a:p>
+          <a:p>
+            <a:r>
+              <a:rPr lang="en-US" sz="1100" b="0" i="0" dirty="0">
+                <a:solidFill>
+                  <a:srgbClr val="3C3C3B"/>
+                </a:solidFill>
+                <a:effectLst/>
+                <a:latin typeface="Calibri" panose="020F0502020204030204" pitchFamily="34" charset="0"/>
+                <a:cs typeface="Calibri" panose="020F0502020204030204" pitchFamily="34" charset="0"/>
+              </a:rPr>
+              <a:t>Some application of CNNs include:</a:t>
+            </a:r>
+          </a:p>
+          <a:p>
+            <a:endParaRPr lang="en-US" sz="1100" b="0" i="0" dirty="0">
+              <a:solidFill>
+                <a:srgbClr val="3C3C3B"/>
+              </a:solidFill>
+              <a:effectLst/>
+              <a:latin typeface="Calibri" panose="020F0502020204030204" pitchFamily="34" charset="0"/>
+              <a:cs typeface="Calibri" panose="020F0502020204030204" pitchFamily="34" charset="0"/>
+            </a:endParaRPr>
+          </a:p>
+          <a:p>
+            <a:pPr marL="233309" indent="-233309" defTabSz="933237">
+              <a:buFontTx/>
+              <a:buAutoNum type="arabicPeriod"/>
+              <a:defRPr/>
+            </a:pPr>
+            <a:r>
+              <a:rPr lang="en-US" sz="1100" b="0" i="0" dirty="0">
+                <a:solidFill>
+                  <a:srgbClr val="000000"/>
+                </a:solidFill>
+                <a:effectLst/>
+                <a:latin typeface="Calibri" panose="020F0502020204030204" pitchFamily="34" charset="0"/>
+                <a:cs typeface="Calibri" panose="020F0502020204030204" pitchFamily="34" charset="0"/>
+              </a:rPr>
+              <a:t>Image processing</a:t>
+            </a:r>
+          </a:p>
+          <a:p>
+            <a:pPr marL="233309" indent="-233309" defTabSz="933237">
+              <a:buFontTx/>
+              <a:buAutoNum type="arabicPeriod"/>
+              <a:defRPr/>
+            </a:pPr>
+            <a:r>
+              <a:rPr lang="en-US" sz="1100" b="0" i="0" dirty="0">
+                <a:solidFill>
+                  <a:srgbClr val="000000"/>
+                </a:solidFill>
+                <a:effectLst/>
+                <a:latin typeface="Calibri" panose="020F0502020204030204" pitchFamily="34" charset="0"/>
+                <a:cs typeface="Calibri" panose="020F0502020204030204" pitchFamily="34" charset="0"/>
+              </a:rPr>
+              <a:t>Computer Vision</a:t>
+            </a:r>
+          </a:p>
+          <a:p>
+            <a:pPr marL="233309" indent="-233309" defTabSz="933237">
+              <a:buFontTx/>
+              <a:buAutoNum type="arabicPeriod"/>
+              <a:defRPr/>
+            </a:pPr>
+            <a:r>
+              <a:rPr lang="en-US" sz="1100" b="0" i="0" dirty="0">
+                <a:solidFill>
+                  <a:srgbClr val="000000"/>
+                </a:solidFill>
+                <a:effectLst/>
+                <a:latin typeface="Calibri" panose="020F0502020204030204" pitchFamily="34" charset="0"/>
+                <a:cs typeface="Calibri" panose="020F0502020204030204" pitchFamily="34" charset="0"/>
+              </a:rPr>
+              <a:t>Speech Recognition</a:t>
+            </a:r>
+          </a:p>
+          <a:p>
+            <a:pPr marL="233309" indent="-233309" defTabSz="933237">
+              <a:buFontTx/>
+              <a:buAutoNum type="arabicPeriod"/>
+              <a:defRPr/>
+            </a:pPr>
+            <a:endParaRPr lang="en-US" b="0" i="0" dirty="0">
+              <a:solidFill>
+                <a:srgbClr val="000000"/>
+              </a:solidFill>
+              <a:effectLst/>
+              <a:latin typeface="Lato"/>
+            </a:endParaRPr>
+          </a:p>
+          <a:p>
+            <a:endParaRPr lang="en-US" dirty="0"/>
           </a:p>
         </p:txBody>
       </p:sp>
@@ -1594,7 +1645,7 @@
     </p:spTree>
     <p:extLst>
       <p:ext uri="{BB962C8B-B14F-4D97-AF65-F5344CB8AC3E}">
-        <p14:creationId xmlns:p14="http://schemas.microsoft.com/office/powerpoint/2010/main" val="1974960137"/>
+        <p14:creationId xmlns:p14="http://schemas.microsoft.com/office/powerpoint/2010/main" val="345247314"/>
       </p:ext>
     </p:extLst>
   </p:cSld>
@@ -1648,7 +1699,172 @@
           <a:bodyPr/>
           <a:lstStyle/>
           <a:p>
-            <a:endParaRPr lang="en-US" dirty="0"/>
+            <a:r>
+              <a:rPr lang="en-US" sz="1100" b="1" i="0" dirty="0">
+                <a:solidFill>
+                  <a:srgbClr val="3C3C3B"/>
+                </a:solidFill>
+                <a:effectLst/>
+                <a:latin typeface="Calibri" panose="020F0502020204030204" pitchFamily="34" charset="0"/>
+                <a:cs typeface="Calibri" panose="020F0502020204030204" pitchFamily="34" charset="0"/>
+              </a:rPr>
+              <a:t>Recurrent neural networks (RNNs) </a:t>
+            </a:r>
+            <a:r>
+              <a:rPr lang="en-US" sz="1100" b="0" i="0" dirty="0">
+                <a:solidFill>
+                  <a:srgbClr val="3C3C3B"/>
+                </a:solidFill>
+                <a:effectLst/>
+                <a:latin typeface="Calibri" panose="020F0502020204030204" pitchFamily="34" charset="0"/>
+                <a:cs typeface="Calibri" panose="020F0502020204030204" pitchFamily="34" charset="0"/>
+              </a:rPr>
+              <a:t>propagate data forward, but also backwards.  As pictured here, the red arrow indicates that the hidden layer connects back to itself, thereby allowing the network to remember what it has already done.  RNN’s are a good choice for sequenced data where the order of the data elements is important.  More recently, </a:t>
+            </a:r>
+            <a:r>
+              <a:rPr lang="en-US" sz="1100" b="1" i="0" dirty="0">
+                <a:solidFill>
+                  <a:srgbClr val="3C3C3B"/>
+                </a:solidFill>
+                <a:effectLst/>
+                <a:latin typeface="Calibri" panose="020F0502020204030204" pitchFamily="34" charset="0"/>
+                <a:cs typeface="Calibri" panose="020F0502020204030204" pitchFamily="34" charset="0"/>
+              </a:rPr>
+              <a:t>Transformers</a:t>
+            </a:r>
+            <a:r>
+              <a:rPr lang="en-US" sz="1100" b="0" i="0" dirty="0">
+                <a:solidFill>
+                  <a:srgbClr val="3C3C3B"/>
+                </a:solidFill>
+                <a:effectLst/>
+                <a:latin typeface="Calibri" panose="020F0502020204030204" pitchFamily="34" charset="0"/>
+                <a:cs typeface="Calibri" panose="020F0502020204030204" pitchFamily="34" charset="0"/>
+              </a:rPr>
+              <a:t> have started to displace RNNs as they are more versatile and effective.</a:t>
+            </a:r>
+          </a:p>
+          <a:p>
+            <a:endParaRPr lang="en-US" sz="1100" b="0" i="0" dirty="0">
+              <a:solidFill>
+                <a:srgbClr val="3C3C3B"/>
+              </a:solidFill>
+              <a:effectLst/>
+              <a:latin typeface="Calibri" panose="020F0502020204030204" pitchFamily="34" charset="0"/>
+              <a:cs typeface="Calibri" panose="020F0502020204030204" pitchFamily="34" charset="0"/>
+            </a:endParaRPr>
+          </a:p>
+          <a:p>
+            <a:r>
+              <a:rPr lang="en-US" sz="1100" b="0" i="0" dirty="0">
+                <a:solidFill>
+                  <a:srgbClr val="3C3C3B"/>
+                </a:solidFill>
+                <a:effectLst/>
+                <a:latin typeface="Calibri" panose="020F0502020204030204" pitchFamily="34" charset="0"/>
+                <a:cs typeface="Calibri" panose="020F0502020204030204" pitchFamily="34" charset="0"/>
+              </a:rPr>
+              <a:t>Some application of RNNs include:</a:t>
+            </a:r>
+          </a:p>
+          <a:p>
+            <a:endParaRPr lang="en-US" sz="1100" b="0" i="0" dirty="0">
+              <a:solidFill>
+                <a:srgbClr val="3C3C3B"/>
+              </a:solidFill>
+              <a:effectLst/>
+              <a:latin typeface="Calibri" panose="020F0502020204030204" pitchFamily="34" charset="0"/>
+              <a:cs typeface="Calibri" panose="020F0502020204030204" pitchFamily="34" charset="0"/>
+            </a:endParaRPr>
+          </a:p>
+          <a:p>
+            <a:pPr marL="233309" indent="-233309">
+              <a:buFont typeface="Arial" panose="020B0604020202020204" pitchFamily="34" charset="0"/>
+              <a:buAutoNum type="arabicPeriod"/>
+            </a:pPr>
+            <a:r>
+              <a:rPr lang="en-US" sz="1100" b="0" i="0" dirty="0">
+                <a:solidFill>
+                  <a:srgbClr val="000000"/>
+                </a:solidFill>
+                <a:effectLst/>
+                <a:latin typeface="Calibri" panose="020F0502020204030204" pitchFamily="34" charset="0"/>
+                <a:cs typeface="Calibri" panose="020F0502020204030204" pitchFamily="34" charset="0"/>
+              </a:rPr>
+              <a:t>Text processing like auto suggest, grammar checks, etc.</a:t>
+            </a:r>
+          </a:p>
+          <a:p>
+            <a:pPr marL="233309" indent="-233309" defTabSz="933237">
+              <a:buFont typeface="Arial" panose="020B0604020202020204" pitchFamily="34" charset="0"/>
+              <a:buAutoNum type="arabicPeriod"/>
+              <a:defRPr/>
+            </a:pPr>
+            <a:r>
+              <a:rPr lang="en-US" sz="1100" b="0" i="0" dirty="0">
+                <a:solidFill>
+                  <a:srgbClr val="000000"/>
+                </a:solidFill>
+                <a:effectLst/>
+                <a:latin typeface="Calibri" panose="020F0502020204030204" pitchFamily="34" charset="0"/>
+                <a:cs typeface="Calibri" panose="020F0502020204030204" pitchFamily="34" charset="0"/>
+              </a:rPr>
+              <a:t>Text to speech processing</a:t>
+            </a:r>
+          </a:p>
+          <a:p>
+            <a:pPr marL="233309" indent="-233309" defTabSz="933237">
+              <a:buFont typeface="Arial" panose="020B0604020202020204" pitchFamily="34" charset="0"/>
+              <a:buAutoNum type="arabicPeriod"/>
+              <a:defRPr/>
+            </a:pPr>
+            <a:r>
+              <a:rPr lang="en-US" sz="1100" b="0" i="0" dirty="0">
+                <a:solidFill>
+                  <a:srgbClr val="000000"/>
+                </a:solidFill>
+                <a:effectLst/>
+                <a:latin typeface="Calibri" panose="020F0502020204030204" pitchFamily="34" charset="0"/>
+                <a:cs typeface="Calibri" panose="020F0502020204030204" pitchFamily="34" charset="0"/>
+              </a:rPr>
+              <a:t>Sentiment Analysis</a:t>
+            </a:r>
+          </a:p>
+          <a:p>
+            <a:pPr marL="233309" indent="-233309" defTabSz="933237">
+              <a:buFont typeface="Arial" panose="020B0604020202020204" pitchFamily="34" charset="0"/>
+              <a:buAutoNum type="arabicPeriod"/>
+              <a:defRPr/>
+            </a:pPr>
+            <a:r>
+              <a:rPr lang="en-US" sz="1100" b="0" i="0" dirty="0">
+                <a:solidFill>
+                  <a:srgbClr val="000000"/>
+                </a:solidFill>
+                <a:effectLst/>
+                <a:latin typeface="Calibri" panose="020F0502020204030204" pitchFamily="34" charset="0"/>
+                <a:cs typeface="Calibri" panose="020F0502020204030204" pitchFamily="34" charset="0"/>
+              </a:rPr>
+              <a:t>Time sequence projections</a:t>
+            </a:r>
+          </a:p>
+          <a:p>
+            <a:pPr marL="233309" indent="-233309" defTabSz="933237">
+              <a:buFont typeface="Arial" panose="020B0604020202020204" pitchFamily="34" charset="0"/>
+              <a:buAutoNum type="arabicPeriod"/>
+              <a:defRPr/>
+            </a:pPr>
+            <a:r>
+              <a:rPr lang="en-US" sz="1100" b="0" i="0" dirty="0">
+                <a:solidFill>
+                  <a:srgbClr val="000000"/>
+                </a:solidFill>
+                <a:effectLst/>
+                <a:latin typeface="Calibri" panose="020F0502020204030204" pitchFamily="34" charset="0"/>
+                <a:cs typeface="Calibri" panose="020F0502020204030204" pitchFamily="34" charset="0"/>
+              </a:rPr>
+              <a:t>Translation</a:t>
+            </a:r>
           </a:p>
         </p:txBody>
       </p:sp>
@@ -1678,7 +1894,7 @@
     </p:spTree>
     <p:extLst>
       <p:ext uri="{BB962C8B-B14F-4D97-AF65-F5344CB8AC3E}">
-        <p14:creationId xmlns:p14="http://schemas.microsoft.com/office/powerpoint/2010/main" val="3573760847"/>
+        <p14:creationId xmlns:p14="http://schemas.microsoft.com/office/powerpoint/2010/main" val="4149381120"/>
       </p:ext>
     </p:extLst>
   </p:cSld>
@@ -1732,10 +1948,107 @@
           <a:bodyPr/>
           <a:lstStyle/>
           <a:p>
-            <a:r>
-              <a:rPr lang="en-US" dirty="0"/>
-              <a:t>Now for those of you who have not worked in a JupyterLab environment, we encourage you to watch our Introduction to JupyterLab video.</a:t>
-            </a:r>
+            <a:pPr marL="0" marR="0" lvl="0" indent="0" algn="l" defTabSz="914400" rtl="0" eaLnBrk="1" fontAlgn="auto" latinLnBrk="0" hangingPunct="1">
+              <a:lnSpc>
+                <a:spcPct val="100000"/>
+              </a:lnSpc>
+              <a:spcBef>
+                <a:spcPts val="0"/>
+              </a:spcBef>
+              <a:spcAft>
+                <a:spcPts val="0"/>
+              </a:spcAft>
+              <a:buClrTx/>
+              <a:buSzTx/>
+              <a:buFontTx/>
+              <a:buNone/>
+              <a:tabLst/>
+              <a:defRPr/>
+            </a:pPr>
+            <a:r>
+              <a:rPr lang="en-US" sz="1100" dirty="0">
+                <a:latin typeface="+mn-lt"/>
+              </a:rPr>
+              <a:t>A </a:t>
+            </a:r>
+            <a:r>
+              <a:rPr lang="en-US" sz="1100" b="1" dirty="0">
+                <a:latin typeface="+mn-lt"/>
+              </a:rPr>
+              <a:t>generative adversarial network (GAN) </a:t>
+            </a:r>
+            <a:r>
+              <a:rPr lang="en-US" sz="1100" dirty="0">
+                <a:latin typeface="+mn-lt"/>
+              </a:rPr>
+              <a:t>is a model in which two neural networks compete with each other to become more accurate in their predictions.  The two neural networks that make up a GAN are referred to as the generator and the discriminator. The goal of the generator is to artificially manufacture outputs that could easily be mistaken for real data. The goal of the discriminator is to identify which outputs it receives have been artificially created.</a:t>
+            </a:r>
+          </a:p>
+          <a:p>
+            <a:endParaRPr lang="en-US" sz="1100" b="1" i="0" dirty="0">
+              <a:solidFill>
+                <a:srgbClr val="3C3C3B"/>
+              </a:solidFill>
+              <a:effectLst/>
+              <a:latin typeface="+mn-lt"/>
+            </a:endParaRPr>
+          </a:p>
+          <a:p>
+            <a:pPr algn="l"/>
+            <a:r>
+              <a:rPr lang="en-US" sz="1800" b="0" i="0" u="none" strike="noStrike" baseline="0" dirty="0">
+                <a:latin typeface="OpenSans"/>
+              </a:rPr>
+              <a:t>GANs are a big area of research, and there are many use cases for them. Some of the useful applications of GANs are as follows:</a:t>
+            </a:r>
+          </a:p>
+          <a:p>
+            <a:pPr algn="l"/>
+            <a:endParaRPr lang="en-US" sz="1800" b="0" i="0" u="none" strike="noStrike" baseline="0" dirty="0">
+              <a:latin typeface="OpenSans"/>
+            </a:endParaRPr>
+          </a:p>
+          <a:p>
+            <a:pPr algn="l"/>
+            <a:r>
+              <a:rPr lang="en-US" sz="1800" b="0" i="0" u="none" strike="noStrike" baseline="0" dirty="0">
+                <a:latin typeface="OpenSans"/>
+              </a:rPr>
+              <a:t>• Image translation</a:t>
+            </a:r>
+          </a:p>
+          <a:p>
+            <a:pPr algn="l"/>
+            <a:r>
+              <a:rPr lang="en-US" sz="1800" b="0" i="0" u="none" strike="noStrike" baseline="0" dirty="0">
+                <a:latin typeface="OpenSans"/>
+              </a:rPr>
+              <a:t>• Text to image synthesis</a:t>
+            </a:r>
+          </a:p>
+          <a:p>
+            <a:pPr algn="l"/>
+            <a:r>
+              <a:rPr lang="en-US" sz="1800" b="0" i="0" u="none" strike="noStrike" baseline="0" dirty="0">
+                <a:latin typeface="OpenSans"/>
+              </a:rPr>
+              <a:t>• Generating videos</a:t>
+            </a:r>
+          </a:p>
+          <a:p>
+            <a:pPr algn="l"/>
+            <a:r>
+              <a:rPr lang="en-US" sz="1800" b="0" i="0" u="none" strike="noStrike" baseline="0" dirty="0">
+                <a:latin typeface="OpenSans"/>
+              </a:rPr>
+              <a:t>• The restoration of art</a:t>
+            </a:r>
+          </a:p>
+          <a:p>
+            <a:pPr algn="l"/>
+            <a:endParaRPr lang="en-US" sz="1800" b="0" i="0" u="none" strike="noStrike" baseline="0" dirty="0">
+              <a:latin typeface="OpenSans"/>
+            </a:endParaRPr>
           </a:p>
         </p:txBody>
       </p:sp>
@@ -1765,7 +2078,194 @@
     </p:spTree>
     <p:extLst>
       <p:ext uri="{BB962C8B-B14F-4D97-AF65-F5344CB8AC3E}">
-        <p14:creationId xmlns:p14="http://schemas.microsoft.com/office/powerpoint/2010/main" val="1328824333"/>
+        <p14:creationId xmlns:p14="http://schemas.microsoft.com/office/powerpoint/2010/main" val="2474625203"/>
+      </p:ext>
+    </p:extLst>
+  </p:cSld>
+  <p:clrMapOvr>
+    <a:masterClrMapping/>
+  </p:clrMapOvr>
+</p:notes>
+</file>
+
+<file path=ppt/notesSlides/notesSlide18.xml><?xml version="1.0" encoding="utf-8"?>
+<p:notes xmlns:a="http://schemas.openxmlformats.org/drawingml/2006/main" xmlns:r="http://schemas.openxmlformats.org/officeDocument/2006/relationships" xmlns:p="http://schemas.openxmlformats.org/presentationml/2006/main">
+  <p:cSld>
+    <p:spTree>
+      <p:nvGrpSpPr>
+        <p:cNvPr id="1" name=""/>
+        <p:cNvGrpSpPr/>
+        <p:nvPr/>
+      </p:nvGrpSpPr>
+      <p:grpSpPr>
+        <a:xfrm>
+          <a:off x="0" y="0"/>
+          <a:ext cx="0" cy="0"/>
+          <a:chOff x="0" y="0"/>
+          <a:chExt cx="0" cy="0"/>
+        </a:xfrm>
+      </p:grpSpPr>
+      <p:sp>
+        <p:nvSpPr>
+          <p:cNvPr id="2" name="Slide Image Placeholder 1"/>
+          <p:cNvSpPr>
+            <a:spLocks noGrp="1" noRot="1" noChangeAspect="1"/>
+          </p:cNvSpPr>
+          <p:nvPr>
+            <p:ph type="sldImg"/>
+          </p:nvPr>
+        </p:nvSpPr>
+        <p:spPr/>
+      </p:sp>
+      <p:sp>
+        <p:nvSpPr>
+          <p:cNvPr id="3" name="Notes Placeholder 2"/>
+          <p:cNvSpPr>
+            <a:spLocks noGrp="1"/>
+          </p:cNvSpPr>
+          <p:nvPr>
+            <p:ph type="body" idx="1"/>
+          </p:nvPr>
+        </p:nvSpPr>
+        <p:spPr/>
+        <p:txBody>
+          <a:bodyPr/>
+          <a:lstStyle/>
+          <a:p>
+            <a:r>
+              <a:rPr lang="en-US" dirty="0"/>
+              <a:t>For additional practice, I recommend that you read the </a:t>
+            </a:r>
+            <a:r>
+              <a:rPr lang="en-US" i="1" dirty="0"/>
+              <a:t>Introduction to Tensorflow </a:t>
+            </a:r>
+            <a:r>
+              <a:rPr lang="en-US" dirty="0"/>
+              <a:t>as well as the </a:t>
+            </a:r>
+            <a:r>
+              <a:rPr lang="en-US" i="1" dirty="0"/>
+              <a:t>Linear Algebra with Tensorflow </a:t>
+            </a:r>
+            <a:r>
+              <a:rPr lang="en-US" dirty="0"/>
+              <a:t>sections, found in the latter half of chapter 1 of our textbook.  The exercises listed in this slide review the basic operations of linear algebra – matrix multiplication, etc…  The matrix multiplication video embedded in the 01.2_linear_algebra notebook is also worth watching.</a:t>
+            </a:r>
+          </a:p>
+        </p:txBody>
+      </p:sp>
+      <p:sp>
+        <p:nvSpPr>
+          <p:cNvPr id="4" name="Slide Number Placeholder 3"/>
+          <p:cNvSpPr>
+            <a:spLocks noGrp="1"/>
+          </p:cNvSpPr>
+          <p:nvPr>
+            <p:ph type="sldNum" sz="quarter" idx="5"/>
+          </p:nvPr>
+        </p:nvSpPr>
+        <p:spPr/>
+        <p:txBody>
+          <a:bodyPr/>
+          <a:lstStyle/>
+          <a:p>
+            <a:fld id="{3148858F-F1DB-4027-9C85-CCA6849540DD}" type="slidenum">
+              <a:rPr lang="en-US" smtClean="0"/>
+              <a:t>18</a:t>
+            </a:fld>
+            <a:endParaRPr lang="en-US"/>
+          </a:p>
+        </p:txBody>
+      </p:sp>
+    </p:spTree>
+    <p:extLst>
+      <p:ext uri="{BB962C8B-B14F-4D97-AF65-F5344CB8AC3E}">
+        <p14:creationId xmlns:p14="http://schemas.microsoft.com/office/powerpoint/2010/main" val="1974960137"/>
+      </p:ext>
+    </p:extLst>
+  </p:cSld>
+  <p:clrMapOvr>
+    <a:masterClrMapping/>
+  </p:clrMapOvr>
+</p:notes>
+</file>
+
+<file path=ppt/notesSlides/notesSlide19.xml><?xml version="1.0" encoding="utf-8"?>
+<p:notes xmlns:a="http://schemas.openxmlformats.org/drawingml/2006/main" xmlns:r="http://schemas.openxmlformats.org/officeDocument/2006/relationships" xmlns:p="http://schemas.openxmlformats.org/presentationml/2006/main">
+  <p:cSld>
+    <p:spTree>
+      <p:nvGrpSpPr>
+        <p:cNvPr id="1" name=""/>
+        <p:cNvGrpSpPr/>
+        <p:nvPr/>
+      </p:nvGrpSpPr>
+      <p:grpSpPr>
+        <a:xfrm>
+          <a:off x="0" y="0"/>
+          <a:ext cx="0" cy="0"/>
+          <a:chOff x="0" y="0"/>
+          <a:chExt cx="0" cy="0"/>
+        </a:xfrm>
+      </p:grpSpPr>
+      <p:sp>
+        <p:nvSpPr>
+          <p:cNvPr id="2" name="Slide Image Placeholder 1"/>
+          <p:cNvSpPr>
+            <a:spLocks noGrp="1" noRot="1" noChangeAspect="1"/>
+          </p:cNvSpPr>
+          <p:nvPr>
+            <p:ph type="sldImg"/>
+          </p:nvPr>
+        </p:nvSpPr>
+        <p:spPr/>
+      </p:sp>
+      <p:sp>
+        <p:nvSpPr>
+          <p:cNvPr id="3" name="Notes Placeholder 2"/>
+          <p:cNvSpPr>
+            <a:spLocks noGrp="1"/>
+          </p:cNvSpPr>
+          <p:nvPr>
+            <p:ph type="body" idx="1"/>
+          </p:nvPr>
+        </p:nvSpPr>
+        <p:spPr/>
+        <p:txBody>
+          <a:bodyPr/>
+          <a:lstStyle/>
+          <a:p>
+            <a:endParaRPr lang="en-US" dirty="0"/>
+          </a:p>
+        </p:txBody>
+      </p:sp>
+      <p:sp>
+        <p:nvSpPr>
+          <p:cNvPr id="4" name="Slide Number Placeholder 3"/>
+          <p:cNvSpPr>
+            <a:spLocks noGrp="1"/>
+          </p:cNvSpPr>
+          <p:nvPr>
+            <p:ph type="sldNum" sz="quarter" idx="5"/>
+          </p:nvPr>
+        </p:nvSpPr>
+        <p:spPr/>
+        <p:txBody>
+          <a:bodyPr/>
+          <a:lstStyle/>
+          <a:p>
+            <a:fld id="{3148858F-F1DB-4027-9C85-CCA6849540DD}" type="slidenum">
+              <a:rPr lang="en-US" smtClean="0"/>
+              <a:t>19</a:t>
+            </a:fld>
+            <a:endParaRPr lang="en-US"/>
+          </a:p>
+        </p:txBody>
+      </p:sp>
+    </p:spTree>
+    <p:extLst>
+      <p:ext uri="{BB962C8B-B14F-4D97-AF65-F5344CB8AC3E}">
+        <p14:creationId xmlns:p14="http://schemas.microsoft.com/office/powerpoint/2010/main" val="3573760847"/>
       </p:ext>
     </p:extLst>
   </p:cSld>
@@ -1869,6 +2369,93 @@
 </p:notes>
 </file>
 
+<file path=ppt/notesSlides/notesSlide20.xml><?xml version="1.0" encoding="utf-8"?>
+<p:notes xmlns:a="http://schemas.openxmlformats.org/drawingml/2006/main" xmlns:r="http://schemas.openxmlformats.org/officeDocument/2006/relationships" xmlns:p="http://schemas.openxmlformats.org/presentationml/2006/main">
+  <p:cSld>
+    <p:spTree>
+      <p:nvGrpSpPr>
+        <p:cNvPr id="1" name=""/>
+        <p:cNvGrpSpPr/>
+        <p:nvPr/>
+      </p:nvGrpSpPr>
+      <p:grpSpPr>
+        <a:xfrm>
+          <a:off x="0" y="0"/>
+          <a:ext cx="0" cy="0"/>
+          <a:chOff x="0" y="0"/>
+          <a:chExt cx="0" cy="0"/>
+        </a:xfrm>
+      </p:grpSpPr>
+      <p:sp>
+        <p:nvSpPr>
+          <p:cNvPr id="2" name="Slide Image Placeholder 1"/>
+          <p:cNvSpPr>
+            <a:spLocks noGrp="1" noRot="1" noChangeAspect="1"/>
+          </p:cNvSpPr>
+          <p:nvPr>
+            <p:ph type="sldImg"/>
+          </p:nvPr>
+        </p:nvSpPr>
+        <p:spPr/>
+      </p:sp>
+      <p:sp>
+        <p:nvSpPr>
+          <p:cNvPr id="3" name="Notes Placeholder 2"/>
+          <p:cNvSpPr>
+            <a:spLocks noGrp="1"/>
+          </p:cNvSpPr>
+          <p:nvPr>
+            <p:ph type="body" idx="1"/>
+          </p:nvPr>
+        </p:nvSpPr>
+        <p:spPr/>
+        <p:txBody>
+          <a:bodyPr/>
+          <a:lstStyle/>
+          <a:p>
+            <a:r>
+              <a:rPr lang="en-US" dirty="0"/>
+              <a:t>Now for those of you who have not worked in a JupyterLab environment, we encourage you to watch our Introduction to JupyterLab video.</a:t>
+            </a:r>
+          </a:p>
+        </p:txBody>
+      </p:sp>
+      <p:sp>
+        <p:nvSpPr>
+          <p:cNvPr id="4" name="Slide Number Placeholder 3"/>
+          <p:cNvSpPr>
+            <a:spLocks noGrp="1"/>
+          </p:cNvSpPr>
+          <p:nvPr>
+            <p:ph type="sldNum" sz="quarter" idx="5"/>
+          </p:nvPr>
+        </p:nvSpPr>
+        <p:spPr/>
+        <p:txBody>
+          <a:bodyPr/>
+          <a:lstStyle/>
+          <a:p>
+            <a:fld id="{3148858F-F1DB-4027-9C85-CCA6849540DD}" type="slidenum">
+              <a:rPr lang="en-US" smtClean="0"/>
+              <a:t>20</a:t>
+            </a:fld>
+            <a:endParaRPr lang="en-US"/>
+          </a:p>
+        </p:txBody>
+      </p:sp>
+    </p:spTree>
+    <p:extLst>
+      <p:ext uri="{BB962C8B-B14F-4D97-AF65-F5344CB8AC3E}">
+        <p14:creationId xmlns:p14="http://schemas.microsoft.com/office/powerpoint/2010/main" val="1328824333"/>
+      </p:ext>
+    </p:extLst>
+  </p:cSld>
+  <p:clrMapOvr>
+    <a:masterClrMapping/>
+  </p:clrMapOvr>
+</p:notes>
+</file>
+
 <file path=ppt/notesSlides/notesSlide3.xml><?xml version="1.0" encoding="utf-8"?>
 <p:notes xmlns:a="http://schemas.openxmlformats.org/drawingml/2006/main" xmlns:r="http://schemas.openxmlformats.org/officeDocument/2006/relationships" xmlns:p="http://schemas.openxmlformats.org/presentationml/2006/main">
   <p:cSld>
@@ -1922,7 +2509,7 @@
                   </a:schemeClr>
                 </a:solidFill>
               </a:rPr>
-              <a:t>Our Deep Learning Foundations series comprise 3 workshops.  In this session and the next two which follow, we cover the basics of deep learning.  In other words, this series provides a foundation for our intermediate and advanced workshops.</a:t>
+              <a:t>Our Deep Learning Foundations series comprise 3 workshops.  In this session and the next two which follow, we cover the basics of deep learning.  Keep in mind that this series is foundational for our intermediate workshops.  </a:t>
             </a:r>
           </a:p>
         </p:txBody>
@@ -2007,6 +2594,9 @@
           <a:bodyPr/>
           <a:lstStyle/>
           <a:p>
+            <a:pPr marL="228600" indent="-228600">
+              <a:buAutoNum type="arabicPeriod"/>
+            </a:pPr>
             <a:r>
               <a:rPr lang="en-US" sz="1100" dirty="0">
                 <a:solidFill>
@@ -2016,10 +2606,83 @@
                   </a:schemeClr>
                 </a:solidFill>
               </a:rPr>
-              <a:t>This workshop series is guided by two essential questions:  How does it – a particular AI algorithm – work?  And where can I use it? </a:t>
-            </a:r>
-          </a:p>
-          <a:p>
+              <a:t>Two essential questions…</a:t>
+            </a:r>
+          </a:p>
+          <a:p>
+            <a:pPr marL="228600" indent="-228600">
+              <a:buAutoNum type="arabicPeriod"/>
+            </a:pPr>
+            <a:r>
+              <a:rPr lang="en-US" sz="1100" dirty="0">
+                <a:solidFill>
+                  <a:schemeClr val="tx1">
+                    <a:lumMod val="75000"/>
+                    <a:lumOff val="25000"/>
+                  </a:schemeClr>
+                </a:solidFill>
+              </a:rPr>
+              <a:t>1st question:  Just as you can drive a car without understanding the laws of thermodynamics, you can drive neural networks without having to master the math (calculus) which underpin them.  Do not need a year of calculus…</a:t>
+            </a:r>
+          </a:p>
+          <a:p>
+            <a:pPr marL="228600" indent="-228600">
+              <a:buAutoNum type="arabicPeriod"/>
+            </a:pPr>
+            <a:r>
+              <a:rPr lang="en-US" sz="1100" dirty="0">
+                <a:solidFill>
+                  <a:schemeClr val="tx1">
+                    <a:lumMod val="75000"/>
+                    <a:lumOff val="25000"/>
+                  </a:schemeClr>
+                </a:solidFill>
+              </a:rPr>
+              <a:t>Higher level understanding – the various dials and gauges (hyperparameters) – Google Teachable Machine introduced these.</a:t>
+            </a:r>
+          </a:p>
+          <a:p>
+            <a:pPr marL="228600" indent="-228600">
+              <a:buAutoNum type="arabicPeriod"/>
+            </a:pPr>
+            <a:r>
+              <a:rPr lang="en-US" sz="1100" dirty="0">
+                <a:solidFill>
+                  <a:schemeClr val="tx1">
+                    <a:lumMod val="75000"/>
+                    <a:lumOff val="25000"/>
+                  </a:schemeClr>
+                </a:solidFill>
+              </a:rPr>
+              <a:t>2</a:t>
+            </a:r>
+            <a:r>
+              <a:rPr lang="en-US" sz="1100" baseline="30000" dirty="0">
+                <a:solidFill>
+                  <a:schemeClr val="tx1">
+                    <a:lumMod val="75000"/>
+                    <a:lumOff val="25000"/>
+                  </a:schemeClr>
+                </a:solidFill>
+              </a:rPr>
+              <a:t>nd</a:t>
+            </a:r>
+            <a:r>
+              <a:rPr lang="en-US" sz="1100" dirty="0">
+                <a:solidFill>
+                  <a:schemeClr val="tx1">
+                    <a:lumMod val="75000"/>
+                    <a:lumOff val="25000"/>
+                  </a:schemeClr>
+                </a:solidFill>
+              </a:rPr>
+              <a:t> question: Equally important – but one you must creatively answer yourself, though we will share applications in today’s mini-lectures.</a:t>
+            </a:r>
+          </a:p>
+          <a:p>
+            <a:pPr marL="228600" indent="-228600">
+              <a:buAutoNum type="arabicPeriod"/>
+            </a:pPr>
             <a:endParaRPr lang="en-US" sz="1100" dirty="0">
               <a:solidFill>
                 <a:schemeClr val="tx1">
@@ -2030,6 +2693,9 @@
             </a:endParaRPr>
           </a:p>
           <a:p>
+            <a:pPr marL="0" indent="0">
+              <a:buNone/>
+            </a:pPr>
             <a:r>
               <a:rPr lang="en-US" sz="1100" dirty="0">
                 <a:solidFill>
@@ -2039,10 +2705,12 @@
                   </a:schemeClr>
                 </a:solidFill>
               </a:rPr>
-              <a:t>With respect to the first question, let me assure you that you can do interesting work in AI without having to master the mathematical details.  Just as you can drive a car without understanding the laws of thermodynamics, likewise you can drive the various types of neural network without having to master the calculus, statistics, and algebra which power them.  Of course, you need to know how they work at a higher level – what the various dials and gauges mean (called </a:t>
-            </a:r>
-            <a:r>
-              <a:rPr lang="en-US" sz="1100" b="1" dirty="0">
+              <a:t>=====</a:t>
+            </a:r>
+          </a:p>
+          <a:p>
+            <a:r>
+              <a:rPr lang="en-US" sz="1100" dirty="0">
                 <a:solidFill>
                   <a:schemeClr val="tx1">
                     <a:lumMod val="75000"/>
@@ -2050,18 +2718,7 @@
                   </a:schemeClr>
                 </a:solidFill>
               </a:rPr>
-              <a:t>hyperparameters</a:t>
-            </a:r>
-            <a:r>
-              <a:rPr lang="en-US" sz="1100" dirty="0">
-                <a:solidFill>
-                  <a:schemeClr val="tx1">
-                    <a:lumMod val="75000"/>
-                    <a:lumOff val="25000"/>
-                  </a:schemeClr>
-                </a:solidFill>
-              </a:rPr>
-              <a:t>) – and the various ways you can manage the learning process.  But you do not need a year of calculus to achieve that kind of understanding.</a:t>
+              <a:t>This workshop series is guided by two essential questions:  How does it – a particular AI algorithm – work?  And where can I use it? </a:t>
             </a:r>
           </a:p>
           <a:p>
@@ -2084,7 +2741,52 @@
                   </a:schemeClr>
                 </a:solidFill>
               </a:rPr>
-              <a:t>The second question is also important.  In fact, it is the primary focus of this learning experience.  It is not a question that we can fully answer for you as it requires a certain level of knowledge and imagination on your part, though we can prime your thinking by demonstrating a specific application.  That’s what you will be doing today.  You are going to write some code to build and then test a neural network capable of classifying images. </a:t>
+              <a:t>With respect to the first question, let me assure you that you can do interesting work in AI without having to master the mathematical details.  Just as you can drive a car without understanding the laws of thermodynamics, likewise you can drive the various types of neural network without having to master the calculus, statistics, and algebra which power them.  Of course, you need to know how they work at a higher level – what the various dials and gauges mean (called </a:t>
+            </a:r>
+            <a:r>
+              <a:rPr lang="en-US" sz="1100" b="1" dirty="0">
+                <a:solidFill>
+                  <a:schemeClr val="tx1">
+                    <a:lumMod val="75000"/>
+                    <a:lumOff val="25000"/>
+                  </a:schemeClr>
+                </a:solidFill>
+              </a:rPr>
+              <a:t>hyperparameters</a:t>
+            </a:r>
+            <a:r>
+              <a:rPr lang="en-US" sz="1100" dirty="0">
+                <a:solidFill>
+                  <a:schemeClr val="tx1">
+                    <a:lumMod val="75000"/>
+                    <a:lumOff val="25000"/>
+                  </a:schemeClr>
+                </a:solidFill>
+              </a:rPr>
+              <a:t>) – and the various ways you can manage the learning process.  But you do not need a year of calculus to achieve that kind of understanding.</a:t>
+            </a:r>
+          </a:p>
+          <a:p>
+            <a:endParaRPr lang="en-US" sz="1100" dirty="0">
+              <a:solidFill>
+                <a:schemeClr val="tx1">
+                  <a:lumMod val="75000"/>
+                  <a:lumOff val="25000"/>
+                </a:schemeClr>
+              </a:solidFill>
+            </a:endParaRPr>
+          </a:p>
+          <a:p>
+            <a:r>
+              <a:rPr lang="en-US" sz="1100" dirty="0">
+                <a:solidFill>
+                  <a:schemeClr val="tx1">
+                    <a:lumMod val="75000"/>
+                    <a:lumOff val="25000"/>
+                  </a:schemeClr>
+                </a:solidFill>
+              </a:rPr>
+              <a:t>The second question is also important.  In fact, it is the primary focus of this learning experience.  It is not a question we can fully answer for you as it requires a certain level of knowledge and imagination on your part, though we can prime your thinking by demonstrating a specific application.  That’s what you will be doing today.  You are going to write some code to build and then test a neural network capable of classifying images. </a:t>
             </a:r>
           </a:p>
         </p:txBody>
@@ -2863,23 +3565,10 @@
                 <a:ea typeface="+mn-ea"/>
                 <a:cs typeface="+mn-cs"/>
               </a:rPr>
-              <a:t>.  </a:t>
-            </a:r>
-          </a:p>
-          <a:p>
-            <a:endParaRPr lang="en-US" sz="1200" b="0" i="0" kern="1200" dirty="0">
-              <a:solidFill>
-                <a:schemeClr val="tx1"/>
-              </a:solidFill>
-              <a:effectLst/>
-              <a:latin typeface="+mn-lt"/>
-              <a:ea typeface="+mn-ea"/>
-              <a:cs typeface="+mn-cs"/>
-            </a:endParaRPr>
-          </a:p>
-          <a:p>
-            <a:r>
-              <a:rPr lang="en-US" sz="1200" b="0" i="0" kern="1200" dirty="0">
+              <a:t>.  Now, the key word in that second definition is </a:t>
+            </a:r>
+            <a:r>
+              <a:rPr lang="en-US" sz="1200" b="1" i="0" kern="1200" dirty="0">
                 <a:solidFill>
                   <a:schemeClr val="tx1"/>
                 </a:solidFill>
@@ -2888,10 +3577,10 @@
                 <a:ea typeface="+mn-ea"/>
                 <a:cs typeface="+mn-cs"/>
               </a:rPr>
-              <a:t>Now, the key word in that second definition is </a:t>
-            </a:r>
-            <a:r>
-              <a:rPr lang="en-US" sz="1200" b="1" i="0" kern="1200" dirty="0">
+              <a:t>data</a:t>
+            </a:r>
+            <a:r>
+              <a:rPr lang="en-US" sz="1200" b="0" i="0" kern="1200" dirty="0">
                 <a:solidFill>
                   <a:schemeClr val="tx1"/>
                 </a:solidFill>
@@ -2900,19 +3589,7 @@
                 <a:ea typeface="+mn-ea"/>
                 <a:cs typeface="+mn-cs"/>
               </a:rPr>
-              <a:t>data</a:t>
-            </a:r>
-            <a:r>
-              <a:rPr lang="en-US" sz="1200" b="0" i="0" kern="1200" dirty="0">
-                <a:solidFill>
-                  <a:schemeClr val="tx1"/>
-                </a:solidFill>
-                <a:effectLst/>
-                <a:latin typeface="+mn-lt"/>
-                <a:ea typeface="+mn-ea"/>
-                <a:cs typeface="+mn-cs"/>
-              </a:rPr>
-              <a:t>.  In fact, deep learning is not possible without data.  In the second half of today’s presentation, we will talk about the various types of data and the AI techniques used on them.  But first, let’s dive into the details of our Practicum AI workshop program.</a:t>
+              <a:t>.</a:t>
             </a:r>
           </a:p>
           <a:p>
@@ -3344,15 +4021,7 @@
           <a:p>
             <a:r>
               <a:rPr lang="en-US" dirty="0"/>
-              <a:t>The exercise for this </a:t>
-            </a:r>
-            <a:r>
-              <a:rPr lang="en-US"/>
-              <a:t>learning experience </a:t>
-            </a:r>
-            <a:r>
-              <a:rPr lang="en-US" dirty="0"/>
-              <a:t>starts on page 7 of the textbook.  For additional information, please watch the exercise 1.01 orientation video.</a:t>
+              <a:t>The exercise for this learning experience starts on page 7 of the textbook.  For additional information, please watch the exercise 1.01 orientation video.</a:t>
             </a:r>
           </a:p>
         </p:txBody>
@@ -3540,7 +4209,7 @@
           <a:p>
             <a:fld id="{C3F78080-8D0A-4BE8-A5B4-CB115102D524}" type="datetimeFigureOut">
               <a:rPr lang="en-US" smtClean="0"/>
-              <a:t>3/18/2022</a:t>
+              <a:t>3/21/2022</a:t>
             </a:fld>
             <a:endParaRPr lang="en-US"/>
           </a:p>
@@ -3738,7 +4407,7 @@
           <a:p>
             <a:fld id="{C3F78080-8D0A-4BE8-A5B4-CB115102D524}" type="datetimeFigureOut">
               <a:rPr lang="en-US" smtClean="0"/>
-              <a:t>3/18/2022</a:t>
+              <a:t>3/21/2022</a:t>
             </a:fld>
             <a:endParaRPr lang="en-US"/>
           </a:p>
@@ -3946,7 +4615,7 @@
           <a:p>
             <a:fld id="{C3F78080-8D0A-4BE8-A5B4-CB115102D524}" type="datetimeFigureOut">
               <a:rPr lang="en-US" smtClean="0"/>
-              <a:t>3/18/2022</a:t>
+              <a:t>3/21/2022</a:t>
             </a:fld>
             <a:endParaRPr lang="en-US"/>
           </a:p>
@@ -4144,7 +4813,7 @@
           <a:p>
             <a:fld id="{C3F78080-8D0A-4BE8-A5B4-CB115102D524}" type="datetimeFigureOut">
               <a:rPr lang="en-US" smtClean="0"/>
-              <a:t>3/18/2022</a:t>
+              <a:t>3/21/2022</a:t>
             </a:fld>
             <a:endParaRPr lang="en-US"/>
           </a:p>
@@ -4419,7 +5088,7 @@
           <a:p>
             <a:fld id="{C3F78080-8D0A-4BE8-A5B4-CB115102D524}" type="datetimeFigureOut">
               <a:rPr lang="en-US" smtClean="0"/>
-              <a:t>3/18/2022</a:t>
+              <a:t>3/21/2022</a:t>
             </a:fld>
             <a:endParaRPr lang="en-US"/>
           </a:p>
@@ -4684,7 +5353,7 @@
           <a:p>
             <a:fld id="{C3F78080-8D0A-4BE8-A5B4-CB115102D524}" type="datetimeFigureOut">
               <a:rPr lang="en-US" smtClean="0"/>
-              <a:t>3/18/2022</a:t>
+              <a:t>3/21/2022</a:t>
             </a:fld>
             <a:endParaRPr lang="en-US"/>
           </a:p>
@@ -5096,7 +5765,7 @@
           <a:p>
             <a:fld id="{C3F78080-8D0A-4BE8-A5B4-CB115102D524}" type="datetimeFigureOut">
               <a:rPr lang="en-US" smtClean="0"/>
-              <a:t>3/18/2022</a:t>
+              <a:t>3/21/2022</a:t>
             </a:fld>
             <a:endParaRPr lang="en-US"/>
           </a:p>
@@ -5237,7 +5906,7 @@
           <a:p>
             <a:fld id="{C3F78080-8D0A-4BE8-A5B4-CB115102D524}" type="datetimeFigureOut">
               <a:rPr lang="en-US" smtClean="0"/>
-              <a:t>3/18/2022</a:t>
+              <a:t>3/21/2022</a:t>
             </a:fld>
             <a:endParaRPr lang="en-US"/>
           </a:p>
@@ -5350,7 +6019,7 @@
           <a:p>
             <a:fld id="{C3F78080-8D0A-4BE8-A5B4-CB115102D524}" type="datetimeFigureOut">
               <a:rPr lang="en-US" smtClean="0"/>
-              <a:t>3/18/2022</a:t>
+              <a:t>3/21/2022</a:t>
             </a:fld>
             <a:endParaRPr lang="en-US"/>
           </a:p>
@@ -5661,7 +6330,7 @@
           <a:p>
             <a:fld id="{C3F78080-8D0A-4BE8-A5B4-CB115102D524}" type="datetimeFigureOut">
               <a:rPr lang="en-US" smtClean="0"/>
-              <a:t>3/18/2022</a:t>
+              <a:t>3/21/2022</a:t>
             </a:fld>
             <a:endParaRPr lang="en-US"/>
           </a:p>
@@ -5949,7 +6618,7 @@
           <a:p>
             <a:fld id="{C3F78080-8D0A-4BE8-A5B4-CB115102D524}" type="datetimeFigureOut">
               <a:rPr lang="en-US" smtClean="0"/>
-              <a:t>3/18/2022</a:t>
+              <a:t>3/21/2022</a:t>
             </a:fld>
             <a:endParaRPr lang="en-US"/>
           </a:p>
@@ -6190,7 +6859,7 @@
           <a:p>
             <a:fld id="{C3F78080-8D0A-4BE8-A5B4-CB115102D524}" type="datetimeFigureOut">
               <a:rPr lang="en-US" smtClean="0"/>
-              <a:t>3/18/2022</a:t>
+              <a:t>3/21/2022</a:t>
             </a:fld>
             <a:endParaRPr lang="en-US"/>
           </a:p>
@@ -6723,6 +7392,427 @@
       </p:grpSpPr>
       <p:sp>
         <p:nvSpPr>
+          <p:cNvPr id="10" name="TextBox 9">
+            <a:extLst>
+              <a:ext uri="{FF2B5EF4-FFF2-40B4-BE49-F238E27FC236}">
+                <a16:creationId xmlns:a16="http://schemas.microsoft.com/office/drawing/2014/main" id="{0A3EA873-9215-4245-A571-9427338BA812}"/>
+              </a:ext>
+            </a:extLst>
+          </p:cNvPr>
+          <p:cNvSpPr txBox="1"/>
+          <p:nvPr/>
+        </p:nvSpPr>
+        <p:spPr>
+          <a:xfrm>
+            <a:off x="0" y="6550223"/>
+            <a:ext cx="12192000" cy="307777"/>
+          </a:xfrm>
+          <a:prstGeom prst="rect">
+            <a:avLst/>
+          </a:prstGeom>
+          <a:noFill/>
+        </p:spPr>
+        <p:txBody>
+          <a:bodyPr wrap="square" rtlCol="0">
+            <a:spAutoFit/>
+          </a:bodyPr>
+          <a:lstStyle/>
+          <a:p>
+            <a:r>
+              <a:rPr lang="en-US" sz="1400" dirty="0">
+                <a:solidFill>
+                  <a:schemeClr val="tx1">
+                    <a:lumMod val="65000"/>
+                    <a:lumOff val="35000"/>
+                  </a:schemeClr>
+                </a:solidFill>
+                <a:latin typeface="+mj-lt"/>
+                <a:ea typeface="Verdana" panose="020B0604030504040204" pitchFamily="34" charset="0"/>
+              </a:rPr>
+              <a:t>Image Credit: </a:t>
+            </a:r>
+            <a:r>
+              <a:rPr lang="en-US" sz="1400" dirty="0">
+                <a:solidFill>
+                  <a:schemeClr val="tx1">
+                    <a:lumMod val="65000"/>
+                    <a:lumOff val="35000"/>
+                  </a:schemeClr>
+                </a:solidFill>
+                <a:latin typeface="+mj-lt"/>
+              </a:rPr>
+              <a:t>https://towardsdatascience.com/what-are-the-types-of-machine-learning-e2b9e5d1756f</a:t>
+            </a:r>
+            <a:endParaRPr lang="en-US" sz="1400" dirty="0">
+              <a:solidFill>
+                <a:schemeClr val="tx1">
+                  <a:lumMod val="65000"/>
+                  <a:lumOff val="35000"/>
+                </a:schemeClr>
+              </a:solidFill>
+              <a:latin typeface="+mj-lt"/>
+              <a:ea typeface="Verdana" panose="020B0604030504040204" pitchFamily="34" charset="0"/>
+            </a:endParaRPr>
+          </a:p>
+        </p:txBody>
+      </p:sp>
+      <p:pic>
+        <p:nvPicPr>
+          <p:cNvPr id="5" name="Picture 4" descr="Diagram&#10;&#10;Description automatically generated">
+            <a:extLst>
+              <a:ext uri="{FF2B5EF4-FFF2-40B4-BE49-F238E27FC236}">
+                <a16:creationId xmlns:a16="http://schemas.microsoft.com/office/drawing/2014/main" id="{BBF9058A-5170-40DE-9A8F-1B69BF44E21E}"/>
+              </a:ext>
+            </a:extLst>
+          </p:cNvPr>
+          <p:cNvPicPr>
+            <a:picLocks noChangeAspect="1"/>
+          </p:cNvPicPr>
+          <p:nvPr/>
+        </p:nvPicPr>
+        <p:blipFill>
+          <a:blip r:embed="rId3">
+            <a:extLst>
+              <a:ext uri="{28A0092B-C50C-407E-A947-70E740481C1C}">
+                <a14:useLocalDpi xmlns:a14="http://schemas.microsoft.com/office/drawing/2010/main" val="0"/>
+              </a:ext>
+            </a:extLst>
+          </a:blip>
+          <a:stretch>
+            <a:fillRect/>
+          </a:stretch>
+        </p:blipFill>
+        <p:spPr>
+          <a:xfrm>
+            <a:off x="3271837" y="1685925"/>
+            <a:ext cx="5648325" cy="3486150"/>
+          </a:xfrm>
+          <a:prstGeom prst="rect">
+            <a:avLst/>
+          </a:prstGeom>
+        </p:spPr>
+      </p:pic>
+    </p:spTree>
+    <p:extLst>
+      <p:ext uri="{BB962C8B-B14F-4D97-AF65-F5344CB8AC3E}">
+        <p14:creationId xmlns:p14="http://schemas.microsoft.com/office/powerpoint/2010/main" val="3276872480"/>
+      </p:ext>
+    </p:extLst>
+  </p:cSld>
+  <p:clrMapOvr>
+    <a:masterClrMapping/>
+  </p:clrMapOvr>
+  <mc:AlternateContent xmlns:mc="http://schemas.openxmlformats.org/markup-compatibility/2006" xmlns:p14="http://schemas.microsoft.com/office/powerpoint/2010/main">
+    <mc:Choice Requires="p14">
+      <p:transition spd="med" p14:dur="700">
+        <p:fade/>
+      </p:transition>
+    </mc:Choice>
+    <mc:Fallback xmlns="">
+      <p:transition spd="med">
+        <p:fade/>
+      </p:transition>
+    </mc:Fallback>
+  </mc:AlternateContent>
+</p:sld>
+</file>
+
+<file path=ppt/slides/slide11.xml><?xml version="1.0" encoding="utf-8"?>
+<p:sld xmlns:a="http://schemas.openxmlformats.org/drawingml/2006/main" xmlns:r="http://schemas.openxmlformats.org/officeDocument/2006/relationships" xmlns:p="http://schemas.openxmlformats.org/presentationml/2006/main">
+  <p:cSld>
+    <p:spTree>
+      <p:nvGrpSpPr>
+        <p:cNvPr id="1" name=""/>
+        <p:cNvGrpSpPr/>
+        <p:nvPr/>
+      </p:nvGrpSpPr>
+      <p:grpSpPr>
+        <a:xfrm>
+          <a:off x="0" y="0"/>
+          <a:ext cx="0" cy="0"/>
+          <a:chOff x="0" y="0"/>
+          <a:chExt cx="0" cy="0"/>
+        </a:xfrm>
+      </p:grpSpPr>
+      <p:pic>
+        <p:nvPicPr>
+          <p:cNvPr id="3" name="Picture 2">
+            <a:extLst>
+              <a:ext uri="{FF2B5EF4-FFF2-40B4-BE49-F238E27FC236}">
+                <a16:creationId xmlns:a16="http://schemas.microsoft.com/office/drawing/2014/main" id="{E00A34AB-652A-4ED3-9F2F-D6870E237A05}"/>
+              </a:ext>
+            </a:extLst>
+          </p:cNvPr>
+          <p:cNvPicPr>
+            <a:picLocks noChangeAspect="1"/>
+          </p:cNvPicPr>
+          <p:nvPr/>
+        </p:nvPicPr>
+        <p:blipFill>
+          <a:blip r:embed="rId3"/>
+          <a:stretch>
+            <a:fillRect/>
+          </a:stretch>
+        </p:blipFill>
+        <p:spPr>
+          <a:xfrm>
+            <a:off x="3120107" y="255331"/>
+            <a:ext cx="5951785" cy="6045107"/>
+          </a:xfrm>
+          <a:prstGeom prst="rect">
+            <a:avLst/>
+          </a:prstGeom>
+        </p:spPr>
+      </p:pic>
+      <p:sp>
+        <p:nvSpPr>
+          <p:cNvPr id="5" name="TextBox 4">
+            <a:extLst>
+              <a:ext uri="{FF2B5EF4-FFF2-40B4-BE49-F238E27FC236}">
+                <a16:creationId xmlns:a16="http://schemas.microsoft.com/office/drawing/2014/main" id="{76ACCFE1-FA9F-4EA7-88D6-57DFBE824437}"/>
+              </a:ext>
+            </a:extLst>
+          </p:cNvPr>
+          <p:cNvSpPr txBox="1"/>
+          <p:nvPr/>
+        </p:nvSpPr>
+        <p:spPr>
+          <a:xfrm>
+            <a:off x="0" y="6550223"/>
+            <a:ext cx="12192000" cy="307777"/>
+          </a:xfrm>
+          <a:prstGeom prst="rect">
+            <a:avLst/>
+          </a:prstGeom>
+          <a:noFill/>
+        </p:spPr>
+        <p:txBody>
+          <a:bodyPr wrap="square" rtlCol="0">
+            <a:spAutoFit/>
+          </a:bodyPr>
+          <a:lstStyle/>
+          <a:p>
+            <a:r>
+              <a:rPr lang="en-US" sz="1400" dirty="0">
+                <a:solidFill>
+                  <a:schemeClr val="tx1">
+                    <a:lumMod val="65000"/>
+                    <a:lumOff val="35000"/>
+                  </a:schemeClr>
+                </a:solidFill>
+                <a:latin typeface="+mj-lt"/>
+                <a:ea typeface="Verdana" panose="020B0604030504040204" pitchFamily="34" charset="0"/>
+              </a:rPr>
+              <a:t>Source: Palmas, A. (2019). </a:t>
+            </a:r>
+            <a:r>
+              <a:rPr lang="en-US" sz="1400" i="1" dirty="0">
+                <a:solidFill>
+                  <a:schemeClr val="tx1">
+                    <a:lumMod val="65000"/>
+                    <a:lumOff val="35000"/>
+                  </a:schemeClr>
+                </a:solidFill>
+                <a:latin typeface="+mj-lt"/>
+                <a:ea typeface="Verdana" panose="020B0604030504040204" pitchFamily="34" charset="0"/>
+              </a:rPr>
+              <a:t>The Reinforcement Learning Workshop</a:t>
+            </a:r>
+            <a:r>
+              <a:rPr lang="en-US" sz="1400" dirty="0">
+                <a:solidFill>
+                  <a:schemeClr val="tx1">
+                    <a:lumMod val="65000"/>
+                    <a:lumOff val="35000"/>
+                  </a:schemeClr>
+                </a:solidFill>
+                <a:latin typeface="+mj-lt"/>
+                <a:ea typeface="Verdana" panose="020B0604030504040204" pitchFamily="34" charset="0"/>
+              </a:rPr>
+              <a:t>. Birmingham, UK</a:t>
+            </a:r>
+            <a:r>
+              <a:rPr lang="en-US" sz="1400" b="0" i="0" dirty="0">
+                <a:solidFill>
+                  <a:schemeClr val="tx1">
+                    <a:lumMod val="65000"/>
+                    <a:lumOff val="35000"/>
+                  </a:schemeClr>
+                </a:solidFill>
+                <a:effectLst/>
+                <a:latin typeface="+mj-lt"/>
+                <a:ea typeface="Verdana" panose="020B0604030504040204" pitchFamily="34" charset="0"/>
+              </a:rPr>
+              <a:t>: Packt Publishing. (Chapter 1)</a:t>
+            </a:r>
+            <a:endParaRPr lang="en-US" sz="1400" dirty="0">
+              <a:solidFill>
+                <a:schemeClr val="tx1">
+                  <a:lumMod val="65000"/>
+                  <a:lumOff val="35000"/>
+                </a:schemeClr>
+              </a:solidFill>
+              <a:latin typeface="+mj-lt"/>
+              <a:ea typeface="Verdana" panose="020B0604030504040204" pitchFamily="34" charset="0"/>
+            </a:endParaRPr>
+          </a:p>
+        </p:txBody>
+      </p:sp>
+    </p:spTree>
+    <p:extLst>
+      <p:ext uri="{BB962C8B-B14F-4D97-AF65-F5344CB8AC3E}">
+        <p14:creationId xmlns:p14="http://schemas.microsoft.com/office/powerpoint/2010/main" val="2948696555"/>
+      </p:ext>
+    </p:extLst>
+  </p:cSld>
+  <p:clrMapOvr>
+    <a:masterClrMapping/>
+  </p:clrMapOvr>
+  <mc:AlternateContent xmlns:mc="http://schemas.openxmlformats.org/markup-compatibility/2006" xmlns:p14="http://schemas.microsoft.com/office/powerpoint/2010/main">
+    <mc:Choice Requires="p14">
+      <p:transition spd="med" p14:dur="700">
+        <p:fade/>
+      </p:transition>
+    </mc:Choice>
+    <mc:Fallback xmlns="">
+      <p:transition spd="med">
+        <p:fade/>
+      </p:transition>
+    </mc:Fallback>
+  </mc:AlternateContent>
+</p:sld>
+</file>
+
+<file path=ppt/slides/slide12.xml><?xml version="1.0" encoding="utf-8"?>
+<p:sld xmlns:a="http://schemas.openxmlformats.org/drawingml/2006/main" xmlns:r="http://schemas.openxmlformats.org/officeDocument/2006/relationships" xmlns:p="http://schemas.openxmlformats.org/presentationml/2006/main">
+  <p:cSld>
+    <p:spTree>
+      <p:nvGrpSpPr>
+        <p:cNvPr id="1" name=""/>
+        <p:cNvGrpSpPr/>
+        <p:nvPr/>
+      </p:nvGrpSpPr>
+      <p:grpSpPr>
+        <a:xfrm>
+          <a:off x="0" y="0"/>
+          <a:ext cx="0" cy="0"/>
+          <a:chOff x="0" y="0"/>
+          <a:chExt cx="0" cy="0"/>
+        </a:xfrm>
+      </p:grpSpPr>
+      <p:sp>
+        <p:nvSpPr>
+          <p:cNvPr id="2" name="Title 1">
+            <a:extLst>
+              <a:ext uri="{FF2B5EF4-FFF2-40B4-BE49-F238E27FC236}">
+                <a16:creationId xmlns:a16="http://schemas.microsoft.com/office/drawing/2014/main" id="{28FF21C3-8FBB-4756-BF7C-FFD2E5CC2B06}"/>
+              </a:ext>
+            </a:extLst>
+          </p:cNvPr>
+          <p:cNvSpPr>
+            <a:spLocks noGrp="1"/>
+          </p:cNvSpPr>
+          <p:nvPr>
+            <p:ph type="title"/>
+          </p:nvPr>
+        </p:nvSpPr>
+        <p:spPr>
+          <a:xfrm>
+            <a:off x="511791" y="440190"/>
+            <a:ext cx="11061510" cy="815404"/>
+          </a:xfrm>
+        </p:spPr>
+        <p:txBody>
+          <a:bodyPr>
+            <a:normAutofit/>
+          </a:bodyPr>
+          <a:lstStyle/>
+          <a:p>
+            <a:pPr algn="ctr"/>
+            <a:r>
+              <a:rPr lang="en-US" dirty="0">
+                <a:latin typeface="Palatino Linotype" panose="02040502050505030304" pitchFamily="18" charset="0"/>
+                <a:cs typeface="Segoe UI Light" panose="020B0502040204020203" pitchFamily="34" charset="0"/>
+              </a:rPr>
+              <a:t>Applications</a:t>
+            </a:r>
+          </a:p>
+        </p:txBody>
+      </p:sp>
+      <p:pic>
+        <p:nvPicPr>
+          <p:cNvPr id="5" name="Picture 4">
+            <a:extLst>
+              <a:ext uri="{FF2B5EF4-FFF2-40B4-BE49-F238E27FC236}">
+                <a16:creationId xmlns:a16="http://schemas.microsoft.com/office/drawing/2014/main" id="{ACB07797-7B87-46D0-98EE-5F648FFB451E}"/>
+              </a:ext>
+            </a:extLst>
+          </p:cNvPr>
+          <p:cNvPicPr>
+            <a:picLocks noChangeAspect="1"/>
+          </p:cNvPicPr>
+          <p:nvPr/>
+        </p:nvPicPr>
+        <p:blipFill>
+          <a:blip r:embed="rId3"/>
+          <a:stretch>
+            <a:fillRect/>
+          </a:stretch>
+        </p:blipFill>
+        <p:spPr>
+          <a:xfrm>
+            <a:off x="221024" y="2065597"/>
+            <a:ext cx="11758743" cy="3885498"/>
+          </a:xfrm>
+          <a:prstGeom prst="rect">
+            <a:avLst/>
+          </a:prstGeom>
+        </p:spPr>
+      </p:pic>
+    </p:spTree>
+    <p:extLst>
+      <p:ext uri="{BB962C8B-B14F-4D97-AF65-F5344CB8AC3E}">
+        <p14:creationId xmlns:p14="http://schemas.microsoft.com/office/powerpoint/2010/main" val="3160123219"/>
+      </p:ext>
+    </p:extLst>
+  </p:cSld>
+  <p:clrMapOvr>
+    <a:masterClrMapping/>
+  </p:clrMapOvr>
+  <mc:AlternateContent xmlns:mc="http://schemas.openxmlformats.org/markup-compatibility/2006" xmlns:p14="http://schemas.microsoft.com/office/powerpoint/2010/main">
+    <mc:Choice Requires="p14">
+      <p:transition spd="med" p14:dur="700">
+        <p:fade/>
+      </p:transition>
+    </mc:Choice>
+    <mc:Fallback xmlns="">
+      <p:transition spd="med">
+        <p:fade/>
+      </p:transition>
+    </mc:Fallback>
+  </mc:AlternateContent>
+</p:sld>
+</file>
+
+<file path=ppt/slides/slide13.xml><?xml version="1.0" encoding="utf-8"?>
+<p:sld xmlns:a="http://schemas.openxmlformats.org/drawingml/2006/main" xmlns:r="http://schemas.openxmlformats.org/officeDocument/2006/relationships" xmlns:p="http://schemas.openxmlformats.org/presentationml/2006/main">
+  <p:cSld>
+    <p:spTree>
+      <p:nvGrpSpPr>
+        <p:cNvPr id="1" name=""/>
+        <p:cNvGrpSpPr/>
+        <p:nvPr/>
+      </p:nvGrpSpPr>
+      <p:grpSpPr>
+        <a:xfrm>
+          <a:off x="0" y="0"/>
+          <a:ext cx="0" cy="0"/>
+          <a:chOff x="0" y="0"/>
+          <a:chExt cx="0" cy="0"/>
+        </a:xfrm>
+      </p:grpSpPr>
+      <p:sp>
+        <p:nvSpPr>
           <p:cNvPr id="2" name="Title 1">
             <a:extLst>
               <a:ext uri="{FF2B5EF4-FFF2-40B4-BE49-F238E27FC236}">
@@ -6951,7 +8041,7 @@
 </p:sld>
 </file>
 
-<file path=ppt/slides/slide11.xml><?xml version="1.0" encoding="utf-8"?>
+<file path=ppt/slides/slide14.xml><?xml version="1.0" encoding="utf-8"?>
 <p:sld xmlns:a="http://schemas.openxmlformats.org/drawingml/2006/main" xmlns:r="http://schemas.openxmlformats.org/officeDocument/2006/relationships" xmlns:p="http://schemas.openxmlformats.org/presentationml/2006/main">
   <p:cSld>
     <p:bg>
@@ -6998,7 +8088,7 @@
         </p:blipFill>
         <p:spPr>
           <a:xfrm>
-            <a:off x="2806558" y="1208627"/>
+            <a:off x="2806558" y="1646777"/>
             <a:ext cx="6578883" cy="4440746"/>
           </a:xfrm>
           <a:prstGeom prst="rect">
@@ -7006,6 +8096,45 @@
           </a:prstGeom>
         </p:spPr>
       </p:pic>
+      <p:sp>
+        <p:nvSpPr>
+          <p:cNvPr id="3" name="Title 1">
+            <a:extLst>
+              <a:ext uri="{FF2B5EF4-FFF2-40B4-BE49-F238E27FC236}">
+                <a16:creationId xmlns:a16="http://schemas.microsoft.com/office/drawing/2014/main" id="{E67ECF1F-6E1A-4319-AD15-9BA09F9B5E49}"/>
+              </a:ext>
+            </a:extLst>
+          </p:cNvPr>
+          <p:cNvSpPr>
+            <a:spLocks noGrp="1"/>
+          </p:cNvSpPr>
+          <p:nvPr>
+            <p:ph type="title"/>
+          </p:nvPr>
+        </p:nvSpPr>
+        <p:spPr>
+          <a:xfrm>
+            <a:off x="0" y="365127"/>
+            <a:ext cx="12191999" cy="827416"/>
+          </a:xfrm>
+        </p:spPr>
+        <p:txBody>
+          <a:bodyPr>
+            <a:normAutofit/>
+          </a:bodyPr>
+          <a:lstStyle/>
+          <a:p>
+            <a:pPr algn="ctr"/>
+            <a:r>
+              <a:rPr lang="en-US" sz="3600" dirty="0">
+                <a:latin typeface="Palatino Linotype" panose="02040502050505030304" pitchFamily="18" charset="0"/>
+                <a:cs typeface="Segoe UI Light" panose="020B0502040204020203" pitchFamily="34" charset="0"/>
+              </a:rPr>
+              <a:t>Fully-Connected Network</a:t>
+            </a:r>
+          </a:p>
+        </p:txBody>
+      </p:sp>
     </p:spTree>
     <p:extLst>
       <p:ext uri="{BB962C8B-B14F-4D97-AF65-F5344CB8AC3E}">
@@ -7031,7 +8160,7 @@
 </p:sld>
 </file>
 
-<file path=ppt/slides/slide12.xml><?xml version="1.0" encoding="utf-8"?>
+<file path=ppt/slides/slide15.xml><?xml version="1.0" encoding="utf-8"?>
 <p:sld xmlns:a="http://schemas.openxmlformats.org/drawingml/2006/main" xmlns:r="http://schemas.openxmlformats.org/officeDocument/2006/relationships" xmlns:p="http://schemas.openxmlformats.org/presentationml/2006/main">
   <p:cSld>
     <p:spTree>
@@ -7070,7 +8199,7 @@
         </p:blipFill>
         <p:spPr>
           <a:xfrm>
-            <a:off x="819150" y="962025"/>
+            <a:off x="819150" y="1628775"/>
             <a:ext cx="10553700" cy="4933950"/>
           </a:xfrm>
           <a:prstGeom prst="rect">
@@ -7078,6 +8207,45 @@
           </a:prstGeom>
         </p:spPr>
       </p:pic>
+      <p:sp>
+        <p:nvSpPr>
+          <p:cNvPr id="4" name="Title 1">
+            <a:extLst>
+              <a:ext uri="{FF2B5EF4-FFF2-40B4-BE49-F238E27FC236}">
+                <a16:creationId xmlns:a16="http://schemas.microsoft.com/office/drawing/2014/main" id="{2C8D8193-3519-4889-999A-10CF304A5AD4}"/>
+              </a:ext>
+            </a:extLst>
+          </p:cNvPr>
+          <p:cNvSpPr>
+            <a:spLocks noGrp="1"/>
+          </p:cNvSpPr>
+          <p:nvPr>
+            <p:ph type="title"/>
+          </p:nvPr>
+        </p:nvSpPr>
+        <p:spPr>
+          <a:xfrm>
+            <a:off x="0" y="365127"/>
+            <a:ext cx="12191999" cy="827416"/>
+          </a:xfrm>
+        </p:spPr>
+        <p:txBody>
+          <a:bodyPr>
+            <a:normAutofit/>
+          </a:bodyPr>
+          <a:lstStyle/>
+          <a:p>
+            <a:pPr algn="ctr"/>
+            <a:r>
+              <a:rPr lang="en-US" sz="3600" dirty="0">
+                <a:latin typeface="Palatino Linotype" panose="02040502050505030304" pitchFamily="18" charset="0"/>
+                <a:cs typeface="Segoe UI Light" panose="020B0502040204020203" pitchFamily="34" charset="0"/>
+              </a:rPr>
+              <a:t>Convolutional Neural Network</a:t>
+            </a:r>
+          </a:p>
+        </p:txBody>
+      </p:sp>
     </p:spTree>
     <p:extLst>
       <p:ext uri="{BB962C8B-B14F-4D97-AF65-F5344CB8AC3E}">
@@ -7103,7 +8271,7 @@
 </p:sld>
 </file>
 
-<file path=ppt/slides/slide13.xml><?xml version="1.0" encoding="utf-8"?>
+<file path=ppt/slides/slide16.xml><?xml version="1.0" encoding="utf-8"?>
 <p:sld xmlns:a="http://schemas.openxmlformats.org/drawingml/2006/main" xmlns:r="http://schemas.openxmlformats.org/officeDocument/2006/relationships" xmlns:p="http://schemas.openxmlformats.org/presentationml/2006/main">
   <p:cSld>
     <p:spTree>
@@ -7142,14 +8310,53 @@
         </p:blipFill>
         <p:spPr>
           <a:xfrm>
-            <a:off x="3476625" y="557212"/>
-            <a:ext cx="5238750" cy="5743575"/>
+            <a:off x="3286125" y="1473084"/>
+            <a:ext cx="4333875" cy="4751503"/>
           </a:xfrm>
           <a:prstGeom prst="rect">
             <a:avLst/>
           </a:prstGeom>
         </p:spPr>
       </p:pic>
+      <p:sp>
+        <p:nvSpPr>
+          <p:cNvPr id="4" name="Title 1">
+            <a:extLst>
+              <a:ext uri="{FF2B5EF4-FFF2-40B4-BE49-F238E27FC236}">
+                <a16:creationId xmlns:a16="http://schemas.microsoft.com/office/drawing/2014/main" id="{7DFF3218-D94E-4034-8ACB-6FD894676D7E}"/>
+              </a:ext>
+            </a:extLst>
+          </p:cNvPr>
+          <p:cNvSpPr>
+            <a:spLocks noGrp="1"/>
+          </p:cNvSpPr>
+          <p:nvPr>
+            <p:ph type="title"/>
+          </p:nvPr>
+        </p:nvSpPr>
+        <p:spPr>
+          <a:xfrm>
+            <a:off x="0" y="365127"/>
+            <a:ext cx="12191999" cy="827416"/>
+          </a:xfrm>
+        </p:spPr>
+        <p:txBody>
+          <a:bodyPr>
+            <a:normAutofit/>
+          </a:bodyPr>
+          <a:lstStyle/>
+          <a:p>
+            <a:pPr algn="ctr"/>
+            <a:r>
+              <a:rPr lang="en-US" sz="3600" dirty="0">
+                <a:latin typeface="Palatino Linotype" panose="02040502050505030304" pitchFamily="18" charset="0"/>
+                <a:cs typeface="Segoe UI Light" panose="020B0502040204020203" pitchFamily="34" charset="0"/>
+              </a:rPr>
+              <a:t>Recurrent Neural Network</a:t>
+            </a:r>
+          </a:p>
+        </p:txBody>
+      </p:sp>
     </p:spTree>
     <p:extLst>
       <p:ext uri="{BB962C8B-B14F-4D97-AF65-F5344CB8AC3E}">
@@ -7175,7 +8382,7 @@
 </p:sld>
 </file>
 
-<file path=ppt/slides/slide14.xml><?xml version="1.0" encoding="utf-8"?>
+<file path=ppt/slides/slide17.xml><?xml version="1.0" encoding="utf-8"?>
 <p:sld xmlns:a="http://schemas.openxmlformats.org/drawingml/2006/main" xmlns:r="http://schemas.openxmlformats.org/officeDocument/2006/relationships" xmlns:p="http://schemas.openxmlformats.org/presentationml/2006/main">
   <p:cSld>
     <p:spTree>
@@ -7214,7 +8421,7 @@
         </p:blipFill>
         <p:spPr>
           <a:xfrm>
-            <a:off x="771525" y="1466850"/>
+            <a:off x="771525" y="2019300"/>
             <a:ext cx="10648950" cy="3924300"/>
           </a:xfrm>
           <a:prstGeom prst="rect">
@@ -7222,6 +8429,45 @@
           </a:prstGeom>
         </p:spPr>
       </p:pic>
+      <p:sp>
+        <p:nvSpPr>
+          <p:cNvPr id="3" name="Title 1">
+            <a:extLst>
+              <a:ext uri="{FF2B5EF4-FFF2-40B4-BE49-F238E27FC236}">
+                <a16:creationId xmlns:a16="http://schemas.microsoft.com/office/drawing/2014/main" id="{7011B29A-A21A-4D4A-9005-371BFA70E48B}"/>
+              </a:ext>
+            </a:extLst>
+          </p:cNvPr>
+          <p:cNvSpPr>
+            <a:spLocks noGrp="1"/>
+          </p:cNvSpPr>
+          <p:nvPr>
+            <p:ph type="title"/>
+          </p:nvPr>
+        </p:nvSpPr>
+        <p:spPr>
+          <a:xfrm>
+            <a:off x="0" y="365127"/>
+            <a:ext cx="12191999" cy="827416"/>
+          </a:xfrm>
+        </p:spPr>
+        <p:txBody>
+          <a:bodyPr>
+            <a:normAutofit/>
+          </a:bodyPr>
+          <a:lstStyle/>
+          <a:p>
+            <a:pPr algn="ctr"/>
+            <a:r>
+              <a:rPr lang="en-US" sz="3600" dirty="0">
+                <a:latin typeface="Palatino Linotype" panose="02040502050505030304" pitchFamily="18" charset="0"/>
+                <a:cs typeface="Segoe UI Light" panose="020B0502040204020203" pitchFamily="34" charset="0"/>
+              </a:rPr>
+              <a:t>Generative Adversarial Network</a:t>
+            </a:r>
+          </a:p>
+        </p:txBody>
+      </p:sp>
     </p:spTree>
     <p:extLst>
       <p:ext uri="{BB962C8B-B14F-4D97-AF65-F5344CB8AC3E}">
@@ -7247,7 +8493,7 @@
 </p:sld>
 </file>
 
-<file path=ppt/slides/slide15.xml><?xml version="1.0" encoding="utf-8"?>
+<file path=ppt/slides/slide18.xml><?xml version="1.0" encoding="utf-8"?>
 <p:sld xmlns:a="http://schemas.openxmlformats.org/drawingml/2006/main" xmlns:r="http://schemas.openxmlformats.org/officeDocument/2006/relationships" xmlns:p="http://schemas.openxmlformats.org/presentationml/2006/main">
   <p:cSld>
     <p:spTree>
@@ -7400,7 +8646,7 @@
                 <a:effectLst/>
                 <a:latin typeface="Palatino Linotype" panose="02040502050505030304" pitchFamily="18" charset="0"/>
               </a:rPr>
-              <a:t>Watch the Matrix Multiplication video embedded in exercise-1.03-student.ipynb.</a:t>
+              <a:t>Watch the Matrix Multiplication video embedded in 01.2_linear_algebra.ipynb notebook</a:t>
             </a:r>
           </a:p>
         </p:txBody>
@@ -7430,7 +8676,7 @@
 </p:sld>
 </file>
 
-<file path=ppt/slides/slide16.xml><?xml version="1.0" encoding="utf-8"?>
+<file path=ppt/slides/slide19.xml><?xml version="1.0" encoding="utf-8"?>
 <p:sld xmlns:a="http://schemas.openxmlformats.org/drawingml/2006/main" xmlns:r="http://schemas.openxmlformats.org/officeDocument/2006/relationships" xmlns:p="http://schemas.openxmlformats.org/presentationml/2006/main">
   <p:cSld>
     <p:spTree>
@@ -7472,7 +8718,129 @@
 </p:sld>
 </file>
 
-<file path=ppt/slides/slide17.xml><?xml version="1.0" encoding="utf-8"?>
+<file path=ppt/slides/slide2.xml><?xml version="1.0" encoding="utf-8"?>
+<p:sld xmlns:a="http://schemas.openxmlformats.org/drawingml/2006/main" xmlns:r="http://schemas.openxmlformats.org/officeDocument/2006/relationships" xmlns:p="http://schemas.openxmlformats.org/presentationml/2006/main">
+  <p:cSld>
+    <p:spTree>
+      <p:nvGrpSpPr>
+        <p:cNvPr id="1" name=""/>
+        <p:cNvGrpSpPr/>
+        <p:nvPr/>
+      </p:nvGrpSpPr>
+      <p:grpSpPr>
+        <a:xfrm>
+          <a:off x="0" y="0"/>
+          <a:ext cx="0" cy="0"/>
+          <a:chOff x="0" y="0"/>
+          <a:chExt cx="0" cy="0"/>
+        </a:xfrm>
+      </p:grpSpPr>
+      <p:sp>
+        <p:nvSpPr>
+          <p:cNvPr id="11" name="TextBox 10">
+            <a:extLst>
+              <a:ext uri="{FF2B5EF4-FFF2-40B4-BE49-F238E27FC236}">
+                <a16:creationId xmlns:a16="http://schemas.microsoft.com/office/drawing/2014/main" id="{032EA95D-BE72-4FC1-87D5-1F0489EE2C7E}"/>
+              </a:ext>
+            </a:extLst>
+          </p:cNvPr>
+          <p:cNvSpPr txBox="1"/>
+          <p:nvPr/>
+        </p:nvSpPr>
+        <p:spPr>
+          <a:xfrm>
+            <a:off x="11430" y="6550223"/>
+            <a:ext cx="12192000" cy="307777"/>
+          </a:xfrm>
+          <a:prstGeom prst="rect">
+            <a:avLst/>
+          </a:prstGeom>
+          <a:noFill/>
+        </p:spPr>
+        <p:txBody>
+          <a:bodyPr wrap="square" rtlCol="0">
+            <a:spAutoFit/>
+          </a:bodyPr>
+          <a:lstStyle/>
+          <a:p>
+            <a:r>
+              <a:rPr lang="en-US" sz="1400" dirty="0">
+                <a:solidFill>
+                  <a:schemeClr val="tx1">
+                    <a:lumMod val="65000"/>
+                    <a:lumOff val="35000"/>
+                  </a:schemeClr>
+                </a:solidFill>
+                <a:latin typeface="+mj-lt"/>
+                <a:ea typeface="Verdana" panose="020B0604030504040204" pitchFamily="34" charset="0"/>
+              </a:rPr>
+              <a:t>Image Credit: https://cktechcheck.com/</a:t>
+            </a:r>
+          </a:p>
+        </p:txBody>
+      </p:sp>
+      <p:pic>
+        <p:nvPicPr>
+          <p:cNvPr id="3" name="Picture 2" descr="A green and white logo&#10;&#10;Description automatically generated with low confidence">
+            <a:extLst>
+              <a:ext uri="{FF2B5EF4-FFF2-40B4-BE49-F238E27FC236}">
+                <a16:creationId xmlns:a16="http://schemas.microsoft.com/office/drawing/2014/main" id="{845735AC-AF18-4257-A9FE-DE0BE6D668A3}"/>
+              </a:ext>
+            </a:extLst>
+          </p:cNvPr>
+          <p:cNvPicPr>
+            <a:picLocks noChangeAspect="1"/>
+          </p:cNvPicPr>
+          <p:nvPr/>
+        </p:nvPicPr>
+        <p:blipFill>
+          <a:blip r:embed="rId3">
+            <a:extLst>
+              <a:ext uri="{28A0092B-C50C-407E-A947-70E740481C1C}">
+                <a14:useLocalDpi xmlns:a14="http://schemas.microsoft.com/office/drawing/2010/main" val="0"/>
+              </a:ext>
+            </a:extLst>
+          </a:blip>
+          <a:stretch>
+            <a:fillRect/>
+          </a:stretch>
+        </p:blipFill>
+        <p:spPr>
+          <a:xfrm>
+            <a:off x="2347157" y="2219696"/>
+            <a:ext cx="7497685" cy="2418608"/>
+          </a:xfrm>
+          <a:prstGeom prst="rect">
+            <a:avLst/>
+          </a:prstGeom>
+        </p:spPr>
+      </p:pic>
+    </p:spTree>
+    <p:extLst>
+      <p:ext uri="{BB962C8B-B14F-4D97-AF65-F5344CB8AC3E}">
+        <p14:creationId xmlns:p14="http://schemas.microsoft.com/office/powerpoint/2010/main" val="2944933400"/>
+      </p:ext>
+    </p:extLst>
+  </p:cSld>
+  <p:clrMapOvr>
+    <a:masterClrMapping/>
+  </p:clrMapOvr>
+  <mc:AlternateContent xmlns:mc="http://schemas.openxmlformats.org/markup-compatibility/2006" xmlns:p14="http://schemas.microsoft.com/office/powerpoint/2010/main">
+    <mc:Choice Requires="p14">
+      <p:transition spd="med" p14:dur="700">
+        <p:fade/>
+      </p:transition>
+    </mc:Choice>
+    <mc:Fallback xmlns="">
+      <p:transition spd="med">
+        <p:fade/>
+      </p:transition>
+    </mc:Fallback>
+  </mc:AlternateContent>
+</p:sld>
+</file>
+
+<file path=ppt/slides/slide20.xml><?xml version="1.0" encoding="utf-8"?>
 <p:sld xmlns:a="http://schemas.openxmlformats.org/drawingml/2006/main" xmlns:r="http://schemas.openxmlformats.org/officeDocument/2006/relationships" xmlns:p="http://schemas.openxmlformats.org/presentationml/2006/main">
   <p:cSld>
     <p:spTree>
@@ -7540,128 +8908,6 @@
     <p:extLst>
       <p:ext uri="{BB962C8B-B14F-4D97-AF65-F5344CB8AC3E}">
         <p14:creationId xmlns:p14="http://schemas.microsoft.com/office/powerpoint/2010/main" val="3356134786"/>
-      </p:ext>
-    </p:extLst>
-  </p:cSld>
-  <p:clrMapOvr>
-    <a:masterClrMapping/>
-  </p:clrMapOvr>
-  <mc:AlternateContent xmlns:mc="http://schemas.openxmlformats.org/markup-compatibility/2006" xmlns:p14="http://schemas.microsoft.com/office/powerpoint/2010/main">
-    <mc:Choice Requires="p14">
-      <p:transition spd="med" p14:dur="700">
-        <p:fade/>
-      </p:transition>
-    </mc:Choice>
-    <mc:Fallback xmlns="">
-      <p:transition spd="med">
-        <p:fade/>
-      </p:transition>
-    </mc:Fallback>
-  </mc:AlternateContent>
-</p:sld>
-</file>
-
-<file path=ppt/slides/slide2.xml><?xml version="1.0" encoding="utf-8"?>
-<p:sld xmlns:a="http://schemas.openxmlformats.org/drawingml/2006/main" xmlns:r="http://schemas.openxmlformats.org/officeDocument/2006/relationships" xmlns:p="http://schemas.openxmlformats.org/presentationml/2006/main">
-  <p:cSld>
-    <p:spTree>
-      <p:nvGrpSpPr>
-        <p:cNvPr id="1" name=""/>
-        <p:cNvGrpSpPr/>
-        <p:nvPr/>
-      </p:nvGrpSpPr>
-      <p:grpSpPr>
-        <a:xfrm>
-          <a:off x="0" y="0"/>
-          <a:ext cx="0" cy="0"/>
-          <a:chOff x="0" y="0"/>
-          <a:chExt cx="0" cy="0"/>
-        </a:xfrm>
-      </p:grpSpPr>
-      <p:sp>
-        <p:nvSpPr>
-          <p:cNvPr id="11" name="TextBox 10">
-            <a:extLst>
-              <a:ext uri="{FF2B5EF4-FFF2-40B4-BE49-F238E27FC236}">
-                <a16:creationId xmlns:a16="http://schemas.microsoft.com/office/drawing/2014/main" id="{032EA95D-BE72-4FC1-87D5-1F0489EE2C7E}"/>
-              </a:ext>
-            </a:extLst>
-          </p:cNvPr>
-          <p:cNvSpPr txBox="1"/>
-          <p:nvPr/>
-        </p:nvSpPr>
-        <p:spPr>
-          <a:xfrm>
-            <a:off x="11430" y="6550223"/>
-            <a:ext cx="12192000" cy="307777"/>
-          </a:xfrm>
-          <a:prstGeom prst="rect">
-            <a:avLst/>
-          </a:prstGeom>
-          <a:noFill/>
-        </p:spPr>
-        <p:txBody>
-          <a:bodyPr wrap="square" rtlCol="0">
-            <a:spAutoFit/>
-          </a:bodyPr>
-          <a:lstStyle/>
-          <a:p>
-            <a:r>
-              <a:rPr lang="en-US" sz="1400" dirty="0">
-                <a:solidFill>
-                  <a:schemeClr val="tx1">
-                    <a:lumMod val="65000"/>
-                    <a:lumOff val="35000"/>
-                  </a:schemeClr>
-                </a:solidFill>
-                <a:latin typeface="+mj-lt"/>
-                <a:ea typeface="Verdana" panose="020B0604030504040204" pitchFamily="34" charset="0"/>
-              </a:rPr>
-              <a:t>Image Credit: https://cktechcheck.com/</a:t>
-            </a:r>
-          </a:p>
-        </p:txBody>
-      </p:sp>
-      <p:pic>
-        <p:nvPicPr>
-          <p:cNvPr id="3" name="Picture 2" descr="A green and white logo&#10;&#10;Description automatically generated with low confidence">
-            <a:extLst>
-              <a:ext uri="{FF2B5EF4-FFF2-40B4-BE49-F238E27FC236}">
-                <a16:creationId xmlns:a16="http://schemas.microsoft.com/office/drawing/2014/main" id="{845735AC-AF18-4257-A9FE-DE0BE6D668A3}"/>
-              </a:ext>
-            </a:extLst>
-          </p:cNvPr>
-          <p:cNvPicPr>
-            <a:picLocks noChangeAspect="1"/>
-          </p:cNvPicPr>
-          <p:nvPr/>
-        </p:nvPicPr>
-        <p:blipFill>
-          <a:blip r:embed="rId3">
-            <a:extLst>
-              <a:ext uri="{28A0092B-C50C-407E-A947-70E740481C1C}">
-                <a14:useLocalDpi xmlns:a14="http://schemas.microsoft.com/office/drawing/2010/main" val="0"/>
-              </a:ext>
-            </a:extLst>
-          </a:blip>
-          <a:stretch>
-            <a:fillRect/>
-          </a:stretch>
-        </p:blipFill>
-        <p:spPr>
-          <a:xfrm>
-            <a:off x="2347157" y="2219696"/>
-            <a:ext cx="7497685" cy="2418608"/>
-          </a:xfrm>
-          <a:prstGeom prst="rect">
-            <a:avLst/>
-          </a:prstGeom>
-        </p:spPr>
-      </p:pic>
-    </p:spTree>
-    <p:extLst>
-      <p:ext uri="{BB962C8B-B14F-4D97-AF65-F5344CB8AC3E}">
-        <p14:creationId xmlns:p14="http://schemas.microsoft.com/office/powerpoint/2010/main" val="2944933400"/>
       </p:ext>
     </p:extLst>
   </p:cSld>
@@ -8451,8 +9697,8 @@
         </p:nvSpPr>
         <p:spPr>
           <a:xfrm>
-            <a:off x="618697" y="365127"/>
-            <a:ext cx="10735103" cy="827416"/>
+            <a:off x="0" y="365127"/>
+            <a:ext cx="12191999" cy="827416"/>
           </a:xfrm>
         </p:spPr>
         <p:txBody>
@@ -8614,8 +9860,8 @@
         </p:nvSpPr>
         <p:spPr>
           <a:xfrm>
-            <a:off x="618697" y="365127"/>
-            <a:ext cx="10735103" cy="827416"/>
+            <a:off x="0" y="365127"/>
+            <a:ext cx="12191999" cy="827416"/>
           </a:xfrm>
         </p:spPr>
         <p:txBody>
@@ -8779,8 +10025,8 @@
         </p:nvSpPr>
         <p:spPr>
           <a:xfrm>
-            <a:off x="618697" y="365127"/>
-            <a:ext cx="10735103" cy="827416"/>
+            <a:off x="0" y="365127"/>
+            <a:ext cx="12191999" cy="827416"/>
           </a:xfrm>
         </p:spPr>
         <p:txBody>
@@ -8975,152 +10221,6 @@
           <a:chExt cx="0" cy="0"/>
         </a:xfrm>
       </p:grpSpPr>
-      <p:sp>
-        <p:nvSpPr>
-          <p:cNvPr id="2" name="Title 1">
-            <a:extLst>
-              <a:ext uri="{FF2B5EF4-FFF2-40B4-BE49-F238E27FC236}">
-                <a16:creationId xmlns:a16="http://schemas.microsoft.com/office/drawing/2014/main" id="{0F853981-B13F-4917-804F-EBF0D4819E7E}"/>
-              </a:ext>
-            </a:extLst>
-          </p:cNvPr>
-          <p:cNvSpPr>
-            <a:spLocks noGrp="1"/>
-          </p:cNvSpPr>
-          <p:nvPr>
-            <p:ph type="title"/>
-          </p:nvPr>
-        </p:nvSpPr>
-        <p:spPr>
-          <a:xfrm>
-            <a:off x="0" y="3076806"/>
-            <a:ext cx="12192000" cy="704387"/>
-          </a:xfrm>
-          <a:noFill/>
-        </p:spPr>
-        <p:txBody>
-          <a:bodyPr>
-            <a:noAutofit/>
-          </a:bodyPr>
-          <a:lstStyle/>
-          <a:p>
-            <a:pPr algn="ctr"/>
-            <a:br>
-              <a:rPr lang="en-US" sz="3600" dirty="0">
-                <a:solidFill>
-                  <a:schemeClr val="tx1">
-                    <a:lumMod val="65000"/>
-                    <a:lumOff val="35000"/>
-                  </a:schemeClr>
-                </a:solidFill>
-              </a:rPr>
-            </a:br>
-            <a:br>
-              <a:rPr lang="en-US" sz="3600" dirty="0">
-                <a:solidFill>
-                  <a:schemeClr val="tx1">
-                    <a:lumMod val="65000"/>
-                    <a:lumOff val="35000"/>
-                  </a:schemeClr>
-                </a:solidFill>
-              </a:rPr>
-            </a:br>
-            <a:br>
-              <a:rPr lang="en-US" sz="3600" dirty="0">
-                <a:solidFill>
-                  <a:schemeClr val="tx1">
-                    <a:lumMod val="65000"/>
-                    <a:lumOff val="35000"/>
-                  </a:schemeClr>
-                </a:solidFill>
-              </a:rPr>
-            </a:br>
-            <a:br>
-              <a:rPr lang="en-US" sz="3600" dirty="0">
-                <a:solidFill>
-                  <a:schemeClr val="tx1">
-                    <a:lumMod val="65000"/>
-                    <a:lumOff val="35000"/>
-                  </a:schemeClr>
-                </a:solidFill>
-              </a:rPr>
-            </a:br>
-            <a:br>
-              <a:rPr lang="en-US" sz="3600" dirty="0">
-                <a:solidFill>
-                  <a:schemeClr val="tx1">
-                    <a:lumMod val="65000"/>
-                    <a:lumOff val="35000"/>
-                  </a:schemeClr>
-                </a:solidFill>
-              </a:rPr>
-            </a:br>
-            <a:br>
-              <a:rPr lang="en-US" sz="3600" dirty="0">
-                <a:solidFill>
-                  <a:schemeClr val="tx1">
-                    <a:lumMod val="65000"/>
-                    <a:lumOff val="35000"/>
-                  </a:schemeClr>
-                </a:solidFill>
-              </a:rPr>
-            </a:br>
-            <a:br>
-              <a:rPr lang="en-US" sz="3600" dirty="0">
-                <a:solidFill>
-                  <a:schemeClr val="tx1">
-                    <a:lumMod val="65000"/>
-                    <a:lumOff val="35000"/>
-                  </a:schemeClr>
-                </a:solidFill>
-              </a:rPr>
-            </a:br>
-            <a:br>
-              <a:rPr lang="en-US" sz="3600" dirty="0">
-                <a:solidFill>
-                  <a:schemeClr val="tx1">
-                    <a:lumMod val="65000"/>
-                    <a:lumOff val="35000"/>
-                  </a:schemeClr>
-                </a:solidFill>
-              </a:rPr>
-            </a:br>
-            <a:r>
-              <a:rPr lang="en-US" sz="3600" dirty="0">
-                <a:solidFill>
-                  <a:schemeClr val="tx1">
-                    <a:lumMod val="65000"/>
-                    <a:lumOff val="35000"/>
-                  </a:schemeClr>
-                </a:solidFill>
-              </a:rPr>
-              <a:t>     </a:t>
-            </a:r>
-            <a:r>
-              <a:rPr lang="en-US" sz="3600" dirty="0">
-                <a:solidFill>
-                  <a:schemeClr val="tx1">
-                    <a:lumMod val="65000"/>
-                    <a:lumOff val="35000"/>
-                  </a:schemeClr>
-                </a:solidFill>
-                <a:latin typeface="Palatino Linotype" panose="02040502050505030304" pitchFamily="18" charset="0"/>
-              </a:rPr>
-              <a:t>1.01 (Image &amp; Speech Recognition Demo)</a:t>
-            </a:r>
-            <a:endParaRPr lang="en-US" sz="3600" dirty="0">
-              <a:solidFill>
-                <a:schemeClr val="tx1">
-                  <a:lumMod val="65000"/>
-                  <a:lumOff val="35000"/>
-                </a:schemeClr>
-              </a:solidFill>
-              <a:latin typeface="Palatino Linotype" panose="02040502050505030304" pitchFamily="18" charset="0"/>
-              <a:cs typeface="Segoe UI Light" panose="020B0502040204020203" pitchFamily="34" charset="0"/>
-            </a:endParaRPr>
-          </a:p>
-        </p:txBody>
-      </p:sp>
       <p:pic>
         <p:nvPicPr>
           <p:cNvPr id="4" name="Picture 3">
@@ -9151,6 +10251,206 @@
           </a:prstGeom>
         </p:spPr>
       </p:pic>
+      <p:sp>
+        <p:nvSpPr>
+          <p:cNvPr id="5" name="Title 1">
+            <a:extLst>
+              <a:ext uri="{FF2B5EF4-FFF2-40B4-BE49-F238E27FC236}">
+                <a16:creationId xmlns:a16="http://schemas.microsoft.com/office/drawing/2014/main" id="{B1DC3772-3811-4D33-8C3E-73B5414A38FE}"/>
+              </a:ext>
+            </a:extLst>
+          </p:cNvPr>
+          <p:cNvSpPr txBox="1">
+            <a:spLocks/>
+          </p:cNvSpPr>
+          <p:nvPr/>
+        </p:nvSpPr>
+        <p:spPr>
+          <a:xfrm>
+            <a:off x="0" y="2883665"/>
+            <a:ext cx="12192000" cy="1090669"/>
+          </a:xfrm>
+          <a:prstGeom prst="rect">
+            <a:avLst/>
+          </a:prstGeom>
+          <a:noFill/>
+        </p:spPr>
+        <p:txBody>
+          <a:bodyPr vert="horz" lIns="91440" tIns="45720" rIns="91440" bIns="45720" rtlCol="0" anchor="b">
+            <a:noAutofit/>
+          </a:bodyPr>
+          <a:lstStyle>
+            <a:lvl1pPr algn="l" defTabSz="914400" rtl="0" eaLnBrk="1" latinLnBrk="0" hangingPunct="1">
+              <a:lnSpc>
+                <a:spcPct val="90000"/>
+              </a:lnSpc>
+              <a:spcBef>
+                <a:spcPct val="0"/>
+              </a:spcBef>
+              <a:buNone/>
+              <a:defRPr sz="6000" kern="1200">
+                <a:solidFill>
+                  <a:schemeClr val="tx1"/>
+                </a:solidFill>
+                <a:latin typeface="+mj-lt"/>
+                <a:ea typeface="+mj-ea"/>
+                <a:cs typeface="+mj-cs"/>
+              </a:defRPr>
+            </a:lvl1pPr>
+          </a:lstStyle>
+          <a:p>
+            <a:pPr algn="ctr"/>
+            <a:br>
+              <a:rPr lang="en-US" sz="3600" dirty="0">
+                <a:solidFill>
+                  <a:schemeClr val="tx1">
+                    <a:lumMod val="65000"/>
+                    <a:lumOff val="35000"/>
+                  </a:schemeClr>
+                </a:solidFill>
+              </a:rPr>
+            </a:br>
+            <a:br>
+              <a:rPr lang="en-US" sz="3600" dirty="0">
+                <a:solidFill>
+                  <a:schemeClr val="tx1">
+                    <a:lumMod val="65000"/>
+                    <a:lumOff val="35000"/>
+                  </a:schemeClr>
+                </a:solidFill>
+              </a:rPr>
+            </a:br>
+            <a:br>
+              <a:rPr lang="en-US" sz="3600" dirty="0">
+                <a:solidFill>
+                  <a:schemeClr val="tx1">
+                    <a:lumMod val="65000"/>
+                    <a:lumOff val="35000"/>
+                  </a:schemeClr>
+                </a:solidFill>
+              </a:rPr>
+            </a:br>
+            <a:br>
+              <a:rPr lang="en-US" sz="3600" dirty="0">
+                <a:solidFill>
+                  <a:schemeClr val="tx1">
+                    <a:lumMod val="65000"/>
+                    <a:lumOff val="35000"/>
+                  </a:schemeClr>
+                </a:solidFill>
+              </a:rPr>
+            </a:br>
+            <a:br>
+              <a:rPr lang="en-US" sz="3600" dirty="0">
+                <a:solidFill>
+                  <a:schemeClr val="tx1">
+                    <a:lumMod val="65000"/>
+                    <a:lumOff val="35000"/>
+                  </a:schemeClr>
+                </a:solidFill>
+              </a:rPr>
+            </a:br>
+            <a:br>
+              <a:rPr lang="en-US" sz="3600" dirty="0">
+                <a:solidFill>
+                  <a:schemeClr val="tx1">
+                    <a:lumMod val="65000"/>
+                    <a:lumOff val="35000"/>
+                  </a:schemeClr>
+                </a:solidFill>
+              </a:rPr>
+            </a:br>
+            <a:br>
+              <a:rPr lang="en-US" sz="3600" dirty="0">
+                <a:solidFill>
+                  <a:schemeClr val="tx1">
+                    <a:lumMod val="65000"/>
+                    <a:lumOff val="35000"/>
+                  </a:schemeClr>
+                </a:solidFill>
+              </a:rPr>
+            </a:br>
+            <a:br>
+              <a:rPr lang="en-US" sz="3600" dirty="0">
+                <a:solidFill>
+                  <a:schemeClr val="tx1">
+                    <a:lumMod val="65000"/>
+                    <a:lumOff val="35000"/>
+                  </a:schemeClr>
+                </a:solidFill>
+              </a:rPr>
+            </a:br>
+            <a:r>
+              <a:rPr lang="en-US" sz="3600" dirty="0">
+                <a:solidFill>
+                  <a:schemeClr val="tx1">
+                    <a:lumMod val="65000"/>
+                    <a:lumOff val="35000"/>
+                  </a:schemeClr>
+                </a:solidFill>
+              </a:rPr>
+              <a:t>     </a:t>
+            </a:r>
+            <a:r>
+              <a:rPr lang="en-US" sz="3600" dirty="0">
+                <a:solidFill>
+                  <a:schemeClr val="tx1">
+                    <a:lumMod val="65000"/>
+                    <a:lumOff val="35000"/>
+                  </a:schemeClr>
+                </a:solidFill>
+                <a:latin typeface="Palatino Linotype" panose="02040502050505030304" pitchFamily="18" charset="0"/>
+              </a:rPr>
+              <a:t>(A Simple Classification Model)</a:t>
+            </a:r>
+            <a:br>
+              <a:rPr lang="en-US" sz="3600" dirty="0">
+                <a:solidFill>
+                  <a:schemeClr val="tx1">
+                    <a:lumMod val="65000"/>
+                    <a:lumOff val="35000"/>
+                  </a:schemeClr>
+                </a:solidFill>
+                <a:latin typeface="Palatino Linotype" panose="02040502050505030304" pitchFamily="18" charset="0"/>
+              </a:rPr>
+            </a:br>
+            <a:r>
+              <a:rPr lang="en-US" sz="3600" dirty="0">
+                <a:solidFill>
+                  <a:schemeClr val="tx1">
+                    <a:lumMod val="65000"/>
+                    <a:lumOff val="35000"/>
+                  </a:schemeClr>
+                </a:solidFill>
+                <a:latin typeface="Palatino Linotype" panose="02040502050505030304" pitchFamily="18" charset="0"/>
+              </a:rPr>
+              <a:t>     </a:t>
+            </a:r>
+            <a:r>
+              <a:rPr lang="en-US" sz="2800" dirty="0">
+                <a:solidFill>
+                  <a:schemeClr val="tx1">
+                    <a:lumMod val="65000"/>
+                    <a:lumOff val="35000"/>
+                  </a:schemeClr>
+                </a:solidFill>
+                <a:latin typeface="Palatino Linotype" panose="02040502050505030304" pitchFamily="18" charset="0"/>
+              </a:rPr>
+              <a:t>01.1_resnet.ipynb</a:t>
+            </a:r>
+            <a:endParaRPr lang="en-US" sz="2800" dirty="0">
+              <a:solidFill>
+                <a:schemeClr val="tx1">
+                  <a:lumMod val="65000"/>
+                  <a:lumOff val="35000"/>
+                </a:schemeClr>
+              </a:solidFill>
+              <a:latin typeface="Palatino Linotype" panose="02040502050505030304" pitchFamily="18" charset="0"/>
+              <a:cs typeface="Segoe UI Light" panose="020B0502040204020203" pitchFamily="34" charset="0"/>
+            </a:endParaRPr>
+          </a:p>
+        </p:txBody>
+      </p:sp>
     </p:spTree>
     <p:extLst>
       <p:ext uri="{BB962C8B-B14F-4D97-AF65-F5344CB8AC3E}">

</xml_diff>

<commit_message>
Minor presentation (deep_learn_intro.pptx) updates.
</commit_message>
<xml_diff>
--- a/presentations/01_deep_learn_intro.pptx
+++ b/presentations/01_deep_learn_intro.pptx
@@ -16,18 +16,18 @@
     <p:sldId id="334" r:id="rId7"/>
     <p:sldId id="335" r:id="rId8"/>
     <p:sldId id="281" r:id="rId9"/>
-    <p:sldId id="325" r:id="rId10"/>
-    <p:sldId id="348" r:id="rId11"/>
-    <p:sldId id="324" r:id="rId12"/>
-    <p:sldId id="287" r:id="rId13"/>
-    <p:sldId id="301" r:id="rId14"/>
-    <p:sldId id="290" r:id="rId15"/>
-    <p:sldId id="295" r:id="rId16"/>
-    <p:sldId id="296" r:id="rId17"/>
-    <p:sldId id="297" r:id="rId18"/>
-    <p:sldId id="305" r:id="rId19"/>
-    <p:sldId id="347" r:id="rId20"/>
-    <p:sldId id="302" r:id="rId21"/>
+    <p:sldId id="302" r:id="rId10"/>
+    <p:sldId id="325" r:id="rId11"/>
+    <p:sldId id="348" r:id="rId12"/>
+    <p:sldId id="324" r:id="rId13"/>
+    <p:sldId id="287" r:id="rId14"/>
+    <p:sldId id="301" r:id="rId15"/>
+    <p:sldId id="290" r:id="rId16"/>
+    <p:sldId id="295" r:id="rId17"/>
+    <p:sldId id="296" r:id="rId18"/>
+    <p:sldId id="297" r:id="rId19"/>
+    <p:sldId id="305" r:id="rId20"/>
+    <p:sldId id="347" r:id="rId21"/>
   </p:sldIdLst>
   <p:sldSz cx="12192000" cy="6858000"/>
   <p:notesSz cx="7023100" cy="9309100"/>
@@ -227,7 +227,7 @@
           <a:p>
             <a:fld id="{FD93C9B2-20F6-4DB1-B471-224337D0AC79}" type="datetimeFigureOut">
               <a:rPr lang="en-US" smtClean="0"/>
-              <a:t>3/21/2022</a:t>
+              <a:t>6/20/2022</a:t>
             </a:fld>
             <a:endParaRPr lang="en-US"/>
           </a:p>
@@ -662,186 +662,7 @@
           <a:bodyPr/>
           <a:lstStyle/>
           <a:p>
-            <a:pPr marL="0" marR="0" lvl="0" indent="0" algn="l" defTabSz="914400" rtl="0" eaLnBrk="1" fontAlgn="auto" latinLnBrk="0" hangingPunct="1">
-              <a:lnSpc>
-                <a:spcPct val="100000"/>
-              </a:lnSpc>
-              <a:spcBef>
-                <a:spcPts val="0"/>
-              </a:spcBef>
-              <a:spcAft>
-                <a:spcPts val="0"/>
-              </a:spcAft>
-              <a:buClrTx/>
-              <a:buSzTx/>
-              <a:buFontTx/>
-              <a:buNone/>
-              <a:tabLst/>
-              <a:defRPr/>
-            </a:pPr>
-            <a:r>
-              <a:rPr lang="en-US" sz="1200" b="0" i="0" kern="1200" dirty="0">
-                <a:solidFill>
-                  <a:schemeClr val="tx1"/>
-                </a:solidFill>
-                <a:effectLst/>
-                <a:latin typeface="+mn-lt"/>
-                <a:ea typeface="+mn-ea"/>
-                <a:cs typeface="+mn-cs"/>
-              </a:rPr>
-              <a:t>I want to introduce you to the different kinds of A.I. learning systems.  There are three principal types of machine / deep learning systems (supervised, unsupervised, and reinforcement).  </a:t>
-            </a:r>
-          </a:p>
-          <a:p>
-            <a:pPr marL="0" indent="0">
-              <a:buNone/>
-            </a:pPr>
-            <a:endParaRPr lang="en-US" sz="1200" dirty="0">
-              <a:latin typeface="Palatino Linotype" panose="02040502050505030304" pitchFamily="18" charset="0"/>
-            </a:endParaRPr>
-          </a:p>
-          <a:p>
-            <a:pPr marL="228600" indent="-228600">
-              <a:buAutoNum type="arabicPeriod"/>
-            </a:pPr>
-            <a:r>
-              <a:rPr lang="en-US" sz="1200" dirty="0">
-                <a:latin typeface="Palatino Linotype" panose="02040502050505030304" pitchFamily="18" charset="0"/>
-              </a:rPr>
-              <a:t>Supervised Learning is </a:t>
-            </a:r>
-            <a:r>
-              <a:rPr lang="en-US" sz="1200" dirty="0">
-                <a:solidFill>
-                  <a:srgbClr val="80BE63"/>
-                </a:solidFill>
-                <a:latin typeface="Palatino Linotype" panose="02040502050505030304" pitchFamily="18" charset="0"/>
-              </a:rPr>
-              <a:t>Task Driven</a:t>
-            </a:r>
-            <a:r>
-              <a:rPr lang="en-US" sz="1200" dirty="0">
-                <a:solidFill>
-                  <a:srgbClr val="0021A5"/>
-                </a:solidFill>
-                <a:latin typeface="Palatino Linotype" panose="02040502050505030304" pitchFamily="18" charset="0"/>
-              </a:rPr>
-              <a:t> </a:t>
-            </a:r>
-            <a:r>
-              <a:rPr lang="en-US" sz="1200" dirty="0">
-                <a:latin typeface="Palatino Linotype" panose="02040502050505030304" pitchFamily="18" charset="0"/>
-              </a:rPr>
-              <a:t>(Predict next value)</a:t>
-            </a:r>
-          </a:p>
-          <a:p>
-            <a:pPr marL="228600" indent="-228600">
-              <a:buAutoNum type="arabicPeriod"/>
-            </a:pPr>
-            <a:r>
-              <a:rPr lang="en-US" sz="1200" dirty="0">
-                <a:latin typeface="Palatino Linotype" panose="02040502050505030304" pitchFamily="18" charset="0"/>
-              </a:rPr>
-              <a:t>Unsupervised Learning is </a:t>
-            </a:r>
-            <a:r>
-              <a:rPr lang="en-US" sz="1200" dirty="0">
-                <a:solidFill>
-                  <a:srgbClr val="80BE63"/>
-                </a:solidFill>
-                <a:latin typeface="Palatino Linotype" panose="02040502050505030304" pitchFamily="18" charset="0"/>
-              </a:rPr>
-              <a:t>Data Driven</a:t>
-            </a:r>
-            <a:r>
-              <a:rPr lang="en-US" sz="1200" dirty="0">
-                <a:solidFill>
-                  <a:srgbClr val="0021A5"/>
-                </a:solidFill>
-                <a:latin typeface="Palatino Linotype" panose="02040502050505030304" pitchFamily="18" charset="0"/>
-              </a:rPr>
-              <a:t> </a:t>
-            </a:r>
-            <a:r>
-              <a:rPr lang="en-US" sz="1200" dirty="0">
-                <a:latin typeface="Palatino Linotype" panose="02040502050505030304" pitchFamily="18" charset="0"/>
-              </a:rPr>
-              <a:t>(Identify Clusters)</a:t>
-            </a:r>
-          </a:p>
-          <a:p>
-            <a:pPr marL="228600" indent="-228600">
-              <a:buAutoNum type="arabicPeriod"/>
-            </a:pPr>
-            <a:r>
-              <a:rPr lang="en-US" sz="1200" dirty="0">
-                <a:latin typeface="Palatino Linotype" panose="02040502050505030304" pitchFamily="18" charset="0"/>
-              </a:rPr>
-              <a:t>Reinforcement Learning is </a:t>
-            </a:r>
-            <a:r>
-              <a:rPr lang="en-US" sz="1200" dirty="0">
-                <a:solidFill>
-                  <a:srgbClr val="80BE63"/>
-                </a:solidFill>
-                <a:latin typeface="Palatino Linotype" panose="02040502050505030304" pitchFamily="18" charset="0"/>
-              </a:rPr>
-              <a:t>Experience Driven </a:t>
-            </a:r>
-            <a:r>
-              <a:rPr lang="en-US" sz="1200" dirty="0">
-                <a:latin typeface="Palatino Linotype" panose="02040502050505030304" pitchFamily="18" charset="0"/>
-              </a:rPr>
-              <a:t>(Learn from Mistakes)</a:t>
-            </a:r>
-          </a:p>
-          <a:p>
-            <a:endParaRPr lang="en-US" sz="1200" b="0" i="0" kern="1200" dirty="0">
-              <a:solidFill>
-                <a:schemeClr val="tx1"/>
-              </a:solidFill>
-              <a:effectLst/>
-              <a:latin typeface="+mn-lt"/>
-              <a:ea typeface="+mn-ea"/>
-              <a:cs typeface="+mn-cs"/>
-            </a:endParaRPr>
-          </a:p>
-          <a:p>
-            <a:r>
-              <a:rPr lang="en-US" sz="1200" b="0" i="0" kern="1200" dirty="0">
-                <a:solidFill>
-                  <a:schemeClr val="tx1"/>
-                </a:solidFill>
-                <a:effectLst/>
-                <a:latin typeface="+mn-lt"/>
-                <a:ea typeface="+mn-ea"/>
-                <a:cs typeface="+mn-cs"/>
-              </a:rPr>
-              <a:t>Let’s dive into the details…</a:t>
-            </a:r>
-          </a:p>
-          <a:p>
-            <a:endParaRPr lang="en-US" sz="1200" b="0" i="0" kern="1200" dirty="0">
-              <a:solidFill>
-                <a:schemeClr val="tx1"/>
-              </a:solidFill>
-              <a:effectLst/>
-              <a:latin typeface="+mn-lt"/>
-              <a:ea typeface="+mn-ea"/>
-              <a:cs typeface="+mn-cs"/>
-            </a:endParaRPr>
-          </a:p>
-          <a:p>
-            <a:endParaRPr lang="en-US" sz="1200" b="0" i="0" kern="1200" dirty="0">
-              <a:solidFill>
-                <a:schemeClr val="tx1"/>
-              </a:solidFill>
-              <a:effectLst/>
-              <a:latin typeface="+mn-lt"/>
-              <a:ea typeface="+mn-ea"/>
-              <a:cs typeface="+mn-cs"/>
-            </a:endParaRPr>
+            <a:endParaRPr lang="en-US" dirty="0"/>
           </a:p>
         </p:txBody>
       </p:sp>
@@ -871,7 +692,7 @@
     </p:spTree>
     <p:extLst>
       <p:ext uri="{BB962C8B-B14F-4D97-AF65-F5344CB8AC3E}">
-        <p14:creationId xmlns:p14="http://schemas.microsoft.com/office/powerpoint/2010/main" val="2830584034"/>
+        <p14:creationId xmlns:p14="http://schemas.microsoft.com/office/powerpoint/2010/main" val="2279087846"/>
       </p:ext>
     </p:extLst>
   </p:cSld>
@@ -925,57 +746,186 @@
           <a:bodyPr/>
           <a:lstStyle/>
           <a:p>
-            <a:pPr marL="0" indent="0" algn="l">
+            <a:pPr marL="0" marR="0" lvl="0" indent="0" algn="l" defTabSz="914400" rtl="0" eaLnBrk="1" fontAlgn="auto" latinLnBrk="0" hangingPunct="1">
+              <a:lnSpc>
+                <a:spcPct val="100000"/>
+              </a:lnSpc>
+              <a:spcBef>
+                <a:spcPts val="0"/>
+              </a:spcBef>
+              <a:spcAft>
+                <a:spcPts val="0"/>
+              </a:spcAft>
+              <a:buClrTx/>
+              <a:buSzTx/>
+              <a:buFontTx/>
+              <a:buNone/>
+              <a:tabLst/>
+              <a:defRPr/>
+            </a:pPr>
+            <a:r>
+              <a:rPr lang="en-US" sz="1200" b="0" i="0" kern="1200" dirty="0">
+                <a:solidFill>
+                  <a:schemeClr val="tx1"/>
+                </a:solidFill>
+                <a:effectLst/>
+                <a:latin typeface="+mn-lt"/>
+                <a:ea typeface="+mn-ea"/>
+                <a:cs typeface="+mn-cs"/>
+              </a:rPr>
+              <a:t>I want to introduce you to the different kinds of A.I. learning systems.  There are three principal types of machine / deep learning systems (supervised, unsupervised, and reinforcement).  </a:t>
+            </a:r>
+          </a:p>
+          <a:p>
+            <a:pPr marL="0" indent="0">
               <a:buNone/>
             </a:pPr>
-            <a:r>
-              <a:rPr lang="en-US" sz="1800" b="0" i="0" u="none" strike="noStrike" baseline="0" dirty="0">
-                <a:latin typeface="OpenSans"/>
-              </a:rPr>
-              <a:t>And another look at the three types of ML/DL learning systems:</a:t>
-            </a:r>
-          </a:p>
-          <a:p>
-            <a:pPr marL="0" indent="0" algn="l">
-              <a:buNone/>
+            <a:endParaRPr lang="en-US" sz="1200" dirty="0">
+              <a:latin typeface="Palatino Linotype" panose="02040502050505030304" pitchFamily="18" charset="0"/>
+            </a:endParaRPr>
+          </a:p>
+          <a:p>
+            <a:pPr marL="228600" indent="-228600">
+              <a:buAutoNum type="arabicPeriod"/>
             </a:pPr>
-            <a:endParaRPr lang="en-US" sz="1800" b="0" i="0" u="none" strike="noStrike" baseline="0" dirty="0">
-              <a:latin typeface="OpenSans"/>
+            <a:r>
+              <a:rPr lang="en-US" sz="1200" dirty="0">
+                <a:latin typeface="Palatino Linotype" panose="02040502050505030304" pitchFamily="18" charset="0"/>
+              </a:rPr>
+              <a:t>Supervised Learning is </a:t>
+            </a:r>
+            <a:r>
+              <a:rPr lang="en-US" sz="1200" dirty="0">
+                <a:solidFill>
+                  <a:srgbClr val="80BE63"/>
+                </a:solidFill>
+                <a:latin typeface="Palatino Linotype" panose="02040502050505030304" pitchFamily="18" charset="0"/>
+              </a:rPr>
+              <a:t>Task Driven</a:t>
+            </a:r>
+            <a:r>
+              <a:rPr lang="en-US" sz="1200" dirty="0">
+                <a:solidFill>
+                  <a:srgbClr val="0021A5"/>
+                </a:solidFill>
+                <a:latin typeface="Palatino Linotype" panose="02040502050505030304" pitchFamily="18" charset="0"/>
+              </a:rPr>
+              <a:t> </a:t>
+            </a:r>
+            <a:r>
+              <a:rPr lang="en-US" sz="1200" dirty="0">
+                <a:latin typeface="Palatino Linotype" panose="02040502050505030304" pitchFamily="18" charset="0"/>
+              </a:rPr>
+              <a:t>(Predict next value)</a:t>
+            </a:r>
+          </a:p>
+          <a:p>
+            <a:pPr marL="228600" indent="-228600">
+              <a:buAutoNum type="arabicPeriod"/>
+            </a:pPr>
+            <a:r>
+              <a:rPr lang="en-US" sz="1200" dirty="0">
+                <a:latin typeface="Palatino Linotype" panose="02040502050505030304" pitchFamily="18" charset="0"/>
+              </a:rPr>
+              <a:t>Unsupervised Learning is </a:t>
+            </a:r>
+            <a:r>
+              <a:rPr lang="en-US" sz="1200" dirty="0">
+                <a:solidFill>
+                  <a:srgbClr val="80BE63"/>
+                </a:solidFill>
+                <a:latin typeface="Palatino Linotype" panose="02040502050505030304" pitchFamily="18" charset="0"/>
+              </a:rPr>
+              <a:t>Data Driven</a:t>
+            </a:r>
+            <a:r>
+              <a:rPr lang="en-US" sz="1200" dirty="0">
+                <a:solidFill>
+                  <a:srgbClr val="0021A5"/>
+                </a:solidFill>
+                <a:latin typeface="Palatino Linotype" panose="02040502050505030304" pitchFamily="18" charset="0"/>
+              </a:rPr>
+              <a:t> </a:t>
+            </a:r>
+            <a:r>
+              <a:rPr lang="en-US" sz="1200" dirty="0">
+                <a:latin typeface="Palatino Linotype" panose="02040502050505030304" pitchFamily="18" charset="0"/>
+              </a:rPr>
+              <a:t>(Identify Clusters)</a:t>
+            </a:r>
+          </a:p>
+          <a:p>
+            <a:pPr marL="228600" indent="-228600">
+              <a:buAutoNum type="arabicPeriod"/>
+            </a:pPr>
+            <a:r>
+              <a:rPr lang="en-US" sz="1200" dirty="0">
+                <a:latin typeface="Palatino Linotype" panose="02040502050505030304" pitchFamily="18" charset="0"/>
+              </a:rPr>
+              <a:t>Reinforcement Learning is </a:t>
+            </a:r>
+            <a:r>
+              <a:rPr lang="en-US" sz="1200" dirty="0">
+                <a:solidFill>
+                  <a:srgbClr val="80BE63"/>
+                </a:solidFill>
+                <a:latin typeface="Palatino Linotype" panose="02040502050505030304" pitchFamily="18" charset="0"/>
+              </a:rPr>
+              <a:t>Experience Driven </a:t>
+            </a:r>
+            <a:r>
+              <a:rPr lang="en-US" sz="1200" dirty="0">
+                <a:latin typeface="Palatino Linotype" panose="02040502050505030304" pitchFamily="18" charset="0"/>
+              </a:rPr>
+              <a:t>(Learn from Mistakes)</a:t>
+            </a:r>
+          </a:p>
+          <a:p>
+            <a:endParaRPr lang="en-US" sz="1200" b="0" i="0" kern="1200" dirty="0">
+              <a:solidFill>
+                <a:schemeClr val="tx1"/>
+              </a:solidFill>
+              <a:effectLst/>
+              <a:latin typeface="+mn-lt"/>
+              <a:ea typeface="+mn-ea"/>
+              <a:cs typeface="+mn-cs"/>
             </a:endParaRPr>
           </a:p>
           <a:p>
-            <a:pPr marL="0" indent="0" algn="l">
-              <a:buNone/>
-            </a:pPr>
-            <a:r>
-              <a:rPr lang="en-US" sz="1800" b="0" i="0" u="none" strike="noStrike" baseline="0" dirty="0">
-                <a:latin typeface="OpenSans"/>
-              </a:rPr>
-              <a:t>1. Supervised learning minimizes the error of the output of the model with respect to a target (label) specified in the training set.</a:t>
-            </a:r>
-          </a:p>
-          <a:p>
-            <a:pPr marL="0" indent="0" algn="l">
-              <a:buNone/>
-            </a:pPr>
-            <a:r>
-              <a:rPr lang="en-US" sz="1800" b="0" i="0" u="none" strike="noStrike" baseline="0" dirty="0">
-                <a:latin typeface="OpenSans"/>
-              </a:rPr>
-              <a:t>2. Reinforcement Learning maximizes the reward signal of the actions.</a:t>
-            </a:r>
-          </a:p>
-          <a:p>
-            <a:pPr marL="0" indent="0" algn="l">
-              <a:buNone/>
-            </a:pPr>
-            <a:r>
-              <a:rPr lang="en-US" sz="1800" b="0" i="0" u="none" strike="noStrike" baseline="0" dirty="0">
-                <a:latin typeface="OpenSans"/>
-              </a:rPr>
-              <a:t>3. Unsupervised learning has no target and no reward; it tries to learn a data representation that can be useful.</a:t>
-            </a:r>
-            <a:endParaRPr lang="en-US" dirty="0"/>
+            <a:r>
+              <a:rPr lang="en-US" sz="1200" b="0" i="0" kern="1200" dirty="0">
+                <a:solidFill>
+                  <a:schemeClr val="tx1"/>
+                </a:solidFill>
+                <a:effectLst/>
+                <a:latin typeface="+mn-lt"/>
+                <a:ea typeface="+mn-ea"/>
+                <a:cs typeface="+mn-cs"/>
+              </a:rPr>
+              <a:t>Let’s dive into the details…</a:t>
+            </a:r>
+          </a:p>
+          <a:p>
+            <a:endParaRPr lang="en-US" sz="1200" b="0" i="0" kern="1200" dirty="0">
+              <a:solidFill>
+                <a:schemeClr val="tx1"/>
+              </a:solidFill>
+              <a:effectLst/>
+              <a:latin typeface="+mn-lt"/>
+              <a:ea typeface="+mn-ea"/>
+              <a:cs typeface="+mn-cs"/>
+            </a:endParaRPr>
+          </a:p>
+          <a:p>
+            <a:endParaRPr lang="en-US" sz="1200" b="0" i="0" kern="1200" dirty="0">
+              <a:solidFill>
+                <a:schemeClr val="tx1"/>
+              </a:solidFill>
+              <a:effectLst/>
+              <a:latin typeface="+mn-lt"/>
+              <a:ea typeface="+mn-ea"/>
+              <a:cs typeface="+mn-cs"/>
+            </a:endParaRPr>
           </a:p>
         </p:txBody>
       </p:sp>
@@ -1005,7 +955,7 @@
     </p:spTree>
     <p:extLst>
       <p:ext uri="{BB962C8B-B14F-4D97-AF65-F5344CB8AC3E}">
-        <p14:creationId xmlns:p14="http://schemas.microsoft.com/office/powerpoint/2010/main" val="2887563307"/>
+        <p14:creationId xmlns:p14="http://schemas.microsoft.com/office/powerpoint/2010/main" val="2830584034"/>
       </p:ext>
     </p:extLst>
   </p:cSld>
@@ -1059,48 +1009,57 @@
           <a:bodyPr/>
           <a:lstStyle/>
           <a:p>
-            <a:r>
-              <a:rPr lang="en-US" sz="1200" b="0" i="0" u="none" strike="noStrike" kern="1200" baseline="0" dirty="0">
-                <a:solidFill>
-                  <a:schemeClr val="tx1"/>
-                </a:solidFill>
-                <a:latin typeface="+mn-lt"/>
-                <a:ea typeface="+mn-ea"/>
-                <a:cs typeface="+mn-cs"/>
-              </a:rPr>
-              <a:t>And finally, this image summarizes some of the primary ways in which AI is being used today.   I present these applications because background knowledge is key to helping you imagine AI possibilities in your domain.  And it’s the reason why I asked Jim Cusick to provide additional bibliographic support.  Of course, the challenge is to take an application in another area and then modify it, so it works in yours.  I believe this is where a lot of innovation is going to happen in the near future.  </a:t>
-            </a:r>
-          </a:p>
-          <a:p>
-            <a:pPr marL="0" marR="0" lvl="0" indent="0" algn="l" defTabSz="914400" rtl="0" eaLnBrk="1" fontAlgn="auto" latinLnBrk="0" hangingPunct="1">
-              <a:lnSpc>
-                <a:spcPct val="100000"/>
-              </a:lnSpc>
-              <a:spcBef>
-                <a:spcPts val="0"/>
-              </a:spcBef>
-              <a:spcAft>
-                <a:spcPts val="0"/>
-              </a:spcAft>
-              <a:buClrTx/>
-              <a:buSzTx/>
-              <a:buFontTx/>
+            <a:pPr marL="0" indent="0" algn="l">
               <a:buNone/>
-              <a:tabLst/>
-              <a:defRPr/>
             </a:pPr>
             <a:r>
-              <a:rPr lang="en-US" sz="1200" b="0" i="0" kern="1200" dirty="0">
-                <a:solidFill>
-                  <a:schemeClr val="tx1"/>
-                </a:solidFill>
-                <a:effectLst/>
-                <a:latin typeface="+mn-lt"/>
-                <a:ea typeface="+mn-ea"/>
-                <a:cs typeface="+mn-cs"/>
-              </a:rPr>
-              <a:t> </a:t>
-            </a:r>
+              <a:rPr lang="en-US" sz="1800" b="0" i="0" u="none" strike="noStrike" baseline="0" dirty="0">
+                <a:latin typeface="OpenSans"/>
+              </a:rPr>
+              <a:t>And another look at the three types of ML/DL systems:</a:t>
+            </a:r>
+          </a:p>
+          <a:p>
+            <a:pPr marL="0" indent="0" algn="l">
+              <a:buNone/>
+            </a:pPr>
+            <a:endParaRPr lang="en-US" sz="1800" b="0" i="0" u="none" strike="noStrike" baseline="0" dirty="0">
+              <a:latin typeface="OpenSans"/>
+            </a:endParaRPr>
+          </a:p>
+          <a:p>
+            <a:pPr marL="0" indent="0" algn="l">
+              <a:buNone/>
+            </a:pPr>
+            <a:r>
+              <a:rPr lang="en-US" sz="1800" b="0" i="0" u="none" strike="noStrike" baseline="0" dirty="0">
+                <a:latin typeface="OpenSans"/>
+              </a:rPr>
+              <a:t>1. Supervised learning minimizes the error of the output of the model with respect to a target (label) specified in the training set.</a:t>
+            </a:r>
+          </a:p>
+          <a:p>
+            <a:pPr marL="0" indent="0" algn="l">
+              <a:buNone/>
+            </a:pPr>
+            <a:r>
+              <a:rPr lang="en-US" sz="1800" b="0" i="0" u="none" strike="noStrike" baseline="0" dirty="0">
+                <a:latin typeface="OpenSans"/>
+              </a:rPr>
+              <a:t>2. Reinforcement Learning maximizes the reward signal of the actions.</a:t>
+            </a:r>
+          </a:p>
+          <a:p>
+            <a:pPr marL="0" indent="0" algn="l">
+              <a:buNone/>
+            </a:pPr>
+            <a:r>
+              <a:rPr lang="en-US" sz="1800" b="0" i="0" u="none" strike="noStrike" baseline="0" dirty="0">
+                <a:latin typeface="OpenSans"/>
+              </a:rPr>
+              <a:t>3. Unsupervised learning has no target and no reward; it tries to learn a data representation that can be useful.</a:t>
+            </a:r>
+            <a:endParaRPr lang="en-US" dirty="0"/>
           </a:p>
         </p:txBody>
       </p:sp>
@@ -1130,7 +1089,7 @@
     </p:spTree>
     <p:extLst>
       <p:ext uri="{BB962C8B-B14F-4D97-AF65-F5344CB8AC3E}">
-        <p14:creationId xmlns:p14="http://schemas.microsoft.com/office/powerpoint/2010/main" val="2041406944"/>
+        <p14:creationId xmlns:p14="http://schemas.microsoft.com/office/powerpoint/2010/main" val="2887563307"/>
       </p:ext>
     </p:extLst>
   </p:cSld>
@@ -1185,8 +1144,46 @@
           <a:lstStyle/>
           <a:p>
             <a:r>
-              <a:rPr lang="en-US" dirty="0"/>
-              <a:t>There are a variety of neural network types and innovation is ongoing in this area.  So, I’d like to conclude this presentation with a brief overview of some of the more popular architectures, including their various applications.</a:t>
+              <a:rPr lang="en-US" sz="1200" b="0" i="0" u="none" strike="noStrike" kern="1200" baseline="0" dirty="0">
+                <a:solidFill>
+                  <a:schemeClr val="tx1"/>
+                </a:solidFill>
+                <a:latin typeface="+mn-lt"/>
+                <a:ea typeface="+mn-ea"/>
+                <a:cs typeface="+mn-cs"/>
+              </a:rPr>
+              <a:t>And finally, this image summarizes some of the primary ways in which AI is being used today.   I present these applications because background knowledge is key to helping you imagine AI possibilities in your domain.  Of course, the challenge is to take an application in another area and then modify it, so it works in yours.  I believe this is where a lot of innovation is going to happen in the future.  </a:t>
+            </a:r>
+          </a:p>
+          <a:p>
+            <a:pPr marL="0" marR="0" lvl="0" indent="0" algn="l" defTabSz="914400" rtl="0" eaLnBrk="1" fontAlgn="auto" latinLnBrk="0" hangingPunct="1">
+              <a:lnSpc>
+                <a:spcPct val="100000"/>
+              </a:lnSpc>
+              <a:spcBef>
+                <a:spcPts val="0"/>
+              </a:spcBef>
+              <a:spcAft>
+                <a:spcPts val="0"/>
+              </a:spcAft>
+              <a:buClrTx/>
+              <a:buSzTx/>
+              <a:buFontTx/>
+              <a:buNone/>
+              <a:tabLst/>
+              <a:defRPr/>
+            </a:pPr>
+            <a:r>
+              <a:rPr lang="en-US" sz="1200" b="0" i="0" kern="1200" dirty="0">
+                <a:solidFill>
+                  <a:schemeClr val="tx1"/>
+                </a:solidFill>
+                <a:effectLst/>
+                <a:latin typeface="+mn-lt"/>
+                <a:ea typeface="+mn-ea"/>
+                <a:cs typeface="+mn-cs"/>
+              </a:rPr>
+              <a:t> </a:t>
             </a:r>
           </a:p>
         </p:txBody>
@@ -1217,7 +1214,7 @@
     </p:spTree>
     <p:extLst>
       <p:ext uri="{BB962C8B-B14F-4D97-AF65-F5344CB8AC3E}">
-        <p14:creationId xmlns:p14="http://schemas.microsoft.com/office/powerpoint/2010/main" val="3873866018"/>
+        <p14:creationId xmlns:p14="http://schemas.microsoft.com/office/powerpoint/2010/main" val="2041406944"/>
       </p:ext>
     </p:extLst>
   </p:cSld>
@@ -1271,131 +1268,10 @@
           <a:bodyPr/>
           <a:lstStyle/>
           <a:p>
-            <a:pPr marL="0" marR="0" lvl="0" indent="0" algn="l" defTabSz="914400" rtl="0" eaLnBrk="1" fontAlgn="auto" latinLnBrk="0" hangingPunct="1">
-              <a:lnSpc>
-                <a:spcPct val="100000"/>
-              </a:lnSpc>
-              <a:spcBef>
-                <a:spcPts val="0"/>
-              </a:spcBef>
-              <a:spcAft>
-                <a:spcPts val="0"/>
-              </a:spcAft>
-              <a:buClrTx/>
-              <a:buSzTx/>
-              <a:buFontTx/>
-              <a:buNone/>
-              <a:tabLst/>
-              <a:defRPr/>
-            </a:pPr>
-            <a:r>
-              <a:rPr lang="en-US" sz="1100" b="0" i="0" dirty="0">
-                <a:solidFill>
-                  <a:srgbClr val="3C3C3B"/>
-                </a:solidFill>
-                <a:effectLst/>
-                <a:latin typeface="+mn-lt"/>
-              </a:rPr>
-              <a:t>A </a:t>
-            </a:r>
-            <a:r>
-              <a:rPr lang="en-US" sz="1100" b="1" i="0" dirty="0">
-                <a:solidFill>
-                  <a:srgbClr val="3C3C3B"/>
-                </a:solidFill>
-                <a:effectLst/>
-                <a:latin typeface="+mn-lt"/>
-              </a:rPr>
-              <a:t>fully connected network </a:t>
-            </a:r>
-            <a:r>
-              <a:rPr lang="en-US" sz="1100" b="0" i="0" dirty="0">
-                <a:solidFill>
-                  <a:srgbClr val="3C3C3B"/>
-                </a:solidFill>
-                <a:effectLst/>
-                <a:latin typeface="+mn-lt"/>
-              </a:rPr>
-              <a:t>is the most basic kind of neural network, also known as feed-forward networks. </a:t>
-            </a:r>
-            <a:r>
-              <a:rPr lang="en-US" sz="1100" b="0" i="0" dirty="0">
-                <a:solidFill>
-                  <a:srgbClr val="3C3C3B"/>
-                </a:solidFill>
-                <a:effectLst/>
-                <a:latin typeface="Calibri" panose="020F0502020204030204" pitchFamily="34" charset="0"/>
-                <a:cs typeface="Calibri" panose="020F0502020204030204" pitchFamily="34" charset="0"/>
-              </a:rPr>
-              <a:t>Some application include:</a:t>
-            </a:r>
-          </a:p>
-          <a:p>
-            <a:endParaRPr lang="en-US" sz="1100" b="0" i="0" dirty="0">
-              <a:solidFill>
-                <a:srgbClr val="3C3C3B"/>
-              </a:solidFill>
-              <a:effectLst/>
-              <a:latin typeface="+mn-lt"/>
-            </a:endParaRPr>
-          </a:p>
-          <a:p>
-            <a:endParaRPr lang="en-US" sz="1100" b="0" i="0" dirty="0">
-              <a:solidFill>
-                <a:srgbClr val="3C3C3B"/>
-              </a:solidFill>
-              <a:effectLst/>
-              <a:latin typeface="+mn-lt"/>
-            </a:endParaRPr>
-          </a:p>
-          <a:p>
-            <a:pPr marL="233309" indent="-233309" defTabSz="933237">
-              <a:buFontTx/>
-              <a:buAutoNum type="arabicPeriod"/>
-              <a:defRPr/>
-            </a:pPr>
-            <a:r>
-              <a:rPr lang="en-US" sz="1100" b="0" i="0" dirty="0">
-                <a:solidFill>
-                  <a:srgbClr val="000000"/>
-                </a:solidFill>
-                <a:effectLst/>
-                <a:latin typeface="+mn-lt"/>
-              </a:rPr>
-              <a:t>Complex Classification</a:t>
-            </a:r>
-          </a:p>
-          <a:p>
-            <a:pPr marL="233309" indent="-233309" defTabSz="933237">
-              <a:buFontTx/>
-              <a:buAutoNum type="arabicPeriod"/>
-              <a:defRPr/>
-            </a:pPr>
-            <a:r>
-              <a:rPr lang="en-US" sz="1100" b="0" i="0" dirty="0">
-                <a:solidFill>
-                  <a:srgbClr val="000000"/>
-                </a:solidFill>
-                <a:effectLst/>
-                <a:latin typeface="+mn-lt"/>
-              </a:rPr>
-              <a:t>Machine Translation</a:t>
-            </a:r>
-          </a:p>
-          <a:p>
-            <a:pPr defTabSz="933237">
-              <a:defRPr/>
-            </a:pPr>
-            <a:endParaRPr lang="en-US" b="0" i="0" dirty="0">
-              <a:solidFill>
-                <a:srgbClr val="000000"/>
-              </a:solidFill>
-              <a:effectLst/>
-              <a:latin typeface="Lato"/>
-            </a:endParaRPr>
-          </a:p>
-          <a:p>
-            <a:endParaRPr lang="en-US" dirty="0"/>
+            <a:r>
+              <a:rPr lang="en-US" dirty="0"/>
+              <a:t>There are a variety of neural network types and innovation is ongoing in this area.  So, I’d like to conclude this presentation with a brief overview of some of the more popular architectures, including their various applications.</a:t>
+            </a:r>
           </a:p>
         </p:txBody>
       </p:sp>
@@ -1425,7 +1301,7 @@
     </p:spTree>
     <p:extLst>
       <p:ext uri="{BB962C8B-B14F-4D97-AF65-F5344CB8AC3E}">
-        <p14:creationId xmlns:p14="http://schemas.microsoft.com/office/powerpoint/2010/main" val="473801370"/>
+        <p14:creationId xmlns:p14="http://schemas.microsoft.com/office/powerpoint/2010/main" val="3873866018"/>
       </p:ext>
     </p:extLst>
   </p:cSld>
@@ -1479,6 +1355,53 @@
           <a:bodyPr/>
           <a:lstStyle/>
           <a:p>
+            <a:pPr marL="0" marR="0" lvl="0" indent="0" algn="l" defTabSz="914400" rtl="0" eaLnBrk="1" fontAlgn="auto" latinLnBrk="0" hangingPunct="1">
+              <a:lnSpc>
+                <a:spcPct val="100000"/>
+              </a:lnSpc>
+              <a:spcBef>
+                <a:spcPts val="0"/>
+              </a:spcBef>
+              <a:spcAft>
+                <a:spcPts val="0"/>
+              </a:spcAft>
+              <a:buClrTx/>
+              <a:buSzTx/>
+              <a:buFontTx/>
+              <a:buNone/>
+              <a:tabLst/>
+              <a:defRPr/>
+            </a:pPr>
+            <a:r>
+              <a:rPr lang="en-US" sz="1100" b="0" i="0" dirty="0">
+                <a:solidFill>
+                  <a:srgbClr val="3C3C3B"/>
+                </a:solidFill>
+                <a:effectLst/>
+                <a:latin typeface="+mn-lt"/>
+              </a:rPr>
+              <a:t>A </a:t>
+            </a:r>
+            <a:r>
+              <a:rPr lang="en-US" sz="1100" b="1" i="0" dirty="0">
+                <a:solidFill>
+                  <a:srgbClr val="3C3C3B"/>
+                </a:solidFill>
+                <a:effectLst/>
+                <a:latin typeface="+mn-lt"/>
+              </a:rPr>
+              <a:t>fully connected network </a:t>
+            </a:r>
+            <a:r>
+              <a:rPr lang="en-US" sz="1100" b="0" i="0" dirty="0">
+                <a:solidFill>
+                  <a:srgbClr val="3C3C3B"/>
+                </a:solidFill>
+                <a:effectLst/>
+                <a:latin typeface="+mn-lt"/>
+              </a:rPr>
+              <a:t>is the most basic kind of neural network, also known as feed-forward networks. </a:t>
+            </a:r>
             <a:r>
               <a:rPr lang="en-US" sz="1100" b="0" i="0" dirty="0">
                 <a:solidFill>
@@ -1488,29 +1411,7 @@
                 <a:latin typeface="Calibri" panose="020F0502020204030204" pitchFamily="34" charset="0"/>
                 <a:cs typeface="Calibri" panose="020F0502020204030204" pitchFamily="34" charset="0"/>
               </a:rPr>
-              <a:t>A </a:t>
-            </a:r>
-            <a:r>
-              <a:rPr lang="en-US" sz="1100" b="1" i="0" dirty="0">
-                <a:solidFill>
-                  <a:srgbClr val="3C3C3B"/>
-                </a:solidFill>
-                <a:effectLst/>
-                <a:latin typeface="Calibri" panose="020F0502020204030204" pitchFamily="34" charset="0"/>
-                <a:cs typeface="Calibri" panose="020F0502020204030204" pitchFamily="34" charset="0"/>
-              </a:rPr>
-              <a:t>convolutional neural network (CNN) </a:t>
-            </a:r>
-            <a:r>
-              <a:rPr lang="en-US" sz="1100" b="0" i="0" dirty="0">
-                <a:solidFill>
-                  <a:srgbClr val="3C3C3B"/>
-                </a:solidFill>
-                <a:effectLst/>
-                <a:latin typeface="Calibri" panose="020F0502020204030204" pitchFamily="34" charset="0"/>
-                <a:cs typeface="Calibri" panose="020F0502020204030204" pitchFamily="34" charset="0"/>
-              </a:rPr>
-              <a:t>is a class of AI models used primarily for image recognition tasks.  In a fully connected network, each neuron in a layer is connected to every other neuron in the next layer (previous slide).  CNNs, however, adopt a different strategy and do not use a fully connected architecture.  As well, CNNs are typically constructed with one or more convolution and/or pooling layers.  These specialized layers allow the model to extract local features from images which are then fed to the subsequent layers.  </a:t>
+              <a:t>Some application include:</a:t>
             </a:r>
           </a:p>
           <a:p>
@@ -1519,22 +1420,8 @@
                 <a:srgbClr val="3C3C3B"/>
               </a:solidFill>
               <a:effectLst/>
-              <a:latin typeface="Calibri" panose="020F0502020204030204" pitchFamily="34" charset="0"/>
-              <a:cs typeface="Calibri" panose="020F0502020204030204" pitchFamily="34" charset="0"/>
+              <a:latin typeface="+mn-lt"/>
             </a:endParaRPr>
-          </a:p>
-          <a:p>
-            <a:r>
-              <a:rPr lang="en-US" sz="1100" b="0" i="0" dirty="0">
-                <a:solidFill>
-                  <a:srgbClr val="3C3C3B"/>
-                </a:solidFill>
-                <a:effectLst/>
-                <a:latin typeface="Calibri" panose="020F0502020204030204" pitchFamily="34" charset="0"/>
-                <a:cs typeface="Calibri" panose="020F0502020204030204" pitchFamily="34" charset="0"/>
-              </a:rPr>
-              <a:t>Some application of CNNs include:</a:t>
-            </a:r>
           </a:p>
           <a:p>
             <a:endParaRPr lang="en-US" sz="1100" b="0" i="0" dirty="0">
@@ -1542,8 +1429,7 @@
                 <a:srgbClr val="3C3C3B"/>
               </a:solidFill>
               <a:effectLst/>
-              <a:latin typeface="Calibri" panose="020F0502020204030204" pitchFamily="34" charset="0"/>
-              <a:cs typeface="Calibri" panose="020F0502020204030204" pitchFamily="34" charset="0"/>
+              <a:latin typeface="+mn-lt"/>
             </a:endParaRPr>
           </a:p>
           <a:p>
@@ -1558,10 +1444,9 @@
                   <a:srgbClr val="000000"/>
                 </a:solidFill>
                 <a:effectLst/>
-                <a:latin typeface="Calibri" panose="020F0502020204030204" pitchFamily="34" charset="0"/>
-                <a:cs typeface="Calibri" panose="020F0502020204030204" pitchFamily="34" charset="0"/>
-              </a:rPr>
-              <a:t>Image processing</a:t>
+                <a:latin typeface="+mn-lt"/>
+              </a:rPr>
+              <a:t>Complex Classification</a:t>
             </a:r>
           </a:p>
           <a:p>
@@ -1576,34 +1461,13 @@
                   <a:srgbClr val="000000"/>
                 </a:solidFill>
                 <a:effectLst/>
-                <a:latin typeface="Calibri" panose="020F0502020204030204" pitchFamily="34" charset="0"/>
-                <a:cs typeface="Calibri" panose="020F0502020204030204" pitchFamily="34" charset="0"/>
-              </a:rPr>
-              <a:t>Computer Vision</a:t>
-            </a:r>
-          </a:p>
-          <a:p>
-            <a:pPr marL="233309" indent="-233309" defTabSz="933237">
-              <a:buFontTx/>
-              <a:buAutoNum type="arabicPeriod"/>
-              <a:defRPr/>
-            </a:pPr>
-            <a:r>
-              <a:rPr lang="en-US" sz="1100" b="0" i="0" dirty="0">
-                <a:solidFill>
-                  <a:srgbClr val="000000"/>
-                </a:solidFill>
-                <a:effectLst/>
-                <a:latin typeface="Calibri" panose="020F0502020204030204" pitchFamily="34" charset="0"/>
-                <a:cs typeface="Calibri" panose="020F0502020204030204" pitchFamily="34" charset="0"/>
-              </a:rPr>
-              <a:t>Speech Recognition</a:t>
-            </a:r>
-          </a:p>
-          <a:p>
-            <a:pPr marL="233309" indent="-233309" defTabSz="933237">
-              <a:buFontTx/>
-              <a:buAutoNum type="arabicPeriod"/>
+                <a:latin typeface="+mn-lt"/>
+              </a:rPr>
+              <a:t>Machine Translation</a:t>
+            </a:r>
+          </a:p>
+          <a:p>
+            <a:pPr defTabSz="933237">
               <a:defRPr/>
             </a:pPr>
             <a:endParaRPr lang="en-US" b="0" i="0" dirty="0">
@@ -1645,7 +1509,7 @@
     </p:spTree>
     <p:extLst>
       <p:ext uri="{BB962C8B-B14F-4D97-AF65-F5344CB8AC3E}">
-        <p14:creationId xmlns:p14="http://schemas.microsoft.com/office/powerpoint/2010/main" val="345247314"/>
+        <p14:creationId xmlns:p14="http://schemas.microsoft.com/office/powerpoint/2010/main" val="473801370"/>
       </p:ext>
     </p:extLst>
   </p:cSld>
@@ -1700,7 +1564,7 @@
           <a:lstStyle/>
           <a:p>
             <a:r>
-              <a:rPr lang="en-US" sz="1100" b="1" i="0" dirty="0">
+              <a:rPr lang="en-US" sz="1100" b="0" i="0" dirty="0">
                 <a:solidFill>
                   <a:srgbClr val="3C3C3B"/>
                 </a:solidFill>
@@ -1708,10 +1572,10 @@
                 <a:latin typeface="Calibri" panose="020F0502020204030204" pitchFamily="34" charset="0"/>
                 <a:cs typeface="Calibri" panose="020F0502020204030204" pitchFamily="34" charset="0"/>
               </a:rPr>
-              <a:t>Recurrent neural networks (RNNs) </a:t>
-            </a:r>
-            <a:r>
-              <a:rPr lang="en-US" sz="1100" b="0" i="0" dirty="0">
+              <a:t>A </a:t>
+            </a:r>
+            <a:r>
+              <a:rPr lang="en-US" sz="1100" b="1" i="0" dirty="0">
                 <a:solidFill>
                   <a:srgbClr val="3C3C3B"/>
                 </a:solidFill>
@@ -1719,10 +1583,10 @@
                 <a:latin typeface="Calibri" panose="020F0502020204030204" pitchFamily="34" charset="0"/>
                 <a:cs typeface="Calibri" panose="020F0502020204030204" pitchFamily="34" charset="0"/>
               </a:rPr>
-              <a:t>propagate data forward, but also backwards.  As pictured here, the red arrow indicates that the hidden layer connects back to itself, thereby allowing the network to remember what it has already done.  RNN’s are a good choice for sequenced data where the order of the data elements is important.  More recently, </a:t>
-            </a:r>
-            <a:r>
-              <a:rPr lang="en-US" sz="1100" b="1" i="0" dirty="0">
+              <a:t>convolutional neural network (CNN) </a:t>
+            </a:r>
+            <a:r>
+              <a:rPr lang="en-US" sz="1100" b="0" i="0" dirty="0">
                 <a:solidFill>
                   <a:srgbClr val="3C3C3B"/>
                 </a:solidFill>
@@ -1730,18 +1594,7 @@
                 <a:latin typeface="Calibri" panose="020F0502020204030204" pitchFamily="34" charset="0"/>
                 <a:cs typeface="Calibri" panose="020F0502020204030204" pitchFamily="34" charset="0"/>
               </a:rPr>
-              <a:t>Transformers</a:t>
-            </a:r>
-            <a:r>
-              <a:rPr lang="en-US" sz="1100" b="0" i="0" dirty="0">
-                <a:solidFill>
-                  <a:srgbClr val="3C3C3B"/>
-                </a:solidFill>
-                <a:effectLst/>
-                <a:latin typeface="Calibri" panose="020F0502020204030204" pitchFamily="34" charset="0"/>
-                <a:cs typeface="Calibri" panose="020F0502020204030204" pitchFamily="34" charset="0"/>
-              </a:rPr>
-              <a:t> have started to displace RNNs as they are more versatile and effective.</a:t>
+              <a:t>is a class of AI models used primarily for image recognition tasks.  In a fully connected network, each neuron in a layer is connected to every other neuron in the next layer (previous slide).  CNNs, however, adopt a different strategy and do not use a fully connected architecture.  As well, CNNs are typically constructed with one or more convolution and/or pooling layers.  These specialized layers allow the model to extract local features from images which are then fed to the subsequent layers.  </a:t>
             </a:r>
           </a:p>
           <a:p>
@@ -1764,7 +1617,7 @@
                 <a:latin typeface="Calibri" panose="020F0502020204030204" pitchFamily="34" charset="0"/>
                 <a:cs typeface="Calibri" panose="020F0502020204030204" pitchFamily="34" charset="0"/>
               </a:rPr>
-              <a:t>Some application of RNNs include:</a:t>
+              <a:t>Some application of CNNs include:</a:t>
             </a:r>
           </a:p>
           <a:p>
@@ -1778,9 +1631,10 @@
             </a:endParaRPr>
           </a:p>
           <a:p>
-            <a:pPr marL="233309" indent="-233309">
-              <a:buFont typeface="Arial" panose="020B0604020202020204" pitchFamily="34" charset="0"/>
+            <a:pPr marL="233309" indent="-233309" defTabSz="933237">
+              <a:buFontTx/>
               <a:buAutoNum type="arabicPeriod"/>
+              <a:defRPr/>
             </a:pPr>
             <a:r>
               <a:rPr lang="en-US" sz="1100" b="0" i="0" dirty="0">
@@ -1791,12 +1645,12 @@
                 <a:latin typeface="Calibri" panose="020F0502020204030204" pitchFamily="34" charset="0"/>
                 <a:cs typeface="Calibri" panose="020F0502020204030204" pitchFamily="34" charset="0"/>
               </a:rPr>
-              <a:t>Text processing like auto suggest, grammar checks, etc.</a:t>
+              <a:t>Image processing</a:t>
             </a:r>
           </a:p>
           <a:p>
             <a:pPr marL="233309" indent="-233309" defTabSz="933237">
-              <a:buFont typeface="Arial" panose="020B0604020202020204" pitchFamily="34" charset="0"/>
+              <a:buFontTx/>
               <a:buAutoNum type="arabicPeriod"/>
               <a:defRPr/>
             </a:pPr>
@@ -1809,12 +1663,12 @@
                 <a:latin typeface="Calibri" panose="020F0502020204030204" pitchFamily="34" charset="0"/>
                 <a:cs typeface="Calibri" panose="020F0502020204030204" pitchFamily="34" charset="0"/>
               </a:rPr>
-              <a:t>Text to speech processing</a:t>
+              <a:t>Computer Vision</a:t>
             </a:r>
           </a:p>
           <a:p>
             <a:pPr marL="233309" indent="-233309" defTabSz="933237">
-              <a:buFont typeface="Arial" panose="020B0604020202020204" pitchFamily="34" charset="0"/>
+              <a:buFontTx/>
               <a:buAutoNum type="arabicPeriod"/>
               <a:defRPr/>
             </a:pPr>
@@ -1827,44 +1681,25 @@
                 <a:latin typeface="Calibri" panose="020F0502020204030204" pitchFamily="34" charset="0"/>
                 <a:cs typeface="Calibri" panose="020F0502020204030204" pitchFamily="34" charset="0"/>
               </a:rPr>
-              <a:t>Sentiment Analysis</a:t>
+              <a:t>Speech Recognition</a:t>
             </a:r>
           </a:p>
           <a:p>
             <a:pPr marL="233309" indent="-233309" defTabSz="933237">
-              <a:buFont typeface="Arial" panose="020B0604020202020204" pitchFamily="34" charset="0"/>
+              <a:buFontTx/>
               <a:buAutoNum type="arabicPeriod"/>
               <a:defRPr/>
             </a:pPr>
-            <a:r>
-              <a:rPr lang="en-US" sz="1100" b="0" i="0" dirty="0">
-                <a:solidFill>
-                  <a:srgbClr val="000000"/>
-                </a:solidFill>
-                <a:effectLst/>
-                <a:latin typeface="Calibri" panose="020F0502020204030204" pitchFamily="34" charset="0"/>
-                <a:cs typeface="Calibri" panose="020F0502020204030204" pitchFamily="34" charset="0"/>
-              </a:rPr>
-              <a:t>Time sequence projections</a:t>
-            </a:r>
-          </a:p>
-          <a:p>
-            <a:pPr marL="233309" indent="-233309" defTabSz="933237">
-              <a:buFont typeface="Arial" panose="020B0604020202020204" pitchFamily="34" charset="0"/>
-              <a:buAutoNum type="arabicPeriod"/>
-              <a:defRPr/>
-            </a:pPr>
-            <a:r>
-              <a:rPr lang="en-US" sz="1100" b="0" i="0" dirty="0">
-                <a:solidFill>
-                  <a:srgbClr val="000000"/>
-                </a:solidFill>
-                <a:effectLst/>
-                <a:latin typeface="Calibri" panose="020F0502020204030204" pitchFamily="34" charset="0"/>
-                <a:cs typeface="Calibri" panose="020F0502020204030204" pitchFamily="34" charset="0"/>
-              </a:rPr>
-              <a:t>Translation</a:t>
-            </a:r>
+            <a:endParaRPr lang="en-US" b="0" i="0" dirty="0">
+              <a:solidFill>
+                <a:srgbClr val="000000"/>
+              </a:solidFill>
+              <a:effectLst/>
+              <a:latin typeface="Lato"/>
+            </a:endParaRPr>
+          </a:p>
+          <a:p>
+            <a:endParaRPr lang="en-US" dirty="0"/>
           </a:p>
         </p:txBody>
       </p:sp>
@@ -1894,7 +1729,7 @@
     </p:spTree>
     <p:extLst>
       <p:ext uri="{BB962C8B-B14F-4D97-AF65-F5344CB8AC3E}">
-        <p14:creationId xmlns:p14="http://schemas.microsoft.com/office/powerpoint/2010/main" val="4149381120"/>
+        <p14:creationId xmlns:p14="http://schemas.microsoft.com/office/powerpoint/2010/main" val="345247314"/>
       </p:ext>
     </p:extLst>
   </p:cSld>
@@ -1948,107 +1783,172 @@
           <a:bodyPr/>
           <a:lstStyle/>
           <a:p>
-            <a:pPr marL="0" marR="0" lvl="0" indent="0" algn="l" defTabSz="914400" rtl="0" eaLnBrk="1" fontAlgn="auto" latinLnBrk="0" hangingPunct="1">
-              <a:lnSpc>
-                <a:spcPct val="100000"/>
-              </a:lnSpc>
-              <a:spcBef>
-                <a:spcPts val="0"/>
-              </a:spcBef>
-              <a:spcAft>
-                <a:spcPts val="0"/>
-              </a:spcAft>
-              <a:buClrTx/>
-              <a:buSzTx/>
-              <a:buFontTx/>
-              <a:buNone/>
-              <a:tabLst/>
-              <a:defRPr/>
-            </a:pPr>
-            <a:r>
-              <a:rPr lang="en-US" sz="1100" dirty="0">
-                <a:latin typeface="+mn-lt"/>
-              </a:rPr>
-              <a:t>A </a:t>
-            </a:r>
-            <a:r>
-              <a:rPr lang="en-US" sz="1100" b="1" dirty="0">
-                <a:latin typeface="+mn-lt"/>
-              </a:rPr>
-              <a:t>generative adversarial network (GAN) </a:t>
-            </a:r>
-            <a:r>
-              <a:rPr lang="en-US" sz="1100" dirty="0">
-                <a:latin typeface="+mn-lt"/>
-              </a:rPr>
-              <a:t>is a model in which two neural networks compete with each other to become more accurate in their predictions.  The two neural networks that make up a GAN are referred to as the generator and the discriminator. The goal of the generator is to artificially manufacture outputs that could easily be mistaken for real data. The goal of the discriminator is to identify which outputs it receives have been artificially created.</a:t>
-            </a:r>
-          </a:p>
-          <a:p>
-            <a:endParaRPr lang="en-US" sz="1100" b="1" i="0" dirty="0">
+            <a:r>
+              <a:rPr lang="en-US" sz="1100" b="1" i="0" dirty="0">
+                <a:solidFill>
+                  <a:srgbClr val="3C3C3B"/>
+                </a:solidFill>
+                <a:effectLst/>
+                <a:latin typeface="Calibri" panose="020F0502020204030204" pitchFamily="34" charset="0"/>
+                <a:cs typeface="Calibri" panose="020F0502020204030204" pitchFamily="34" charset="0"/>
+              </a:rPr>
+              <a:t>Recurrent neural networks (RNNs) </a:t>
+            </a:r>
+            <a:r>
+              <a:rPr lang="en-US" sz="1100" b="0" i="0" dirty="0">
+                <a:solidFill>
+                  <a:srgbClr val="3C3C3B"/>
+                </a:solidFill>
+                <a:effectLst/>
+                <a:latin typeface="Calibri" panose="020F0502020204030204" pitchFamily="34" charset="0"/>
+                <a:cs typeface="Calibri" panose="020F0502020204030204" pitchFamily="34" charset="0"/>
+              </a:rPr>
+              <a:t>propagate data forward, but also backwards.  As pictured here, the red arrow indicates that the hidden layer connects back to itself, thereby allowing the network to remember what it has already done.  RNN’s are a good choice for sequenced data where the order of the data elements is important.  More recently, </a:t>
+            </a:r>
+            <a:r>
+              <a:rPr lang="en-US" sz="1100" b="1" i="0" dirty="0">
+                <a:solidFill>
+                  <a:srgbClr val="3C3C3B"/>
+                </a:solidFill>
+                <a:effectLst/>
+                <a:latin typeface="Calibri" panose="020F0502020204030204" pitchFamily="34" charset="0"/>
+                <a:cs typeface="Calibri" panose="020F0502020204030204" pitchFamily="34" charset="0"/>
+              </a:rPr>
+              <a:t>Transformers</a:t>
+            </a:r>
+            <a:r>
+              <a:rPr lang="en-US" sz="1100" b="0" i="0" dirty="0">
+                <a:solidFill>
+                  <a:srgbClr val="3C3C3B"/>
+                </a:solidFill>
+                <a:effectLst/>
+                <a:latin typeface="Calibri" panose="020F0502020204030204" pitchFamily="34" charset="0"/>
+                <a:cs typeface="Calibri" panose="020F0502020204030204" pitchFamily="34" charset="0"/>
+              </a:rPr>
+              <a:t> have started to displace RNNs as they are more versatile and effective.</a:t>
+            </a:r>
+          </a:p>
+          <a:p>
+            <a:endParaRPr lang="en-US" sz="1100" b="0" i="0" dirty="0">
               <a:solidFill>
                 <a:srgbClr val="3C3C3B"/>
               </a:solidFill>
               <a:effectLst/>
-              <a:latin typeface="+mn-lt"/>
+              <a:latin typeface="Calibri" panose="020F0502020204030204" pitchFamily="34" charset="0"/>
+              <a:cs typeface="Calibri" panose="020F0502020204030204" pitchFamily="34" charset="0"/>
             </a:endParaRPr>
           </a:p>
           <a:p>
-            <a:pPr algn="l"/>
-            <a:r>
-              <a:rPr lang="en-US" sz="1800" b="0" i="0" u="none" strike="noStrike" baseline="0" dirty="0">
-                <a:latin typeface="OpenSans"/>
-              </a:rPr>
-              <a:t>GANs are a big area of research, and there are many use cases for them. Some of the useful applications of GANs are as follows:</a:t>
-            </a:r>
-          </a:p>
-          <a:p>
-            <a:pPr algn="l"/>
-            <a:endParaRPr lang="en-US" sz="1800" b="0" i="0" u="none" strike="noStrike" baseline="0" dirty="0">
-              <a:latin typeface="OpenSans"/>
+            <a:r>
+              <a:rPr lang="en-US" sz="1100" b="0" i="0" dirty="0">
+                <a:solidFill>
+                  <a:srgbClr val="3C3C3B"/>
+                </a:solidFill>
+                <a:effectLst/>
+                <a:latin typeface="Calibri" panose="020F0502020204030204" pitchFamily="34" charset="0"/>
+                <a:cs typeface="Calibri" panose="020F0502020204030204" pitchFamily="34" charset="0"/>
+              </a:rPr>
+              <a:t>Some application of RNNs include:</a:t>
+            </a:r>
+          </a:p>
+          <a:p>
+            <a:endParaRPr lang="en-US" sz="1100" b="0" i="0" dirty="0">
+              <a:solidFill>
+                <a:srgbClr val="3C3C3B"/>
+              </a:solidFill>
+              <a:effectLst/>
+              <a:latin typeface="Calibri" panose="020F0502020204030204" pitchFamily="34" charset="0"/>
+              <a:cs typeface="Calibri" panose="020F0502020204030204" pitchFamily="34" charset="0"/>
             </a:endParaRPr>
           </a:p>
           <a:p>
-            <a:pPr algn="l"/>
-            <a:r>
-              <a:rPr lang="en-US" sz="1800" b="0" i="0" u="none" strike="noStrike" baseline="0" dirty="0">
-                <a:latin typeface="OpenSans"/>
-              </a:rPr>
-              <a:t>• Image translation</a:t>
-            </a:r>
-          </a:p>
-          <a:p>
-            <a:pPr algn="l"/>
-            <a:r>
-              <a:rPr lang="en-US" sz="1800" b="0" i="0" u="none" strike="noStrike" baseline="0" dirty="0">
-                <a:latin typeface="OpenSans"/>
-              </a:rPr>
-              <a:t>• Text to image synthesis</a:t>
-            </a:r>
-          </a:p>
-          <a:p>
-            <a:pPr algn="l"/>
-            <a:r>
-              <a:rPr lang="en-US" sz="1800" b="0" i="0" u="none" strike="noStrike" baseline="0" dirty="0">
-                <a:latin typeface="OpenSans"/>
-              </a:rPr>
-              <a:t>• Generating videos</a:t>
-            </a:r>
-          </a:p>
-          <a:p>
-            <a:pPr algn="l"/>
-            <a:r>
-              <a:rPr lang="en-US" sz="1800" b="0" i="0" u="none" strike="noStrike" baseline="0" dirty="0">
-                <a:latin typeface="OpenSans"/>
-              </a:rPr>
-              <a:t>• The restoration of art</a:t>
-            </a:r>
-          </a:p>
-          <a:p>
-            <a:pPr algn="l"/>
-            <a:endParaRPr lang="en-US" sz="1800" b="0" i="0" u="none" strike="noStrike" baseline="0" dirty="0">
-              <a:latin typeface="OpenSans"/>
-            </a:endParaRPr>
+            <a:pPr marL="233309" indent="-233309">
+              <a:buFont typeface="Arial" panose="020B0604020202020204" pitchFamily="34" charset="0"/>
+              <a:buAutoNum type="arabicPeriod"/>
+            </a:pPr>
+            <a:r>
+              <a:rPr lang="en-US" sz="1100" b="0" i="0" dirty="0">
+                <a:solidFill>
+                  <a:srgbClr val="000000"/>
+                </a:solidFill>
+                <a:effectLst/>
+                <a:latin typeface="Calibri" panose="020F0502020204030204" pitchFamily="34" charset="0"/>
+                <a:cs typeface="Calibri" panose="020F0502020204030204" pitchFamily="34" charset="0"/>
+              </a:rPr>
+              <a:t>Text processing like auto suggest, grammar checks, etc.</a:t>
+            </a:r>
+          </a:p>
+          <a:p>
+            <a:pPr marL="233309" indent="-233309" defTabSz="933237">
+              <a:buFont typeface="Arial" panose="020B0604020202020204" pitchFamily="34" charset="0"/>
+              <a:buAutoNum type="arabicPeriod"/>
+              <a:defRPr/>
+            </a:pPr>
+            <a:r>
+              <a:rPr lang="en-US" sz="1100" b="0" i="0" dirty="0">
+                <a:solidFill>
+                  <a:srgbClr val="000000"/>
+                </a:solidFill>
+                <a:effectLst/>
+                <a:latin typeface="Calibri" panose="020F0502020204030204" pitchFamily="34" charset="0"/>
+                <a:cs typeface="Calibri" panose="020F0502020204030204" pitchFamily="34" charset="0"/>
+              </a:rPr>
+              <a:t>Text to speech processing</a:t>
+            </a:r>
+          </a:p>
+          <a:p>
+            <a:pPr marL="233309" indent="-233309" defTabSz="933237">
+              <a:buFont typeface="Arial" panose="020B0604020202020204" pitchFamily="34" charset="0"/>
+              <a:buAutoNum type="arabicPeriod"/>
+              <a:defRPr/>
+            </a:pPr>
+            <a:r>
+              <a:rPr lang="en-US" sz="1100" b="0" i="0" dirty="0">
+                <a:solidFill>
+                  <a:srgbClr val="000000"/>
+                </a:solidFill>
+                <a:effectLst/>
+                <a:latin typeface="Calibri" panose="020F0502020204030204" pitchFamily="34" charset="0"/>
+                <a:cs typeface="Calibri" panose="020F0502020204030204" pitchFamily="34" charset="0"/>
+              </a:rPr>
+              <a:t>Sentiment Analysis</a:t>
+            </a:r>
+          </a:p>
+          <a:p>
+            <a:pPr marL="233309" indent="-233309" defTabSz="933237">
+              <a:buFont typeface="Arial" panose="020B0604020202020204" pitchFamily="34" charset="0"/>
+              <a:buAutoNum type="arabicPeriod"/>
+              <a:defRPr/>
+            </a:pPr>
+            <a:r>
+              <a:rPr lang="en-US" sz="1100" b="0" i="0" dirty="0">
+                <a:solidFill>
+                  <a:srgbClr val="000000"/>
+                </a:solidFill>
+                <a:effectLst/>
+                <a:latin typeface="Calibri" panose="020F0502020204030204" pitchFamily="34" charset="0"/>
+                <a:cs typeface="Calibri" panose="020F0502020204030204" pitchFamily="34" charset="0"/>
+              </a:rPr>
+              <a:t>Time sequence projections</a:t>
+            </a:r>
+          </a:p>
+          <a:p>
+            <a:pPr marL="233309" indent="-233309" defTabSz="933237">
+              <a:buFont typeface="Arial" panose="020B0604020202020204" pitchFamily="34" charset="0"/>
+              <a:buAutoNum type="arabicPeriod"/>
+              <a:defRPr/>
+            </a:pPr>
+            <a:r>
+              <a:rPr lang="en-US" sz="1100" b="0" i="0" dirty="0">
+                <a:solidFill>
+                  <a:srgbClr val="000000"/>
+                </a:solidFill>
+                <a:effectLst/>
+                <a:latin typeface="Calibri" panose="020F0502020204030204" pitchFamily="34" charset="0"/>
+                <a:cs typeface="Calibri" panose="020F0502020204030204" pitchFamily="34" charset="0"/>
+              </a:rPr>
+              <a:t>Translation</a:t>
+            </a:r>
           </a:p>
         </p:txBody>
       </p:sp>
@@ -2078,7 +1978,7 @@
     </p:spTree>
     <p:extLst>
       <p:ext uri="{BB962C8B-B14F-4D97-AF65-F5344CB8AC3E}">
-        <p14:creationId xmlns:p14="http://schemas.microsoft.com/office/powerpoint/2010/main" val="2474625203"/>
+        <p14:creationId xmlns:p14="http://schemas.microsoft.com/office/powerpoint/2010/main" val="4149381120"/>
       </p:ext>
     </p:extLst>
   </p:cSld>
@@ -2132,26 +2032,107 @@
           <a:bodyPr/>
           <a:lstStyle/>
           <a:p>
-            <a:r>
-              <a:rPr lang="en-US" dirty="0"/>
-              <a:t>For additional practice, I recommend that you read the </a:t>
-            </a:r>
-            <a:r>
-              <a:rPr lang="en-US" i="1" dirty="0"/>
-              <a:t>Introduction to Tensorflow </a:t>
-            </a:r>
-            <a:r>
-              <a:rPr lang="en-US" dirty="0"/>
-              <a:t>as well as the </a:t>
-            </a:r>
-            <a:r>
-              <a:rPr lang="en-US" i="1" dirty="0"/>
-              <a:t>Linear Algebra with Tensorflow </a:t>
-            </a:r>
-            <a:r>
-              <a:rPr lang="en-US" dirty="0"/>
-              <a:t>sections, found in the latter half of chapter 1 of our textbook.  The exercises listed in this slide review the basic operations of linear algebra – matrix multiplication, etc…  The matrix multiplication video embedded in the 01.2_linear_algebra notebook is also worth watching.</a:t>
-            </a:r>
+            <a:pPr marL="0" marR="0" lvl="0" indent="0" algn="l" defTabSz="914400" rtl="0" eaLnBrk="1" fontAlgn="auto" latinLnBrk="0" hangingPunct="1">
+              <a:lnSpc>
+                <a:spcPct val="100000"/>
+              </a:lnSpc>
+              <a:spcBef>
+                <a:spcPts val="0"/>
+              </a:spcBef>
+              <a:spcAft>
+                <a:spcPts val="0"/>
+              </a:spcAft>
+              <a:buClrTx/>
+              <a:buSzTx/>
+              <a:buFontTx/>
+              <a:buNone/>
+              <a:tabLst/>
+              <a:defRPr/>
+            </a:pPr>
+            <a:r>
+              <a:rPr lang="en-US" sz="1100" dirty="0">
+                <a:latin typeface="+mn-lt"/>
+              </a:rPr>
+              <a:t>A </a:t>
+            </a:r>
+            <a:r>
+              <a:rPr lang="en-US" sz="1100" b="1" dirty="0">
+                <a:latin typeface="+mn-lt"/>
+              </a:rPr>
+              <a:t>generative adversarial network (GAN) </a:t>
+            </a:r>
+            <a:r>
+              <a:rPr lang="en-US" sz="1100" dirty="0">
+                <a:latin typeface="+mn-lt"/>
+              </a:rPr>
+              <a:t>is a model in which two neural networks compete with each other to become more accurate in their predictions.  The two neural networks that make up a GAN are referred to as the generator and the discriminator. The goal of the generator is to artificially manufacture outputs that could easily be mistaken for real data. The goal of the discriminator is to identify which outputs it receives have been artificially created.</a:t>
+            </a:r>
+          </a:p>
+          <a:p>
+            <a:endParaRPr lang="en-US" sz="1100" b="1" i="0" dirty="0">
+              <a:solidFill>
+                <a:srgbClr val="3C3C3B"/>
+              </a:solidFill>
+              <a:effectLst/>
+              <a:latin typeface="+mn-lt"/>
+            </a:endParaRPr>
+          </a:p>
+          <a:p>
+            <a:pPr algn="l"/>
+            <a:r>
+              <a:rPr lang="en-US" sz="1800" b="0" i="0" u="none" strike="noStrike" baseline="0" dirty="0">
+                <a:latin typeface="OpenSans"/>
+              </a:rPr>
+              <a:t>GANs are a big area of research, and there are many use cases for them. Some of the useful applications of GANs are as follows:</a:t>
+            </a:r>
+          </a:p>
+          <a:p>
+            <a:pPr algn="l"/>
+            <a:endParaRPr lang="en-US" sz="1800" b="0" i="0" u="none" strike="noStrike" baseline="0" dirty="0">
+              <a:latin typeface="OpenSans"/>
+            </a:endParaRPr>
+          </a:p>
+          <a:p>
+            <a:pPr algn="l"/>
+            <a:r>
+              <a:rPr lang="en-US" sz="1800" b="0" i="0" u="none" strike="noStrike" baseline="0" dirty="0">
+                <a:latin typeface="OpenSans"/>
+              </a:rPr>
+              <a:t>• Image translation</a:t>
+            </a:r>
+          </a:p>
+          <a:p>
+            <a:pPr algn="l"/>
+            <a:r>
+              <a:rPr lang="en-US" sz="1800" b="0" i="0" u="none" strike="noStrike" baseline="0" dirty="0">
+                <a:latin typeface="OpenSans"/>
+              </a:rPr>
+              <a:t>• Text to image synthesis</a:t>
+            </a:r>
+          </a:p>
+          <a:p>
+            <a:pPr algn="l"/>
+            <a:r>
+              <a:rPr lang="en-US" sz="1800" b="0" i="0" u="none" strike="noStrike" baseline="0" dirty="0">
+                <a:latin typeface="OpenSans"/>
+              </a:rPr>
+              <a:t>• Generating videos</a:t>
+            </a:r>
+          </a:p>
+          <a:p>
+            <a:pPr algn="l"/>
+            <a:r>
+              <a:rPr lang="en-US" sz="1800" b="0" i="0" u="none" strike="noStrike" baseline="0" dirty="0">
+                <a:latin typeface="OpenSans"/>
+              </a:rPr>
+              <a:t>• The restoration of art</a:t>
+            </a:r>
+          </a:p>
+          <a:p>
+            <a:pPr algn="l"/>
+            <a:endParaRPr lang="en-US" sz="1800" b="0" i="0" u="none" strike="noStrike" baseline="0" dirty="0">
+              <a:latin typeface="OpenSans"/>
+            </a:endParaRPr>
           </a:p>
         </p:txBody>
       </p:sp>
@@ -2181,7 +2162,7 @@
     </p:spTree>
     <p:extLst>
       <p:ext uri="{BB962C8B-B14F-4D97-AF65-F5344CB8AC3E}">
-        <p14:creationId xmlns:p14="http://schemas.microsoft.com/office/powerpoint/2010/main" val="1974960137"/>
+        <p14:creationId xmlns:p14="http://schemas.microsoft.com/office/powerpoint/2010/main" val="2474625203"/>
       </p:ext>
     </p:extLst>
   </p:cSld>
@@ -2265,7 +2246,7 @@
     </p:spTree>
     <p:extLst>
       <p:ext uri="{BB962C8B-B14F-4D97-AF65-F5344CB8AC3E}">
-        <p14:creationId xmlns:p14="http://schemas.microsoft.com/office/powerpoint/2010/main" val="3573760847"/>
+        <p14:creationId xmlns:p14="http://schemas.microsoft.com/office/powerpoint/2010/main" val="1974960137"/>
       </p:ext>
     </p:extLst>
   </p:cSld>
@@ -2413,10 +2394,7 @@
           <a:bodyPr/>
           <a:lstStyle/>
           <a:p>
-            <a:r>
-              <a:rPr lang="en-US" dirty="0"/>
-              <a:t>Now for those of you who have not worked in a JupyterLab environment, we encourage you to watch our Introduction to JupyterLab video.</a:t>
-            </a:r>
+            <a:endParaRPr lang="en-US" dirty="0"/>
           </a:p>
         </p:txBody>
       </p:sp>
@@ -2446,7 +2424,7 @@
     </p:spTree>
     <p:extLst>
       <p:ext uri="{BB962C8B-B14F-4D97-AF65-F5344CB8AC3E}">
-        <p14:creationId xmlns:p14="http://schemas.microsoft.com/office/powerpoint/2010/main" val="1328824333"/>
+        <p14:creationId xmlns:p14="http://schemas.microsoft.com/office/powerpoint/2010/main" val="3573760847"/>
       </p:ext>
     </p:extLst>
   </p:cSld>
@@ -2638,7 +2616,7 @@
                   </a:schemeClr>
                 </a:solidFill>
               </a:rPr>
-              <a:t>Higher level understanding – the various dials and gauges (hyperparameters) – Google Teachable Machine introduced these.</a:t>
+              <a:t>Higher level understanding – the various dials and gauges (hyperparameters) </a:t>
             </a:r>
           </a:p>
           <a:p>
@@ -2884,7 +2862,7 @@
                 <a:ea typeface="+mn-ea"/>
                 <a:cs typeface="+mn-cs"/>
               </a:rPr>
-              <a:t>Review of content from What is AI workshop</a:t>
+              <a:t>This graphic comes from our “What is AI” workshop</a:t>
             </a:r>
           </a:p>
           <a:p>
@@ -4019,9 +3997,21 @@
           <a:bodyPr/>
           <a:lstStyle/>
           <a:p>
+            <a:pPr marL="228600" indent="-228600">
+              <a:buAutoNum type="arabicPeriod"/>
+            </a:pPr>
             <a:r>
               <a:rPr lang="en-US" dirty="0"/>
-              <a:t>The exercise for this learning experience starts on page 7 of the textbook.  For additional information, please watch the exercise 1.01 orientation video.</a:t>
+              <a:t>Overview of Jupyter &amp; CoLab</a:t>
+            </a:r>
+          </a:p>
+          <a:p>
+            <a:pPr marL="228600" indent="-228600">
+              <a:buAutoNum type="arabicPeriod"/>
+            </a:pPr>
+            <a:r>
+              <a:rPr lang="en-US" dirty="0"/>
+              <a:t>Clone the repository</a:t>
             </a:r>
           </a:p>
         </p:txBody>
@@ -4052,7 +4042,7 @@
     </p:spTree>
     <p:extLst>
       <p:ext uri="{BB962C8B-B14F-4D97-AF65-F5344CB8AC3E}">
-        <p14:creationId xmlns:p14="http://schemas.microsoft.com/office/powerpoint/2010/main" val="2279087846"/>
+        <p14:creationId xmlns:p14="http://schemas.microsoft.com/office/powerpoint/2010/main" val="1328824333"/>
       </p:ext>
     </p:extLst>
   </p:cSld>
@@ -4209,7 +4199,7 @@
           <a:p>
             <a:fld id="{C3F78080-8D0A-4BE8-A5B4-CB115102D524}" type="datetimeFigureOut">
               <a:rPr lang="en-US" smtClean="0"/>
-              <a:t>3/21/2022</a:t>
+              <a:t>6/20/2022</a:t>
             </a:fld>
             <a:endParaRPr lang="en-US"/>
           </a:p>
@@ -4407,7 +4397,7 @@
           <a:p>
             <a:fld id="{C3F78080-8D0A-4BE8-A5B4-CB115102D524}" type="datetimeFigureOut">
               <a:rPr lang="en-US" smtClean="0"/>
-              <a:t>3/21/2022</a:t>
+              <a:t>6/20/2022</a:t>
             </a:fld>
             <a:endParaRPr lang="en-US"/>
           </a:p>
@@ -4615,7 +4605,7 @@
           <a:p>
             <a:fld id="{C3F78080-8D0A-4BE8-A5B4-CB115102D524}" type="datetimeFigureOut">
               <a:rPr lang="en-US" smtClean="0"/>
-              <a:t>3/21/2022</a:t>
+              <a:t>6/20/2022</a:t>
             </a:fld>
             <a:endParaRPr lang="en-US"/>
           </a:p>
@@ -4813,7 +4803,7 @@
           <a:p>
             <a:fld id="{C3F78080-8D0A-4BE8-A5B4-CB115102D524}" type="datetimeFigureOut">
               <a:rPr lang="en-US" smtClean="0"/>
-              <a:t>3/21/2022</a:t>
+              <a:t>6/20/2022</a:t>
             </a:fld>
             <a:endParaRPr lang="en-US"/>
           </a:p>
@@ -5088,7 +5078,7 @@
           <a:p>
             <a:fld id="{C3F78080-8D0A-4BE8-A5B4-CB115102D524}" type="datetimeFigureOut">
               <a:rPr lang="en-US" smtClean="0"/>
-              <a:t>3/21/2022</a:t>
+              <a:t>6/20/2022</a:t>
             </a:fld>
             <a:endParaRPr lang="en-US"/>
           </a:p>
@@ -5353,7 +5343,7 @@
           <a:p>
             <a:fld id="{C3F78080-8D0A-4BE8-A5B4-CB115102D524}" type="datetimeFigureOut">
               <a:rPr lang="en-US" smtClean="0"/>
-              <a:t>3/21/2022</a:t>
+              <a:t>6/20/2022</a:t>
             </a:fld>
             <a:endParaRPr lang="en-US"/>
           </a:p>
@@ -5765,7 +5755,7 @@
           <a:p>
             <a:fld id="{C3F78080-8D0A-4BE8-A5B4-CB115102D524}" type="datetimeFigureOut">
               <a:rPr lang="en-US" smtClean="0"/>
-              <a:t>3/21/2022</a:t>
+              <a:t>6/20/2022</a:t>
             </a:fld>
             <a:endParaRPr lang="en-US"/>
           </a:p>
@@ -5906,7 +5896,7 @@
           <a:p>
             <a:fld id="{C3F78080-8D0A-4BE8-A5B4-CB115102D524}" type="datetimeFigureOut">
               <a:rPr lang="en-US" smtClean="0"/>
-              <a:t>3/21/2022</a:t>
+              <a:t>6/20/2022</a:t>
             </a:fld>
             <a:endParaRPr lang="en-US"/>
           </a:p>
@@ -6019,7 +6009,7 @@
           <a:p>
             <a:fld id="{C3F78080-8D0A-4BE8-A5B4-CB115102D524}" type="datetimeFigureOut">
               <a:rPr lang="en-US" smtClean="0"/>
-              <a:t>3/21/2022</a:t>
+              <a:t>6/20/2022</a:t>
             </a:fld>
             <a:endParaRPr lang="en-US"/>
           </a:p>
@@ -6330,7 +6320,7 @@
           <a:p>
             <a:fld id="{C3F78080-8D0A-4BE8-A5B4-CB115102D524}" type="datetimeFigureOut">
               <a:rPr lang="en-US" smtClean="0"/>
-              <a:t>3/21/2022</a:t>
+              <a:t>6/20/2022</a:t>
             </a:fld>
             <a:endParaRPr lang="en-US"/>
           </a:p>
@@ -6618,7 +6608,7 @@
           <a:p>
             <a:fld id="{C3F78080-8D0A-4BE8-A5B4-CB115102D524}" type="datetimeFigureOut">
               <a:rPr lang="en-US" smtClean="0"/>
-              <a:t>3/21/2022</a:t>
+              <a:t>6/20/2022</a:t>
             </a:fld>
             <a:endParaRPr lang="en-US"/>
           </a:p>
@@ -6859,7 +6849,7 @@
           <a:p>
             <a:fld id="{C3F78080-8D0A-4BE8-A5B4-CB115102D524}" type="datetimeFigureOut">
               <a:rPr lang="en-US" smtClean="0"/>
-              <a:t>3/21/2022</a:t>
+              <a:t>6/20/2022</a:t>
             </a:fld>
             <a:endParaRPr lang="en-US"/>
           </a:p>
@@ -7390,6 +7380,278 @@
           <a:chExt cx="0" cy="0"/>
         </a:xfrm>
       </p:grpSpPr>
+      <p:pic>
+        <p:nvPicPr>
+          <p:cNvPr id="4" name="Picture 3">
+            <a:extLst>
+              <a:ext uri="{FF2B5EF4-FFF2-40B4-BE49-F238E27FC236}">
+                <a16:creationId xmlns:a16="http://schemas.microsoft.com/office/drawing/2014/main" id="{539F426C-5A30-441C-B0C2-04ADFC8CE324}"/>
+              </a:ext>
+            </a:extLst>
+          </p:cNvPr>
+          <p:cNvPicPr>
+            <a:picLocks noChangeAspect="1"/>
+          </p:cNvPicPr>
+          <p:nvPr/>
+        </p:nvPicPr>
+        <p:blipFill>
+          <a:blip r:embed="rId3"/>
+          <a:stretch>
+            <a:fillRect/>
+          </a:stretch>
+        </p:blipFill>
+        <p:spPr>
+          <a:xfrm>
+            <a:off x="0" y="365760"/>
+            <a:ext cx="3233668" cy="805144"/>
+          </a:xfrm>
+          <a:prstGeom prst="rect">
+            <a:avLst/>
+          </a:prstGeom>
+        </p:spPr>
+      </p:pic>
+      <p:sp>
+        <p:nvSpPr>
+          <p:cNvPr id="5" name="Title 1">
+            <a:extLst>
+              <a:ext uri="{FF2B5EF4-FFF2-40B4-BE49-F238E27FC236}">
+                <a16:creationId xmlns:a16="http://schemas.microsoft.com/office/drawing/2014/main" id="{B1DC3772-3811-4D33-8C3E-73B5414A38FE}"/>
+              </a:ext>
+            </a:extLst>
+          </p:cNvPr>
+          <p:cNvSpPr txBox="1">
+            <a:spLocks/>
+          </p:cNvSpPr>
+          <p:nvPr/>
+        </p:nvSpPr>
+        <p:spPr>
+          <a:xfrm>
+            <a:off x="0" y="2883665"/>
+            <a:ext cx="12192000" cy="1090669"/>
+          </a:xfrm>
+          <a:prstGeom prst="rect">
+            <a:avLst/>
+          </a:prstGeom>
+          <a:noFill/>
+        </p:spPr>
+        <p:txBody>
+          <a:bodyPr vert="horz" lIns="91440" tIns="45720" rIns="91440" bIns="45720" rtlCol="0" anchor="b">
+            <a:noAutofit/>
+          </a:bodyPr>
+          <a:lstStyle>
+            <a:lvl1pPr algn="l" defTabSz="914400" rtl="0" eaLnBrk="1" latinLnBrk="0" hangingPunct="1">
+              <a:lnSpc>
+                <a:spcPct val="90000"/>
+              </a:lnSpc>
+              <a:spcBef>
+                <a:spcPct val="0"/>
+              </a:spcBef>
+              <a:buNone/>
+              <a:defRPr sz="6000" kern="1200">
+                <a:solidFill>
+                  <a:schemeClr val="tx1"/>
+                </a:solidFill>
+                <a:latin typeface="+mj-lt"/>
+                <a:ea typeface="+mj-ea"/>
+                <a:cs typeface="+mj-cs"/>
+              </a:defRPr>
+            </a:lvl1pPr>
+          </a:lstStyle>
+          <a:p>
+            <a:pPr algn="ctr"/>
+            <a:br>
+              <a:rPr lang="en-US" sz="3600" dirty="0">
+                <a:solidFill>
+                  <a:schemeClr val="tx1">
+                    <a:lumMod val="65000"/>
+                    <a:lumOff val="35000"/>
+                  </a:schemeClr>
+                </a:solidFill>
+              </a:rPr>
+            </a:br>
+            <a:br>
+              <a:rPr lang="en-US" sz="3600" dirty="0">
+                <a:solidFill>
+                  <a:schemeClr val="tx1">
+                    <a:lumMod val="65000"/>
+                    <a:lumOff val="35000"/>
+                  </a:schemeClr>
+                </a:solidFill>
+              </a:rPr>
+            </a:br>
+            <a:br>
+              <a:rPr lang="en-US" sz="3600" dirty="0">
+                <a:solidFill>
+                  <a:schemeClr val="tx1">
+                    <a:lumMod val="65000"/>
+                    <a:lumOff val="35000"/>
+                  </a:schemeClr>
+                </a:solidFill>
+              </a:rPr>
+            </a:br>
+            <a:br>
+              <a:rPr lang="en-US" sz="3600" dirty="0">
+                <a:solidFill>
+                  <a:schemeClr val="tx1">
+                    <a:lumMod val="65000"/>
+                    <a:lumOff val="35000"/>
+                  </a:schemeClr>
+                </a:solidFill>
+              </a:rPr>
+            </a:br>
+            <a:br>
+              <a:rPr lang="en-US" sz="3600" dirty="0">
+                <a:solidFill>
+                  <a:schemeClr val="tx1">
+                    <a:lumMod val="65000"/>
+                    <a:lumOff val="35000"/>
+                  </a:schemeClr>
+                </a:solidFill>
+              </a:rPr>
+            </a:br>
+            <a:br>
+              <a:rPr lang="en-US" sz="3600" dirty="0">
+                <a:solidFill>
+                  <a:schemeClr val="tx1">
+                    <a:lumMod val="65000"/>
+                    <a:lumOff val="35000"/>
+                  </a:schemeClr>
+                </a:solidFill>
+              </a:rPr>
+            </a:br>
+            <a:br>
+              <a:rPr lang="en-US" sz="3600" dirty="0">
+                <a:solidFill>
+                  <a:schemeClr val="tx1">
+                    <a:lumMod val="65000"/>
+                    <a:lumOff val="35000"/>
+                  </a:schemeClr>
+                </a:solidFill>
+              </a:rPr>
+            </a:br>
+            <a:br>
+              <a:rPr lang="en-US" sz="3600" dirty="0">
+                <a:solidFill>
+                  <a:schemeClr val="tx1">
+                    <a:lumMod val="65000"/>
+                    <a:lumOff val="35000"/>
+                  </a:schemeClr>
+                </a:solidFill>
+              </a:rPr>
+            </a:br>
+            <a:r>
+              <a:rPr lang="en-US" sz="3600" dirty="0">
+                <a:solidFill>
+                  <a:schemeClr val="tx1">
+                    <a:lumMod val="65000"/>
+                    <a:lumOff val="35000"/>
+                  </a:schemeClr>
+                </a:solidFill>
+              </a:rPr>
+              <a:t>     </a:t>
+            </a:r>
+            <a:r>
+              <a:rPr lang="en-US" sz="3600" dirty="0">
+                <a:solidFill>
+                  <a:schemeClr val="tx1">
+                    <a:lumMod val="65000"/>
+                    <a:lumOff val="35000"/>
+                  </a:schemeClr>
+                </a:solidFill>
+                <a:latin typeface="Palatino Linotype" panose="02040502050505030304" pitchFamily="18" charset="0"/>
+              </a:rPr>
+              <a:t>(A Simple Classification Model)</a:t>
+            </a:r>
+            <a:br>
+              <a:rPr lang="en-US" sz="3600" dirty="0">
+                <a:solidFill>
+                  <a:schemeClr val="tx1">
+                    <a:lumMod val="65000"/>
+                    <a:lumOff val="35000"/>
+                  </a:schemeClr>
+                </a:solidFill>
+                <a:latin typeface="Palatino Linotype" panose="02040502050505030304" pitchFamily="18" charset="0"/>
+              </a:rPr>
+            </a:br>
+            <a:r>
+              <a:rPr lang="en-US" sz="3600" dirty="0">
+                <a:solidFill>
+                  <a:schemeClr val="tx1">
+                    <a:lumMod val="65000"/>
+                    <a:lumOff val="35000"/>
+                  </a:schemeClr>
+                </a:solidFill>
+                <a:latin typeface="Palatino Linotype" panose="02040502050505030304" pitchFamily="18" charset="0"/>
+              </a:rPr>
+              <a:t>     </a:t>
+            </a:r>
+            <a:r>
+              <a:rPr lang="en-US" sz="2800" dirty="0">
+                <a:solidFill>
+                  <a:schemeClr val="tx1">
+                    <a:lumMod val="65000"/>
+                    <a:lumOff val="35000"/>
+                  </a:schemeClr>
+                </a:solidFill>
+                <a:latin typeface="Palatino Linotype" panose="02040502050505030304" pitchFamily="18" charset="0"/>
+              </a:rPr>
+              <a:t>01.1_resnet.ipynb</a:t>
+            </a:r>
+            <a:endParaRPr lang="en-US" sz="2800" dirty="0">
+              <a:solidFill>
+                <a:schemeClr val="tx1">
+                  <a:lumMod val="65000"/>
+                  <a:lumOff val="35000"/>
+                </a:schemeClr>
+              </a:solidFill>
+              <a:latin typeface="Palatino Linotype" panose="02040502050505030304" pitchFamily="18" charset="0"/>
+              <a:cs typeface="Segoe UI Light" panose="020B0502040204020203" pitchFamily="34" charset="0"/>
+            </a:endParaRPr>
+          </a:p>
+        </p:txBody>
+      </p:sp>
+    </p:spTree>
+    <p:extLst>
+      <p:ext uri="{BB962C8B-B14F-4D97-AF65-F5344CB8AC3E}">
+        <p14:creationId xmlns:p14="http://schemas.microsoft.com/office/powerpoint/2010/main" val="300486163"/>
+      </p:ext>
+    </p:extLst>
+  </p:cSld>
+  <p:clrMapOvr>
+    <a:masterClrMapping/>
+  </p:clrMapOvr>
+  <mc:AlternateContent xmlns:mc="http://schemas.openxmlformats.org/markup-compatibility/2006" xmlns:p14="http://schemas.microsoft.com/office/powerpoint/2010/main">
+    <mc:Choice Requires="p14">
+      <p:transition spd="med" p14:dur="700">
+        <p:fade/>
+      </p:transition>
+    </mc:Choice>
+    <mc:Fallback xmlns="">
+      <p:transition spd="med">
+        <p:fade/>
+      </p:transition>
+    </mc:Fallback>
+  </mc:AlternateContent>
+</p:sld>
+</file>
+
+<file path=ppt/slides/slide11.xml><?xml version="1.0" encoding="utf-8"?>
+<p:sld xmlns:a="http://schemas.openxmlformats.org/drawingml/2006/main" xmlns:r="http://schemas.openxmlformats.org/officeDocument/2006/relationships" xmlns:p="http://schemas.openxmlformats.org/presentationml/2006/main">
+  <p:cSld>
+    <p:spTree>
+      <p:nvGrpSpPr>
+        <p:cNvPr id="1" name=""/>
+        <p:cNvGrpSpPr/>
+        <p:nvPr/>
+      </p:nvGrpSpPr>
+      <p:grpSpPr>
+        <a:xfrm>
+          <a:off x="0" y="0"/>
+          <a:ext cx="0" cy="0"/>
+          <a:chOff x="0" y="0"/>
+          <a:chExt cx="0" cy="0"/>
+        </a:xfrm>
+      </p:grpSpPr>
       <p:sp>
         <p:nvSpPr>
           <p:cNvPr id="10" name="TextBox 9">
@@ -7517,7 +7779,7 @@
 </p:sld>
 </file>
 
-<file path=ppt/slides/slide11.xml><?xml version="1.0" encoding="utf-8"?>
+<file path=ppt/slides/slide12.xml><?xml version="1.0" encoding="utf-8"?>
 <p:sld xmlns:a="http://schemas.openxmlformats.org/drawingml/2006/main" xmlns:r="http://schemas.openxmlformats.org/officeDocument/2006/relationships" xmlns:p="http://schemas.openxmlformats.org/presentationml/2006/main">
   <p:cSld>
     <p:spTree>
@@ -7683,7 +7945,7 @@
 </p:sld>
 </file>
 
-<file path=ppt/slides/slide12.xml><?xml version="1.0" encoding="utf-8"?>
+<file path=ppt/slides/slide13.xml><?xml version="1.0" encoding="utf-8"?>
 <p:sld xmlns:a="http://schemas.openxmlformats.org/drawingml/2006/main" xmlns:r="http://schemas.openxmlformats.org/officeDocument/2006/relationships" xmlns:p="http://schemas.openxmlformats.org/presentationml/2006/main">
   <p:cSld>
     <p:spTree>
@@ -7794,7 +8056,7 @@
 </p:sld>
 </file>
 
-<file path=ppt/slides/slide13.xml><?xml version="1.0" encoding="utf-8"?>
+<file path=ppt/slides/slide14.xml><?xml version="1.0" encoding="utf-8"?>
 <p:sld xmlns:a="http://schemas.openxmlformats.org/drawingml/2006/main" xmlns:r="http://schemas.openxmlformats.org/officeDocument/2006/relationships" xmlns:p="http://schemas.openxmlformats.org/presentationml/2006/main">
   <p:cSld>
     <p:spTree>
@@ -8041,7 +8303,7 @@
 </p:sld>
 </file>
 
-<file path=ppt/slides/slide14.xml><?xml version="1.0" encoding="utf-8"?>
+<file path=ppt/slides/slide15.xml><?xml version="1.0" encoding="utf-8"?>
 <p:sld xmlns:a="http://schemas.openxmlformats.org/drawingml/2006/main" xmlns:r="http://schemas.openxmlformats.org/officeDocument/2006/relationships" xmlns:p="http://schemas.openxmlformats.org/presentationml/2006/main">
   <p:cSld>
     <p:bg>
@@ -8160,7 +8422,7 @@
 </p:sld>
 </file>
 
-<file path=ppt/slides/slide15.xml><?xml version="1.0" encoding="utf-8"?>
+<file path=ppt/slides/slide16.xml><?xml version="1.0" encoding="utf-8"?>
 <p:sld xmlns:a="http://schemas.openxmlformats.org/drawingml/2006/main" xmlns:r="http://schemas.openxmlformats.org/officeDocument/2006/relationships" xmlns:p="http://schemas.openxmlformats.org/presentationml/2006/main">
   <p:cSld>
     <p:spTree>
@@ -8271,7 +8533,7 @@
 </p:sld>
 </file>
 
-<file path=ppt/slides/slide16.xml><?xml version="1.0" encoding="utf-8"?>
+<file path=ppt/slides/slide17.xml><?xml version="1.0" encoding="utf-8"?>
 <p:sld xmlns:a="http://schemas.openxmlformats.org/drawingml/2006/main" xmlns:r="http://schemas.openxmlformats.org/officeDocument/2006/relationships" xmlns:p="http://schemas.openxmlformats.org/presentationml/2006/main">
   <p:cSld>
     <p:spTree>
@@ -8382,7 +8644,7 @@
 </p:sld>
 </file>
 
-<file path=ppt/slides/slide17.xml><?xml version="1.0" encoding="utf-8"?>
+<file path=ppt/slides/slide18.xml><?xml version="1.0" encoding="utf-8"?>
 <p:sld xmlns:a="http://schemas.openxmlformats.org/drawingml/2006/main" xmlns:r="http://schemas.openxmlformats.org/officeDocument/2006/relationships" xmlns:p="http://schemas.openxmlformats.org/presentationml/2006/main">
   <p:cSld>
     <p:spTree>
@@ -8493,7 +8755,7 @@
 </p:sld>
 </file>
 
-<file path=ppt/slides/slide18.xml><?xml version="1.0" encoding="utf-8"?>
+<file path=ppt/slides/slide19.xml><?xml version="1.0" encoding="utf-8"?>
 <p:sld xmlns:a="http://schemas.openxmlformats.org/drawingml/2006/main" xmlns:r="http://schemas.openxmlformats.org/officeDocument/2006/relationships" xmlns:p="http://schemas.openxmlformats.org/presentationml/2006/main">
   <p:cSld>
     <p:spTree>
@@ -8542,20 +8804,22 @@
       </p:pic>
       <p:sp>
         <p:nvSpPr>
-          <p:cNvPr id="8" name="TextBox 7">
+          <p:cNvPr id="4" name="Title 1">
             <a:extLst>
               <a:ext uri="{FF2B5EF4-FFF2-40B4-BE49-F238E27FC236}">
-                <a16:creationId xmlns:a16="http://schemas.microsoft.com/office/drawing/2014/main" id="{4AD8EB02-F5C0-4262-A653-4F56FF9C406E}"/>
+                <a16:creationId xmlns:a16="http://schemas.microsoft.com/office/drawing/2014/main" id="{074D5D9A-A4E8-45A6-897D-5EA85164402A}"/>
               </a:ext>
             </a:extLst>
           </p:cNvPr>
-          <p:cNvSpPr txBox="1"/>
+          <p:cNvSpPr txBox="1">
+            <a:spLocks/>
+          </p:cNvSpPr>
           <p:nvPr/>
         </p:nvSpPr>
         <p:spPr>
           <a:xfrm>
-            <a:off x="477981" y="2265724"/>
-            <a:ext cx="11236037" cy="3046988"/>
+            <a:off x="0" y="2883665"/>
+            <a:ext cx="12192000" cy="1090669"/>
           </a:xfrm>
           <a:prstGeom prst="rect">
             <a:avLst/>
@@ -8563,91 +8827,178 @@
           <a:noFill/>
         </p:spPr>
         <p:txBody>
-          <a:bodyPr wrap="square">
-            <a:spAutoFit/>
+          <a:bodyPr vert="horz" lIns="91440" tIns="45720" rIns="91440" bIns="45720" rtlCol="0" anchor="b">
+            <a:noAutofit/>
           </a:bodyPr>
-          <a:lstStyle/>
-          <a:p>
-            <a:pPr algn="l"/>
-            <a:r>
-              <a:rPr lang="en-US" sz="2400" b="0" i="0" dirty="0">
-                <a:effectLst/>
+          <a:lstStyle>
+            <a:lvl1pPr algn="l" defTabSz="914400" rtl="0" eaLnBrk="1" latinLnBrk="0" hangingPunct="1">
+              <a:lnSpc>
+                <a:spcPct val="90000"/>
+              </a:lnSpc>
+              <a:spcBef>
+                <a:spcPct val="0"/>
+              </a:spcBef>
+              <a:buNone/>
+              <a:defRPr sz="6000" kern="1200">
+                <a:solidFill>
+                  <a:schemeClr val="tx1"/>
+                </a:solidFill>
+                <a:latin typeface="+mj-lt"/>
+                <a:ea typeface="+mj-ea"/>
+                <a:cs typeface="+mj-cs"/>
+              </a:defRPr>
+            </a:lvl1pPr>
+          </a:lstStyle>
+          <a:p>
+            <a:pPr algn="ctr"/>
+            <a:br>
+              <a:rPr lang="en-US" sz="3600" dirty="0">
+                <a:solidFill>
+                  <a:schemeClr val="tx1">
+                    <a:lumMod val="65000"/>
+                    <a:lumOff val="35000"/>
+                  </a:schemeClr>
+                </a:solidFill>
+              </a:rPr>
+            </a:br>
+            <a:br>
+              <a:rPr lang="en-US" sz="3600" dirty="0">
+                <a:solidFill>
+                  <a:schemeClr val="tx1">
+                    <a:lumMod val="65000"/>
+                    <a:lumOff val="35000"/>
+                  </a:schemeClr>
+                </a:solidFill>
+              </a:rPr>
+            </a:br>
+            <a:br>
+              <a:rPr lang="en-US" sz="3600" dirty="0">
+                <a:solidFill>
+                  <a:schemeClr val="tx1">
+                    <a:lumMod val="65000"/>
+                    <a:lumOff val="35000"/>
+                  </a:schemeClr>
+                </a:solidFill>
+              </a:rPr>
+            </a:br>
+            <a:br>
+              <a:rPr lang="en-US" sz="3600" dirty="0">
+                <a:solidFill>
+                  <a:schemeClr val="tx1">
+                    <a:lumMod val="65000"/>
+                    <a:lumOff val="35000"/>
+                  </a:schemeClr>
+                </a:solidFill>
+              </a:rPr>
+            </a:br>
+            <a:br>
+              <a:rPr lang="en-US" sz="3600" dirty="0">
+                <a:solidFill>
+                  <a:schemeClr val="tx1">
+                    <a:lumMod val="65000"/>
+                    <a:lumOff val="35000"/>
+                  </a:schemeClr>
+                </a:solidFill>
+              </a:rPr>
+            </a:br>
+            <a:br>
+              <a:rPr lang="en-US" sz="3600" dirty="0">
+                <a:solidFill>
+                  <a:schemeClr val="tx1">
+                    <a:lumMod val="65000"/>
+                    <a:lumOff val="35000"/>
+                  </a:schemeClr>
+                </a:solidFill>
+              </a:rPr>
+            </a:br>
+            <a:br>
+              <a:rPr lang="en-US" sz="3600" dirty="0">
+                <a:solidFill>
+                  <a:schemeClr val="tx1">
+                    <a:lumMod val="65000"/>
+                    <a:lumOff val="35000"/>
+                  </a:schemeClr>
+                </a:solidFill>
+              </a:rPr>
+            </a:br>
+            <a:br>
+              <a:rPr lang="en-US" sz="3600" dirty="0">
+                <a:solidFill>
+                  <a:schemeClr val="tx1">
+                    <a:lumMod val="65000"/>
+                    <a:lumOff val="35000"/>
+                  </a:schemeClr>
+                </a:solidFill>
+              </a:rPr>
+            </a:br>
+            <a:r>
+              <a:rPr lang="en-US" sz="3600" dirty="0">
+                <a:solidFill>
+                  <a:schemeClr val="tx1">
+                    <a:lumMod val="65000"/>
+                    <a:lumOff val="35000"/>
+                  </a:schemeClr>
+                </a:solidFill>
+              </a:rPr>
+              <a:t>     </a:t>
+            </a:r>
+            <a:r>
+              <a:rPr lang="en-US" sz="3600" dirty="0">
+                <a:solidFill>
+                  <a:schemeClr val="tx1">
+                    <a:lumMod val="65000"/>
+                    <a:lumOff val="35000"/>
+                  </a:schemeClr>
+                </a:solidFill>
                 <a:latin typeface="Palatino Linotype" panose="02040502050505030304" pitchFamily="18" charset="0"/>
               </a:rPr>
-              <a:t>Complete the following exercises:</a:t>
-            </a:r>
-          </a:p>
-          <a:p>
-            <a:pPr algn="l"/>
-            <a:r>
-              <a:rPr lang="en-US" sz="2400" dirty="0">
+              <a:t>(Tensorflow Introduction)</a:t>
+            </a:r>
+            <a:br>
+              <a:rPr lang="en-US" sz="3600" dirty="0">
+                <a:solidFill>
+                  <a:schemeClr val="tx1">
+                    <a:lumMod val="65000"/>
+                    <a:lumOff val="35000"/>
+                  </a:schemeClr>
+                </a:solidFill>
                 <a:latin typeface="Palatino Linotype" panose="02040502050505030304" pitchFamily="18" charset="0"/>
               </a:rPr>
-              <a:t>	</a:t>
-            </a:r>
-            <a:r>
-              <a:rPr lang="en-US" sz="2400" b="0" i="0" dirty="0">
-                <a:effectLst/>
+            </a:br>
+            <a:r>
+              <a:rPr lang="en-US" sz="3600" dirty="0">
+                <a:solidFill>
+                  <a:schemeClr val="tx1">
+                    <a:lumMod val="65000"/>
+                    <a:lumOff val="35000"/>
+                  </a:schemeClr>
+                </a:solidFill>
                 <a:latin typeface="Palatino Linotype" panose="02040502050505030304" pitchFamily="18" charset="0"/>
               </a:rPr>
-              <a:t>Exercise 1.02</a:t>
-            </a:r>
-          </a:p>
-          <a:p>
-            <a:pPr algn="l"/>
-            <a:r>
-              <a:rPr lang="en-US" sz="2400" b="0" i="0" dirty="0">
-                <a:effectLst/>
+              <a:t>     </a:t>
+            </a:r>
+            <a:r>
+              <a:rPr lang="en-US" sz="2800" dirty="0">
+                <a:solidFill>
+                  <a:schemeClr val="tx1">
+                    <a:lumMod val="65000"/>
+                    <a:lumOff val="35000"/>
+                  </a:schemeClr>
+                </a:solidFill>
                 <a:latin typeface="Palatino Linotype" panose="02040502050505030304" pitchFamily="18" charset="0"/>
               </a:rPr>
-              <a:t>	Exercise 1.03</a:t>
-            </a:r>
-          </a:p>
-          <a:p>
-            <a:pPr algn="l"/>
-            <a:r>
-              <a:rPr lang="en-US" sz="2400" b="0" i="0" dirty="0">
-                <a:effectLst/>
-                <a:latin typeface="Palatino Linotype" panose="02040502050505030304" pitchFamily="18" charset="0"/>
-              </a:rPr>
-              <a:t>	Exercise 1.04</a:t>
-            </a:r>
-          </a:p>
-          <a:p>
-            <a:pPr algn="l"/>
-            <a:r>
-              <a:rPr lang="en-US" sz="2400" b="0" i="0" dirty="0">
-                <a:effectLst/>
-                <a:latin typeface="Palatino Linotype" panose="02040502050505030304" pitchFamily="18" charset="0"/>
-              </a:rPr>
-              <a:t>	Exercise 1.05</a:t>
-            </a:r>
-          </a:p>
-          <a:p>
-            <a:pPr algn="l"/>
-            <a:r>
-              <a:rPr lang="en-US" sz="2400" b="0" i="0" dirty="0">
-                <a:effectLst/>
-                <a:latin typeface="Palatino Linotype" panose="02040502050505030304" pitchFamily="18" charset="0"/>
-              </a:rPr>
-              <a:t>	Exercise 1.06</a:t>
-            </a:r>
-          </a:p>
-          <a:p>
-            <a:pPr algn="l"/>
-            <a:endParaRPr lang="en-US" sz="2400" dirty="0">
+              <a:t>01.2_tensorflow_intro.ipynb</a:t>
+            </a:r>
+            <a:endParaRPr lang="en-US" sz="2800" dirty="0">
+              <a:solidFill>
+                <a:schemeClr val="tx1">
+                  <a:lumMod val="65000"/>
+                  <a:lumOff val="35000"/>
+                </a:schemeClr>
+              </a:solidFill>
               <a:latin typeface="Palatino Linotype" panose="02040502050505030304" pitchFamily="18" charset="0"/>
+              <a:cs typeface="Segoe UI Light" panose="020B0502040204020203" pitchFamily="34" charset="0"/>
             </a:endParaRPr>
-          </a:p>
-          <a:p>
-            <a:pPr algn="l"/>
-            <a:r>
-              <a:rPr lang="en-US" sz="2000" b="0" i="0" dirty="0">
-                <a:effectLst/>
-                <a:latin typeface="Palatino Linotype" panose="02040502050505030304" pitchFamily="18" charset="0"/>
-              </a:rPr>
-              <a:t>Watch the Matrix Multiplication video embedded in 01.2_linear_algebra.ipynb notebook</a:t>
-            </a:r>
           </a:p>
         </p:txBody>
       </p:sp>
@@ -8655,48 +9006,6 @@
     <p:extLst>
       <p:ext uri="{BB962C8B-B14F-4D97-AF65-F5344CB8AC3E}">
         <p14:creationId xmlns:p14="http://schemas.microsoft.com/office/powerpoint/2010/main" val="994788979"/>
-      </p:ext>
-    </p:extLst>
-  </p:cSld>
-  <p:clrMapOvr>
-    <a:masterClrMapping/>
-  </p:clrMapOvr>
-  <mc:AlternateContent xmlns:mc="http://schemas.openxmlformats.org/markup-compatibility/2006" xmlns:p14="http://schemas.microsoft.com/office/powerpoint/2010/main">
-    <mc:Choice Requires="p14">
-      <p:transition spd="med" p14:dur="700">
-        <p:fade/>
-      </p:transition>
-    </mc:Choice>
-    <mc:Fallback xmlns="">
-      <p:transition spd="med">
-        <p:fade/>
-      </p:transition>
-    </mc:Fallback>
-  </mc:AlternateContent>
-</p:sld>
-</file>
-
-<file path=ppt/slides/slide19.xml><?xml version="1.0" encoding="utf-8"?>
-<p:sld xmlns:a="http://schemas.openxmlformats.org/drawingml/2006/main" xmlns:r="http://schemas.openxmlformats.org/officeDocument/2006/relationships" xmlns:p="http://schemas.openxmlformats.org/presentationml/2006/main">
-  <p:cSld>
-    <p:spTree>
-      <p:nvGrpSpPr>
-        <p:cNvPr id="1" name=""/>
-        <p:cNvGrpSpPr/>
-        <p:nvPr/>
-      </p:nvGrpSpPr>
-      <p:grpSpPr>
-        <a:xfrm>
-          <a:off x="0" y="0"/>
-          <a:ext cx="0" cy="0"/>
-          <a:chOff x="0" y="0"/>
-          <a:chExt cx="0" cy="0"/>
-        </a:xfrm>
-      </p:grpSpPr>
-    </p:spTree>
-    <p:extLst>
-      <p:ext uri="{BB962C8B-B14F-4D97-AF65-F5344CB8AC3E}">
-        <p14:creationId xmlns:p14="http://schemas.microsoft.com/office/powerpoint/2010/main" val="1856205587"/>
       </p:ext>
     </p:extLst>
   </p:cSld>
@@ -8857,57 +9166,10 @@
           <a:chExt cx="0" cy="0"/>
         </a:xfrm>
       </p:grpSpPr>
-      <p:pic>
-        <p:nvPicPr>
-          <p:cNvPr id="1028" name="Picture 4" descr="Project Jupyter - Wikipedia">
-            <a:extLst>
-              <a:ext uri="{FF2B5EF4-FFF2-40B4-BE49-F238E27FC236}">
-                <a16:creationId xmlns:a16="http://schemas.microsoft.com/office/drawing/2014/main" id="{D47FA80A-C63A-4289-A2E5-C40C439B39C6}"/>
-              </a:ext>
-            </a:extLst>
-          </p:cNvPr>
-          <p:cNvPicPr>
-            <a:picLocks noChangeAspect="1" noChangeArrowheads="1"/>
-          </p:cNvPicPr>
-          <p:nvPr/>
-        </p:nvPicPr>
-        <p:blipFill>
-          <a:blip r:embed="rId3">
-            <a:extLst>
-              <a:ext uri="{28A0092B-C50C-407E-A947-70E740481C1C}">
-                <a14:useLocalDpi xmlns:a14="http://schemas.microsoft.com/office/drawing/2010/main" val="0"/>
-              </a:ext>
-            </a:extLst>
-          </a:blip>
-          <a:srcRect/>
-          <a:stretch>
-            <a:fillRect/>
-          </a:stretch>
-        </p:blipFill>
-        <p:spPr bwMode="auto">
-          <a:xfrm>
-            <a:off x="4651516" y="1754685"/>
-            <a:ext cx="2888968" cy="3348629"/>
-          </a:xfrm>
-          <a:prstGeom prst="rect">
-            <a:avLst/>
-          </a:prstGeom>
-          <a:noFill/>
-          <a:extLst>
-            <a:ext uri="{909E8E84-426E-40DD-AFC4-6F175D3DCCD1}">
-              <a14:hiddenFill xmlns:a14="http://schemas.microsoft.com/office/drawing/2010/main">
-                <a:solidFill>
-                  <a:srgbClr val="FFFFFF"/>
-                </a:solidFill>
-              </a14:hiddenFill>
-            </a:ext>
-          </a:extLst>
-        </p:spPr>
-      </p:pic>
     </p:spTree>
     <p:extLst>
       <p:ext uri="{BB962C8B-B14F-4D97-AF65-F5344CB8AC3E}">
-        <p14:creationId xmlns:p14="http://schemas.microsoft.com/office/powerpoint/2010/main" val="3356134786"/>
+        <p14:creationId xmlns:p14="http://schemas.microsoft.com/office/powerpoint/2010/main" val="1856205587"/>
       </p:ext>
     </p:extLst>
   </p:cSld>
@@ -10223,238 +10485,55 @@
       </p:grpSpPr>
       <p:pic>
         <p:nvPicPr>
-          <p:cNvPr id="4" name="Picture 3">
+          <p:cNvPr id="1028" name="Picture 4" descr="Project Jupyter - Wikipedia">
             <a:extLst>
               <a:ext uri="{FF2B5EF4-FFF2-40B4-BE49-F238E27FC236}">
-                <a16:creationId xmlns:a16="http://schemas.microsoft.com/office/drawing/2014/main" id="{539F426C-5A30-441C-B0C2-04ADFC8CE324}"/>
+                <a16:creationId xmlns:a16="http://schemas.microsoft.com/office/drawing/2014/main" id="{D47FA80A-C63A-4289-A2E5-C40C439B39C6}"/>
               </a:ext>
             </a:extLst>
           </p:cNvPr>
           <p:cNvPicPr>
-            <a:picLocks noChangeAspect="1"/>
+            <a:picLocks noChangeAspect="1" noChangeArrowheads="1"/>
           </p:cNvPicPr>
           <p:nvPr/>
         </p:nvPicPr>
         <p:blipFill>
-          <a:blip r:embed="rId3"/>
+          <a:blip r:embed="rId3">
+            <a:extLst>
+              <a:ext uri="{28A0092B-C50C-407E-A947-70E740481C1C}">
+                <a14:useLocalDpi xmlns:a14="http://schemas.microsoft.com/office/drawing/2010/main" val="0"/>
+              </a:ext>
+            </a:extLst>
+          </a:blip>
+          <a:srcRect/>
           <a:stretch>
             <a:fillRect/>
           </a:stretch>
         </p:blipFill>
-        <p:spPr>
+        <p:spPr bwMode="auto">
           <a:xfrm>
-            <a:off x="0" y="365760"/>
-            <a:ext cx="3233668" cy="805144"/>
-          </a:xfrm>
-          <a:prstGeom prst="rect">
-            <a:avLst/>
-          </a:prstGeom>
-        </p:spPr>
-      </p:pic>
-      <p:sp>
-        <p:nvSpPr>
-          <p:cNvPr id="5" name="Title 1">
-            <a:extLst>
-              <a:ext uri="{FF2B5EF4-FFF2-40B4-BE49-F238E27FC236}">
-                <a16:creationId xmlns:a16="http://schemas.microsoft.com/office/drawing/2014/main" id="{B1DC3772-3811-4D33-8C3E-73B5414A38FE}"/>
-              </a:ext>
-            </a:extLst>
-          </p:cNvPr>
-          <p:cNvSpPr txBox="1">
-            <a:spLocks/>
-          </p:cNvSpPr>
-          <p:nvPr/>
-        </p:nvSpPr>
-        <p:spPr>
-          <a:xfrm>
-            <a:off x="0" y="2883665"/>
-            <a:ext cx="12192000" cy="1090669"/>
+            <a:off x="4651516" y="1754685"/>
+            <a:ext cx="2888968" cy="3348629"/>
           </a:xfrm>
           <a:prstGeom prst="rect">
             <a:avLst/>
           </a:prstGeom>
           <a:noFill/>
+          <a:extLst>
+            <a:ext uri="{909E8E84-426E-40DD-AFC4-6F175D3DCCD1}">
+              <a14:hiddenFill xmlns:a14="http://schemas.microsoft.com/office/drawing/2010/main">
+                <a:solidFill>
+                  <a:srgbClr val="FFFFFF"/>
+                </a:solidFill>
+              </a14:hiddenFill>
+            </a:ext>
+          </a:extLst>
         </p:spPr>
-        <p:txBody>
-          <a:bodyPr vert="horz" lIns="91440" tIns="45720" rIns="91440" bIns="45720" rtlCol="0" anchor="b">
-            <a:noAutofit/>
-          </a:bodyPr>
-          <a:lstStyle>
-            <a:lvl1pPr algn="l" defTabSz="914400" rtl="0" eaLnBrk="1" latinLnBrk="0" hangingPunct="1">
-              <a:lnSpc>
-                <a:spcPct val="90000"/>
-              </a:lnSpc>
-              <a:spcBef>
-                <a:spcPct val="0"/>
-              </a:spcBef>
-              <a:buNone/>
-              <a:defRPr sz="6000" kern="1200">
-                <a:solidFill>
-                  <a:schemeClr val="tx1"/>
-                </a:solidFill>
-                <a:latin typeface="+mj-lt"/>
-                <a:ea typeface="+mj-ea"/>
-                <a:cs typeface="+mj-cs"/>
-              </a:defRPr>
-            </a:lvl1pPr>
-          </a:lstStyle>
-          <a:p>
-            <a:pPr algn="ctr"/>
-            <a:br>
-              <a:rPr lang="en-US" sz="3600" dirty="0">
-                <a:solidFill>
-                  <a:schemeClr val="tx1">
-                    <a:lumMod val="65000"/>
-                    <a:lumOff val="35000"/>
-                  </a:schemeClr>
-                </a:solidFill>
-              </a:rPr>
-            </a:br>
-            <a:br>
-              <a:rPr lang="en-US" sz="3600" dirty="0">
-                <a:solidFill>
-                  <a:schemeClr val="tx1">
-                    <a:lumMod val="65000"/>
-                    <a:lumOff val="35000"/>
-                  </a:schemeClr>
-                </a:solidFill>
-              </a:rPr>
-            </a:br>
-            <a:br>
-              <a:rPr lang="en-US" sz="3600" dirty="0">
-                <a:solidFill>
-                  <a:schemeClr val="tx1">
-                    <a:lumMod val="65000"/>
-                    <a:lumOff val="35000"/>
-                  </a:schemeClr>
-                </a:solidFill>
-              </a:rPr>
-            </a:br>
-            <a:br>
-              <a:rPr lang="en-US" sz="3600" dirty="0">
-                <a:solidFill>
-                  <a:schemeClr val="tx1">
-                    <a:lumMod val="65000"/>
-                    <a:lumOff val="35000"/>
-                  </a:schemeClr>
-                </a:solidFill>
-              </a:rPr>
-            </a:br>
-            <a:br>
-              <a:rPr lang="en-US" sz="3600" dirty="0">
-                <a:solidFill>
-                  <a:schemeClr val="tx1">
-                    <a:lumMod val="65000"/>
-                    <a:lumOff val="35000"/>
-                  </a:schemeClr>
-                </a:solidFill>
-              </a:rPr>
-            </a:br>
-            <a:br>
-              <a:rPr lang="en-US" sz="3600" dirty="0">
-                <a:solidFill>
-                  <a:schemeClr val="tx1">
-                    <a:lumMod val="65000"/>
-                    <a:lumOff val="35000"/>
-                  </a:schemeClr>
-                </a:solidFill>
-              </a:rPr>
-            </a:br>
-            <a:br>
-              <a:rPr lang="en-US" sz="3600" dirty="0">
-                <a:solidFill>
-                  <a:schemeClr val="tx1">
-                    <a:lumMod val="65000"/>
-                    <a:lumOff val="35000"/>
-                  </a:schemeClr>
-                </a:solidFill>
-              </a:rPr>
-            </a:br>
-            <a:br>
-              <a:rPr lang="en-US" sz="3600" dirty="0">
-                <a:solidFill>
-                  <a:schemeClr val="tx1">
-                    <a:lumMod val="65000"/>
-                    <a:lumOff val="35000"/>
-                  </a:schemeClr>
-                </a:solidFill>
-              </a:rPr>
-            </a:br>
-            <a:r>
-              <a:rPr lang="en-US" sz="3600" dirty="0">
-                <a:solidFill>
-                  <a:schemeClr val="tx1">
-                    <a:lumMod val="65000"/>
-                    <a:lumOff val="35000"/>
-                  </a:schemeClr>
-                </a:solidFill>
-              </a:rPr>
-              <a:t>     </a:t>
-            </a:r>
-            <a:r>
-              <a:rPr lang="en-US" sz="3600" dirty="0">
-                <a:solidFill>
-                  <a:schemeClr val="tx1">
-                    <a:lumMod val="65000"/>
-                    <a:lumOff val="35000"/>
-                  </a:schemeClr>
-                </a:solidFill>
-                <a:latin typeface="Palatino Linotype" panose="02040502050505030304" pitchFamily="18" charset="0"/>
-              </a:rPr>
-              <a:t>(A Simple Classification Model)</a:t>
-            </a:r>
-            <a:br>
-              <a:rPr lang="en-US" sz="3600" dirty="0">
-                <a:solidFill>
-                  <a:schemeClr val="tx1">
-                    <a:lumMod val="65000"/>
-                    <a:lumOff val="35000"/>
-                  </a:schemeClr>
-                </a:solidFill>
-                <a:latin typeface="Palatino Linotype" panose="02040502050505030304" pitchFamily="18" charset="0"/>
-              </a:rPr>
-            </a:br>
-            <a:r>
-              <a:rPr lang="en-US" sz="3600" dirty="0">
-                <a:solidFill>
-                  <a:schemeClr val="tx1">
-                    <a:lumMod val="65000"/>
-                    <a:lumOff val="35000"/>
-                  </a:schemeClr>
-                </a:solidFill>
-                <a:latin typeface="Palatino Linotype" panose="02040502050505030304" pitchFamily="18" charset="0"/>
-              </a:rPr>
-              <a:t>     </a:t>
-            </a:r>
-            <a:r>
-              <a:rPr lang="en-US" sz="2800" dirty="0">
-                <a:solidFill>
-                  <a:schemeClr val="tx1">
-                    <a:lumMod val="65000"/>
-                    <a:lumOff val="35000"/>
-                  </a:schemeClr>
-                </a:solidFill>
-                <a:latin typeface="Palatino Linotype" panose="02040502050505030304" pitchFamily="18" charset="0"/>
-              </a:rPr>
-              <a:t>01.1_resnet.ipynb</a:t>
-            </a:r>
-            <a:endParaRPr lang="en-US" sz="2800" dirty="0">
-              <a:solidFill>
-                <a:schemeClr val="tx1">
-                  <a:lumMod val="65000"/>
-                  <a:lumOff val="35000"/>
-                </a:schemeClr>
-              </a:solidFill>
-              <a:latin typeface="Palatino Linotype" panose="02040502050505030304" pitchFamily="18" charset="0"/>
-              <a:cs typeface="Segoe UI Light" panose="020B0502040204020203" pitchFamily="34" charset="0"/>
-            </a:endParaRPr>
-          </a:p>
-        </p:txBody>
-      </p:sp>
+      </p:pic>
     </p:spTree>
     <p:extLst>
       <p:ext uri="{BB962C8B-B14F-4D97-AF65-F5344CB8AC3E}">
-        <p14:creationId xmlns:p14="http://schemas.microsoft.com/office/powerpoint/2010/main" val="300486163"/>
+        <p14:creationId xmlns:p14="http://schemas.microsoft.com/office/powerpoint/2010/main" val="3356134786"/>
       </p:ext>
     </p:extLst>
   </p:cSld>

</xml_diff>

<commit_message>
Updated colors and notes in the Resnet model slide.
</commit_message>
<xml_diff>
--- a/presentations/01_deep_learn_intro.pptx
+++ b/presentations/01_deep_learn_intro.pptx
@@ -229,7 +229,7 @@
           <a:p>
             <a:fld id="{FD93C9B2-20F6-4DB1-B471-224337D0AC79}" type="datetimeFigureOut">
               <a:rPr lang="en-US" smtClean="0"/>
-              <a:t>6/20/2022</a:t>
+              <a:t>6/21/2022</a:t>
             </a:fld>
             <a:endParaRPr lang="en-US"/>
           </a:p>
@@ -753,7 +753,7 @@
             </a:pPr>
             <a:r>
               <a:rPr lang="en-US" dirty="0"/>
-              <a:t>Design a deep learning model called ResNet with 50 layers and capable of distinguishing between 1000 categories of images</a:t>
+              <a:t>Design a deep learning model called ResNet with 50 layers and capable of distinguishing between 1000 categories of images.  This box is colored black because the inner workings of deep models are often opaque, not amenable to inquiry.  Also, we do not discuss the technical details of the Resnet50 architecture here.</a:t>
             </a:r>
           </a:p>
           <a:p>
@@ -762,7 +762,7 @@
             </a:pPr>
             <a:r>
               <a:rPr lang="en-US" dirty="0"/>
-              <a:t>Train the ResNet model using the ImageNet dataset which has 14 million images</a:t>
+              <a:t>Train the ResNet model using the ImageNet dataset which has 14 million images.  The ImageNet dataset has a distinguished history in the field of AI, being one of the largest and earliest training datasets.</a:t>
             </a:r>
           </a:p>
           <a:p>
@@ -771,8 +771,20 @@
             </a:pPr>
             <a:r>
               <a:rPr lang="en-US" dirty="0"/>
-              <a:t>Submit our pizza image to the model to see if it classifies it correctly.</a:t>
-            </a:r>
+              <a:t>Move the trained model to production.  Submit a pizza image to the model to see if it classifies it correctly.</a:t>
+            </a:r>
+          </a:p>
+          <a:p>
+            <a:pPr marL="0" indent="0">
+              <a:buNone/>
+            </a:pPr>
+            <a:endParaRPr lang="en-US" dirty="0"/>
+          </a:p>
+          <a:p>
+            <a:pPr marL="0" indent="0">
+              <a:buNone/>
+            </a:pPr>
+            <a:endParaRPr lang="en-US" dirty="0"/>
           </a:p>
         </p:txBody>
       </p:sp>
@@ -4402,7 +4414,7 @@
           <a:p>
             <a:fld id="{C3F78080-8D0A-4BE8-A5B4-CB115102D524}" type="datetimeFigureOut">
               <a:rPr lang="en-US" smtClean="0"/>
-              <a:t>6/20/2022</a:t>
+              <a:t>6/21/2022</a:t>
             </a:fld>
             <a:endParaRPr lang="en-US"/>
           </a:p>
@@ -4600,7 +4612,7 @@
           <a:p>
             <a:fld id="{C3F78080-8D0A-4BE8-A5B4-CB115102D524}" type="datetimeFigureOut">
               <a:rPr lang="en-US" smtClean="0"/>
-              <a:t>6/20/2022</a:t>
+              <a:t>6/21/2022</a:t>
             </a:fld>
             <a:endParaRPr lang="en-US"/>
           </a:p>
@@ -4808,7 +4820,7 @@
           <a:p>
             <a:fld id="{C3F78080-8D0A-4BE8-A5B4-CB115102D524}" type="datetimeFigureOut">
               <a:rPr lang="en-US" smtClean="0"/>
-              <a:t>6/20/2022</a:t>
+              <a:t>6/21/2022</a:t>
             </a:fld>
             <a:endParaRPr lang="en-US"/>
           </a:p>
@@ -5006,7 +5018,7 @@
           <a:p>
             <a:fld id="{C3F78080-8D0A-4BE8-A5B4-CB115102D524}" type="datetimeFigureOut">
               <a:rPr lang="en-US" smtClean="0"/>
-              <a:t>6/20/2022</a:t>
+              <a:t>6/21/2022</a:t>
             </a:fld>
             <a:endParaRPr lang="en-US"/>
           </a:p>
@@ -5281,7 +5293,7 @@
           <a:p>
             <a:fld id="{C3F78080-8D0A-4BE8-A5B4-CB115102D524}" type="datetimeFigureOut">
               <a:rPr lang="en-US" smtClean="0"/>
-              <a:t>6/20/2022</a:t>
+              <a:t>6/21/2022</a:t>
             </a:fld>
             <a:endParaRPr lang="en-US"/>
           </a:p>
@@ -5546,7 +5558,7 @@
           <a:p>
             <a:fld id="{C3F78080-8D0A-4BE8-A5B4-CB115102D524}" type="datetimeFigureOut">
               <a:rPr lang="en-US" smtClean="0"/>
-              <a:t>6/20/2022</a:t>
+              <a:t>6/21/2022</a:t>
             </a:fld>
             <a:endParaRPr lang="en-US"/>
           </a:p>
@@ -5958,7 +5970,7 @@
           <a:p>
             <a:fld id="{C3F78080-8D0A-4BE8-A5B4-CB115102D524}" type="datetimeFigureOut">
               <a:rPr lang="en-US" smtClean="0"/>
-              <a:t>6/20/2022</a:t>
+              <a:t>6/21/2022</a:t>
             </a:fld>
             <a:endParaRPr lang="en-US"/>
           </a:p>
@@ -6099,7 +6111,7 @@
           <a:p>
             <a:fld id="{C3F78080-8D0A-4BE8-A5B4-CB115102D524}" type="datetimeFigureOut">
               <a:rPr lang="en-US" smtClean="0"/>
-              <a:t>6/20/2022</a:t>
+              <a:t>6/21/2022</a:t>
             </a:fld>
             <a:endParaRPr lang="en-US"/>
           </a:p>
@@ -6212,7 +6224,7 @@
           <a:p>
             <a:fld id="{C3F78080-8D0A-4BE8-A5B4-CB115102D524}" type="datetimeFigureOut">
               <a:rPr lang="en-US" smtClean="0"/>
-              <a:t>6/20/2022</a:t>
+              <a:t>6/21/2022</a:t>
             </a:fld>
             <a:endParaRPr lang="en-US"/>
           </a:p>
@@ -6523,7 +6535,7 @@
           <a:p>
             <a:fld id="{C3F78080-8D0A-4BE8-A5B4-CB115102D524}" type="datetimeFigureOut">
               <a:rPr lang="en-US" smtClean="0"/>
-              <a:t>6/20/2022</a:t>
+              <a:t>6/21/2022</a:t>
             </a:fld>
             <a:endParaRPr lang="en-US"/>
           </a:p>
@@ -6811,7 +6823,7 @@
           <a:p>
             <a:fld id="{C3F78080-8D0A-4BE8-A5B4-CB115102D524}" type="datetimeFigureOut">
               <a:rPr lang="en-US" smtClean="0"/>
-              <a:t>6/20/2022</a:t>
+              <a:t>6/21/2022</a:t>
             </a:fld>
             <a:endParaRPr lang="en-US"/>
           </a:p>
@@ -7052,7 +7064,7 @@
           <a:p>
             <a:fld id="{C3F78080-8D0A-4BE8-A5B4-CB115102D524}" type="datetimeFigureOut">
               <a:rPr lang="en-US" smtClean="0"/>
-              <a:t>6/20/2022</a:t>
+              <a:t>6/21/2022</a:t>
             </a:fld>
             <a:endParaRPr lang="en-US"/>
           </a:p>
@@ -7669,8 +7681,8 @@
         </p:blipFill>
         <p:spPr>
           <a:xfrm>
-            <a:off x="4779107" y="1838194"/>
-            <a:ext cx="2633784" cy="3181611"/>
+            <a:off x="4938534" y="2030782"/>
+            <a:ext cx="2314931" cy="2796436"/>
           </a:xfrm>
           <a:prstGeom prst="rect">
             <a:avLst/>
@@ -7735,8 +7747,9 @@
             <a:avLst/>
           </a:prstGeom>
           <a:solidFill>
-            <a:schemeClr val="accent3">
+            <a:schemeClr val="tx1">
               <a:lumMod val="75000"/>
+              <a:lumOff val="25000"/>
             </a:schemeClr>
           </a:solidFill>
           <a:effectLst>

</xml_diff>

<commit_message>
Updated intro presentation to align w/Amelia story in the notebook.
</commit_message>
<xml_diff>
--- a/presentations/01_deep_learn_intro.pptx
+++ b/presentations/01_deep_learn_intro.pptx
@@ -669,7 +669,7 @@
             </a:pPr>
             <a:r>
               <a:rPr lang="en-US" dirty="0"/>
-              <a:t>Design a deep learning model called ResNet with 50 layers and capable of distinguishing between 1000 categories of images.  This box is colored black because the inner workings of deep models are often opaque, not amenable to inquiry.  Also, we do not discuss the technical details of the Resnet50 architecture here.</a:t>
+              <a:t>The first step is to design a deep learning model.  In this case, the ResNet50 architecture, as its name suggest, consists if 50 layers.  The box picture here is black because the inner workings of a deep neural network is largely hidden.  This is known as the black-box problem.  Also, we do not discuss the technical details of the architecture here.</a:t>
             </a:r>
           </a:p>
           <a:p>
@@ -678,15 +678,7 @@
             </a:pPr>
             <a:r>
               <a:rPr lang="en-US" dirty="0"/>
-              <a:t>Train the ResNet model using the ImageNet dataset.  </a:t>
-            </a:r>
-            <a:r>
-              <a:rPr lang="en-US"/>
-              <a:t>This dataset </a:t>
-            </a:r>
-            <a:r>
-              <a:rPr lang="en-US" dirty="0"/>
-              <a:t>has a distinguished history in the field of AI, being one of the largest and earliest training datasets.  Since 2010, it has been the dataset used for the ImageNet Large Scale Visual Recognition Challenge (ILSVRC).  AlexNet was the first deep neural network to blow away the competition in 2012.</a:t>
+              <a:t>The second step is to train the ResNet model using the ImageNet dataset.  This dataset has a distinguished history in the field of AI, being one of the largest and earliest training datasets.  Since 2010, it has been used for the ImageNet Large Scale Visual Recognition Challenge.  AlexNet was the first deep neural network to blow away the competition in 2012.</a:t>
             </a:r>
           </a:p>
           <a:p>
@@ -695,7 +687,7 @@
             </a:pPr>
             <a:r>
               <a:rPr lang="en-US" dirty="0"/>
-              <a:t>Move the trained model to production.  Submit a pizza image to the model to see if it classifies it correctly.</a:t>
+              <a:t>And finally, the last step is to move the trained model to production.  Submit a pizza image to the model to see if it classifies it correctly.</a:t>
             </a:r>
           </a:p>
           <a:p>
@@ -2830,8 +2822,8 @@
           <a:bodyPr/>
           <a:lstStyle/>
           <a:p>
-            <a:pPr marL="228600" indent="-228600">
-              <a:buAutoNum type="arabicPeriod"/>
+            <a:pPr marL="0" indent="0">
+              <a:buNone/>
             </a:pPr>
             <a:r>
               <a:rPr lang="en-US" sz="1100" dirty="0">
@@ -2842,8 +2834,21 @@
                   </a:schemeClr>
                 </a:solidFill>
               </a:rPr>
-              <a:t>Two essential questions…</a:t>
-            </a:r>
+              <a:t>Two essential questions:</a:t>
+            </a:r>
+          </a:p>
+          <a:p>
+            <a:pPr marL="0" indent="0">
+              <a:buNone/>
+            </a:pPr>
+            <a:endParaRPr lang="en-US" sz="1100" dirty="0">
+              <a:solidFill>
+                <a:schemeClr val="tx1">
+                  <a:lumMod val="75000"/>
+                  <a:lumOff val="25000"/>
+                </a:schemeClr>
+              </a:solidFill>
+            </a:endParaRPr>
           </a:p>
           <a:p>
             <a:pPr marL="228600" indent="-228600">
@@ -2859,22 +2864,6 @@
                 </a:solidFill>
               </a:rPr>
               <a:t>1st question:  Just as you can drive a car without understanding the laws of thermodynamics, you can drive neural networks without having to master the math (calculus) which underpin them.  Do not need a year of calculus…</a:t>
-            </a:r>
-          </a:p>
-          <a:p>
-            <a:pPr marL="228600" indent="-228600">
-              <a:buAutoNum type="arabicPeriod"/>
-            </a:pPr>
-            <a:r>
-              <a:rPr lang="en-US" sz="1100" dirty="0">
-                <a:solidFill>
-                  <a:schemeClr val="tx1">
-                    <a:lumMod val="75000"/>
-                    <a:lumOff val="25000"/>
-                  </a:schemeClr>
-                </a:solidFill>
-              </a:rPr>
-              <a:t>Higher level understanding – the various dials and gauges (hyperparameters) </a:t>
             </a:r>
           </a:p>
           <a:p>
@@ -4255,7 +4244,36 @@
           <a:bodyPr/>
           <a:lstStyle/>
           <a:p>
+            <a:r>
+              <a:rPr lang="en-US" dirty="0"/>
+              <a:t>Amelia, our tech-geek, teenaged heroine, is an extremely picky eater.  Some say she’s a pizza fanatic 🍕. When dinner rolls around, she only wants to come down from her bedroom if pizza is served.   To achieve that goal, Amelia has installed a hidden camera in the dining room.  Once dinner is set, the camera snaps a photo of the meal.  Now, she wants to develop an AI image recognition system to determine if pizza is on the menu or not. </a:t>
+            </a:r>
+          </a:p>
+          <a:p>
             <a:endParaRPr lang="en-US" dirty="0"/>
+          </a:p>
+          <a:p>
+            <a:r>
+              <a:rPr lang="en-US" dirty="0"/>
+              <a:t>After doing some research, Amelia finds </a:t>
+            </a:r>
+            <a:r>
+              <a:rPr lang="en-US" b="1" dirty="0"/>
+              <a:t>ResNet</a:t>
+            </a:r>
+            <a:r>
+              <a:rPr lang="en-US" dirty="0"/>
+              <a:t>, a neural network classifier trained to identify a thousand different kinds of images, include pizza.  But how was ResNet created?  </a:t>
+            </a:r>
+          </a:p>
+          <a:p>
+            <a:endParaRPr lang="en-US" dirty="0"/>
+          </a:p>
+          <a:p>
+            <a:r>
+              <a:rPr lang="en-US" dirty="0"/>
+              <a:t>Let’s quickly review the three-step process of creating a ResNet like classifier.</a:t>
+            </a:r>
           </a:p>
         </p:txBody>
       </p:sp>
@@ -11776,7 +11794,7 @@
         </p:nvSpPr>
         <p:spPr>
           <a:xfrm>
-            <a:off x="0" y="365127"/>
+            <a:off x="0" y="352601"/>
             <a:ext cx="12191999" cy="827416"/>
           </a:xfrm>
           <a:prstGeom prst="rect">
@@ -11813,7 +11831,7 @@
                 <a:latin typeface="Palatino Linotype" panose="02040502050505030304" pitchFamily="18" charset="0"/>
                 <a:cs typeface="Segoe UI Light" panose="020B0502040204020203" pitchFamily="34" charset="0"/>
               </a:rPr>
-              <a:t>What is this?</a:t>
+              <a:t>Amelia’s Pizza Obsession</a:t>
             </a:r>
           </a:p>
         </p:txBody>
@@ -11846,12 +11864,71 @@
         </p:blipFill>
         <p:spPr>
           <a:xfrm>
-            <a:off x="4938534" y="2030782"/>
+            <a:off x="7118063" y="2030782"/>
             <a:ext cx="2314931" cy="2796436"/>
           </a:xfrm>
           <a:prstGeom prst="rect">
             <a:avLst/>
           </a:prstGeom>
+          <a:ln w="3175">
+            <a:solidFill>
+              <a:schemeClr val="tx1">
+                <a:lumMod val="75000"/>
+                <a:lumOff val="25000"/>
+              </a:schemeClr>
+            </a:solidFill>
+          </a:ln>
+          <a:effectLst>
+            <a:outerShdw blurRad="50800" dist="38100" dir="2700000" algn="tl" rotWithShape="0">
+              <a:prstClr val="black">
+                <a:alpha val="40000"/>
+              </a:prstClr>
+            </a:outerShdw>
+          </a:effectLst>
+        </p:spPr>
+      </p:pic>
+      <p:pic>
+        <p:nvPicPr>
+          <p:cNvPr id="7" name="Picture 6" descr="A picture containing sky&#10;&#10;Description automatically generated">
+            <a:extLst>
+              <a:ext uri="{FF2B5EF4-FFF2-40B4-BE49-F238E27FC236}">
+                <a16:creationId xmlns:a16="http://schemas.microsoft.com/office/drawing/2014/main" id="{A2B75824-BB94-8718-A72E-B9A124C92F89}"/>
+              </a:ext>
+            </a:extLst>
+          </p:cNvPr>
+          <p:cNvPicPr>
+            <a:picLocks noChangeAspect="1"/>
+          </p:cNvPicPr>
+          <p:nvPr/>
+        </p:nvPicPr>
+        <p:blipFill>
+          <a:blip r:embed="rId4">
+            <a:extLst>
+              <a:ext uri="{28A0092B-C50C-407E-A947-70E740481C1C}">
+                <a14:useLocalDpi xmlns:a14="http://schemas.microsoft.com/office/drawing/2010/main" val="0"/>
+              </a:ext>
+            </a:extLst>
+          </a:blip>
+          <a:stretch>
+            <a:fillRect/>
+          </a:stretch>
+        </p:blipFill>
+        <p:spPr>
+          <a:xfrm>
+            <a:off x="3124522" y="2030782"/>
+            <a:ext cx="2411981" cy="2816829"/>
+          </a:xfrm>
+          <a:prstGeom prst="rect">
+            <a:avLst/>
+          </a:prstGeom>
+          <a:ln w="3175">
+            <a:solidFill>
+              <a:schemeClr val="tx1">
+                <a:lumMod val="75000"/>
+                <a:lumOff val="25000"/>
+              </a:schemeClr>
+            </a:solidFill>
+          </a:ln>
           <a:effectLst>
             <a:outerShdw blurRad="50800" dist="38100" dir="2700000" algn="tl" rotWithShape="0">
               <a:prstClr val="black">

</xml_diff>